<commit_message>
fixed typo in decaf LLVM slides
</commit_message>
<xml_diff>
--- a/assets/ppt/codegen/decafLLVM.pptx
+++ b/assets/ppt/codegen/decafLLVM.pptx
@@ -7930,19 +7930,11 @@
             </a:r>
             <a:r>
               <a:rPr lang="en-US" sz="2800" dirty="0" err="1"/>
-              <a:t>llvm</a:t>
+              <a:t>TheContext</a:t>
             </a:r>
             <a:r>
               <a:rPr lang="en-US" sz="2800" dirty="0"/>
-              <a:t>::</a:t>
-            </a:r>
-            <a:r>
-              <a:rPr lang="en-US" sz="2800" dirty="0" err="1"/>
-              <a:t>getGlobalContext</a:t>
-            </a:r>
-            <a:r>
-              <a:rPr lang="en-US" sz="2800" dirty="0"/>
-              <a:t>(), </a:t>
+              <a:t>, </a:t>
             </a:r>
           </a:p>
           <a:p>

</xml_diff>

<commit_message>
updated decaf LLVM slides
</commit_message>
<xml_diff>
--- a/assets/ppt/codegen/decafLLVM.pptx
+++ b/assets/ppt/codegen/decafLLVM.pptx
@@ -5,10 +5,10 @@
     <p:sldMasterId id="2147483660" r:id="rId1"/>
   </p:sldMasterIdLst>
   <p:notesMasterIdLst>
-    <p:notesMasterId r:id="rId15"/>
+    <p:notesMasterId r:id="rId16"/>
   </p:notesMasterIdLst>
   <p:handoutMasterIdLst>
-    <p:handoutMasterId r:id="rId16"/>
+    <p:handoutMasterId r:id="rId17"/>
   </p:handoutMasterIdLst>
   <p:sldIdLst>
     <p:sldId id="257" r:id="rId2"/>
@@ -20,10 +20,11 @@
     <p:sldId id="262" r:id="rId8"/>
     <p:sldId id="264" r:id="rId9"/>
     <p:sldId id="263" r:id="rId10"/>
-    <p:sldId id="265" r:id="rId11"/>
-    <p:sldId id="266" r:id="rId12"/>
-    <p:sldId id="267" r:id="rId13"/>
-    <p:sldId id="268" r:id="rId14"/>
+    <p:sldId id="270" r:id="rId11"/>
+    <p:sldId id="265" r:id="rId12"/>
+    <p:sldId id="266" r:id="rId13"/>
+    <p:sldId id="267" r:id="rId14"/>
+    <p:sldId id="268" r:id="rId15"/>
   </p:sldIdLst>
   <p:sldSz cx="9144000" cy="6858000" type="screen4x3"/>
   <p:notesSz cx="6858000" cy="9144000"/>
@@ -254,7 +255,7 @@
             <a:fld id="{4B27B186-84AC-564A-BA3D-0F3633C8B4F8}" type="datetimeFigureOut">
               <a:rPr lang="en-US" smtClean="0"/>
               <a:pPr/>
-              <a:t>7/2/19</a:t>
+              <a:t>7/4/19</a:t>
             </a:fld>
             <a:endParaRPr lang="en-US"/>
           </a:p>
@@ -4074,12 +4075,18 @@
       </p:grpSpPr>
       <p:sp>
         <p:nvSpPr>
-          <p:cNvPr id="2" name="Title 1"/>
+          <p:cNvPr id="2" name="Slide Number Placeholder 1">
+            <a:extLst>
+              <a:ext uri="{FF2B5EF4-FFF2-40B4-BE49-F238E27FC236}">
+                <a16:creationId xmlns:a16="http://schemas.microsoft.com/office/drawing/2014/main" id="{F023E20E-3008-1440-97BE-4E3DBFBF20A9}"/>
+              </a:ext>
+            </a:extLst>
+          </p:cNvPr>
           <p:cNvSpPr>
             <a:spLocks noGrp="1"/>
           </p:cNvSpPr>
           <p:nvPr>
-            <p:ph type="title"/>
+            <p:ph type="sldNum" sz="quarter" idx="11"/>
           </p:nvPr>
         </p:nvSpPr>
         <p:spPr/>
@@ -4087,163 +4094,61 @@
           <a:bodyPr/>
           <a:lstStyle/>
           <a:p>
-            <a:r>
-              <a:rPr lang="en-US" dirty="0"/>
-              <a:t>“</a:t>
-            </a:r>
-            <a:r>
-              <a:rPr lang="en-US" dirty="0" err="1"/>
-              <a:t>Backpatching</a:t>
-            </a:r>
-            <a:r>
-              <a:rPr lang="en-US" dirty="0"/>
-              <a:t>” in LLVM</a:t>
-            </a:r>
-          </a:p>
-        </p:txBody>
-      </p:sp>
-      <p:sp>
-        <p:nvSpPr>
-          <p:cNvPr id="3" name="Content Placeholder 2"/>
-          <p:cNvSpPr>
-            <a:spLocks noGrp="1"/>
-          </p:cNvSpPr>
-          <p:nvPr>
-            <p:ph idx="1"/>
-          </p:nvPr>
-        </p:nvSpPr>
-        <p:spPr/>
-        <p:txBody>
-          <a:bodyPr/>
-          <a:lstStyle/>
-          <a:p>
-            <a:r>
-              <a:rPr lang="en-US" dirty="0"/>
-              <a:t>Inside </a:t>
-            </a:r>
-            <a:r>
-              <a:rPr lang="en-US" dirty="0" err="1"/>
-              <a:t>IfStmt</a:t>
-            </a:r>
-            <a:r>
-              <a:rPr lang="en-US" dirty="0"/>
-              <a:t>-&gt;</a:t>
-            </a:r>
-            <a:r>
-              <a:rPr lang="en-US" dirty="0" err="1"/>
-              <a:t>Codegen</a:t>
-            </a:r>
-            <a:r>
-              <a:rPr lang="en-US" dirty="0"/>
-              <a:t>:</a:t>
-            </a:r>
-          </a:p>
-          <a:p>
-            <a:pPr lvl="1"/>
-            <a:r>
-              <a:rPr lang="en-US" dirty="0"/>
-              <a:t>Set up a new symbol table for code locations</a:t>
-            </a:r>
-          </a:p>
-          <a:p>
-            <a:pPr lvl="1"/>
-            <a:r>
-              <a:rPr lang="en-US" dirty="0"/>
-              <a:t>Create a new </a:t>
-            </a:r>
-            <a:r>
-              <a:rPr lang="en-US" dirty="0" err="1"/>
-              <a:t>BasicBlock</a:t>
-            </a:r>
-            <a:r>
-              <a:rPr lang="en-US" dirty="0"/>
-              <a:t> called </a:t>
-            </a:r>
-            <a:r>
-              <a:rPr lang="en-US" dirty="0" err="1"/>
-              <a:t>iftrue</a:t>
-            </a:r>
-            <a:endParaRPr lang="en-US" dirty="0"/>
-          </a:p>
-          <a:p>
-            <a:pPr lvl="1"/>
-            <a:r>
-              <a:rPr lang="en-US" dirty="0"/>
-              <a:t>Create a new </a:t>
-            </a:r>
-            <a:r>
-              <a:rPr lang="en-US" dirty="0" err="1"/>
-              <a:t>BasicBlock</a:t>
-            </a:r>
-            <a:r>
-              <a:rPr lang="en-US" dirty="0"/>
-              <a:t> called </a:t>
-            </a:r>
-            <a:r>
-              <a:rPr lang="en-US" dirty="0" err="1"/>
-              <a:t>iffalse</a:t>
-            </a:r>
-            <a:endParaRPr lang="en-US" dirty="0"/>
-          </a:p>
-          <a:p>
-            <a:pPr lvl="1"/>
-            <a:r>
-              <a:rPr lang="en-US" dirty="0"/>
-              <a:t>Create a new </a:t>
-            </a:r>
-            <a:r>
-              <a:rPr lang="en-US" dirty="0" err="1"/>
-              <a:t>BasicBlock</a:t>
-            </a:r>
-            <a:r>
-              <a:rPr lang="en-US" dirty="0"/>
-              <a:t> called end</a:t>
-            </a:r>
-          </a:p>
-          <a:p>
-            <a:pPr lvl="1"/>
-            <a:r>
-              <a:rPr lang="en-US" dirty="0"/>
-              <a:t>Subsequent code generation anywhere else can insert code into these code locations</a:t>
-            </a:r>
-          </a:p>
-          <a:p>
-            <a:pPr lvl="1"/>
-            <a:r>
-              <a:rPr lang="en-US" dirty="0"/>
-              <a:t>Can be used for break, continue, short-circuits, etc.</a:t>
-            </a:r>
-          </a:p>
-        </p:txBody>
-      </p:sp>
-      <p:sp>
-        <p:nvSpPr>
-          <p:cNvPr id="5" name="Slide Number Placeholder 4"/>
-          <p:cNvSpPr>
-            <a:spLocks noGrp="1"/>
-          </p:cNvSpPr>
-          <p:nvPr>
-            <p:ph type="sldNum" sz="quarter" idx="12"/>
-          </p:nvPr>
-        </p:nvSpPr>
-        <p:spPr/>
-        <p:txBody>
-          <a:bodyPr/>
-          <a:lstStyle/>
-          <a:p>
-            <a:fld id="{2B2C104B-E445-B247-BB91-C10CB560B869}" type="slidenum">
+            <a:fld id="{95FC67CD-6733-D04F-B9BE-AD105949F24E}" type="slidenum">
               <a:rPr lang="en-US" smtClean="0"/>
               <a:pPr/>
               <a:t>10</a:t>
             </a:fld>
-            <a:endParaRPr lang="en-US"/>
+            <a:endParaRPr lang="en-US" dirty="0"/>
+          </a:p>
+        </p:txBody>
+      </p:sp>
+      <p:sp>
+        <p:nvSpPr>
+          <p:cNvPr id="3" name="Rectangle 2">
+            <a:extLst>
+              <a:ext uri="{FF2B5EF4-FFF2-40B4-BE49-F238E27FC236}">
+                <a16:creationId xmlns:a16="http://schemas.microsoft.com/office/drawing/2014/main" id="{FD26A773-1259-7941-88D5-64B5F2ADED33}"/>
+              </a:ext>
+            </a:extLst>
+          </p:cNvPr>
+          <p:cNvSpPr/>
+          <p:nvPr/>
+        </p:nvSpPr>
+        <p:spPr>
+          <a:xfrm>
+            <a:off x="2062819" y="3044279"/>
+            <a:ext cx="5018361" cy="769441"/>
+          </a:xfrm>
+          <a:prstGeom prst="rect">
+            <a:avLst/>
+          </a:prstGeom>
+        </p:spPr>
+        <p:txBody>
+          <a:bodyPr wrap="none">
+            <a:spAutoFit/>
+          </a:bodyPr>
+          <a:lstStyle/>
+          <a:p>
+            <a:r>
+              <a:rPr lang="en-CA" sz="4400" dirty="0">
+                <a:solidFill>
+                  <a:srgbClr val="000000"/>
+                </a:solidFill>
+                <a:latin typeface="+mn-lt"/>
+              </a:rPr>
+              <a:t>Control Flow in LLVM</a:t>
+            </a:r>
+            <a:endParaRPr lang="en-US" sz="4400" dirty="0">
+              <a:latin typeface="+mn-lt"/>
+            </a:endParaRPr>
           </a:p>
         </p:txBody>
       </p:sp>
     </p:spTree>
     <p:extLst>
       <p:ext uri="{BB962C8B-B14F-4D97-AF65-F5344CB8AC3E}">
-        <p14:creationId xmlns:p14="http://schemas.microsoft.com/office/powerpoint/2010/main" val="4112616064"/>
+        <p14:creationId xmlns:p14="http://schemas.microsoft.com/office/powerpoint/2010/main" val="3314715340"/>
       </p:ext>
     </p:extLst>
   </p:cSld>
@@ -4290,12 +4195,126 @@
               <a:t>“</a:t>
             </a:r>
             <a:r>
-              <a:rPr lang="en-US"/>
+              <a:rPr lang="en-US" dirty="0" err="1"/>
               <a:t>Backpatching</a:t>
             </a:r>
             <a:r>
               <a:rPr lang="en-US" dirty="0"/>
               <a:t>” in LLVM</a:t>
+            </a:r>
+          </a:p>
+        </p:txBody>
+      </p:sp>
+      <p:sp>
+        <p:nvSpPr>
+          <p:cNvPr id="3" name="Content Placeholder 2"/>
+          <p:cNvSpPr>
+            <a:spLocks noGrp="1"/>
+          </p:cNvSpPr>
+          <p:nvPr>
+            <p:ph idx="1"/>
+          </p:nvPr>
+        </p:nvSpPr>
+        <p:spPr/>
+        <p:txBody>
+          <a:bodyPr/>
+          <a:lstStyle/>
+          <a:p>
+            <a:r>
+              <a:rPr lang="en-US" dirty="0"/>
+              <a:t>Inside </a:t>
+            </a:r>
+            <a:r>
+              <a:rPr lang="en-US" dirty="0" err="1"/>
+              <a:t>IfStmt</a:t>
+            </a:r>
+            <a:r>
+              <a:rPr lang="en-US" dirty="0"/>
+              <a:t>-&gt;</a:t>
+            </a:r>
+            <a:r>
+              <a:rPr lang="en-US" dirty="0" err="1"/>
+              <a:t>Codegen</a:t>
+            </a:r>
+            <a:r>
+              <a:rPr lang="en-US" dirty="0"/>
+              <a:t>:</a:t>
+            </a:r>
+          </a:p>
+          <a:p>
+            <a:pPr lvl="1"/>
+            <a:r>
+              <a:rPr lang="en-US" dirty="0"/>
+              <a:t>Set up a new symbol table for code locations</a:t>
+            </a:r>
+          </a:p>
+          <a:p>
+            <a:pPr lvl="1"/>
+            <a:r>
+              <a:rPr lang="en-US" dirty="0"/>
+              <a:t>Create a new </a:t>
+            </a:r>
+            <a:r>
+              <a:rPr lang="en-US" dirty="0" err="1"/>
+              <a:t>BasicBlock</a:t>
+            </a:r>
+            <a:r>
+              <a:rPr lang="en-US" dirty="0"/>
+              <a:t> called </a:t>
+            </a:r>
+            <a:r>
+              <a:rPr lang="en-US" dirty="0" err="1"/>
+              <a:t>iftrue</a:t>
+            </a:r>
+            <a:endParaRPr lang="en-US" dirty="0"/>
+          </a:p>
+          <a:p>
+            <a:pPr lvl="1"/>
+            <a:r>
+              <a:rPr lang="en-US" dirty="0"/>
+              <a:t>Create a new </a:t>
+            </a:r>
+            <a:r>
+              <a:rPr lang="en-US" dirty="0" err="1"/>
+              <a:t>BasicBlock</a:t>
+            </a:r>
+            <a:r>
+              <a:rPr lang="en-US" dirty="0"/>
+              <a:t> called </a:t>
+            </a:r>
+            <a:r>
+              <a:rPr lang="en-US" dirty="0" err="1"/>
+              <a:t>iffalse</a:t>
+            </a:r>
+            <a:endParaRPr lang="en-US" dirty="0"/>
+          </a:p>
+          <a:p>
+            <a:pPr lvl="1"/>
+            <a:r>
+              <a:rPr lang="en-US" dirty="0"/>
+              <a:t>Create a new </a:t>
+            </a:r>
+            <a:r>
+              <a:rPr lang="en-US" dirty="0" err="1"/>
+              <a:t>BasicBlock</a:t>
+            </a:r>
+            <a:r>
+              <a:rPr lang="en-US" dirty="0"/>
+              <a:t> called end</a:t>
+            </a:r>
+          </a:p>
+          <a:p>
+            <a:pPr lvl="1"/>
+            <a:r>
+              <a:rPr lang="en-US" dirty="0"/>
+              <a:t>Subsequent code generation anywhere else can insert code into these code locations</a:t>
+            </a:r>
+          </a:p>
+          <a:p>
+            <a:pPr lvl="1"/>
+            <a:r>
+              <a:rPr lang="en-US" dirty="0"/>
+              <a:t>Can be used for break, continue, short-circuits, etc.</a:t>
             </a:r>
           </a:p>
         </p:txBody>
@@ -4324,406 +4343,10 @@
           </a:p>
         </p:txBody>
       </p:sp>
-      <p:sp>
-        <p:nvSpPr>
-          <p:cNvPr id="6" name="TextBox 5"/>
-          <p:cNvSpPr txBox="1"/>
-          <p:nvPr/>
-        </p:nvSpPr>
-        <p:spPr>
-          <a:xfrm>
-            <a:off x="1187624" y="2348880"/>
-            <a:ext cx="6671868" cy="1569660"/>
-          </a:xfrm>
-          <a:prstGeom prst="rect">
-            <a:avLst/>
-          </a:prstGeom>
-        </p:spPr>
-        <p:style>
-          <a:lnRef idx="1">
-            <a:schemeClr val="accent6"/>
-          </a:lnRef>
-          <a:fillRef idx="2">
-            <a:schemeClr val="accent6"/>
-          </a:fillRef>
-          <a:effectRef idx="1">
-            <a:schemeClr val="accent6"/>
-          </a:effectRef>
-          <a:fontRef idx="minor">
-            <a:schemeClr val="dk1"/>
-          </a:fontRef>
-        </p:style>
-        <p:txBody>
-          <a:bodyPr wrap="none" rtlCol="0">
-            <a:spAutoFit/>
-          </a:bodyPr>
-          <a:lstStyle/>
-          <a:p>
-            <a:r>
-              <a:rPr lang="en-US" dirty="0">
-                <a:solidFill>
-                  <a:srgbClr val="000000"/>
-                </a:solidFill>
-              </a:rPr>
-              <a:t>  /* </a:t>
-            </a:r>
-            <a:r>
-              <a:rPr lang="en-US" b="1" dirty="0" err="1">
-                <a:solidFill>
-                  <a:srgbClr val="000000"/>
-                </a:solidFill>
-              </a:rPr>
-              <a:t>val</a:t>
-            </a:r>
-            <a:r>
-              <a:rPr lang="en-US" dirty="0">
-                <a:solidFill>
-                  <a:srgbClr val="000000"/>
-                </a:solidFill>
-              </a:rPr>
-              <a:t> contains the </a:t>
-            </a:r>
-            <a:r>
-              <a:rPr lang="en-US" dirty="0" err="1">
-                <a:solidFill>
-                  <a:srgbClr val="000000"/>
-                </a:solidFill>
-              </a:rPr>
-              <a:t>Expr</a:t>
-            </a:r>
-            <a:r>
-              <a:rPr lang="en-US" dirty="0">
-                <a:solidFill>
-                  <a:srgbClr val="000000"/>
-                </a:solidFill>
-              </a:rPr>
-              <a:t> value for the conditional */</a:t>
-            </a:r>
-          </a:p>
-          <a:p>
-            <a:r>
-              <a:rPr lang="en-US" dirty="0">
-                <a:solidFill>
-                  <a:srgbClr val="000000"/>
-                </a:solidFill>
-              </a:rPr>
-              <a:t>  </a:t>
-            </a:r>
-            <a:r>
-              <a:rPr lang="en-US" dirty="0" err="1">
-                <a:solidFill>
-                  <a:srgbClr val="000000"/>
-                </a:solidFill>
-              </a:rPr>
-              <a:t>Builder.CreateCondBr</a:t>
-            </a:r>
-            <a:r>
-              <a:rPr lang="en-US" dirty="0">
-                <a:solidFill>
-                  <a:srgbClr val="000000"/>
-                </a:solidFill>
-              </a:rPr>
-              <a:t>(</a:t>
-            </a:r>
-            <a:r>
-              <a:rPr lang="en-US" b="1" dirty="0" err="1">
-                <a:solidFill>
-                  <a:srgbClr val="000000"/>
-                </a:solidFill>
-              </a:rPr>
-              <a:t>val</a:t>
-            </a:r>
-            <a:r>
-              <a:rPr lang="en-US" dirty="0">
-                <a:solidFill>
-                  <a:srgbClr val="000000"/>
-                </a:solidFill>
-              </a:rPr>
-              <a:t>, </a:t>
-            </a:r>
-            <a:r>
-              <a:rPr lang="en-US" dirty="0" err="1">
-                <a:solidFill>
-                  <a:srgbClr val="000000"/>
-                </a:solidFill>
-              </a:rPr>
-              <a:t>IfTrueBB</a:t>
-            </a:r>
-            <a:r>
-              <a:rPr lang="en-US" dirty="0">
-                <a:solidFill>
-                  <a:srgbClr val="000000"/>
-                </a:solidFill>
-              </a:rPr>
-              <a:t>, </a:t>
-            </a:r>
-            <a:r>
-              <a:rPr lang="en-US" dirty="0" err="1">
-                <a:solidFill>
-                  <a:srgbClr val="000000"/>
-                </a:solidFill>
-              </a:rPr>
-              <a:t>EndBB</a:t>
-            </a:r>
-            <a:r>
-              <a:rPr lang="en-US" dirty="0">
-                <a:solidFill>
-                  <a:srgbClr val="000000"/>
-                </a:solidFill>
-              </a:rPr>
-              <a:t>);</a:t>
-            </a:r>
-          </a:p>
-          <a:p>
-            <a:r>
-              <a:rPr lang="en-US" dirty="0">
-                <a:solidFill>
-                  <a:srgbClr val="000000"/>
-                </a:solidFill>
-              </a:rPr>
-              <a:t>  </a:t>
-            </a:r>
-            <a:r>
-              <a:rPr lang="en-US" dirty="0" err="1">
-                <a:solidFill>
-                  <a:srgbClr val="000000"/>
-                </a:solidFill>
-              </a:rPr>
-              <a:t>Builder.SetInsertPoint</a:t>
-            </a:r>
-            <a:r>
-              <a:rPr lang="en-US" dirty="0">
-                <a:solidFill>
-                  <a:srgbClr val="000000"/>
-                </a:solidFill>
-              </a:rPr>
-              <a:t>(</a:t>
-            </a:r>
-            <a:r>
-              <a:rPr lang="en-US" dirty="0" err="1">
-                <a:solidFill>
-                  <a:srgbClr val="000000"/>
-                </a:solidFill>
-              </a:rPr>
-              <a:t>IfTrueBB</a:t>
-            </a:r>
-            <a:r>
-              <a:rPr lang="en-US" dirty="0">
-                <a:solidFill>
-                  <a:srgbClr val="000000"/>
-                </a:solidFill>
-              </a:rPr>
-              <a:t>);</a:t>
-            </a:r>
-          </a:p>
-          <a:p>
-            <a:r>
-              <a:rPr lang="en-US" dirty="0">
-                <a:solidFill>
-                  <a:srgbClr val="000000"/>
-                </a:solidFill>
-              </a:rPr>
-              <a:t>  </a:t>
-            </a:r>
-            <a:r>
-              <a:rPr lang="en-US" dirty="0" err="1">
-                <a:solidFill>
-                  <a:srgbClr val="000000"/>
-                </a:solidFill>
-              </a:rPr>
-              <a:t>IfTrueBlock</a:t>
-            </a:r>
-            <a:r>
-              <a:rPr lang="en-US" dirty="0">
-                <a:solidFill>
-                  <a:srgbClr val="000000"/>
-                </a:solidFill>
-              </a:rPr>
-              <a:t>-&gt;</a:t>
-            </a:r>
-            <a:r>
-              <a:rPr lang="en-US" dirty="0" err="1">
-                <a:solidFill>
-                  <a:srgbClr val="000000"/>
-                </a:solidFill>
-              </a:rPr>
-              <a:t>Codegen</a:t>
-            </a:r>
-            <a:r>
-              <a:rPr lang="en-US" dirty="0">
-                <a:solidFill>
-                  <a:srgbClr val="000000"/>
-                </a:solidFill>
-              </a:rPr>
-              <a:t>();</a:t>
-            </a:r>
-          </a:p>
-        </p:txBody>
-      </p:sp>
-      <p:sp>
-        <p:nvSpPr>
-          <p:cNvPr id="7" name="TextBox 6"/>
-          <p:cNvSpPr txBox="1"/>
-          <p:nvPr/>
-        </p:nvSpPr>
-        <p:spPr>
-          <a:xfrm>
-            <a:off x="1259632" y="4797152"/>
-            <a:ext cx="7022926" cy="1200328"/>
-          </a:xfrm>
-          <a:prstGeom prst="rect">
-            <a:avLst/>
-          </a:prstGeom>
-        </p:spPr>
-        <p:style>
-          <a:lnRef idx="1">
-            <a:schemeClr val="accent6"/>
-          </a:lnRef>
-          <a:fillRef idx="2">
-            <a:schemeClr val="accent6"/>
-          </a:fillRef>
-          <a:effectRef idx="1">
-            <a:schemeClr val="accent6"/>
-          </a:effectRef>
-          <a:fontRef idx="minor">
-            <a:schemeClr val="dk1"/>
-          </a:fontRef>
-        </p:style>
-        <p:txBody>
-          <a:bodyPr wrap="none" rtlCol="0">
-            <a:spAutoFit/>
-          </a:bodyPr>
-          <a:lstStyle/>
-          <a:p>
-            <a:r>
-              <a:rPr lang="en-US" dirty="0" err="1"/>
-              <a:t>Builder.CreateBr</a:t>
-            </a:r>
-            <a:r>
-              <a:rPr lang="en-US" dirty="0"/>
-              <a:t>(</a:t>
-            </a:r>
-            <a:r>
-              <a:rPr lang="en-US" dirty="0" err="1"/>
-              <a:t>EndBB</a:t>
-            </a:r>
-            <a:r>
-              <a:rPr lang="en-US" dirty="0"/>
-              <a:t>);</a:t>
-            </a:r>
-          </a:p>
-          <a:p>
-            <a:r>
-              <a:rPr lang="en-US" dirty="0"/>
-              <a:t>/* pop the symbol table after </a:t>
-            </a:r>
-            <a:r>
-              <a:rPr lang="en-US" dirty="0" err="1"/>
-              <a:t>IfStmt</a:t>
-            </a:r>
-            <a:r>
-              <a:rPr lang="en-US" dirty="0"/>
-              <a:t> </a:t>
-            </a:r>
-            <a:r>
-              <a:rPr lang="en-US" dirty="0" err="1"/>
-              <a:t>Codegen</a:t>
-            </a:r>
-            <a:r>
-              <a:rPr lang="en-US" dirty="0"/>
-              <a:t> is done */</a:t>
-            </a:r>
-          </a:p>
-          <a:p>
-            <a:r>
-              <a:rPr lang="en-US" dirty="0" err="1"/>
-              <a:t>Builder.SetInsertPoint</a:t>
-            </a:r>
-            <a:r>
-              <a:rPr lang="en-US" dirty="0"/>
-              <a:t>(</a:t>
-            </a:r>
-            <a:r>
-              <a:rPr lang="en-US" dirty="0" err="1"/>
-              <a:t>EndBB</a:t>
-            </a:r>
-            <a:r>
-              <a:rPr lang="en-US" dirty="0"/>
-              <a:t>);</a:t>
-            </a:r>
-          </a:p>
-        </p:txBody>
-      </p:sp>
-      <p:sp>
-        <p:nvSpPr>
-          <p:cNvPr id="3" name="TextBox 2"/>
-          <p:cNvSpPr txBox="1"/>
-          <p:nvPr/>
-        </p:nvSpPr>
-        <p:spPr>
-          <a:xfrm>
-            <a:off x="683568" y="1844824"/>
-            <a:ext cx="7065431" cy="523220"/>
-          </a:xfrm>
-          <a:prstGeom prst="rect">
-            <a:avLst/>
-          </a:prstGeom>
-          <a:noFill/>
-        </p:spPr>
-        <p:txBody>
-          <a:bodyPr wrap="none" rtlCol="0">
-            <a:spAutoFit/>
-          </a:bodyPr>
-          <a:lstStyle/>
-          <a:p>
-            <a:r>
-              <a:rPr lang="en-US" sz="2800" dirty="0"/>
-              <a:t>Setting up the branching between Basic Blocks:</a:t>
-            </a:r>
-          </a:p>
-        </p:txBody>
-      </p:sp>
-      <p:sp>
-        <p:nvSpPr>
-          <p:cNvPr id="8" name="TextBox 7"/>
-          <p:cNvSpPr txBox="1"/>
-          <p:nvPr/>
-        </p:nvSpPr>
-        <p:spPr>
-          <a:xfrm>
-            <a:off x="683568" y="4149080"/>
-            <a:ext cx="8112317" cy="523220"/>
-          </a:xfrm>
-          <a:prstGeom prst="rect">
-            <a:avLst/>
-          </a:prstGeom>
-          <a:noFill/>
-        </p:spPr>
-        <p:txBody>
-          <a:bodyPr wrap="none" rtlCol="0">
-            <a:spAutoFit/>
-          </a:bodyPr>
-          <a:lstStyle/>
-          <a:p>
-            <a:r>
-              <a:rPr lang="en-US" sz="2800" dirty="0"/>
-              <a:t>After the </a:t>
-            </a:r>
-            <a:r>
-              <a:rPr lang="en-US" sz="2800" dirty="0" err="1"/>
-              <a:t>IfStmt</a:t>
-            </a:r>
-            <a:r>
-              <a:rPr lang="en-US" sz="2800" dirty="0"/>
-              <a:t> we continue with the end Basic Block:</a:t>
-            </a:r>
-          </a:p>
-        </p:txBody>
-      </p:sp>
     </p:spTree>
     <p:extLst>
       <p:ext uri="{BB962C8B-B14F-4D97-AF65-F5344CB8AC3E}">
-        <p14:creationId xmlns:p14="http://schemas.microsoft.com/office/powerpoint/2010/main" val="3552448716"/>
+        <p14:creationId xmlns:p14="http://schemas.microsoft.com/office/powerpoint/2010/main" val="4112616064"/>
       </p:ext>
     </p:extLst>
   </p:cSld>
@@ -4767,6 +4390,486 @@
           <a:p>
             <a:r>
               <a:rPr lang="en-US" dirty="0"/>
+              <a:t>“</a:t>
+            </a:r>
+            <a:r>
+              <a:rPr lang="en-US"/>
+              <a:t>Backpatching</a:t>
+            </a:r>
+            <a:r>
+              <a:rPr lang="en-US" dirty="0"/>
+              <a:t>” in LLVM</a:t>
+            </a:r>
+          </a:p>
+        </p:txBody>
+      </p:sp>
+      <p:sp>
+        <p:nvSpPr>
+          <p:cNvPr id="5" name="Slide Number Placeholder 4"/>
+          <p:cNvSpPr>
+            <a:spLocks noGrp="1"/>
+          </p:cNvSpPr>
+          <p:nvPr>
+            <p:ph type="sldNum" sz="quarter" idx="12"/>
+          </p:nvPr>
+        </p:nvSpPr>
+        <p:spPr/>
+        <p:txBody>
+          <a:bodyPr/>
+          <a:lstStyle/>
+          <a:p>
+            <a:fld id="{2B2C104B-E445-B247-BB91-C10CB560B869}" type="slidenum">
+              <a:rPr lang="en-US" smtClean="0"/>
+              <a:pPr/>
+              <a:t>12</a:t>
+            </a:fld>
+            <a:endParaRPr lang="en-US"/>
+          </a:p>
+        </p:txBody>
+      </p:sp>
+      <p:sp>
+        <p:nvSpPr>
+          <p:cNvPr id="6" name="TextBox 5"/>
+          <p:cNvSpPr txBox="1"/>
+          <p:nvPr/>
+        </p:nvSpPr>
+        <p:spPr>
+          <a:xfrm>
+            <a:off x="1187624" y="2348880"/>
+            <a:ext cx="6671868" cy="1569660"/>
+          </a:xfrm>
+          <a:prstGeom prst="rect">
+            <a:avLst/>
+          </a:prstGeom>
+        </p:spPr>
+        <p:style>
+          <a:lnRef idx="1">
+            <a:schemeClr val="accent6"/>
+          </a:lnRef>
+          <a:fillRef idx="2">
+            <a:schemeClr val="accent6"/>
+          </a:fillRef>
+          <a:effectRef idx="1">
+            <a:schemeClr val="accent6"/>
+          </a:effectRef>
+          <a:fontRef idx="minor">
+            <a:schemeClr val="dk1"/>
+          </a:fontRef>
+        </p:style>
+        <p:txBody>
+          <a:bodyPr wrap="none" rtlCol="0">
+            <a:spAutoFit/>
+          </a:bodyPr>
+          <a:lstStyle/>
+          <a:p>
+            <a:r>
+              <a:rPr lang="en-US" dirty="0">
+                <a:solidFill>
+                  <a:srgbClr val="000000"/>
+                </a:solidFill>
+              </a:rPr>
+              <a:t>  /* </a:t>
+            </a:r>
+            <a:r>
+              <a:rPr lang="en-US" b="1" dirty="0" err="1">
+                <a:solidFill>
+                  <a:srgbClr val="000000"/>
+                </a:solidFill>
+              </a:rPr>
+              <a:t>val</a:t>
+            </a:r>
+            <a:r>
+              <a:rPr lang="en-US" dirty="0">
+                <a:solidFill>
+                  <a:srgbClr val="000000"/>
+                </a:solidFill>
+              </a:rPr>
+              <a:t> contains the </a:t>
+            </a:r>
+            <a:r>
+              <a:rPr lang="en-US" dirty="0" err="1">
+                <a:solidFill>
+                  <a:srgbClr val="000000"/>
+                </a:solidFill>
+              </a:rPr>
+              <a:t>Expr</a:t>
+            </a:r>
+            <a:r>
+              <a:rPr lang="en-US" dirty="0">
+                <a:solidFill>
+                  <a:srgbClr val="000000"/>
+                </a:solidFill>
+              </a:rPr>
+              <a:t> value for the conditional */</a:t>
+            </a:r>
+          </a:p>
+          <a:p>
+            <a:r>
+              <a:rPr lang="en-US" dirty="0">
+                <a:solidFill>
+                  <a:srgbClr val="000000"/>
+                </a:solidFill>
+              </a:rPr>
+              <a:t>  </a:t>
+            </a:r>
+            <a:r>
+              <a:rPr lang="en-US" dirty="0" err="1">
+                <a:solidFill>
+                  <a:srgbClr val="000000"/>
+                </a:solidFill>
+              </a:rPr>
+              <a:t>Builder.CreateCondBr</a:t>
+            </a:r>
+            <a:r>
+              <a:rPr lang="en-US" dirty="0">
+                <a:solidFill>
+                  <a:srgbClr val="000000"/>
+                </a:solidFill>
+              </a:rPr>
+              <a:t>(</a:t>
+            </a:r>
+            <a:r>
+              <a:rPr lang="en-US" b="1" dirty="0" err="1">
+                <a:solidFill>
+                  <a:srgbClr val="000000"/>
+                </a:solidFill>
+              </a:rPr>
+              <a:t>val</a:t>
+            </a:r>
+            <a:r>
+              <a:rPr lang="en-US" dirty="0">
+                <a:solidFill>
+                  <a:srgbClr val="000000"/>
+                </a:solidFill>
+              </a:rPr>
+              <a:t>, </a:t>
+            </a:r>
+            <a:r>
+              <a:rPr lang="en-US" dirty="0" err="1">
+                <a:solidFill>
+                  <a:srgbClr val="000000"/>
+                </a:solidFill>
+              </a:rPr>
+              <a:t>IfTrueBB</a:t>
+            </a:r>
+            <a:r>
+              <a:rPr lang="en-US" dirty="0">
+                <a:solidFill>
+                  <a:srgbClr val="000000"/>
+                </a:solidFill>
+              </a:rPr>
+              <a:t>, </a:t>
+            </a:r>
+            <a:r>
+              <a:rPr lang="en-US" dirty="0" err="1">
+                <a:solidFill>
+                  <a:srgbClr val="000000"/>
+                </a:solidFill>
+              </a:rPr>
+              <a:t>EndBB</a:t>
+            </a:r>
+            <a:r>
+              <a:rPr lang="en-US" dirty="0">
+                <a:solidFill>
+                  <a:srgbClr val="000000"/>
+                </a:solidFill>
+              </a:rPr>
+              <a:t>);</a:t>
+            </a:r>
+          </a:p>
+          <a:p>
+            <a:r>
+              <a:rPr lang="en-US" dirty="0">
+                <a:solidFill>
+                  <a:srgbClr val="000000"/>
+                </a:solidFill>
+              </a:rPr>
+              <a:t>  </a:t>
+            </a:r>
+            <a:r>
+              <a:rPr lang="en-US" dirty="0" err="1">
+                <a:solidFill>
+                  <a:srgbClr val="000000"/>
+                </a:solidFill>
+              </a:rPr>
+              <a:t>Builder.SetInsertPoint</a:t>
+            </a:r>
+            <a:r>
+              <a:rPr lang="en-US" dirty="0">
+                <a:solidFill>
+                  <a:srgbClr val="000000"/>
+                </a:solidFill>
+              </a:rPr>
+              <a:t>(</a:t>
+            </a:r>
+            <a:r>
+              <a:rPr lang="en-US" dirty="0" err="1">
+                <a:solidFill>
+                  <a:srgbClr val="000000"/>
+                </a:solidFill>
+              </a:rPr>
+              <a:t>IfTrueBB</a:t>
+            </a:r>
+            <a:r>
+              <a:rPr lang="en-US" dirty="0">
+                <a:solidFill>
+                  <a:srgbClr val="000000"/>
+                </a:solidFill>
+              </a:rPr>
+              <a:t>);</a:t>
+            </a:r>
+          </a:p>
+          <a:p>
+            <a:r>
+              <a:rPr lang="en-US" dirty="0">
+                <a:solidFill>
+                  <a:srgbClr val="000000"/>
+                </a:solidFill>
+              </a:rPr>
+              <a:t>  </a:t>
+            </a:r>
+            <a:r>
+              <a:rPr lang="en-US" dirty="0" err="1">
+                <a:solidFill>
+                  <a:srgbClr val="000000"/>
+                </a:solidFill>
+              </a:rPr>
+              <a:t>IfTrueBlock</a:t>
+            </a:r>
+            <a:r>
+              <a:rPr lang="en-US" dirty="0">
+                <a:solidFill>
+                  <a:srgbClr val="000000"/>
+                </a:solidFill>
+              </a:rPr>
+              <a:t>-&gt;</a:t>
+            </a:r>
+            <a:r>
+              <a:rPr lang="en-US" dirty="0" err="1">
+                <a:solidFill>
+                  <a:srgbClr val="000000"/>
+                </a:solidFill>
+              </a:rPr>
+              <a:t>Codegen</a:t>
+            </a:r>
+            <a:r>
+              <a:rPr lang="en-US" dirty="0">
+                <a:solidFill>
+                  <a:srgbClr val="000000"/>
+                </a:solidFill>
+              </a:rPr>
+              <a:t>();</a:t>
+            </a:r>
+          </a:p>
+        </p:txBody>
+      </p:sp>
+      <p:sp>
+        <p:nvSpPr>
+          <p:cNvPr id="7" name="TextBox 6"/>
+          <p:cNvSpPr txBox="1"/>
+          <p:nvPr/>
+        </p:nvSpPr>
+        <p:spPr>
+          <a:xfrm>
+            <a:off x="1259632" y="4797152"/>
+            <a:ext cx="7022926" cy="1200328"/>
+          </a:xfrm>
+          <a:prstGeom prst="rect">
+            <a:avLst/>
+          </a:prstGeom>
+        </p:spPr>
+        <p:style>
+          <a:lnRef idx="1">
+            <a:schemeClr val="accent6"/>
+          </a:lnRef>
+          <a:fillRef idx="2">
+            <a:schemeClr val="accent6"/>
+          </a:fillRef>
+          <a:effectRef idx="1">
+            <a:schemeClr val="accent6"/>
+          </a:effectRef>
+          <a:fontRef idx="minor">
+            <a:schemeClr val="dk1"/>
+          </a:fontRef>
+        </p:style>
+        <p:txBody>
+          <a:bodyPr wrap="none" rtlCol="0">
+            <a:spAutoFit/>
+          </a:bodyPr>
+          <a:lstStyle/>
+          <a:p>
+            <a:r>
+              <a:rPr lang="en-US" dirty="0" err="1"/>
+              <a:t>Builder.CreateBr</a:t>
+            </a:r>
+            <a:r>
+              <a:rPr lang="en-US" dirty="0"/>
+              <a:t>(</a:t>
+            </a:r>
+            <a:r>
+              <a:rPr lang="en-US" dirty="0" err="1"/>
+              <a:t>EndBB</a:t>
+            </a:r>
+            <a:r>
+              <a:rPr lang="en-US" dirty="0"/>
+              <a:t>);</a:t>
+            </a:r>
+          </a:p>
+          <a:p>
+            <a:r>
+              <a:rPr lang="en-US" dirty="0"/>
+              <a:t>/* pop the symbol table after </a:t>
+            </a:r>
+            <a:r>
+              <a:rPr lang="en-US" dirty="0" err="1"/>
+              <a:t>IfStmt</a:t>
+            </a:r>
+            <a:r>
+              <a:rPr lang="en-US" dirty="0"/>
+              <a:t> </a:t>
+            </a:r>
+            <a:r>
+              <a:rPr lang="en-US" dirty="0" err="1"/>
+              <a:t>Codegen</a:t>
+            </a:r>
+            <a:r>
+              <a:rPr lang="en-US" dirty="0"/>
+              <a:t> is done */</a:t>
+            </a:r>
+          </a:p>
+          <a:p>
+            <a:r>
+              <a:rPr lang="en-US" dirty="0" err="1"/>
+              <a:t>Builder.SetInsertPoint</a:t>
+            </a:r>
+            <a:r>
+              <a:rPr lang="en-US" dirty="0"/>
+              <a:t>(</a:t>
+            </a:r>
+            <a:r>
+              <a:rPr lang="en-US" dirty="0" err="1"/>
+              <a:t>EndBB</a:t>
+            </a:r>
+            <a:r>
+              <a:rPr lang="en-US" dirty="0"/>
+              <a:t>);</a:t>
+            </a:r>
+          </a:p>
+        </p:txBody>
+      </p:sp>
+      <p:sp>
+        <p:nvSpPr>
+          <p:cNvPr id="3" name="TextBox 2"/>
+          <p:cNvSpPr txBox="1"/>
+          <p:nvPr/>
+        </p:nvSpPr>
+        <p:spPr>
+          <a:xfrm>
+            <a:off x="683568" y="1844824"/>
+            <a:ext cx="7065431" cy="523220"/>
+          </a:xfrm>
+          <a:prstGeom prst="rect">
+            <a:avLst/>
+          </a:prstGeom>
+          <a:noFill/>
+        </p:spPr>
+        <p:txBody>
+          <a:bodyPr wrap="none" rtlCol="0">
+            <a:spAutoFit/>
+          </a:bodyPr>
+          <a:lstStyle/>
+          <a:p>
+            <a:r>
+              <a:rPr lang="en-US" sz="2800" dirty="0"/>
+              <a:t>Setting up the branching between Basic Blocks:</a:t>
+            </a:r>
+          </a:p>
+        </p:txBody>
+      </p:sp>
+      <p:sp>
+        <p:nvSpPr>
+          <p:cNvPr id="8" name="TextBox 7"/>
+          <p:cNvSpPr txBox="1"/>
+          <p:nvPr/>
+        </p:nvSpPr>
+        <p:spPr>
+          <a:xfrm>
+            <a:off x="683568" y="4149080"/>
+            <a:ext cx="8112317" cy="523220"/>
+          </a:xfrm>
+          <a:prstGeom prst="rect">
+            <a:avLst/>
+          </a:prstGeom>
+          <a:noFill/>
+        </p:spPr>
+        <p:txBody>
+          <a:bodyPr wrap="none" rtlCol="0">
+            <a:spAutoFit/>
+          </a:bodyPr>
+          <a:lstStyle/>
+          <a:p>
+            <a:r>
+              <a:rPr lang="en-US" sz="2800" dirty="0"/>
+              <a:t>After the </a:t>
+            </a:r>
+            <a:r>
+              <a:rPr lang="en-US" sz="2800" dirty="0" err="1"/>
+              <a:t>IfStmt</a:t>
+            </a:r>
+            <a:r>
+              <a:rPr lang="en-US" sz="2800" dirty="0"/>
+              <a:t> we continue with the end Basic Block:</a:t>
+            </a:r>
+          </a:p>
+        </p:txBody>
+      </p:sp>
+    </p:spTree>
+    <p:extLst>
+      <p:ext uri="{BB962C8B-B14F-4D97-AF65-F5344CB8AC3E}">
+        <p14:creationId xmlns:p14="http://schemas.microsoft.com/office/powerpoint/2010/main" val="3552448716"/>
+      </p:ext>
+    </p:extLst>
+  </p:cSld>
+  <p:clrMapOvr>
+    <a:masterClrMapping/>
+  </p:clrMapOvr>
+</p:sld>
+</file>
+
+<file path=ppt/slides/slide13.xml><?xml version="1.0" encoding="utf-8"?>
+<p:sld xmlns:a="http://schemas.openxmlformats.org/drawingml/2006/main" xmlns:r="http://schemas.openxmlformats.org/officeDocument/2006/relationships" xmlns:p="http://schemas.openxmlformats.org/presentationml/2006/main">
+  <p:cSld>
+    <p:spTree>
+      <p:nvGrpSpPr>
+        <p:cNvPr id="1" name=""/>
+        <p:cNvGrpSpPr/>
+        <p:nvPr/>
+      </p:nvGrpSpPr>
+      <p:grpSpPr>
+        <a:xfrm>
+          <a:off x="0" y="0"/>
+          <a:ext cx="0" cy="0"/>
+          <a:chOff x="0" y="0"/>
+          <a:chExt cx="0" cy="0"/>
+        </a:xfrm>
+      </p:grpSpPr>
+      <p:sp>
+        <p:nvSpPr>
+          <p:cNvPr id="2" name="Title 1"/>
+          <p:cNvSpPr>
+            <a:spLocks noGrp="1"/>
+          </p:cNvSpPr>
+          <p:nvPr>
+            <p:ph type="title"/>
+          </p:nvPr>
+        </p:nvSpPr>
+        <p:spPr/>
+        <p:txBody>
+          <a:bodyPr/>
+          <a:lstStyle/>
+          <a:p>
+            <a:r>
+              <a:rPr lang="en-US" dirty="0"/>
               <a:t>Static Single Assignment in LLVM</a:t>
             </a:r>
           </a:p>
@@ -4834,7 +4937,7 @@
             <a:fld id="{2B2C104B-E445-B247-BB91-C10CB560B869}" type="slidenum">
               <a:rPr lang="en-US" smtClean="0"/>
               <a:pPr/>
-              <a:t>12</a:t>
+              <a:t>13</a:t>
             </a:fld>
             <a:endParaRPr lang="en-US"/>
           </a:p>
@@ -4984,7 +5087,7 @@
 </p:sld>
 </file>
 
-<file path=ppt/slides/slide13.xml><?xml version="1.0" encoding="utf-8"?>
+<file path=ppt/slides/slide14.xml><?xml version="1.0" encoding="utf-8"?>
 <p:sld xmlns:a="http://schemas.openxmlformats.org/drawingml/2006/main" xmlns:r="http://schemas.openxmlformats.org/officeDocument/2006/relationships" xmlns:p="http://schemas.openxmlformats.org/presentationml/2006/main">
   <p:cSld>
     <p:spTree>
@@ -5076,7 +5179,7 @@
             <a:fld id="{2B2C104B-E445-B247-BB91-C10CB560B869}" type="slidenum">
               <a:rPr lang="en-US" smtClean="0"/>
               <a:pPr/>
-              <a:t>13</a:t>
+              <a:t>14</a:t>
             </a:fld>
             <a:endParaRPr lang="en-US"/>
           </a:p>

</xml_diff>

<commit_message>
more concise function arg handling using auto pointers
</commit_message>
<xml_diff>
--- a/assets/ppt/codegen/decafLLVM.pptx
+++ b/assets/ppt/codegen/decafLLVM.pptx
@@ -5875,97 +5875,72 @@
         </p:nvSpPr>
         <p:spPr>
           <a:xfrm>
-            <a:off x="463284" y="1220658"/>
-            <a:ext cx="8213172" cy="1105347"/>
+            <a:off x="468612" y="1289507"/>
+            <a:ext cx="8213172" cy="788697"/>
           </a:xfrm>
+          <a:solidFill>
+            <a:schemeClr val="accent5">
+              <a:lumMod val="20000"/>
+              <a:lumOff val="80000"/>
+            </a:schemeClr>
+          </a:solidFill>
         </p:spPr>
         <p:txBody>
-          <a:bodyPr/>
+          <a:bodyPr>
+            <a:noAutofit/>
+          </a:bodyPr>
           <a:lstStyle/>
           <a:p>
-            <a:pPr>
-              <a:buFont typeface="Arial"/>
-              <a:buChar char="•"/>
+            <a:pPr marL="0" indent="0">
+              <a:buNone/>
             </a:pPr>
             <a:r>
-              <a:rPr lang="en-US" sz="1800" dirty="0"/>
+              <a:rPr lang="en-US" sz="2400" dirty="0"/>
               <a:t>For </a:t>
             </a:r>
             <a:r>
-              <a:rPr lang="en-US" sz="1500" dirty="0">
+              <a:rPr lang="en-US" sz="2400" dirty="0">
                 <a:latin typeface="Consolas" panose="020B0609020204030204" pitchFamily="49" charset="0"/>
                 <a:cs typeface="Consolas" panose="020B0609020204030204" pitchFamily="49" charset="0"/>
               </a:rPr>
               <a:t>Function* </a:t>
             </a:r>
             <a:r>
-              <a:rPr lang="en-US" sz="1500" dirty="0" err="1">
+              <a:rPr lang="en-US" sz="2400" dirty="0" err="1">
                 <a:latin typeface="Consolas" panose="020B0609020204030204" pitchFamily="49" charset="0"/>
                 <a:cs typeface="Consolas" panose="020B0609020204030204" pitchFamily="49" charset="0"/>
               </a:rPr>
               <a:t>func</a:t>
             </a:r>
             <a:r>
-              <a:rPr lang="en-US" sz="1500" dirty="0">
+              <a:rPr lang="en-US" sz="2400" dirty="0">
                 <a:latin typeface="Consolas" panose="020B0609020204030204" pitchFamily="49" charset="0"/>
                 <a:cs typeface="Consolas" panose="020B0609020204030204" pitchFamily="49" charset="0"/>
               </a:rPr>
               <a:t> </a:t>
             </a:r>
             <a:r>
-              <a:rPr lang="en-US" sz="1800" dirty="0"/>
+              <a:rPr lang="en-US" sz="2400" dirty="0"/>
               <a:t>iterate through the function arguments using </a:t>
             </a:r>
             <a:r>
-              <a:rPr lang="en-US" sz="1500" dirty="0" err="1">
+              <a:rPr lang="en-US" sz="2400" dirty="0" err="1">
                 <a:latin typeface="Consolas" panose="020B0609020204030204" pitchFamily="49" charset="0"/>
                 <a:cs typeface="Consolas" panose="020B0609020204030204" pitchFamily="49" charset="0"/>
               </a:rPr>
               <a:t>arg_iterator</a:t>
             </a:r>
             <a:r>
-              <a:rPr lang="en-US" sz="1500" dirty="0">
+              <a:rPr lang="en-US" sz="2400" dirty="0">
                 <a:latin typeface="Consolas" panose="020B0609020204030204" pitchFamily="49" charset="0"/>
                 <a:cs typeface="Consolas" panose="020B0609020204030204" pitchFamily="49" charset="0"/>
               </a:rPr>
               <a:t> </a:t>
             </a:r>
             <a:r>
-              <a:rPr lang="en-US" sz="1800" dirty="0"/>
+              <a:rPr lang="en-US" sz="2400" dirty="0"/>
               <a:t>and allocate them into the stack.</a:t>
             </a:r>
-          </a:p>
-          <a:p>
-            <a:pPr>
-              <a:buFont typeface="Arial"/>
-              <a:buChar char="•"/>
-            </a:pPr>
-            <a:r>
-              <a:rPr lang="en-US" sz="1800" dirty="0"/>
-              <a:t>For example if we have one function parameter called </a:t>
-            </a:r>
-            <a:r>
-              <a:rPr lang="en-US" sz="1500" dirty="0"/>
-              <a:t>a</a:t>
-            </a:r>
-            <a:r>
-              <a:rPr lang="en-US" sz="1800" dirty="0"/>
-              <a:t> of type </a:t>
-            </a:r>
-            <a:r>
-              <a:rPr lang="en-US" sz="1500" dirty="0">
-                <a:latin typeface="Consolas" panose="020B0609020204030204" pitchFamily="49" charset="0"/>
-                <a:cs typeface="Consolas" panose="020B0609020204030204" pitchFamily="49" charset="0"/>
-              </a:rPr>
-              <a:t>int</a:t>
-            </a:r>
-            <a:r>
-              <a:rPr lang="en-US" sz="1800" dirty="0"/>
-              <a:t>:</a:t>
-            </a:r>
-          </a:p>
-          <a:p>
-            <a:endParaRPr lang="en-US" sz="1800" dirty="0"/>
           </a:p>
         </p:txBody>
       </p:sp>
@@ -5983,8 +5958,8 @@
         </p:nvSpPr>
         <p:spPr>
           <a:xfrm>
-            <a:off x="105374" y="2499742"/>
-            <a:ext cx="8928992" cy="1754326"/>
+            <a:off x="467057" y="2315111"/>
+            <a:ext cx="7346946" cy="2554545"/>
           </a:xfrm>
           <a:prstGeom prst="rect">
             <a:avLst/>
@@ -5998,255 +5973,285 @@
           <a:lstStyle/>
           <a:p>
             <a:r>
-              <a:rPr lang="en-US" sz="1350" dirty="0">
-                <a:latin typeface="Consolas" panose="020B0609020204030204" pitchFamily="49" charset="0"/>
-                <a:cs typeface="Consolas" panose="020B0609020204030204" pitchFamily="49" charset="0"/>
-              </a:rPr>
-              <a:t>string name = string("a");</a:t>
-            </a:r>
-          </a:p>
-          <a:p>
-            <a:r>
-              <a:rPr lang="en-US" sz="1350" dirty="0" err="1">
+              <a:rPr lang="en-US" sz="2000" dirty="0">
+                <a:latin typeface="Consolas" panose="020B0609020204030204" pitchFamily="49" charset="0"/>
+                <a:cs typeface="Consolas" panose="020B0609020204030204" pitchFamily="49" charset="0"/>
+              </a:rPr>
+              <a:t>for (auto &amp;</a:t>
+            </a:r>
+            <a:r>
+              <a:rPr lang="en-US" sz="2000" dirty="0" err="1">
+                <a:latin typeface="Consolas" panose="020B0609020204030204" pitchFamily="49" charset="0"/>
+                <a:cs typeface="Consolas" panose="020B0609020204030204" pitchFamily="49" charset="0"/>
+              </a:rPr>
+              <a:t>Arg</a:t>
+            </a:r>
+            <a:r>
+              <a:rPr lang="en-US" sz="2000" dirty="0">
+                <a:latin typeface="Consolas" panose="020B0609020204030204" pitchFamily="49" charset="0"/>
+                <a:cs typeface="Consolas" panose="020B0609020204030204" pitchFamily="49" charset="0"/>
+              </a:rPr>
+              <a:t> : </a:t>
+            </a:r>
+            <a:r>
+              <a:rPr lang="en-US" sz="2000" dirty="0" err="1">
+                <a:latin typeface="Consolas" panose="020B0609020204030204" pitchFamily="49" charset="0"/>
+                <a:cs typeface="Consolas" panose="020B0609020204030204" pitchFamily="49" charset="0"/>
+              </a:rPr>
+              <a:t>func</a:t>
+            </a:r>
+            <a:r>
+              <a:rPr lang="en-US" sz="2000" dirty="0">
+                <a:latin typeface="Consolas" panose="020B0609020204030204" pitchFamily="49" charset="0"/>
+                <a:cs typeface="Consolas" panose="020B0609020204030204" pitchFamily="49" charset="0"/>
+              </a:rPr>
+              <a:t>-&gt;</a:t>
+            </a:r>
+            <a:r>
+              <a:rPr lang="en-US" sz="2000" dirty="0" err="1">
+                <a:latin typeface="Consolas" panose="020B0609020204030204" pitchFamily="49" charset="0"/>
+                <a:cs typeface="Consolas" panose="020B0609020204030204" pitchFamily="49" charset="0"/>
+              </a:rPr>
+              <a:t>args</a:t>
+            </a:r>
+            <a:r>
+              <a:rPr lang="en-US" sz="2000" dirty="0">
+                <a:latin typeface="Consolas" panose="020B0609020204030204" pitchFamily="49" charset="0"/>
+                <a:cs typeface="Consolas" panose="020B0609020204030204" pitchFamily="49" charset="0"/>
+              </a:rPr>
+              <a:t>()) {</a:t>
+            </a:r>
+          </a:p>
+          <a:p>
+            <a:r>
+              <a:rPr lang="en-US" sz="2000" dirty="0">
+                <a:latin typeface="Consolas" panose="020B0609020204030204" pitchFamily="49" charset="0"/>
+                <a:cs typeface="Consolas" panose="020B0609020204030204" pitchFamily="49" charset="0"/>
+              </a:rPr>
+              <a:t>  </a:t>
+            </a:r>
+            <a:r>
+              <a:rPr lang="en-US" sz="2000" dirty="0" err="1">
                 <a:latin typeface="Consolas" panose="020B0609020204030204" pitchFamily="49" charset="0"/>
                 <a:cs typeface="Consolas" panose="020B0609020204030204" pitchFamily="49" charset="0"/>
               </a:rPr>
               <a:t>llvm</a:t>
             </a:r>
             <a:r>
-              <a:rPr lang="en-US" sz="1350" dirty="0">
-                <a:latin typeface="Consolas" panose="020B0609020204030204" pitchFamily="49" charset="0"/>
-                <a:cs typeface="Consolas" panose="020B0609020204030204" pitchFamily="49" charset="0"/>
-              </a:rPr>
-              <a:t>::Function::</a:t>
-            </a:r>
-            <a:r>
-              <a:rPr lang="en-US" sz="1350" dirty="0" err="1">
-                <a:latin typeface="Consolas" panose="020B0609020204030204" pitchFamily="49" charset="0"/>
-                <a:cs typeface="Consolas" panose="020B0609020204030204" pitchFamily="49" charset="0"/>
-              </a:rPr>
-              <a:t>arg_iterator</a:t>
-            </a:r>
-            <a:r>
-              <a:rPr lang="en-US" sz="1350" dirty="0">
-                <a:latin typeface="Consolas" panose="020B0609020204030204" pitchFamily="49" charset="0"/>
-                <a:cs typeface="Consolas" panose="020B0609020204030204" pitchFamily="49" charset="0"/>
-              </a:rPr>
-              <a:t> AI = </a:t>
-            </a:r>
-            <a:r>
-              <a:rPr lang="en-US" sz="1350" dirty="0" err="1">
+              <a:rPr lang="en-US" sz="2000" dirty="0">
+                <a:latin typeface="Consolas" panose="020B0609020204030204" pitchFamily="49" charset="0"/>
+                <a:cs typeface="Consolas" panose="020B0609020204030204" pitchFamily="49" charset="0"/>
+              </a:rPr>
+              <a:t>::</a:t>
+            </a:r>
+            <a:r>
+              <a:rPr lang="en-US" sz="2000" dirty="0" err="1">
+                <a:latin typeface="Consolas" panose="020B0609020204030204" pitchFamily="49" charset="0"/>
+                <a:cs typeface="Consolas" panose="020B0609020204030204" pitchFamily="49" charset="0"/>
+              </a:rPr>
+              <a:t>AllocaInst</a:t>
+            </a:r>
+            <a:r>
+              <a:rPr lang="en-US" sz="2000" dirty="0">
+                <a:latin typeface="Consolas" panose="020B0609020204030204" pitchFamily="49" charset="0"/>
+                <a:cs typeface="Consolas" panose="020B0609020204030204" pitchFamily="49" charset="0"/>
+              </a:rPr>
+              <a:t> *</a:t>
+            </a:r>
+            <a:r>
+              <a:rPr lang="en-US" sz="2000" dirty="0" err="1">
+                <a:latin typeface="Consolas" panose="020B0609020204030204" pitchFamily="49" charset="0"/>
+                <a:cs typeface="Consolas" panose="020B0609020204030204" pitchFamily="49" charset="0"/>
+              </a:rPr>
+              <a:t>Alloca</a:t>
+            </a:r>
+            <a:r>
+              <a:rPr lang="en-US" sz="2000" dirty="0">
+                <a:latin typeface="Consolas" panose="020B0609020204030204" pitchFamily="49" charset="0"/>
+                <a:cs typeface="Consolas" panose="020B0609020204030204" pitchFamily="49" charset="0"/>
+              </a:rPr>
+              <a:t> = </a:t>
+            </a:r>
+          </a:p>
+          <a:p>
+            <a:r>
+              <a:rPr lang="en-US" sz="2000" dirty="0">
+                <a:latin typeface="Consolas" panose="020B0609020204030204" pitchFamily="49" charset="0"/>
+                <a:cs typeface="Consolas" panose="020B0609020204030204" pitchFamily="49" charset="0"/>
+              </a:rPr>
+              <a:t>	</a:t>
+            </a:r>
+            <a:r>
+              <a:rPr lang="en-US" sz="2000" dirty="0" err="1">
+                <a:latin typeface="Consolas" panose="020B0609020204030204" pitchFamily="49" charset="0"/>
+                <a:cs typeface="Consolas" panose="020B0609020204030204" pitchFamily="49" charset="0"/>
+              </a:rPr>
+              <a:t>CreateEntryBlockAlloca</a:t>
+            </a:r>
+            <a:r>
+              <a:rPr lang="en-US" sz="2000" dirty="0">
+                <a:latin typeface="Consolas" panose="020B0609020204030204" pitchFamily="49" charset="0"/>
+                <a:cs typeface="Consolas" panose="020B0609020204030204" pitchFamily="49" charset="0"/>
+              </a:rPr>
+              <a:t>(</a:t>
+            </a:r>
+            <a:r>
+              <a:rPr lang="en-US" sz="2000" dirty="0" err="1">
                 <a:latin typeface="Consolas" panose="020B0609020204030204" pitchFamily="49" charset="0"/>
                 <a:cs typeface="Consolas" panose="020B0609020204030204" pitchFamily="49" charset="0"/>
               </a:rPr>
               <a:t>func</a:t>
             </a:r>
             <a:r>
-              <a:rPr lang="en-US" sz="1350" dirty="0">
-                <a:latin typeface="Consolas" panose="020B0609020204030204" pitchFamily="49" charset="0"/>
-                <a:cs typeface="Consolas" panose="020B0609020204030204" pitchFamily="49" charset="0"/>
-              </a:rPr>
-              <a:t>-&gt;</a:t>
-            </a:r>
-            <a:r>
-              <a:rPr lang="en-US" sz="1350" dirty="0" err="1">
-                <a:latin typeface="Consolas" panose="020B0609020204030204" pitchFamily="49" charset="0"/>
-                <a:cs typeface="Consolas" panose="020B0609020204030204" pitchFamily="49" charset="0"/>
-              </a:rPr>
-              <a:t>arg_begin</a:t>
-            </a:r>
-            <a:r>
-              <a:rPr lang="en-US" sz="1350" dirty="0">
-                <a:latin typeface="Consolas" panose="020B0609020204030204" pitchFamily="49" charset="0"/>
-                <a:cs typeface="Consolas" panose="020B0609020204030204" pitchFamily="49" charset="0"/>
-              </a:rPr>
-              <a:t>();</a:t>
-            </a:r>
-          </a:p>
-          <a:p>
-            <a:r>
-              <a:rPr lang="en-US" sz="1350" dirty="0">
-                <a:latin typeface="Consolas" panose="020B0609020204030204" pitchFamily="49" charset="0"/>
-                <a:cs typeface="Consolas" panose="020B0609020204030204" pitchFamily="49" charset="0"/>
-              </a:rPr>
-              <a:t>AI-&gt;</a:t>
-            </a:r>
-            <a:r>
-              <a:rPr lang="en-US" sz="1350" dirty="0" err="1">
-                <a:latin typeface="Consolas" panose="020B0609020204030204" pitchFamily="49" charset="0"/>
-                <a:cs typeface="Consolas" panose="020B0609020204030204" pitchFamily="49" charset="0"/>
-              </a:rPr>
-              <a:t>setName</a:t>
-            </a:r>
-            <a:r>
-              <a:rPr lang="en-US" sz="1350" dirty="0">
-                <a:latin typeface="Consolas" panose="020B0609020204030204" pitchFamily="49" charset="0"/>
-                <a:cs typeface="Consolas" panose="020B0609020204030204" pitchFamily="49" charset="0"/>
-              </a:rPr>
-              <a:t>(name);</a:t>
-            </a:r>
-          </a:p>
-          <a:p>
-            <a:r>
-              <a:rPr lang="en-US" sz="1350" dirty="0" err="1">
-                <a:latin typeface="Consolas" panose="020B0609020204030204" pitchFamily="49" charset="0"/>
-                <a:cs typeface="Consolas" panose="020B0609020204030204" pitchFamily="49" charset="0"/>
-              </a:rPr>
-              <a:t>llvm</a:t>
-            </a:r>
-            <a:r>
-              <a:rPr lang="en-US" sz="1350" dirty="0">
-                <a:latin typeface="Consolas" panose="020B0609020204030204" pitchFamily="49" charset="0"/>
-                <a:cs typeface="Consolas" panose="020B0609020204030204" pitchFamily="49" charset="0"/>
-              </a:rPr>
-              <a:t>::</a:t>
-            </a:r>
-            <a:r>
-              <a:rPr lang="en-US" sz="1350" dirty="0" err="1">
-                <a:latin typeface="Consolas" panose="020B0609020204030204" pitchFamily="49" charset="0"/>
-                <a:cs typeface="Consolas" panose="020B0609020204030204" pitchFamily="49" charset="0"/>
-              </a:rPr>
-              <a:t>AllocaInst</a:t>
-            </a:r>
-            <a:r>
-              <a:rPr lang="en-US" sz="1350" dirty="0">
-                <a:latin typeface="Consolas" panose="020B0609020204030204" pitchFamily="49" charset="0"/>
-                <a:cs typeface="Consolas" panose="020B0609020204030204" pitchFamily="49" charset="0"/>
-              </a:rPr>
-              <a:t> *</a:t>
-            </a:r>
-            <a:r>
-              <a:rPr lang="en-US" sz="1350" dirty="0" err="1">
+              <a:rPr lang="en-US" sz="2000" dirty="0">
+                <a:latin typeface="Consolas" panose="020B0609020204030204" pitchFamily="49" charset="0"/>
+                <a:cs typeface="Consolas" panose="020B0609020204030204" pitchFamily="49" charset="0"/>
+              </a:rPr>
+              <a:t>, </a:t>
+            </a:r>
+            <a:r>
+              <a:rPr lang="en-US" sz="2000" dirty="0" err="1">
+                <a:latin typeface="Consolas" panose="020B0609020204030204" pitchFamily="49" charset="0"/>
+                <a:cs typeface="Consolas" panose="020B0609020204030204" pitchFamily="49" charset="0"/>
+              </a:rPr>
+              <a:t>Arg.getName</a:t>
+            </a:r>
+            <a:r>
+              <a:rPr lang="en-US" sz="2000" dirty="0">
+                <a:latin typeface="Consolas" panose="020B0609020204030204" pitchFamily="49" charset="0"/>
+                <a:cs typeface="Consolas" panose="020B0609020204030204" pitchFamily="49" charset="0"/>
+              </a:rPr>
+              <a:t>());</a:t>
+            </a:r>
+          </a:p>
+          <a:p>
+            <a:r>
+              <a:rPr lang="en-US" sz="2000" dirty="0">
+                <a:latin typeface="Consolas" panose="020B0609020204030204" pitchFamily="49" charset="0"/>
+                <a:cs typeface="Consolas" panose="020B0609020204030204" pitchFamily="49" charset="0"/>
+              </a:rPr>
+              <a:t>  // Store the initial value into the </a:t>
+            </a:r>
+            <a:r>
+              <a:rPr lang="en-US" sz="2000" dirty="0" err="1">
+                <a:latin typeface="Consolas" panose="020B0609020204030204" pitchFamily="49" charset="0"/>
+                <a:cs typeface="Consolas" panose="020B0609020204030204" pitchFamily="49" charset="0"/>
+              </a:rPr>
+              <a:t>alloca</a:t>
+            </a:r>
+            <a:r>
+              <a:rPr lang="en-US" sz="2000" dirty="0">
+                <a:latin typeface="Consolas" panose="020B0609020204030204" pitchFamily="49" charset="0"/>
+                <a:cs typeface="Consolas" panose="020B0609020204030204" pitchFamily="49" charset="0"/>
+              </a:rPr>
+              <a:t>.</a:t>
+            </a:r>
+          </a:p>
+          <a:p>
+            <a:r>
+              <a:rPr lang="en-US" sz="2000" dirty="0">
+                <a:latin typeface="Consolas" panose="020B0609020204030204" pitchFamily="49" charset="0"/>
+                <a:cs typeface="Consolas" panose="020B0609020204030204" pitchFamily="49" charset="0"/>
+              </a:rPr>
+              <a:t>  </a:t>
+            </a:r>
+            <a:r>
+              <a:rPr lang="en-US" sz="2000" dirty="0" err="1">
+                <a:latin typeface="Consolas" panose="020B0609020204030204" pitchFamily="49" charset="0"/>
+                <a:cs typeface="Consolas" panose="020B0609020204030204" pitchFamily="49" charset="0"/>
+              </a:rPr>
+              <a:t>Builder.CreateStore</a:t>
+            </a:r>
+            <a:r>
+              <a:rPr lang="en-US" sz="2000" dirty="0">
+                <a:latin typeface="Consolas" panose="020B0609020204030204" pitchFamily="49" charset="0"/>
+                <a:cs typeface="Consolas" panose="020B0609020204030204" pitchFamily="49" charset="0"/>
+              </a:rPr>
+              <a:t>(&amp;</a:t>
+            </a:r>
+            <a:r>
+              <a:rPr lang="en-US" sz="2000" dirty="0" err="1">
+                <a:latin typeface="Consolas" panose="020B0609020204030204" pitchFamily="49" charset="0"/>
+                <a:cs typeface="Consolas" panose="020B0609020204030204" pitchFamily="49" charset="0"/>
+              </a:rPr>
+              <a:t>Arg</a:t>
+            </a:r>
+            <a:r>
+              <a:rPr lang="en-US" sz="2000" dirty="0">
+                <a:latin typeface="Consolas" panose="020B0609020204030204" pitchFamily="49" charset="0"/>
+                <a:cs typeface="Consolas" panose="020B0609020204030204" pitchFamily="49" charset="0"/>
+              </a:rPr>
+              <a:t>, </a:t>
+            </a:r>
+            <a:r>
+              <a:rPr lang="en-US" sz="2000" dirty="0" err="1">
                 <a:latin typeface="Consolas" panose="020B0609020204030204" pitchFamily="49" charset="0"/>
                 <a:cs typeface="Consolas" panose="020B0609020204030204" pitchFamily="49" charset="0"/>
               </a:rPr>
               <a:t>Alloca</a:t>
             </a:r>
             <a:r>
-              <a:rPr lang="en-US" sz="1350" dirty="0">
-                <a:latin typeface="Consolas" panose="020B0609020204030204" pitchFamily="49" charset="0"/>
-                <a:cs typeface="Consolas" panose="020B0609020204030204" pitchFamily="49" charset="0"/>
-              </a:rPr>
-              <a:t> = </a:t>
-            </a:r>
-            <a:r>
-              <a:rPr lang="en-US" sz="1350" dirty="0" err="1">
-                <a:latin typeface="Consolas" panose="020B0609020204030204" pitchFamily="49" charset="0"/>
-                <a:cs typeface="Consolas" panose="020B0609020204030204" pitchFamily="49" charset="0"/>
-              </a:rPr>
-              <a:t>Builder.CreateAlloca</a:t>
-            </a:r>
-            <a:r>
-              <a:rPr lang="en-US" sz="1350" dirty="0">
-                <a:latin typeface="Consolas" panose="020B0609020204030204" pitchFamily="49" charset="0"/>
-                <a:cs typeface="Consolas" panose="020B0609020204030204" pitchFamily="49" charset="0"/>
-              </a:rPr>
-              <a:t>(Builder.getInt32Ty(), </a:t>
-            </a:r>
-            <a:r>
-              <a:rPr lang="en-US" sz="1350" dirty="0" err="1">
-                <a:latin typeface="Consolas" panose="020B0609020204030204" pitchFamily="49" charset="0"/>
-                <a:cs typeface="Consolas" panose="020B0609020204030204" pitchFamily="49" charset="0"/>
-              </a:rPr>
-              <a:t>nullptr</a:t>
-            </a:r>
-            <a:r>
-              <a:rPr lang="en-US" sz="1350" dirty="0">
-                <a:latin typeface="Consolas" panose="020B0609020204030204" pitchFamily="49" charset="0"/>
-                <a:cs typeface="Consolas" panose="020B0609020204030204" pitchFamily="49" charset="0"/>
-              </a:rPr>
-              <a:t>, </a:t>
-            </a:r>
-            <a:r>
-              <a:rPr lang="en-US" sz="1350" dirty="0" err="1">
-                <a:latin typeface="Consolas" panose="020B0609020204030204" pitchFamily="49" charset="0"/>
-                <a:cs typeface="Consolas" panose="020B0609020204030204" pitchFamily="49" charset="0"/>
-              </a:rPr>
-              <a:t>name.c_str</a:t>
-            </a:r>
-            <a:r>
-              <a:rPr lang="en-US" sz="1350" dirty="0">
-                <a:latin typeface="Consolas" panose="020B0609020204030204" pitchFamily="49" charset="0"/>
-                <a:cs typeface="Consolas" panose="020B0609020204030204" pitchFamily="49" charset="0"/>
-              </a:rPr>
-              <a:t>());</a:t>
-            </a:r>
-          </a:p>
-          <a:p>
-            <a:r>
-              <a:rPr lang="en-US" sz="1350" dirty="0">
-                <a:latin typeface="Consolas" panose="020B0609020204030204" pitchFamily="49" charset="0"/>
-                <a:cs typeface="Consolas" panose="020B0609020204030204" pitchFamily="49" charset="0"/>
-              </a:rPr>
-              <a:t>// Store the initial value into the </a:t>
-            </a:r>
-            <a:r>
-              <a:rPr lang="en-US" sz="1350" dirty="0" err="1">
-                <a:latin typeface="Consolas" panose="020B0609020204030204" pitchFamily="49" charset="0"/>
-                <a:cs typeface="Consolas" panose="020B0609020204030204" pitchFamily="49" charset="0"/>
-              </a:rPr>
-              <a:t>alloca</a:t>
-            </a:r>
-            <a:r>
-              <a:rPr lang="en-US" sz="1350" dirty="0">
-                <a:latin typeface="Consolas" panose="020B0609020204030204" pitchFamily="49" charset="0"/>
-                <a:cs typeface="Consolas" panose="020B0609020204030204" pitchFamily="49" charset="0"/>
-              </a:rPr>
-              <a:t>.</a:t>
-            </a:r>
-          </a:p>
-          <a:p>
-            <a:r>
-              <a:rPr lang="en-US" sz="1350" dirty="0" err="1">
-                <a:latin typeface="Consolas" panose="020B0609020204030204" pitchFamily="49" charset="0"/>
-                <a:cs typeface="Consolas" panose="020B0609020204030204" pitchFamily="49" charset="0"/>
-              </a:rPr>
-              <a:t>Builder.CreateStore</a:t>
-            </a:r>
-            <a:r>
-              <a:rPr lang="en-US" sz="1350" dirty="0">
+              <a:rPr lang="en-US" sz="2000" dirty="0">
+                <a:latin typeface="Consolas" panose="020B0609020204030204" pitchFamily="49" charset="0"/>
+                <a:cs typeface="Consolas" panose="020B0609020204030204" pitchFamily="49" charset="0"/>
+              </a:rPr>
+              <a:t>);</a:t>
+            </a:r>
+          </a:p>
+          <a:p>
+            <a:r>
+              <a:rPr lang="en-US" sz="2000" dirty="0">
+                <a:latin typeface="Consolas" panose="020B0609020204030204" pitchFamily="49" charset="0"/>
+                <a:cs typeface="Consolas" panose="020B0609020204030204" pitchFamily="49" charset="0"/>
+              </a:rPr>
+              <a:t>  // Add to symbol table</a:t>
+            </a:r>
+          </a:p>
+          <a:p>
+            <a:r>
+              <a:rPr lang="en-US" sz="2000" dirty="0">
+                <a:latin typeface="Consolas" panose="020B0609020204030204" pitchFamily="49" charset="0"/>
+                <a:cs typeface="Consolas" panose="020B0609020204030204" pitchFamily="49" charset="0"/>
+              </a:rPr>
+              <a:t>  </a:t>
+            </a:r>
+            <a:r>
+              <a:rPr lang="en-US" sz="2000" dirty="0" err="1">
+                <a:latin typeface="Consolas" panose="020B0609020204030204" pitchFamily="49" charset="0"/>
+                <a:cs typeface="Consolas" panose="020B0609020204030204" pitchFamily="49" charset="0"/>
+              </a:rPr>
+              <a:t>syms.enter_symtbl</a:t>
+            </a:r>
+            <a:r>
+              <a:rPr lang="en-US" sz="2000" dirty="0">
                 <a:latin typeface="Consolas" panose="020B0609020204030204" pitchFamily="49" charset="0"/>
                 <a:cs typeface="Consolas" panose="020B0609020204030204" pitchFamily="49" charset="0"/>
               </a:rPr>
               <a:t>(</a:t>
             </a:r>
             <a:r>
-              <a:rPr lang="en-US" sz="1350" dirty="0" err="1">
-                <a:latin typeface="Consolas" panose="020B0609020204030204" pitchFamily="49" charset="0"/>
-                <a:cs typeface="Consolas" panose="020B0609020204030204" pitchFamily="49" charset="0"/>
-              </a:rPr>
-              <a:t>static_cast</a:t>
-            </a:r>
-            <a:r>
-              <a:rPr lang="en-US" sz="1350" dirty="0">
-                <a:latin typeface="Consolas" panose="020B0609020204030204" pitchFamily="49" charset="0"/>
-                <a:cs typeface="Consolas" panose="020B0609020204030204" pitchFamily="49" charset="0"/>
-              </a:rPr>
-              <a:t>&lt;</a:t>
-            </a:r>
-            <a:r>
-              <a:rPr lang="en-US" sz="1350" dirty="0" err="1">
-                <a:latin typeface="Consolas" panose="020B0609020204030204" pitchFamily="49" charset="0"/>
-                <a:cs typeface="Consolas" panose="020B0609020204030204" pitchFamily="49" charset="0"/>
-              </a:rPr>
-              <a:t>llvm</a:t>
-            </a:r>
-            <a:r>
-              <a:rPr lang="en-US" sz="1350" dirty="0">
-                <a:latin typeface="Consolas" panose="020B0609020204030204" pitchFamily="49" charset="0"/>
-                <a:cs typeface="Consolas" panose="020B0609020204030204" pitchFamily="49" charset="0"/>
-              </a:rPr>
-              <a:t>::Value *&gt;(&amp;*AI), </a:t>
-            </a:r>
-            <a:r>
-              <a:rPr lang="en-US" sz="1350" dirty="0" err="1">
+              <a:rPr lang="en-US" sz="2000" dirty="0" err="1">
+                <a:latin typeface="Consolas" panose="020B0609020204030204" pitchFamily="49" charset="0"/>
+                <a:cs typeface="Consolas" panose="020B0609020204030204" pitchFamily="49" charset="0"/>
+              </a:rPr>
+              <a:t>Arg.getName</a:t>
+            </a:r>
+            <a:r>
+              <a:rPr lang="en-US" sz="2000" dirty="0">
+                <a:latin typeface="Consolas" panose="020B0609020204030204" pitchFamily="49" charset="0"/>
+                <a:cs typeface="Consolas" panose="020B0609020204030204" pitchFamily="49" charset="0"/>
+              </a:rPr>
+              <a:t>(), </a:t>
+            </a:r>
+            <a:r>
+              <a:rPr lang="en-US" sz="2000" dirty="0" err="1">
                 <a:latin typeface="Consolas" panose="020B0609020204030204" pitchFamily="49" charset="0"/>
                 <a:cs typeface="Consolas" panose="020B0609020204030204" pitchFamily="49" charset="0"/>
               </a:rPr>
               <a:t>Alloca</a:t>
             </a:r>
             <a:r>
-              <a:rPr lang="en-US" sz="1350" dirty="0">
+              <a:rPr lang="en-US" sz="2000" dirty="0">
                 <a:latin typeface="Consolas" panose="020B0609020204030204" pitchFamily="49" charset="0"/>
                 <a:cs typeface="Consolas" panose="020B0609020204030204" pitchFamily="49" charset="0"/>
               </a:rPr>
@@ -6255,42 +6260,79 @@
           </a:p>
           <a:p>
             <a:r>
-              <a:rPr lang="en-US" sz="1350" dirty="0">
-                <a:latin typeface="Consolas" panose="020B0609020204030204" pitchFamily="49" charset="0"/>
-                <a:cs typeface="Consolas" panose="020B0609020204030204" pitchFamily="49" charset="0"/>
-              </a:rPr>
-              <a:t>// Add to symbol table</a:t>
-            </a:r>
-          </a:p>
-          <a:p>
-            <a:r>
-              <a:rPr lang="en-US" sz="1350" dirty="0" err="1">
-                <a:latin typeface="Consolas" panose="020B0609020204030204" pitchFamily="49" charset="0"/>
-                <a:cs typeface="Consolas" panose="020B0609020204030204" pitchFamily="49" charset="0"/>
-              </a:rPr>
-              <a:t>syms.enter_symtbl</a:t>
-            </a:r>
-            <a:r>
-              <a:rPr lang="en-US" sz="1350" dirty="0">
-                <a:latin typeface="Consolas" panose="020B0609020204030204" pitchFamily="49" charset="0"/>
-                <a:cs typeface="Consolas" panose="020B0609020204030204" pitchFamily="49" charset="0"/>
-              </a:rPr>
-              <a:t>(name, </a:t>
-            </a:r>
-            <a:r>
-              <a:rPr lang="en-US" sz="1350" dirty="0" err="1">
-                <a:latin typeface="Consolas" panose="020B0609020204030204" pitchFamily="49" charset="0"/>
-                <a:cs typeface="Consolas" panose="020B0609020204030204" pitchFamily="49" charset="0"/>
-              </a:rPr>
-              <a:t>Alloca</a:t>
-            </a:r>
-            <a:r>
-              <a:rPr lang="en-US" sz="1350" dirty="0">
-                <a:latin typeface="Consolas" panose="020B0609020204030204" pitchFamily="49" charset="0"/>
-                <a:cs typeface="Consolas" panose="020B0609020204030204" pitchFamily="49" charset="0"/>
-              </a:rPr>
-              <a:t>);</a:t>
-            </a:r>
+              <a:rPr lang="en-US" sz="2000" dirty="0">
+                <a:latin typeface="Consolas" panose="020B0609020204030204" pitchFamily="49" charset="0"/>
+                <a:cs typeface="Consolas" panose="020B0609020204030204" pitchFamily="49" charset="0"/>
+              </a:rPr>
+              <a:t>}</a:t>
+            </a:r>
+          </a:p>
+        </p:txBody>
+      </p:sp>
+      <p:sp>
+        <p:nvSpPr>
+          <p:cNvPr id="6" name="TextBox 5">
+            <a:extLst>
+              <a:ext uri="{FF2B5EF4-FFF2-40B4-BE49-F238E27FC236}">
+                <a16:creationId xmlns:a16="http://schemas.microsoft.com/office/drawing/2014/main" id="{A86788E3-AC78-3D41-AFF6-7303371CE405}"/>
+              </a:ext>
+            </a:extLst>
+          </p:cNvPr>
+          <p:cNvSpPr txBox="1"/>
+          <p:nvPr/>
+        </p:nvSpPr>
+        <p:spPr>
+          <a:xfrm>
+            <a:off x="4869501" y="147216"/>
+            <a:ext cx="3176897" cy="1015663"/>
+          </a:xfrm>
+          <a:prstGeom prst="rect">
+            <a:avLst/>
+          </a:prstGeom>
+          <a:noFill/>
+        </p:spPr>
+        <p:txBody>
+          <a:bodyPr wrap="square" rtlCol="0">
+            <a:spAutoFit/>
+          </a:bodyPr>
+          <a:lstStyle/>
+          <a:p>
+            <a:r>
+              <a:rPr lang="en-CA" sz="2000" dirty="0" err="1">
+                <a:latin typeface="Consolas" panose="020B0609020204030204" pitchFamily="49" charset="0"/>
+                <a:cs typeface="Consolas" panose="020B0609020204030204" pitchFamily="49" charset="0"/>
+              </a:rPr>
+              <a:t>func</a:t>
+            </a:r>
+            <a:r>
+              <a:rPr lang="en-CA" sz="2000" dirty="0">
+                <a:latin typeface="Consolas" panose="020B0609020204030204" pitchFamily="49" charset="0"/>
+                <a:cs typeface="Consolas" panose="020B0609020204030204" pitchFamily="49" charset="0"/>
+              </a:rPr>
+              <a:t> foo(x int) int { </a:t>
+            </a:r>
+          </a:p>
+          <a:p>
+            <a:r>
+              <a:rPr lang="en-CA" sz="2000" dirty="0">
+                <a:latin typeface="Consolas" panose="020B0609020204030204" pitchFamily="49" charset="0"/>
+                <a:cs typeface="Consolas" panose="020B0609020204030204" pitchFamily="49" charset="0"/>
+              </a:rPr>
+              <a:t>	x = 1; </a:t>
+            </a:r>
+          </a:p>
+          <a:p>
+            <a:r>
+              <a:rPr lang="en-CA" sz="2000" dirty="0">
+                <a:latin typeface="Consolas" panose="020B0609020204030204" pitchFamily="49" charset="0"/>
+                <a:cs typeface="Consolas" panose="020B0609020204030204" pitchFamily="49" charset="0"/>
+              </a:rPr>
+              <a:t>}</a:t>
+            </a:r>
+            <a:endParaRPr lang="en-US" sz="2000" dirty="0">
+              <a:latin typeface="Consolas" panose="020B0609020204030204" pitchFamily="49" charset="0"/>
+              <a:cs typeface="Consolas" panose="020B0609020204030204" pitchFamily="49" charset="0"/>
+            </a:endParaRPr>
           </a:p>
         </p:txBody>
       </p:sp>

</xml_diff>

<commit_message>
updated lecture notes upto SDT for LR parsing
</commit_message>
<xml_diff>
--- a/assets/ppt/codegen/decafLLVM.pptx
+++ b/assets/ppt/codegen/decafLLVM.pptx
@@ -267,7 +267,7 @@
                 <a:latin typeface="Calibri" panose="020F0502020204030204" pitchFamily="34" charset="0"/>
               </a:rPr>
               <a:pPr/>
-              <a:t>10/17/20</a:t>
+              <a:t>10/18/20</a:t>
             </a:fld>
             <a:endParaRPr lang="en-US" dirty="0">
               <a:latin typeface="Calibri" panose="020F0502020204030204" pitchFamily="34" charset="0"/>
@@ -952,7 +952,7 @@
           <a:p>
             <a:fld id="{1B6DC762-1116-2146-A47C-D79A5A5DBAFD}" type="datetime1">
               <a:rPr lang="en-CA" smtClean="0"/>
-              <a:t>2020-10-17</a:t>
+              <a:t>2020-10-18</a:t>
             </a:fld>
             <a:endParaRPr lang="en-US"/>
           </a:p>
@@ -1150,7 +1150,7 @@
           <a:p>
             <a:fld id="{725FEDD1-5A1B-2342-BAF0-F7C5511A73CE}" type="datetime1">
               <a:rPr lang="en-CA" smtClean="0"/>
-              <a:t>2020-10-17</a:t>
+              <a:t>2020-10-18</a:t>
             </a:fld>
             <a:endParaRPr lang="en-US"/>
           </a:p>
@@ -1358,7 +1358,7 @@
           <a:p>
             <a:fld id="{F09E59AE-0AE1-4048-8BD6-D39FC0EBB194}" type="datetime1">
               <a:rPr lang="en-CA" smtClean="0"/>
-              <a:t>2020-10-17</a:t>
+              <a:t>2020-10-18</a:t>
             </a:fld>
             <a:endParaRPr lang="en-US"/>
           </a:p>
@@ -2833,7 +2833,7 @@
           <a:p>
             <a:fld id="{A2849525-9B7D-5945-A782-775278635E42}" type="datetime1">
               <a:rPr lang="en-CA" smtClean="0"/>
-              <a:t>2020-10-17</a:t>
+              <a:t>2020-10-18</a:t>
             </a:fld>
             <a:endParaRPr lang="en-US"/>
           </a:p>
@@ -3108,7 +3108,7 @@
           <a:p>
             <a:fld id="{D05E1499-BDD1-6940-8C79-13A8B8E63D57}" type="datetime1">
               <a:rPr lang="en-CA" smtClean="0"/>
-              <a:t>2020-10-17</a:t>
+              <a:t>2020-10-18</a:t>
             </a:fld>
             <a:endParaRPr lang="en-US"/>
           </a:p>
@@ -3373,7 +3373,7 @@
           <a:p>
             <a:fld id="{17E70EF3-18A7-4644-8DA2-1EB9CA66C736}" type="datetime1">
               <a:rPr lang="en-CA" smtClean="0"/>
-              <a:t>2020-10-17</a:t>
+              <a:t>2020-10-18</a:t>
             </a:fld>
             <a:endParaRPr lang="en-US"/>
           </a:p>
@@ -3785,7 +3785,7 @@
           <a:p>
             <a:fld id="{54538FC1-2481-FB4A-91E5-87F3422DE2D5}" type="datetime1">
               <a:rPr lang="en-CA" smtClean="0"/>
-              <a:t>2020-10-17</a:t>
+              <a:t>2020-10-18</a:t>
             </a:fld>
             <a:endParaRPr lang="en-US"/>
           </a:p>
@@ -3926,7 +3926,7 @@
           <a:p>
             <a:fld id="{93D5C515-1622-C840-89B2-A4A55D34866A}" type="datetime1">
               <a:rPr lang="en-CA" smtClean="0"/>
-              <a:t>2020-10-17</a:t>
+              <a:t>2020-10-18</a:t>
             </a:fld>
             <a:endParaRPr lang="en-US"/>
           </a:p>
@@ -4039,7 +4039,7 @@
           <a:p>
             <a:fld id="{B9077E75-6C88-BB47-AC6F-0DCA859E7113}" type="datetime1">
               <a:rPr lang="en-CA" smtClean="0"/>
-              <a:t>2020-10-17</a:t>
+              <a:t>2020-10-18</a:t>
             </a:fld>
             <a:endParaRPr lang="en-US"/>
           </a:p>
@@ -4350,7 +4350,7 @@
           <a:p>
             <a:fld id="{1AD12F8B-7E05-A047-BAC3-EE71BEBBE5BE}" type="datetime1">
               <a:rPr lang="en-CA" smtClean="0"/>
-              <a:t>2020-10-17</a:t>
+              <a:t>2020-10-18</a:t>
             </a:fld>
             <a:endParaRPr lang="en-US"/>
           </a:p>
@@ -4638,7 +4638,7 @@
           <a:p>
             <a:fld id="{C1D9F72A-E93E-B546-8268-6408A6E1DA62}" type="datetime1">
               <a:rPr lang="en-CA" smtClean="0"/>
-              <a:t>2020-10-17</a:t>
+              <a:t>2020-10-18</a:t>
             </a:fld>
             <a:endParaRPr lang="en-US"/>
           </a:p>
@@ -4881,7 +4881,7 @@
             <a:fld id="{97DF4AC7-DB73-7444-A2A7-FD79FE1A2B2B}" type="datetime1">
               <a:rPr lang="en-CA" smtClean="0"/>
               <a:pPr/>
-              <a:t>2020-10-17</a:t>
+              <a:t>2020-10-18</a:t>
             </a:fld>
             <a:endParaRPr lang="en-US" dirty="0"/>
           </a:p>
@@ -5921,25 +5921,7 @@
             </a:r>
             <a:r>
               <a:rPr lang="en-US" sz="2400" dirty="0"/>
-              <a:t>iterate through the function arguments using </a:t>
-            </a:r>
-            <a:r>
-              <a:rPr lang="en-US" sz="2400" dirty="0" err="1">
-                <a:latin typeface="Consolas" panose="020B0609020204030204" pitchFamily="49" charset="0"/>
-                <a:cs typeface="Consolas" panose="020B0609020204030204" pitchFamily="49" charset="0"/>
-              </a:rPr>
-              <a:t>arg_iterator</a:t>
-            </a:r>
-            <a:r>
-              <a:rPr lang="en-US" sz="2400" dirty="0">
-                <a:latin typeface="Consolas" panose="020B0609020204030204" pitchFamily="49" charset="0"/>
-                <a:cs typeface="Consolas" panose="020B0609020204030204" pitchFamily="49" charset="0"/>
-              </a:rPr>
-              <a:t> </a:t>
-            </a:r>
-            <a:r>
-              <a:rPr lang="en-US" sz="2400" dirty="0"/>
-              <a:t>and allocate them into the stack.</a:t>
+              <a:t>iterate through the function arguments and allocate them into the stack.</a:t>
             </a:r>
           </a:p>
         </p:txBody>
@@ -6130,81 +6112,104 @@
                 <a:latin typeface="Consolas" panose="020B0609020204030204" pitchFamily="49" charset="0"/>
                 <a:cs typeface="Consolas" panose="020B0609020204030204" pitchFamily="49" charset="0"/>
               </a:rPr>
-              <a:t>  // Store the initial value into the </a:t>
+              <a:t>  </a:t>
+            </a:r>
+            <a:r>
+              <a:rPr lang="en-US" sz="2000" dirty="0">
+                <a:solidFill>
+                  <a:srgbClr val="C00000"/>
+                </a:solidFill>
+                <a:latin typeface="Consolas" panose="020B0609020204030204" pitchFamily="49" charset="0"/>
+                <a:cs typeface="Consolas" panose="020B0609020204030204" pitchFamily="49" charset="0"/>
+              </a:rPr>
+              <a:t>// Store the initial value into the </a:t>
             </a:r>
             <a:r>
               <a:rPr lang="en-US" sz="2000" dirty="0" err="1">
+                <a:solidFill>
+                  <a:srgbClr val="C00000"/>
+                </a:solidFill>
                 <a:latin typeface="Consolas" panose="020B0609020204030204" pitchFamily="49" charset="0"/>
                 <a:cs typeface="Consolas" panose="020B0609020204030204" pitchFamily="49" charset="0"/>
               </a:rPr>
               <a:t>alloca</a:t>
             </a:r>
+            <a:endParaRPr lang="en-US" sz="2000" dirty="0">
+              <a:solidFill>
+                <a:srgbClr val="C00000"/>
+              </a:solidFill>
+              <a:latin typeface="Consolas" panose="020B0609020204030204" pitchFamily="49" charset="0"/>
+              <a:cs typeface="Consolas" panose="020B0609020204030204" pitchFamily="49" charset="0"/>
+            </a:endParaRPr>
+          </a:p>
+          <a:p>
             <a:r>
               <a:rPr lang="en-US" sz="2000" dirty="0">
                 <a:latin typeface="Consolas" panose="020B0609020204030204" pitchFamily="49" charset="0"/>
                 <a:cs typeface="Consolas" panose="020B0609020204030204" pitchFamily="49" charset="0"/>
               </a:rPr>
-              <a:t>.</a:t>
-            </a:r>
-          </a:p>
-          <a:p>
+              <a:t>  </a:t>
+            </a:r>
+            <a:r>
+              <a:rPr lang="en-US" sz="2000" dirty="0" err="1">
+                <a:latin typeface="Consolas" panose="020B0609020204030204" pitchFamily="49" charset="0"/>
+                <a:cs typeface="Consolas" panose="020B0609020204030204" pitchFamily="49" charset="0"/>
+              </a:rPr>
+              <a:t>Builder.CreateStore</a:t>
+            </a:r>
             <a:r>
               <a:rPr lang="en-US" sz="2000" dirty="0">
                 <a:latin typeface="Consolas" panose="020B0609020204030204" pitchFamily="49" charset="0"/>
                 <a:cs typeface="Consolas" panose="020B0609020204030204" pitchFamily="49" charset="0"/>
               </a:rPr>
+              <a:t>(&amp;</a:t>
+            </a:r>
+            <a:r>
+              <a:rPr lang="en-US" sz="2000" dirty="0" err="1">
+                <a:latin typeface="Consolas" panose="020B0609020204030204" pitchFamily="49" charset="0"/>
+                <a:cs typeface="Consolas" panose="020B0609020204030204" pitchFamily="49" charset="0"/>
+              </a:rPr>
+              <a:t>Arg</a:t>
+            </a:r>
+            <a:r>
+              <a:rPr lang="en-US" sz="2000" dirty="0">
+                <a:latin typeface="Consolas" panose="020B0609020204030204" pitchFamily="49" charset="0"/>
+                <a:cs typeface="Consolas" panose="020B0609020204030204" pitchFamily="49" charset="0"/>
+              </a:rPr>
+              <a:t>, </a:t>
+            </a:r>
+            <a:r>
+              <a:rPr lang="en-US" sz="2000" dirty="0" err="1">
+                <a:latin typeface="Consolas" panose="020B0609020204030204" pitchFamily="49" charset="0"/>
+                <a:cs typeface="Consolas" panose="020B0609020204030204" pitchFamily="49" charset="0"/>
+              </a:rPr>
+              <a:t>Alloca</a:t>
+            </a:r>
+            <a:r>
+              <a:rPr lang="en-US" sz="2000" dirty="0">
+                <a:latin typeface="Consolas" panose="020B0609020204030204" pitchFamily="49" charset="0"/>
+                <a:cs typeface="Consolas" panose="020B0609020204030204" pitchFamily="49" charset="0"/>
+              </a:rPr>
+              <a:t>);</a:t>
+            </a:r>
+          </a:p>
+          <a:p>
+            <a:r>
+              <a:rPr lang="en-US" sz="2000" dirty="0">
+                <a:latin typeface="Consolas" panose="020B0609020204030204" pitchFamily="49" charset="0"/>
+                <a:cs typeface="Consolas" panose="020B0609020204030204" pitchFamily="49" charset="0"/>
+              </a:rPr>
               <a:t>  </a:t>
             </a:r>
             <a:r>
-              <a:rPr lang="en-US" sz="2000" dirty="0" err="1">
-                <a:latin typeface="Consolas" panose="020B0609020204030204" pitchFamily="49" charset="0"/>
-                <a:cs typeface="Consolas" panose="020B0609020204030204" pitchFamily="49" charset="0"/>
-              </a:rPr>
-              <a:t>Builder.CreateStore</a:t>
-            </a:r>
-            <a:r>
               <a:rPr lang="en-US" sz="2000" dirty="0">
-                <a:latin typeface="Consolas" panose="020B0609020204030204" pitchFamily="49" charset="0"/>
-                <a:cs typeface="Consolas" panose="020B0609020204030204" pitchFamily="49" charset="0"/>
-              </a:rPr>
-              <a:t>(&amp;</a:t>
-            </a:r>
-            <a:r>
-              <a:rPr lang="en-US" sz="2000" dirty="0" err="1">
-                <a:latin typeface="Consolas" panose="020B0609020204030204" pitchFamily="49" charset="0"/>
-                <a:cs typeface="Consolas" panose="020B0609020204030204" pitchFamily="49" charset="0"/>
-              </a:rPr>
-              <a:t>Arg</a:t>
-            </a:r>
-            <a:r>
-              <a:rPr lang="en-US" sz="2000" dirty="0">
-                <a:latin typeface="Consolas" panose="020B0609020204030204" pitchFamily="49" charset="0"/>
-                <a:cs typeface="Consolas" panose="020B0609020204030204" pitchFamily="49" charset="0"/>
-              </a:rPr>
-              <a:t>, </a:t>
-            </a:r>
-            <a:r>
-              <a:rPr lang="en-US" sz="2000" dirty="0" err="1">
-                <a:latin typeface="Consolas" panose="020B0609020204030204" pitchFamily="49" charset="0"/>
-                <a:cs typeface="Consolas" panose="020B0609020204030204" pitchFamily="49" charset="0"/>
-              </a:rPr>
-              <a:t>Alloca</a:t>
-            </a:r>
-            <a:r>
-              <a:rPr lang="en-US" sz="2000" dirty="0">
-                <a:latin typeface="Consolas" panose="020B0609020204030204" pitchFamily="49" charset="0"/>
-                <a:cs typeface="Consolas" panose="020B0609020204030204" pitchFamily="49" charset="0"/>
-              </a:rPr>
-              <a:t>);</a:t>
-            </a:r>
-          </a:p>
-          <a:p>
-            <a:r>
-              <a:rPr lang="en-US" sz="2000" dirty="0">
-                <a:latin typeface="Consolas" panose="020B0609020204030204" pitchFamily="49" charset="0"/>
-                <a:cs typeface="Consolas" panose="020B0609020204030204" pitchFamily="49" charset="0"/>
-              </a:rPr>
-              <a:t>  // Add to symbol table</a:t>
+                <a:solidFill>
+                  <a:srgbClr val="C00000"/>
+                </a:solidFill>
+                <a:latin typeface="Consolas" panose="020B0609020204030204" pitchFamily="49" charset="0"/>
+                <a:cs typeface="Consolas" panose="020B0609020204030204" pitchFamily="49" charset="0"/>
+              </a:rPr>
+              <a:t>// Add to symbol table</a:t>
             </a:r>
           </a:p>
           <a:p>
@@ -6994,7 +6999,10 @@
               <a:rPr lang="en-US" dirty="0" err="1"/>
               <a:t>iftrue</a:t>
             </a:r>
-            <a:endParaRPr lang="en-US" dirty="0"/>
+            <a:r>
+              <a:rPr lang="en-US" dirty="0"/>
+              <a:t> (see slide 9)</a:t>
+            </a:r>
           </a:p>
           <a:p>
             <a:pPr lvl="1"/>
@@ -7199,16 +7207,64 @@
             <a:r>
               <a:rPr lang="en-US" sz="1800" dirty="0">
                 <a:solidFill>
+                  <a:srgbClr val="C00000"/>
+                </a:solidFill>
+              </a:rPr>
+              <a:t>  // </a:t>
+            </a:r>
+            <a:r>
+              <a:rPr lang="en-US" sz="1800" b="1" dirty="0" err="1">
+                <a:solidFill>
+                  <a:srgbClr val="C00000"/>
+                </a:solidFill>
+              </a:rPr>
+              <a:t>val</a:t>
+            </a:r>
+            <a:r>
+              <a:rPr lang="en-US" sz="1800" dirty="0">
+                <a:solidFill>
+                  <a:srgbClr val="C00000"/>
+                </a:solidFill>
+              </a:rPr>
+              <a:t> contains the Expr value for the conditional</a:t>
+            </a:r>
+          </a:p>
+          <a:p>
+            <a:r>
+              <a:rPr lang="en-US" sz="1800" dirty="0">
+                <a:solidFill>
                   <a:srgbClr val="000000"/>
                 </a:solidFill>
               </a:rPr>
-              <a:t>  /* </a:t>
+              <a:t>  </a:t>
+            </a:r>
+            <a:r>
+              <a:rPr lang="en-US" sz="1800" dirty="0" err="1">
+                <a:solidFill>
+                  <a:srgbClr val="000000"/>
+                </a:solidFill>
+                <a:latin typeface="Consolas" panose="020B0609020204030204" pitchFamily="49" charset="0"/>
+                <a:cs typeface="Consolas" panose="020B0609020204030204" pitchFamily="49" charset="0"/>
+              </a:rPr>
+              <a:t>Builder.CreateCondBr</a:t>
+            </a:r>
+            <a:r>
+              <a:rPr lang="en-US" sz="1800" dirty="0">
+                <a:solidFill>
+                  <a:srgbClr val="000000"/>
+                </a:solidFill>
+                <a:latin typeface="Consolas" panose="020B0609020204030204" pitchFamily="49" charset="0"/>
+                <a:cs typeface="Consolas" panose="020B0609020204030204" pitchFamily="49" charset="0"/>
+              </a:rPr>
+              <a:t>(</a:t>
             </a:r>
             <a:r>
               <a:rPr lang="en-US" sz="1800" b="1" dirty="0" err="1">
                 <a:solidFill>
                   <a:srgbClr val="000000"/>
                 </a:solidFill>
+                <a:latin typeface="Consolas" panose="020B0609020204030204" pitchFamily="49" charset="0"/>
+                <a:cs typeface="Consolas" panose="020B0609020204030204" pitchFamily="49" charset="0"/>
               </a:rPr>
               <a:t>val</a:t>
             </a:r>
@@ -7217,34 +7273,62 @@
                 <a:solidFill>
                   <a:srgbClr val="000000"/>
                 </a:solidFill>
-              </a:rPr>
-              <a:t> contains the </a:t>
+                <a:latin typeface="Consolas" panose="020B0609020204030204" pitchFamily="49" charset="0"/>
+                <a:cs typeface="Consolas" panose="020B0609020204030204" pitchFamily="49" charset="0"/>
+              </a:rPr>
+              <a:t>, </a:t>
             </a:r>
             <a:r>
               <a:rPr lang="en-US" sz="1800" dirty="0" err="1">
                 <a:solidFill>
                   <a:srgbClr val="000000"/>
                 </a:solidFill>
-              </a:rPr>
-              <a:t>Expr</a:t>
+                <a:latin typeface="Consolas" panose="020B0609020204030204" pitchFamily="49" charset="0"/>
+                <a:cs typeface="Consolas" panose="020B0609020204030204" pitchFamily="49" charset="0"/>
+              </a:rPr>
+              <a:t>IfTrueBB</a:t>
             </a:r>
             <a:r>
               <a:rPr lang="en-US" sz="1800" dirty="0">
                 <a:solidFill>
                   <a:srgbClr val="000000"/>
                 </a:solidFill>
-              </a:rPr>
-              <a:t> value for the conditional */</a:t>
-            </a:r>
-          </a:p>
-          <a:p>
+                <a:latin typeface="Consolas" panose="020B0609020204030204" pitchFamily="49" charset="0"/>
+                <a:cs typeface="Consolas" panose="020B0609020204030204" pitchFamily="49" charset="0"/>
+              </a:rPr>
+              <a:t>, </a:t>
+            </a:r>
+            <a:r>
+              <a:rPr lang="en-US" sz="1800" dirty="0" err="1">
+                <a:solidFill>
+                  <a:srgbClr val="000000"/>
+                </a:solidFill>
+                <a:latin typeface="Consolas" panose="020B0609020204030204" pitchFamily="49" charset="0"/>
+                <a:cs typeface="Consolas" panose="020B0609020204030204" pitchFamily="49" charset="0"/>
+              </a:rPr>
+              <a:t>EndBB</a:t>
+            </a:r>
             <a:r>
               <a:rPr lang="en-US" sz="1800" dirty="0">
                 <a:solidFill>
                   <a:srgbClr val="000000"/>
                 </a:solidFill>
-              </a:rPr>
-              <a:t>  </a:t>
+                <a:latin typeface="Consolas" panose="020B0609020204030204" pitchFamily="49" charset="0"/>
+                <a:cs typeface="Consolas" panose="020B0609020204030204" pitchFamily="49" charset="0"/>
+              </a:rPr>
+              <a:t>);</a:t>
+            </a:r>
+          </a:p>
+          <a:p>
+            <a:r>
+              <a:rPr lang="en-US" sz="1800" dirty="0">
+                <a:solidFill>
+                  <a:srgbClr val="000000"/>
+                </a:solidFill>
+                <a:latin typeface="Consolas" panose="020B0609020204030204" pitchFamily="49" charset="0"/>
+                <a:cs typeface="Consolas" panose="020B0609020204030204" pitchFamily="49" charset="0"/>
+              </a:rPr>
+              <a:t> </a:t>
             </a:r>
             <a:r>
               <a:rPr lang="en-US" sz="1800" dirty="0" err="1">
@@ -7254,7 +7338,7 @@
                 <a:latin typeface="Consolas" panose="020B0609020204030204" pitchFamily="49" charset="0"/>
                 <a:cs typeface="Consolas" panose="020B0609020204030204" pitchFamily="49" charset="0"/>
               </a:rPr>
-              <a:t>Builder.CreateCondBr</a:t>
+              <a:t>Builder.SetInsertPoint</a:t>
             </a:r>
             <a:r>
               <a:rPr lang="en-US" sz="1800" dirty="0">
@@ -7267,14 +7351,14 @@
               <a:t>(</a:t>
             </a:r>
             <a:r>
-              <a:rPr lang="en-US" sz="1800" b="1" dirty="0" err="1">
+              <a:rPr lang="en-US" sz="1800" dirty="0" err="1">
                 <a:solidFill>
                   <a:srgbClr val="000000"/>
                 </a:solidFill>
                 <a:latin typeface="Consolas" panose="020B0609020204030204" pitchFamily="49" charset="0"/>
                 <a:cs typeface="Consolas" panose="020B0609020204030204" pitchFamily="49" charset="0"/>
               </a:rPr>
-              <a:t>val</a:t>
+              <a:t>IfTrueBB</a:t>
             </a:r>
             <a:r>
               <a:rPr lang="en-US" sz="1800" dirty="0">
@@ -7284,7 +7368,19 @@
                 <a:latin typeface="Consolas" panose="020B0609020204030204" pitchFamily="49" charset="0"/>
                 <a:cs typeface="Consolas" panose="020B0609020204030204" pitchFamily="49" charset="0"/>
               </a:rPr>
-              <a:t>, </a:t>
+              <a:t>);</a:t>
+            </a:r>
+          </a:p>
+          <a:p>
+            <a:r>
+              <a:rPr lang="en-US" sz="1800" dirty="0">
+                <a:solidFill>
+                  <a:srgbClr val="000000"/>
+                </a:solidFill>
+                <a:latin typeface="Consolas" panose="020B0609020204030204" pitchFamily="49" charset="0"/>
+                <a:cs typeface="Consolas" panose="020B0609020204030204" pitchFamily="49" charset="0"/>
+              </a:rPr>
+              <a:t> </a:t>
             </a:r>
             <a:r>
               <a:rPr lang="en-US" sz="1800" dirty="0" err="1">
@@ -7294,7 +7390,7 @@
                 <a:latin typeface="Consolas" panose="020B0609020204030204" pitchFamily="49" charset="0"/>
                 <a:cs typeface="Consolas" panose="020B0609020204030204" pitchFamily="49" charset="0"/>
               </a:rPr>
-              <a:t>IfTrueBB</a:t>
+              <a:t>IfTrueBlock</a:t>
             </a:r>
             <a:r>
               <a:rPr lang="en-US" sz="1800" dirty="0">
@@ -7304,7 +7400,7 @@
                 <a:latin typeface="Consolas" panose="020B0609020204030204" pitchFamily="49" charset="0"/>
                 <a:cs typeface="Consolas" panose="020B0609020204030204" pitchFamily="49" charset="0"/>
               </a:rPr>
-              <a:t>, </a:t>
+              <a:t>-&gt;</a:t>
             </a:r>
             <a:r>
               <a:rPr lang="en-US" sz="1800" dirty="0" err="1">
@@ -7314,7 +7410,7 @@
                 <a:latin typeface="Consolas" panose="020B0609020204030204" pitchFamily="49" charset="0"/>
                 <a:cs typeface="Consolas" panose="020B0609020204030204" pitchFamily="49" charset="0"/>
               </a:rPr>
-              <a:t>EndBB</a:t>
+              <a:t>Codegen</a:t>
             </a:r>
             <a:r>
               <a:rPr lang="en-US" sz="1800" dirty="0">
@@ -7324,110 +7420,6 @@
                 <a:latin typeface="Consolas" panose="020B0609020204030204" pitchFamily="49" charset="0"/>
                 <a:cs typeface="Consolas" panose="020B0609020204030204" pitchFamily="49" charset="0"/>
               </a:rPr>
-              <a:t>);</a:t>
-            </a:r>
-          </a:p>
-          <a:p>
-            <a:r>
-              <a:rPr lang="en-US" sz="1800" dirty="0">
-                <a:solidFill>
-                  <a:srgbClr val="000000"/>
-                </a:solidFill>
-                <a:latin typeface="Consolas" panose="020B0609020204030204" pitchFamily="49" charset="0"/>
-                <a:cs typeface="Consolas" panose="020B0609020204030204" pitchFamily="49" charset="0"/>
-              </a:rPr>
-              <a:t> </a:t>
-            </a:r>
-            <a:r>
-              <a:rPr lang="en-US" sz="1800" dirty="0" err="1">
-                <a:solidFill>
-                  <a:srgbClr val="000000"/>
-                </a:solidFill>
-                <a:latin typeface="Consolas" panose="020B0609020204030204" pitchFamily="49" charset="0"/>
-                <a:cs typeface="Consolas" panose="020B0609020204030204" pitchFamily="49" charset="0"/>
-              </a:rPr>
-              <a:t>Builder.SetInsertPoint</a:t>
-            </a:r>
-            <a:r>
-              <a:rPr lang="en-US" sz="1800" dirty="0">
-                <a:solidFill>
-                  <a:srgbClr val="000000"/>
-                </a:solidFill>
-                <a:latin typeface="Consolas" panose="020B0609020204030204" pitchFamily="49" charset="0"/>
-                <a:cs typeface="Consolas" panose="020B0609020204030204" pitchFamily="49" charset="0"/>
-              </a:rPr>
-              <a:t>(</a:t>
-            </a:r>
-            <a:r>
-              <a:rPr lang="en-US" sz="1800" dirty="0" err="1">
-                <a:solidFill>
-                  <a:srgbClr val="000000"/>
-                </a:solidFill>
-                <a:latin typeface="Consolas" panose="020B0609020204030204" pitchFamily="49" charset="0"/>
-                <a:cs typeface="Consolas" panose="020B0609020204030204" pitchFamily="49" charset="0"/>
-              </a:rPr>
-              <a:t>IfTrueBB</a:t>
-            </a:r>
-            <a:r>
-              <a:rPr lang="en-US" sz="1800" dirty="0">
-                <a:solidFill>
-                  <a:srgbClr val="000000"/>
-                </a:solidFill>
-                <a:latin typeface="Consolas" panose="020B0609020204030204" pitchFamily="49" charset="0"/>
-                <a:cs typeface="Consolas" panose="020B0609020204030204" pitchFamily="49" charset="0"/>
-              </a:rPr>
-              <a:t>);</a:t>
-            </a:r>
-          </a:p>
-          <a:p>
-            <a:r>
-              <a:rPr lang="en-US" sz="1800" dirty="0">
-                <a:solidFill>
-                  <a:srgbClr val="000000"/>
-                </a:solidFill>
-                <a:latin typeface="Consolas" panose="020B0609020204030204" pitchFamily="49" charset="0"/>
-                <a:cs typeface="Consolas" panose="020B0609020204030204" pitchFamily="49" charset="0"/>
-              </a:rPr>
-              <a:t> </a:t>
-            </a:r>
-            <a:r>
-              <a:rPr lang="en-US" sz="1800" dirty="0" err="1">
-                <a:solidFill>
-                  <a:srgbClr val="000000"/>
-                </a:solidFill>
-                <a:latin typeface="Consolas" panose="020B0609020204030204" pitchFamily="49" charset="0"/>
-                <a:cs typeface="Consolas" panose="020B0609020204030204" pitchFamily="49" charset="0"/>
-              </a:rPr>
-              <a:t>IfTrueBlock</a:t>
-            </a:r>
-            <a:r>
-              <a:rPr lang="en-US" sz="1800" dirty="0">
-                <a:solidFill>
-                  <a:srgbClr val="000000"/>
-                </a:solidFill>
-                <a:latin typeface="Consolas" panose="020B0609020204030204" pitchFamily="49" charset="0"/>
-                <a:cs typeface="Consolas" panose="020B0609020204030204" pitchFamily="49" charset="0"/>
-              </a:rPr>
-              <a:t>-&gt;</a:t>
-            </a:r>
-            <a:r>
-              <a:rPr lang="en-US" sz="1800" dirty="0" err="1">
-                <a:solidFill>
-                  <a:srgbClr val="000000"/>
-                </a:solidFill>
-                <a:latin typeface="Consolas" panose="020B0609020204030204" pitchFamily="49" charset="0"/>
-                <a:cs typeface="Consolas" panose="020B0609020204030204" pitchFamily="49" charset="0"/>
-              </a:rPr>
-              <a:t>Codegen</a:t>
-            </a:r>
-            <a:r>
-              <a:rPr lang="en-US" sz="1800" dirty="0">
-                <a:solidFill>
-                  <a:srgbClr val="000000"/>
-                </a:solidFill>
-                <a:latin typeface="Consolas" panose="020B0609020204030204" pitchFamily="49" charset="0"/>
-                <a:cs typeface="Consolas" panose="020B0609020204030204" pitchFamily="49" charset="0"/>
-              </a:rPr>
               <a:t>();</a:t>
             </a:r>
           </a:p>
@@ -7442,7 +7434,7 @@
         <p:spPr>
           <a:xfrm>
             <a:off x="1038325" y="3760883"/>
-            <a:ext cx="7149714" cy="923330"/>
+            <a:ext cx="6896440" cy="923330"/>
           </a:xfrm>
           <a:prstGeom prst="rect">
             <a:avLst/>
@@ -7506,13 +7498,19 @@
           <a:p>
             <a:r>
               <a:rPr lang="en-US" sz="1800" dirty="0">
-                <a:latin typeface="Consolas" panose="020B0609020204030204" pitchFamily="49" charset="0"/>
-                <a:cs typeface="Consolas" panose="020B0609020204030204" pitchFamily="49" charset="0"/>
-              </a:rPr>
-              <a:t>/* pop the symbol table after </a:t>
+                <a:solidFill>
+                  <a:srgbClr val="C00000"/>
+                </a:solidFill>
+                <a:latin typeface="Consolas" panose="020B0609020204030204" pitchFamily="49" charset="0"/>
+                <a:cs typeface="Consolas" panose="020B0609020204030204" pitchFamily="49" charset="0"/>
+              </a:rPr>
+              <a:t>// pop the symbol table after </a:t>
             </a:r>
             <a:r>
               <a:rPr lang="en-US" sz="1800" dirty="0" err="1">
+                <a:solidFill>
+                  <a:srgbClr val="C00000"/>
+                </a:solidFill>
                 <a:latin typeface="Consolas" panose="020B0609020204030204" pitchFamily="49" charset="0"/>
                 <a:cs typeface="Consolas" panose="020B0609020204030204" pitchFamily="49" charset="0"/>
               </a:rPr>
@@ -7520,6 +7518,9 @@
             </a:r>
             <a:r>
               <a:rPr lang="en-US" sz="1800" dirty="0">
+                <a:solidFill>
+                  <a:srgbClr val="C00000"/>
+                </a:solidFill>
                 <a:latin typeface="Consolas" panose="020B0609020204030204" pitchFamily="49" charset="0"/>
                 <a:cs typeface="Consolas" panose="020B0609020204030204" pitchFamily="49" charset="0"/>
               </a:rPr>
@@ -7527,6 +7528,9 @@
             </a:r>
             <a:r>
               <a:rPr lang="en-US" sz="1800" dirty="0" err="1">
+                <a:solidFill>
+                  <a:srgbClr val="C00000"/>
+                </a:solidFill>
                 <a:latin typeface="Consolas" panose="020B0609020204030204" pitchFamily="49" charset="0"/>
                 <a:cs typeface="Consolas" panose="020B0609020204030204" pitchFamily="49" charset="0"/>
               </a:rPr>
@@ -7534,10 +7538,13 @@
             </a:r>
             <a:r>
               <a:rPr lang="en-US" sz="1800" dirty="0">
-                <a:latin typeface="Consolas" panose="020B0609020204030204" pitchFamily="49" charset="0"/>
-                <a:cs typeface="Consolas" panose="020B0609020204030204" pitchFamily="49" charset="0"/>
-              </a:rPr>
-              <a:t> is done */</a:t>
+                <a:solidFill>
+                  <a:srgbClr val="C00000"/>
+                </a:solidFill>
+                <a:latin typeface="Consolas" panose="020B0609020204030204" pitchFamily="49" charset="0"/>
+                <a:cs typeface="Consolas" panose="020B0609020204030204" pitchFamily="49" charset="0"/>
+              </a:rPr>
+              <a:t> is done</a:t>
             </a:r>
           </a:p>
           <a:p>
@@ -7708,7 +7715,12 @@
             <p:ph idx="1"/>
           </p:nvPr>
         </p:nvSpPr>
-        <p:spPr/>
+        <p:spPr>
+          <a:xfrm>
+            <a:off x="628650" y="1369219"/>
+            <a:ext cx="7886700" cy="1562571"/>
+          </a:xfrm>
+        </p:spPr>
         <p:txBody>
           <a:bodyPr/>
           <a:lstStyle/>
@@ -7766,6 +7778,237 @@
           </a:p>
         </p:txBody>
       </p:sp>
+      <p:sp>
+        <p:nvSpPr>
+          <p:cNvPr id="4" name="Rectangle 3">
+            <a:extLst>
+              <a:ext uri="{FF2B5EF4-FFF2-40B4-BE49-F238E27FC236}">
+                <a16:creationId xmlns:a16="http://schemas.microsoft.com/office/drawing/2014/main" id="{0032F20A-E870-5440-911B-0A0C10F65979}"/>
+              </a:ext>
+            </a:extLst>
+          </p:cNvPr>
+          <p:cNvSpPr/>
+          <p:nvPr/>
+        </p:nvSpPr>
+        <p:spPr>
+          <a:xfrm>
+            <a:off x="2195736" y="3147814"/>
+            <a:ext cx="1224136" cy="360040"/>
+          </a:xfrm>
+          <a:prstGeom prst="rect">
+            <a:avLst/>
+          </a:prstGeom>
+        </p:spPr>
+        <p:style>
+          <a:lnRef idx="2">
+            <a:schemeClr val="accent1">
+              <a:shade val="50000"/>
+            </a:schemeClr>
+          </a:lnRef>
+          <a:fillRef idx="1">
+            <a:schemeClr val="accent1"/>
+          </a:fillRef>
+          <a:effectRef idx="0">
+            <a:schemeClr val="accent1"/>
+          </a:effectRef>
+          <a:fontRef idx="minor">
+            <a:schemeClr val="lt1"/>
+          </a:fontRef>
+        </p:style>
+        <p:txBody>
+          <a:bodyPr rtlCol="0" anchor="ctr"/>
+          <a:lstStyle/>
+          <a:p>
+            <a:pPr algn="ctr"/>
+            <a:r>
+              <a:rPr lang="en-US" sz="1800" dirty="0"/>
+              <a:t>BB1: x1 = 1</a:t>
+            </a:r>
+          </a:p>
+        </p:txBody>
+      </p:sp>
+      <p:sp>
+        <p:nvSpPr>
+          <p:cNvPr id="7" name="Rectangle 6">
+            <a:extLst>
+              <a:ext uri="{FF2B5EF4-FFF2-40B4-BE49-F238E27FC236}">
+                <a16:creationId xmlns:a16="http://schemas.microsoft.com/office/drawing/2014/main" id="{98869C11-1354-9648-A1DE-7B9429020F44}"/>
+              </a:ext>
+            </a:extLst>
+          </p:cNvPr>
+          <p:cNvSpPr/>
+          <p:nvPr/>
+        </p:nvSpPr>
+        <p:spPr>
+          <a:xfrm>
+            <a:off x="4577977" y="3147814"/>
+            <a:ext cx="1224136" cy="360040"/>
+          </a:xfrm>
+          <a:prstGeom prst="rect">
+            <a:avLst/>
+          </a:prstGeom>
+        </p:spPr>
+        <p:style>
+          <a:lnRef idx="2">
+            <a:schemeClr val="accent1">
+              <a:shade val="50000"/>
+            </a:schemeClr>
+          </a:lnRef>
+          <a:fillRef idx="1">
+            <a:schemeClr val="accent1"/>
+          </a:fillRef>
+          <a:effectRef idx="0">
+            <a:schemeClr val="accent1"/>
+          </a:effectRef>
+          <a:fontRef idx="minor">
+            <a:schemeClr val="lt1"/>
+          </a:fontRef>
+        </p:style>
+        <p:txBody>
+          <a:bodyPr rtlCol="0" anchor="ctr"/>
+          <a:lstStyle/>
+          <a:p>
+            <a:pPr algn="ctr"/>
+            <a:r>
+              <a:rPr lang="en-US" sz="1800" dirty="0"/>
+              <a:t>BB2: x2 = 2</a:t>
+            </a:r>
+          </a:p>
+        </p:txBody>
+      </p:sp>
+      <p:sp>
+        <p:nvSpPr>
+          <p:cNvPr id="8" name="Rectangle 7">
+            <a:extLst>
+              <a:ext uri="{FF2B5EF4-FFF2-40B4-BE49-F238E27FC236}">
+                <a16:creationId xmlns:a16="http://schemas.microsoft.com/office/drawing/2014/main" id="{13CCB3DD-9935-054F-87FE-47D57AC63CD1}"/>
+              </a:ext>
+            </a:extLst>
+          </p:cNvPr>
+          <p:cNvSpPr/>
+          <p:nvPr/>
+        </p:nvSpPr>
+        <p:spPr>
+          <a:xfrm>
+            <a:off x="2915816" y="4155926"/>
+            <a:ext cx="2088232" cy="360040"/>
+          </a:xfrm>
+          <a:prstGeom prst="rect">
+            <a:avLst/>
+          </a:prstGeom>
+        </p:spPr>
+        <p:style>
+          <a:lnRef idx="2">
+            <a:schemeClr val="accent1">
+              <a:shade val="50000"/>
+            </a:schemeClr>
+          </a:lnRef>
+          <a:fillRef idx="1">
+            <a:schemeClr val="accent1"/>
+          </a:fillRef>
+          <a:effectRef idx="0">
+            <a:schemeClr val="accent1"/>
+          </a:effectRef>
+          <a:fontRef idx="minor">
+            <a:schemeClr val="lt1"/>
+          </a:fontRef>
+        </p:style>
+        <p:txBody>
+          <a:bodyPr rtlCol="0" anchor="ctr"/>
+          <a:lstStyle/>
+          <a:p>
+            <a:pPr algn="ctr"/>
+            <a:r>
+              <a:rPr lang="en-US" sz="1800" dirty="0"/>
+              <a:t>BB3: x3 = Phi(x1, x2)</a:t>
+            </a:r>
+          </a:p>
+        </p:txBody>
+      </p:sp>
+      <p:cxnSp>
+        <p:nvCxnSpPr>
+          <p:cNvPr id="10" name="Straight Arrow Connector 9">
+            <a:extLst>
+              <a:ext uri="{FF2B5EF4-FFF2-40B4-BE49-F238E27FC236}">
+                <a16:creationId xmlns:a16="http://schemas.microsoft.com/office/drawing/2014/main" id="{E868A5D8-94C5-134E-A7DC-D56E1385DAD1}"/>
+              </a:ext>
+            </a:extLst>
+          </p:cNvPr>
+          <p:cNvCxnSpPr>
+            <a:stCxn id="4" idx="2"/>
+            <a:endCxn id="8" idx="0"/>
+          </p:cNvCxnSpPr>
+          <p:nvPr/>
+        </p:nvCxnSpPr>
+        <p:spPr>
+          <a:xfrm>
+            <a:off x="2807804" y="3507854"/>
+            <a:ext cx="1152128" cy="648072"/>
+          </a:xfrm>
+          <a:prstGeom prst="straightConnector1">
+            <a:avLst/>
+          </a:prstGeom>
+          <a:ln>
+            <a:tailEnd type="triangle"/>
+          </a:ln>
+        </p:spPr>
+        <p:style>
+          <a:lnRef idx="1">
+            <a:schemeClr val="accent1"/>
+          </a:lnRef>
+          <a:fillRef idx="0">
+            <a:schemeClr val="accent1"/>
+          </a:fillRef>
+          <a:effectRef idx="0">
+            <a:schemeClr val="accent1"/>
+          </a:effectRef>
+          <a:fontRef idx="minor">
+            <a:schemeClr val="tx1"/>
+          </a:fontRef>
+        </p:style>
+      </p:cxnSp>
+      <p:cxnSp>
+        <p:nvCxnSpPr>
+          <p:cNvPr id="12" name="Straight Arrow Connector 11">
+            <a:extLst>
+              <a:ext uri="{FF2B5EF4-FFF2-40B4-BE49-F238E27FC236}">
+                <a16:creationId xmlns:a16="http://schemas.microsoft.com/office/drawing/2014/main" id="{DCB84FE6-2BF9-C04D-8DE1-69B1209284C9}"/>
+              </a:ext>
+            </a:extLst>
+          </p:cNvPr>
+          <p:cNvCxnSpPr>
+            <a:stCxn id="7" idx="2"/>
+            <a:endCxn id="8" idx="0"/>
+          </p:cNvCxnSpPr>
+          <p:nvPr/>
+        </p:nvCxnSpPr>
+        <p:spPr>
+          <a:xfrm flipH="1">
+            <a:off x="3959932" y="3507854"/>
+            <a:ext cx="1230113" cy="648072"/>
+          </a:xfrm>
+          <a:prstGeom prst="straightConnector1">
+            <a:avLst/>
+          </a:prstGeom>
+          <a:ln>
+            <a:tailEnd type="triangle"/>
+          </a:ln>
+        </p:spPr>
+        <p:style>
+          <a:lnRef idx="1">
+            <a:schemeClr val="accent1"/>
+          </a:lnRef>
+          <a:fillRef idx="0">
+            <a:schemeClr val="accent1"/>
+          </a:fillRef>
+          <a:effectRef idx="0">
+            <a:schemeClr val="accent1"/>
+          </a:effectRef>
+          <a:fontRef idx="minor">
+            <a:schemeClr val="tx1"/>
+          </a:fontRef>
+        </p:style>
+      </p:cxnSp>
     </p:spTree>
     <p:extLst>
       <p:ext uri="{BB962C8B-B14F-4D97-AF65-F5344CB8AC3E}">
@@ -7882,6 +8125,195 @@
                       </p:childTnLst>
                     </p:cTn>
                   </p:par>
+                  <p:par>
+                    <p:cTn id="11" fill="hold">
+                      <p:stCondLst>
+                        <p:cond delay="indefinite"/>
+                      </p:stCondLst>
+                      <p:childTnLst>
+                        <p:par>
+                          <p:cTn id="12" fill="hold">
+                            <p:stCondLst>
+                              <p:cond delay="0"/>
+                            </p:stCondLst>
+                            <p:childTnLst>
+                              <p:par>
+                                <p:cTn id="13" presetID="1" presetClass="entr" presetSubtype="0" fill="hold" grpId="0" nodeType="clickEffect">
+                                  <p:stCondLst>
+                                    <p:cond delay="0"/>
+                                  </p:stCondLst>
+                                  <p:childTnLst>
+                                    <p:set>
+                                      <p:cBhvr>
+                                        <p:cTn id="14" dur="1" fill="hold">
+                                          <p:stCondLst>
+                                            <p:cond delay="0"/>
+                                          </p:stCondLst>
+                                        </p:cTn>
+                                        <p:tgtEl>
+                                          <p:spTgt spid="4"/>
+                                        </p:tgtEl>
+                                        <p:attrNameLst>
+                                          <p:attrName>style.visibility</p:attrName>
+                                        </p:attrNameLst>
+                                      </p:cBhvr>
+                                      <p:to>
+                                        <p:strVal val="visible"/>
+                                      </p:to>
+                                    </p:set>
+                                  </p:childTnLst>
+                                </p:cTn>
+                              </p:par>
+                            </p:childTnLst>
+                          </p:cTn>
+                        </p:par>
+                      </p:childTnLst>
+                    </p:cTn>
+                  </p:par>
+                  <p:par>
+                    <p:cTn id="15" fill="hold">
+                      <p:stCondLst>
+                        <p:cond delay="indefinite"/>
+                      </p:stCondLst>
+                      <p:childTnLst>
+                        <p:par>
+                          <p:cTn id="16" fill="hold">
+                            <p:stCondLst>
+                              <p:cond delay="0"/>
+                            </p:stCondLst>
+                            <p:childTnLst>
+                              <p:par>
+                                <p:cTn id="17" presetID="1" presetClass="entr" presetSubtype="0" fill="hold" grpId="0" nodeType="clickEffect">
+                                  <p:stCondLst>
+                                    <p:cond delay="0"/>
+                                  </p:stCondLst>
+                                  <p:childTnLst>
+                                    <p:set>
+                                      <p:cBhvr>
+                                        <p:cTn id="18" dur="1" fill="hold">
+                                          <p:stCondLst>
+                                            <p:cond delay="0"/>
+                                          </p:stCondLst>
+                                        </p:cTn>
+                                        <p:tgtEl>
+                                          <p:spTgt spid="7"/>
+                                        </p:tgtEl>
+                                        <p:attrNameLst>
+                                          <p:attrName>style.visibility</p:attrName>
+                                        </p:attrNameLst>
+                                      </p:cBhvr>
+                                      <p:to>
+                                        <p:strVal val="visible"/>
+                                      </p:to>
+                                    </p:set>
+                                  </p:childTnLst>
+                                </p:cTn>
+                              </p:par>
+                            </p:childTnLst>
+                          </p:cTn>
+                        </p:par>
+                      </p:childTnLst>
+                    </p:cTn>
+                  </p:par>
+                  <p:par>
+                    <p:cTn id="19" fill="hold">
+                      <p:stCondLst>
+                        <p:cond delay="indefinite"/>
+                      </p:stCondLst>
+                      <p:childTnLst>
+                        <p:par>
+                          <p:cTn id="20" fill="hold">
+                            <p:stCondLst>
+                              <p:cond delay="0"/>
+                            </p:stCondLst>
+                            <p:childTnLst>
+                              <p:par>
+                                <p:cTn id="21" presetID="1" presetClass="entr" presetSubtype="0" fill="hold" nodeType="clickEffect">
+                                  <p:stCondLst>
+                                    <p:cond delay="0"/>
+                                  </p:stCondLst>
+                                  <p:childTnLst>
+                                    <p:set>
+                                      <p:cBhvr>
+                                        <p:cTn id="22" dur="1" fill="hold">
+                                          <p:stCondLst>
+                                            <p:cond delay="0"/>
+                                          </p:stCondLst>
+                                        </p:cTn>
+                                        <p:tgtEl>
+                                          <p:spTgt spid="10"/>
+                                        </p:tgtEl>
+                                        <p:attrNameLst>
+                                          <p:attrName>style.visibility</p:attrName>
+                                        </p:attrNameLst>
+                                      </p:cBhvr>
+                                      <p:to>
+                                        <p:strVal val="visible"/>
+                                      </p:to>
+                                    </p:set>
+                                  </p:childTnLst>
+                                </p:cTn>
+                              </p:par>
+                              <p:par>
+                                <p:cTn id="23" presetID="1" presetClass="entr" presetSubtype="0" fill="hold" nodeType="withEffect">
+                                  <p:stCondLst>
+                                    <p:cond delay="0"/>
+                                  </p:stCondLst>
+                                  <p:childTnLst>
+                                    <p:set>
+                                      <p:cBhvr>
+                                        <p:cTn id="24" dur="1" fill="hold">
+                                          <p:stCondLst>
+                                            <p:cond delay="0"/>
+                                          </p:stCondLst>
+                                        </p:cTn>
+                                        <p:tgtEl>
+                                          <p:spTgt spid="12"/>
+                                        </p:tgtEl>
+                                        <p:attrNameLst>
+                                          <p:attrName>style.visibility</p:attrName>
+                                        </p:attrNameLst>
+                                      </p:cBhvr>
+                                      <p:to>
+                                        <p:strVal val="visible"/>
+                                      </p:to>
+                                    </p:set>
+                                  </p:childTnLst>
+                                </p:cTn>
+                              </p:par>
+                              <p:par>
+                                <p:cTn id="25" presetID="1" presetClass="entr" presetSubtype="0" fill="hold" grpId="0" nodeType="withEffect">
+                                  <p:stCondLst>
+                                    <p:cond delay="0"/>
+                                  </p:stCondLst>
+                                  <p:childTnLst>
+                                    <p:set>
+                                      <p:cBhvr>
+                                        <p:cTn id="26" dur="1" fill="hold">
+                                          <p:stCondLst>
+                                            <p:cond delay="0"/>
+                                          </p:stCondLst>
+                                        </p:cTn>
+                                        <p:tgtEl>
+                                          <p:spTgt spid="8"/>
+                                        </p:tgtEl>
+                                        <p:attrNameLst>
+                                          <p:attrName>style.visibility</p:attrName>
+                                        </p:attrNameLst>
+                                      </p:cBhvr>
+                                      <p:to>
+                                        <p:strVal val="visible"/>
+                                      </p:to>
+                                    </p:set>
+                                  </p:childTnLst>
+                                </p:cTn>
+                              </p:par>
+                            </p:childTnLst>
+                          </p:cTn>
+                        </p:par>
+                      </p:childTnLst>
+                    </p:cTn>
+                  </p:par>
                 </p:childTnLst>
               </p:cTn>
               <p:prevCondLst>
@@ -7905,6 +8337,9 @@
     </p:tnLst>
     <p:bldLst>
       <p:bldP spid="3" grpId="0" build="p"/>
+      <p:bldP spid="4" grpId="0" animBg="1"/>
+      <p:bldP spid="7" grpId="0" animBg="1"/>
+      <p:bldP spid="8" grpId="0" animBg="1"/>
     </p:bldLst>
   </p:timing>
 </p:sld>
@@ -8140,32 +8575,82 @@
           <a:p>
             <a:r>
               <a:rPr lang="en-US" sz="2100" dirty="0">
-                <a:latin typeface="Consolas" panose="020B0609020204030204" pitchFamily="49" charset="0"/>
-                <a:cs typeface="Consolas" panose="020B0609020204030204" pitchFamily="49" charset="0"/>
-              </a:rPr>
-              <a:t>/* </a:t>
+                <a:solidFill>
+                  <a:srgbClr val="C00000"/>
+                </a:solidFill>
+                <a:latin typeface="Consolas" panose="020B0609020204030204" pitchFamily="49" charset="0"/>
+                <a:cs typeface="Consolas" panose="020B0609020204030204" pitchFamily="49" charset="0"/>
+              </a:rPr>
+              <a:t>// </a:t>
             </a:r>
             <a:r>
               <a:rPr lang="en-US" sz="2100" b="1" dirty="0">
-                <a:latin typeface="Consolas" panose="020B0609020204030204" pitchFamily="49" charset="0"/>
-                <a:cs typeface="Consolas" panose="020B0609020204030204" pitchFamily="49" charset="0"/>
-              </a:rPr>
-              <a:t>type is an LLVM::Type </a:t>
+                <a:solidFill>
+                  <a:srgbClr val="C00000"/>
+                </a:solidFill>
+                <a:latin typeface="Consolas" panose="020B0609020204030204" pitchFamily="49" charset="0"/>
+                <a:cs typeface="Consolas" panose="020B0609020204030204" pitchFamily="49" charset="0"/>
+              </a:rPr>
+              <a:t>type is an LLVM::Type</a:t>
+            </a:r>
+            <a:endParaRPr lang="en-US" sz="2100" dirty="0">
+              <a:solidFill>
+                <a:srgbClr val="C00000"/>
+              </a:solidFill>
+              <a:latin typeface="Consolas" panose="020B0609020204030204" pitchFamily="49" charset="0"/>
+              <a:cs typeface="Consolas" panose="020B0609020204030204" pitchFamily="49" charset="0"/>
+            </a:endParaRPr>
+          </a:p>
+          <a:p>
+            <a:r>
+              <a:rPr lang="en-US" sz="2100" dirty="0" err="1">
+                <a:latin typeface="Consolas" panose="020B0609020204030204" pitchFamily="49" charset="0"/>
+                <a:cs typeface="Consolas" panose="020B0609020204030204" pitchFamily="49" charset="0"/>
+              </a:rPr>
+              <a:t>val</a:t>
             </a:r>
             <a:r>
               <a:rPr lang="en-US" sz="2100" dirty="0">
                 <a:latin typeface="Consolas" panose="020B0609020204030204" pitchFamily="49" charset="0"/>
                 <a:cs typeface="Consolas" panose="020B0609020204030204" pitchFamily="49" charset="0"/>
               </a:rPr>
-              <a:t>*/</a:t>
-            </a:r>
-          </a:p>
-          <a:p>
+              <a:t>-&gt;</a:t>
+            </a:r>
             <a:r>
               <a:rPr lang="en-US" sz="2100" dirty="0" err="1">
                 <a:latin typeface="Consolas" panose="020B0609020204030204" pitchFamily="49" charset="0"/>
                 <a:cs typeface="Consolas" panose="020B0609020204030204" pitchFamily="49" charset="0"/>
               </a:rPr>
+              <a:t>addIncoming</a:t>
+            </a:r>
+            <a:r>
+              <a:rPr lang="en-US" sz="2100" dirty="0">
+                <a:latin typeface="Consolas" panose="020B0609020204030204" pitchFamily="49" charset="0"/>
+                <a:cs typeface="Consolas" panose="020B0609020204030204" pitchFamily="49" charset="0"/>
+              </a:rPr>
+              <a:t>(L, </a:t>
+            </a:r>
+            <a:r>
+              <a:rPr lang="en-US" sz="2100" dirty="0" err="1">
+                <a:latin typeface="Consolas" panose="020B0609020204030204" pitchFamily="49" charset="0"/>
+                <a:cs typeface="Consolas" panose="020B0609020204030204" pitchFamily="49" charset="0"/>
+              </a:rPr>
+              <a:t>CurBB</a:t>
+            </a:r>
+            <a:r>
+              <a:rPr lang="en-US" sz="2100" dirty="0">
+                <a:latin typeface="Consolas" panose="020B0609020204030204" pitchFamily="49" charset="0"/>
+                <a:cs typeface="Consolas" panose="020B0609020204030204" pitchFamily="49" charset="0"/>
+              </a:rPr>
+              <a:t>);</a:t>
+            </a:r>
+          </a:p>
+          <a:p>
+            <a:r>
+              <a:rPr lang="en-US" sz="2100" dirty="0" err="1">
+                <a:latin typeface="Consolas" panose="020B0609020204030204" pitchFamily="49" charset="0"/>
+                <a:cs typeface="Consolas" panose="020B0609020204030204" pitchFamily="49" charset="0"/>
+              </a:rPr>
               <a:t>val</a:t>
             </a:r>
             <a:r>
@@ -8187,124 +8672,95 @@
                 <a:latin typeface="Consolas" panose="020B0609020204030204" pitchFamily="49" charset="0"/>
                 <a:cs typeface="Consolas" panose="020B0609020204030204" pitchFamily="49" charset="0"/>
               </a:rPr>
-              <a:t>(L, </a:t>
+              <a:t>(</a:t>
             </a:r>
             <a:r>
               <a:rPr lang="en-US" sz="2100" dirty="0" err="1">
                 <a:latin typeface="Consolas" panose="020B0609020204030204" pitchFamily="49" charset="0"/>
                 <a:cs typeface="Consolas" panose="020B0609020204030204" pitchFamily="49" charset="0"/>
               </a:rPr>
+              <a:t>opval</a:t>
+            </a:r>
+            <a:r>
+              <a:rPr lang="en-US" sz="2100" dirty="0">
+                <a:latin typeface="Consolas" panose="020B0609020204030204" pitchFamily="49" charset="0"/>
+                <a:cs typeface="Consolas" panose="020B0609020204030204" pitchFamily="49" charset="0"/>
+              </a:rPr>
+              <a:t>, </a:t>
+            </a:r>
+            <a:r>
+              <a:rPr lang="en-US" sz="2100" dirty="0" err="1">
+                <a:latin typeface="Consolas" panose="020B0609020204030204" pitchFamily="49" charset="0"/>
+                <a:cs typeface="Consolas" panose="020B0609020204030204" pitchFamily="49" charset="0"/>
+              </a:rPr>
+              <a:t>OpValBB</a:t>
+            </a:r>
+            <a:r>
+              <a:rPr lang="en-US" sz="2100" dirty="0">
+                <a:latin typeface="Consolas" panose="020B0609020204030204" pitchFamily="49" charset="0"/>
+                <a:cs typeface="Consolas" panose="020B0609020204030204" pitchFamily="49" charset="0"/>
+              </a:rPr>
+              <a:t>);</a:t>
+            </a:r>
+          </a:p>
+          <a:p>
+            <a:r>
+              <a:rPr lang="en-US" sz="2100" dirty="0">
+                <a:solidFill>
+                  <a:srgbClr val="C00000"/>
+                </a:solidFill>
+                <a:latin typeface="Consolas" panose="020B0609020204030204" pitchFamily="49" charset="0"/>
+                <a:cs typeface="Consolas" panose="020B0609020204030204" pitchFamily="49" charset="0"/>
+              </a:rPr>
+              <a:t>// </a:t>
+            </a:r>
+            <a:r>
+              <a:rPr lang="en-US" sz="2100" b="1" dirty="0" err="1">
+                <a:solidFill>
+                  <a:srgbClr val="C00000"/>
+                </a:solidFill>
+                <a:latin typeface="Consolas" panose="020B0609020204030204" pitchFamily="49" charset="0"/>
+                <a:cs typeface="Consolas" panose="020B0609020204030204" pitchFamily="49" charset="0"/>
+              </a:rPr>
               <a:t>CurBB</a:t>
             </a:r>
             <a:r>
-              <a:rPr lang="en-US" sz="2100" dirty="0">
-                <a:latin typeface="Consolas" panose="020B0609020204030204" pitchFamily="49" charset="0"/>
-                <a:cs typeface="Consolas" panose="020B0609020204030204" pitchFamily="49" charset="0"/>
-              </a:rPr>
-              <a:t>);</a:t>
-            </a:r>
-          </a:p>
-          <a:p>
-            <a:r>
-              <a:rPr lang="en-US" sz="2100" dirty="0" err="1">
-                <a:latin typeface="Consolas" panose="020B0609020204030204" pitchFamily="49" charset="0"/>
-                <a:cs typeface="Consolas" panose="020B0609020204030204" pitchFamily="49" charset="0"/>
-              </a:rPr>
-              <a:t>val</a:t>
-            </a:r>
-            <a:r>
-              <a:rPr lang="en-US" sz="2100" dirty="0">
-                <a:latin typeface="Consolas" panose="020B0609020204030204" pitchFamily="49" charset="0"/>
-                <a:cs typeface="Consolas" panose="020B0609020204030204" pitchFamily="49" charset="0"/>
-              </a:rPr>
-              <a:t>-&gt;</a:t>
-            </a:r>
-            <a:r>
-              <a:rPr lang="en-US" sz="2100" dirty="0" err="1">
-                <a:latin typeface="Consolas" panose="020B0609020204030204" pitchFamily="49" charset="0"/>
-                <a:cs typeface="Consolas" panose="020B0609020204030204" pitchFamily="49" charset="0"/>
-              </a:rPr>
-              <a:t>addIncoming</a:t>
-            </a:r>
-            <a:r>
-              <a:rPr lang="en-US" sz="2100" dirty="0">
-                <a:latin typeface="Consolas" panose="020B0609020204030204" pitchFamily="49" charset="0"/>
-                <a:cs typeface="Consolas" panose="020B0609020204030204" pitchFamily="49" charset="0"/>
-              </a:rPr>
-              <a:t>(</a:t>
-            </a:r>
-            <a:r>
-              <a:rPr lang="en-US" sz="2100" dirty="0" err="1">
-                <a:latin typeface="Consolas" panose="020B0609020204030204" pitchFamily="49" charset="0"/>
-                <a:cs typeface="Consolas" panose="020B0609020204030204" pitchFamily="49" charset="0"/>
-              </a:rPr>
-              <a:t>opval</a:t>
-            </a:r>
-            <a:r>
-              <a:rPr lang="en-US" sz="2100" dirty="0">
-                <a:latin typeface="Consolas" panose="020B0609020204030204" pitchFamily="49" charset="0"/>
-                <a:cs typeface="Consolas" panose="020B0609020204030204" pitchFamily="49" charset="0"/>
-              </a:rPr>
-              <a:t>, </a:t>
-            </a:r>
-            <a:r>
-              <a:rPr lang="en-US" sz="2100" dirty="0" err="1">
+              <a:rPr lang="en-US" sz="2100" b="1" dirty="0">
+                <a:solidFill>
+                  <a:srgbClr val="C00000"/>
+                </a:solidFill>
+                <a:latin typeface="Consolas" panose="020B0609020204030204" pitchFamily="49" charset="0"/>
+                <a:cs typeface="Consolas" panose="020B0609020204030204" pitchFamily="49" charset="0"/>
+              </a:rPr>
+              <a:t> and </a:t>
+            </a:r>
+            <a:r>
+              <a:rPr lang="en-US" sz="2100" b="1" dirty="0" err="1">
+                <a:solidFill>
+                  <a:srgbClr val="C00000"/>
+                </a:solidFill>
                 <a:latin typeface="Consolas" panose="020B0609020204030204" pitchFamily="49" charset="0"/>
                 <a:cs typeface="Consolas" panose="020B0609020204030204" pitchFamily="49" charset="0"/>
               </a:rPr>
               <a:t>OpValBB</a:t>
             </a:r>
             <a:r>
-              <a:rPr lang="en-US" sz="2100" dirty="0">
-                <a:latin typeface="Consolas" panose="020B0609020204030204" pitchFamily="49" charset="0"/>
-                <a:cs typeface="Consolas" panose="020B0609020204030204" pitchFamily="49" charset="0"/>
-              </a:rPr>
-              <a:t>);</a:t>
-            </a:r>
-          </a:p>
-          <a:p>
-            <a:r>
-              <a:rPr lang="en-US" sz="2100" dirty="0">
-                <a:latin typeface="Consolas" panose="020B0609020204030204" pitchFamily="49" charset="0"/>
-                <a:cs typeface="Consolas" panose="020B0609020204030204" pitchFamily="49" charset="0"/>
-              </a:rPr>
-              <a:t>/* </a:t>
-            </a:r>
-            <a:r>
-              <a:rPr lang="en-US" sz="2100" b="1" dirty="0" err="1">
-                <a:latin typeface="Consolas" panose="020B0609020204030204" pitchFamily="49" charset="0"/>
-                <a:cs typeface="Consolas" panose="020B0609020204030204" pitchFamily="49" charset="0"/>
-              </a:rPr>
-              <a:t>CurBB</a:t>
-            </a:r>
-            <a:r>
               <a:rPr lang="en-US" sz="2100" b="1" dirty="0">
-                <a:latin typeface="Consolas" panose="020B0609020204030204" pitchFamily="49" charset="0"/>
-                <a:cs typeface="Consolas" panose="020B0609020204030204" pitchFamily="49" charset="0"/>
-              </a:rPr>
-              <a:t> and </a:t>
-            </a:r>
-            <a:r>
-              <a:rPr lang="en-US" sz="2100" b="1" dirty="0" err="1">
-                <a:latin typeface="Consolas" panose="020B0609020204030204" pitchFamily="49" charset="0"/>
-                <a:cs typeface="Consolas" panose="020B0609020204030204" pitchFamily="49" charset="0"/>
-              </a:rPr>
-              <a:t>OpValBB</a:t>
-            </a:r>
-            <a:r>
-              <a:rPr lang="en-US" sz="2100" b="1" dirty="0">
-                <a:latin typeface="Consolas" panose="020B0609020204030204" pitchFamily="49" charset="0"/>
-                <a:cs typeface="Consolas" panose="020B0609020204030204" pitchFamily="49" charset="0"/>
-              </a:rPr>
-              <a:t> are the two basic blocks that are incoming blocks for the PHI function </a:t>
-            </a:r>
-            <a:r>
-              <a:rPr lang="en-US" sz="2100" dirty="0">
-                <a:latin typeface="Consolas" panose="020B0609020204030204" pitchFamily="49" charset="0"/>
-                <a:cs typeface="Consolas" panose="020B0609020204030204" pitchFamily="49" charset="0"/>
-              </a:rPr>
-              <a:t>*/</a:t>
-            </a:r>
+                <a:solidFill>
+                  <a:srgbClr val="C00000"/>
+                </a:solidFill>
+                <a:latin typeface="Consolas" panose="020B0609020204030204" pitchFamily="49" charset="0"/>
+                <a:cs typeface="Consolas" panose="020B0609020204030204" pitchFamily="49" charset="0"/>
+              </a:rPr>
+              <a:t> are the two basic blocks that are incoming blocks for the PHI function</a:t>
+            </a:r>
+            <a:endParaRPr lang="en-US" sz="2100" dirty="0">
+              <a:solidFill>
+                <a:srgbClr val="C00000"/>
+              </a:solidFill>
+              <a:latin typeface="Consolas" panose="020B0609020204030204" pitchFamily="49" charset="0"/>
+              <a:cs typeface="Consolas" panose="020B0609020204030204" pitchFamily="49" charset="0"/>
+            </a:endParaRPr>
           </a:p>
         </p:txBody>
       </p:sp>
@@ -8375,6 +8831,51 @@
                       </p:childTnLst>
                     </p:cTn>
                   </p:par>
+                  <p:par>
+                    <p:cTn id="7" fill="hold">
+                      <p:stCondLst>
+                        <p:cond delay="indefinite"/>
+                      </p:stCondLst>
+                      <p:childTnLst>
+                        <p:par>
+                          <p:cTn id="8" fill="hold">
+                            <p:stCondLst>
+                              <p:cond delay="0"/>
+                            </p:stCondLst>
+                            <p:childTnLst>
+                              <p:par>
+                                <p:cTn id="9" presetID="1" presetClass="entr" presetSubtype="0" fill="hold" grpId="0" nodeType="clickEffect">
+                                  <p:stCondLst>
+                                    <p:cond delay="0"/>
+                                  </p:stCondLst>
+                                  <p:childTnLst>
+                                    <p:set>
+                                      <p:cBhvr>
+                                        <p:cTn id="10" dur="1" fill="hold">
+                                          <p:stCondLst>
+                                            <p:cond delay="0"/>
+                                          </p:stCondLst>
+                                        </p:cTn>
+                                        <p:tgtEl>
+                                          <p:spTgt spid="6"/>
+                                        </p:tgtEl>
+                                        <p:attrNameLst>
+                                          <p:attrName>style.visibility</p:attrName>
+                                        </p:attrNameLst>
+                                      </p:cBhvr>
+                                      <p:to>
+                                        <p:strVal val="visible"/>
+                                      </p:to>
+                                    </p:set>
+                                  </p:childTnLst>
+                                </p:cTn>
+                              </p:par>
+                            </p:childTnLst>
+                          </p:cTn>
+                        </p:par>
+                      </p:childTnLst>
+                    </p:cTn>
+                  </p:par>
                 </p:childTnLst>
               </p:cTn>
               <p:prevCondLst>
@@ -8398,6 +8899,7 @@
     </p:tnLst>
     <p:bldLst>
       <p:bldP spid="3" grpId="0" build="p"/>
+      <p:bldP spid="6" grpId="0" animBg="1"/>
     </p:bldLst>
   </p:timing>
 </p:sld>
@@ -10317,6 +10819,319 @@
           </a:p>
         </p:txBody>
       </p:sp>
+      <p:sp>
+        <p:nvSpPr>
+          <p:cNvPr id="12" name="Rectangle 11">
+            <a:extLst>
+              <a:ext uri="{FF2B5EF4-FFF2-40B4-BE49-F238E27FC236}">
+                <a16:creationId xmlns:a16="http://schemas.microsoft.com/office/drawing/2014/main" id="{F7165190-925B-DC4A-A171-212AE6D8B3F6}"/>
+              </a:ext>
+            </a:extLst>
+          </p:cNvPr>
+          <p:cNvSpPr/>
+          <p:nvPr/>
+        </p:nvSpPr>
+        <p:spPr>
+          <a:xfrm>
+            <a:off x="5456266" y="2156661"/>
+            <a:ext cx="1924046" cy="563269"/>
+          </a:xfrm>
+          <a:prstGeom prst="rect">
+            <a:avLst/>
+          </a:prstGeom>
+        </p:spPr>
+        <p:style>
+          <a:lnRef idx="2">
+            <a:schemeClr val="accent1">
+              <a:shade val="50000"/>
+            </a:schemeClr>
+          </a:lnRef>
+          <a:fillRef idx="1">
+            <a:schemeClr val="accent1"/>
+          </a:fillRef>
+          <a:effectRef idx="0">
+            <a:schemeClr val="accent1"/>
+          </a:effectRef>
+          <a:fontRef idx="minor">
+            <a:schemeClr val="lt1"/>
+          </a:fontRef>
+        </p:style>
+        <p:txBody>
+          <a:bodyPr rtlCol="0" anchor="ctr"/>
+          <a:lstStyle/>
+          <a:p>
+            <a:pPr algn="ctr"/>
+            <a:r>
+              <a:rPr lang="en-US" sz="1800" dirty="0"/>
+              <a:t>if </a:t>
+            </a:r>
+            <a:r>
+              <a:rPr lang="en-US" sz="1800" dirty="0">
+                <a:latin typeface="Consolas" panose="020B0609020204030204" pitchFamily="49" charset="0"/>
+                <a:cs typeface="Consolas" panose="020B0609020204030204" pitchFamily="49" charset="0"/>
+              </a:rPr>
+              <a:t>a</a:t>
+            </a:r>
+            <a:r>
+              <a:rPr lang="en-US" sz="1800" dirty="0"/>
+              <a:t> is </a:t>
+            </a:r>
+            <a:r>
+              <a:rPr lang="en-US" sz="1800" dirty="0">
+                <a:latin typeface="Consolas" panose="020B0609020204030204" pitchFamily="49" charset="0"/>
+                <a:cs typeface="Consolas" panose="020B0609020204030204" pitchFamily="49" charset="0"/>
+              </a:rPr>
+              <a:t>True</a:t>
+            </a:r>
+            <a:r>
+              <a:rPr lang="en-US" sz="1800" dirty="0"/>
+              <a:t> then do not evaluate </a:t>
+            </a:r>
+            <a:r>
+              <a:rPr lang="en-US" sz="1800" dirty="0">
+                <a:latin typeface="Consolas" panose="020B0609020204030204" pitchFamily="49" charset="0"/>
+                <a:cs typeface="Consolas" panose="020B0609020204030204" pitchFamily="49" charset="0"/>
+              </a:rPr>
+              <a:t>b</a:t>
+            </a:r>
+          </a:p>
+        </p:txBody>
+      </p:sp>
+      <p:sp>
+        <p:nvSpPr>
+          <p:cNvPr id="13" name="Rectangle 12">
+            <a:extLst>
+              <a:ext uri="{FF2B5EF4-FFF2-40B4-BE49-F238E27FC236}">
+                <a16:creationId xmlns:a16="http://schemas.microsoft.com/office/drawing/2014/main" id="{55E6DD7F-84B3-464E-97F2-45A27969D387}"/>
+              </a:ext>
+            </a:extLst>
+          </p:cNvPr>
+          <p:cNvSpPr/>
+          <p:nvPr/>
+        </p:nvSpPr>
+        <p:spPr>
+          <a:xfrm>
+            <a:off x="1538741" y="2945776"/>
+            <a:ext cx="440971" cy="248518"/>
+          </a:xfrm>
+          <a:prstGeom prst="rect">
+            <a:avLst/>
+          </a:prstGeom>
+          <a:noFill/>
+        </p:spPr>
+        <p:style>
+          <a:lnRef idx="2">
+            <a:schemeClr val="accent1">
+              <a:shade val="50000"/>
+            </a:schemeClr>
+          </a:lnRef>
+          <a:fillRef idx="1">
+            <a:schemeClr val="accent1"/>
+          </a:fillRef>
+          <a:effectRef idx="0">
+            <a:schemeClr val="accent1"/>
+          </a:effectRef>
+          <a:fontRef idx="minor">
+            <a:schemeClr val="lt1"/>
+          </a:fontRef>
+        </p:style>
+        <p:txBody>
+          <a:bodyPr rtlCol="0" anchor="ctr"/>
+          <a:lstStyle/>
+          <a:p>
+            <a:pPr algn="ctr"/>
+            <a:endParaRPr lang="en-US"/>
+          </a:p>
+        </p:txBody>
+      </p:sp>
+      <p:sp>
+        <p:nvSpPr>
+          <p:cNvPr id="14" name="Rectangle 13">
+            <a:extLst>
+              <a:ext uri="{FF2B5EF4-FFF2-40B4-BE49-F238E27FC236}">
+                <a16:creationId xmlns:a16="http://schemas.microsoft.com/office/drawing/2014/main" id="{FE21BABD-3E36-BE40-9F04-F11F1ADF92AC}"/>
+              </a:ext>
+            </a:extLst>
+          </p:cNvPr>
+          <p:cNvSpPr/>
+          <p:nvPr/>
+        </p:nvSpPr>
+        <p:spPr>
+          <a:xfrm>
+            <a:off x="2589184" y="2945776"/>
+            <a:ext cx="902696" cy="248518"/>
+          </a:xfrm>
+          <a:prstGeom prst="rect">
+            <a:avLst/>
+          </a:prstGeom>
+          <a:noFill/>
+        </p:spPr>
+        <p:style>
+          <a:lnRef idx="2">
+            <a:schemeClr val="accent1">
+              <a:shade val="50000"/>
+            </a:schemeClr>
+          </a:lnRef>
+          <a:fillRef idx="1">
+            <a:schemeClr val="accent1"/>
+          </a:fillRef>
+          <a:effectRef idx="0">
+            <a:schemeClr val="accent1"/>
+          </a:effectRef>
+          <a:fontRef idx="minor">
+            <a:schemeClr val="lt1"/>
+          </a:fontRef>
+        </p:style>
+        <p:txBody>
+          <a:bodyPr rtlCol="0" anchor="ctr"/>
+          <a:lstStyle/>
+          <a:p>
+            <a:pPr algn="ctr"/>
+            <a:endParaRPr lang="en-US"/>
+          </a:p>
+        </p:txBody>
+      </p:sp>
+      <p:sp>
+        <p:nvSpPr>
+          <p:cNvPr id="15" name="Rectangle 14">
+            <a:extLst>
+              <a:ext uri="{FF2B5EF4-FFF2-40B4-BE49-F238E27FC236}">
+                <a16:creationId xmlns:a16="http://schemas.microsoft.com/office/drawing/2014/main" id="{B684ABAF-4BD1-5B46-B8D3-769AC9B24473}"/>
+              </a:ext>
+            </a:extLst>
+          </p:cNvPr>
+          <p:cNvSpPr/>
+          <p:nvPr/>
+        </p:nvSpPr>
+        <p:spPr>
+          <a:xfrm>
+            <a:off x="3888992" y="3684053"/>
+            <a:ext cx="902696" cy="248518"/>
+          </a:xfrm>
+          <a:prstGeom prst="rect">
+            <a:avLst/>
+          </a:prstGeom>
+          <a:noFill/>
+        </p:spPr>
+        <p:style>
+          <a:lnRef idx="2">
+            <a:schemeClr val="accent1">
+              <a:shade val="50000"/>
+            </a:schemeClr>
+          </a:lnRef>
+          <a:fillRef idx="1">
+            <a:schemeClr val="accent1"/>
+          </a:fillRef>
+          <a:effectRef idx="0">
+            <a:schemeClr val="accent1"/>
+          </a:effectRef>
+          <a:fontRef idx="minor">
+            <a:schemeClr val="lt1"/>
+          </a:fontRef>
+        </p:style>
+        <p:txBody>
+          <a:bodyPr rtlCol="0" anchor="ctr"/>
+          <a:lstStyle/>
+          <a:p>
+            <a:pPr algn="ctr"/>
+            <a:endParaRPr lang="en-US"/>
+          </a:p>
+        </p:txBody>
+      </p:sp>
+      <p:sp>
+        <p:nvSpPr>
+          <p:cNvPr id="16" name="Rectangle 15">
+            <a:extLst>
+              <a:ext uri="{FF2B5EF4-FFF2-40B4-BE49-F238E27FC236}">
+                <a16:creationId xmlns:a16="http://schemas.microsoft.com/office/drawing/2014/main" id="{9E9D424F-8E9A-FA49-81BC-81191E4B6618}"/>
+              </a:ext>
+            </a:extLst>
+          </p:cNvPr>
+          <p:cNvSpPr/>
+          <p:nvPr/>
+        </p:nvSpPr>
+        <p:spPr>
+          <a:xfrm>
+            <a:off x="4155577" y="2945776"/>
+            <a:ext cx="902696" cy="248518"/>
+          </a:xfrm>
+          <a:prstGeom prst="rect">
+            <a:avLst/>
+          </a:prstGeom>
+          <a:noFill/>
+        </p:spPr>
+        <p:style>
+          <a:lnRef idx="2">
+            <a:schemeClr val="accent1">
+              <a:shade val="50000"/>
+            </a:schemeClr>
+          </a:lnRef>
+          <a:fillRef idx="1">
+            <a:schemeClr val="accent1"/>
+          </a:fillRef>
+          <a:effectRef idx="0">
+            <a:schemeClr val="accent1"/>
+          </a:effectRef>
+          <a:fontRef idx="minor">
+            <a:schemeClr val="lt1"/>
+          </a:fontRef>
+        </p:style>
+        <p:txBody>
+          <a:bodyPr rtlCol="0" anchor="ctr"/>
+          <a:lstStyle/>
+          <a:p>
+            <a:pPr algn="ctr"/>
+            <a:endParaRPr lang="en-US"/>
+          </a:p>
+        </p:txBody>
+      </p:sp>
+      <p:sp>
+        <p:nvSpPr>
+          <p:cNvPr id="17" name="Rectangle 16">
+            <a:extLst>
+              <a:ext uri="{FF2B5EF4-FFF2-40B4-BE49-F238E27FC236}">
+                <a16:creationId xmlns:a16="http://schemas.microsoft.com/office/drawing/2014/main" id="{97D6064D-D646-5C4D-A1B4-E7BC689D2424}"/>
+              </a:ext>
+            </a:extLst>
+          </p:cNvPr>
+          <p:cNvSpPr/>
+          <p:nvPr/>
+        </p:nvSpPr>
+        <p:spPr>
+          <a:xfrm>
+            <a:off x="665722" y="3525474"/>
+            <a:ext cx="776526" cy="248518"/>
+          </a:xfrm>
+          <a:prstGeom prst="rect">
+            <a:avLst/>
+          </a:prstGeom>
+          <a:noFill/>
+        </p:spPr>
+        <p:style>
+          <a:lnRef idx="2">
+            <a:schemeClr val="accent1">
+              <a:shade val="50000"/>
+            </a:schemeClr>
+          </a:lnRef>
+          <a:fillRef idx="1">
+            <a:schemeClr val="accent1"/>
+          </a:fillRef>
+          <a:effectRef idx="0">
+            <a:schemeClr val="accent1"/>
+          </a:effectRef>
+          <a:fontRef idx="minor">
+            <a:schemeClr val="lt1"/>
+          </a:fontRef>
+        </p:style>
+        <p:txBody>
+          <a:bodyPr rtlCol="0" anchor="ctr"/>
+          <a:lstStyle/>
+          <a:p>
+            <a:pPr algn="ctr"/>
+            <a:endParaRPr lang="en-US"/>
+          </a:p>
+        </p:txBody>
+      </p:sp>
     </p:spTree>
     <p:extLst>
       <p:ext uri="{BB962C8B-B14F-4D97-AF65-F5344CB8AC3E}">
@@ -10327,6 +11142,360 @@
   <p:clrMapOvr>
     <a:masterClrMapping/>
   </p:clrMapOvr>
+  <p:timing>
+    <p:tnLst>
+      <p:par>
+        <p:cTn id="1" dur="indefinite" restart="never" nodeType="tmRoot">
+          <p:childTnLst>
+            <p:seq concurrent="1" nextAc="seek">
+              <p:cTn id="2" dur="indefinite" nodeType="mainSeq">
+                <p:childTnLst>
+                  <p:par>
+                    <p:cTn id="3" fill="hold">
+                      <p:stCondLst>
+                        <p:cond delay="indefinite"/>
+                      </p:stCondLst>
+                      <p:childTnLst>
+                        <p:par>
+                          <p:cTn id="4" fill="hold">
+                            <p:stCondLst>
+                              <p:cond delay="0"/>
+                            </p:stCondLst>
+                            <p:childTnLst>
+                              <p:par>
+                                <p:cTn id="5" presetID="1" presetClass="entr" presetSubtype="0" fill="hold" grpId="0" nodeType="clickEffect">
+                                  <p:stCondLst>
+                                    <p:cond delay="0"/>
+                                  </p:stCondLst>
+                                  <p:childTnLst>
+                                    <p:set>
+                                      <p:cBhvr>
+                                        <p:cTn id="6" dur="1" fill="hold">
+                                          <p:stCondLst>
+                                            <p:cond delay="0"/>
+                                          </p:stCondLst>
+                                        </p:cTn>
+                                        <p:tgtEl>
+                                          <p:spTgt spid="11"/>
+                                        </p:tgtEl>
+                                        <p:attrNameLst>
+                                          <p:attrName>style.visibility</p:attrName>
+                                        </p:attrNameLst>
+                                      </p:cBhvr>
+                                      <p:to>
+                                        <p:strVal val="visible"/>
+                                      </p:to>
+                                    </p:set>
+                                  </p:childTnLst>
+                                </p:cTn>
+                              </p:par>
+                            </p:childTnLst>
+                          </p:cTn>
+                        </p:par>
+                      </p:childTnLst>
+                    </p:cTn>
+                  </p:par>
+                  <p:par>
+                    <p:cTn id="7" fill="hold">
+                      <p:stCondLst>
+                        <p:cond delay="indefinite"/>
+                      </p:stCondLst>
+                      <p:childTnLst>
+                        <p:par>
+                          <p:cTn id="8" fill="hold">
+                            <p:stCondLst>
+                              <p:cond delay="0"/>
+                            </p:stCondLst>
+                            <p:childTnLst>
+                              <p:par>
+                                <p:cTn id="9" presetID="1" presetClass="entr" presetSubtype="0" fill="hold" grpId="0" nodeType="clickEffect">
+                                  <p:stCondLst>
+                                    <p:cond delay="0"/>
+                                  </p:stCondLst>
+                                  <p:childTnLst>
+                                    <p:set>
+                                      <p:cBhvr>
+                                        <p:cTn id="10" dur="1" fill="hold">
+                                          <p:stCondLst>
+                                            <p:cond delay="0"/>
+                                          </p:stCondLst>
+                                        </p:cTn>
+                                        <p:tgtEl>
+                                          <p:spTgt spid="12"/>
+                                        </p:tgtEl>
+                                        <p:attrNameLst>
+                                          <p:attrName>style.visibility</p:attrName>
+                                        </p:attrNameLst>
+                                      </p:cBhvr>
+                                      <p:to>
+                                        <p:strVal val="visible"/>
+                                      </p:to>
+                                    </p:set>
+                                  </p:childTnLst>
+                                </p:cTn>
+                              </p:par>
+                            </p:childTnLst>
+                          </p:cTn>
+                        </p:par>
+                      </p:childTnLst>
+                    </p:cTn>
+                  </p:par>
+                  <p:par>
+                    <p:cTn id="11" fill="hold">
+                      <p:stCondLst>
+                        <p:cond delay="indefinite"/>
+                      </p:stCondLst>
+                      <p:childTnLst>
+                        <p:par>
+                          <p:cTn id="12" fill="hold">
+                            <p:stCondLst>
+                              <p:cond delay="0"/>
+                            </p:stCondLst>
+                            <p:childTnLst>
+                              <p:par>
+                                <p:cTn id="13" presetID="1" presetClass="entr" presetSubtype="0" fill="hold" grpId="0" nodeType="clickEffect">
+                                  <p:stCondLst>
+                                    <p:cond delay="0"/>
+                                  </p:stCondLst>
+                                  <p:childTnLst>
+                                    <p:set>
+                                      <p:cBhvr>
+                                        <p:cTn id="14" dur="1" fill="hold">
+                                          <p:stCondLst>
+                                            <p:cond delay="0"/>
+                                          </p:stCondLst>
+                                        </p:cTn>
+                                        <p:tgtEl>
+                                          <p:spTgt spid="13"/>
+                                        </p:tgtEl>
+                                        <p:attrNameLst>
+                                          <p:attrName>style.visibility</p:attrName>
+                                        </p:attrNameLst>
+                                      </p:cBhvr>
+                                      <p:to>
+                                        <p:strVal val="visible"/>
+                                      </p:to>
+                                    </p:set>
+                                  </p:childTnLst>
+                                </p:cTn>
+                              </p:par>
+                            </p:childTnLst>
+                          </p:cTn>
+                        </p:par>
+                      </p:childTnLst>
+                    </p:cTn>
+                  </p:par>
+                  <p:par>
+                    <p:cTn id="15" fill="hold">
+                      <p:stCondLst>
+                        <p:cond delay="indefinite"/>
+                      </p:stCondLst>
+                      <p:childTnLst>
+                        <p:par>
+                          <p:cTn id="16" fill="hold">
+                            <p:stCondLst>
+                              <p:cond delay="0"/>
+                            </p:stCondLst>
+                            <p:childTnLst>
+                              <p:par>
+                                <p:cTn id="17" presetID="1" presetClass="entr" presetSubtype="0" fill="hold" grpId="0" nodeType="clickEffect">
+                                  <p:stCondLst>
+                                    <p:cond delay="0"/>
+                                  </p:stCondLst>
+                                  <p:childTnLst>
+                                    <p:set>
+                                      <p:cBhvr>
+                                        <p:cTn id="18" dur="1" fill="hold">
+                                          <p:stCondLst>
+                                            <p:cond delay="0"/>
+                                          </p:stCondLst>
+                                        </p:cTn>
+                                        <p:tgtEl>
+                                          <p:spTgt spid="14"/>
+                                        </p:tgtEl>
+                                        <p:attrNameLst>
+                                          <p:attrName>style.visibility</p:attrName>
+                                        </p:attrNameLst>
+                                      </p:cBhvr>
+                                      <p:to>
+                                        <p:strVal val="visible"/>
+                                      </p:to>
+                                    </p:set>
+                                  </p:childTnLst>
+                                </p:cTn>
+                              </p:par>
+                            </p:childTnLst>
+                          </p:cTn>
+                        </p:par>
+                      </p:childTnLst>
+                    </p:cTn>
+                  </p:par>
+                  <p:par>
+                    <p:cTn id="19" fill="hold">
+                      <p:stCondLst>
+                        <p:cond delay="indefinite"/>
+                      </p:stCondLst>
+                      <p:childTnLst>
+                        <p:par>
+                          <p:cTn id="20" fill="hold">
+                            <p:stCondLst>
+                              <p:cond delay="0"/>
+                            </p:stCondLst>
+                            <p:childTnLst>
+                              <p:par>
+                                <p:cTn id="21" presetID="1" presetClass="entr" presetSubtype="0" fill="hold" grpId="0" nodeType="clickEffect">
+                                  <p:stCondLst>
+                                    <p:cond delay="0"/>
+                                  </p:stCondLst>
+                                  <p:childTnLst>
+                                    <p:set>
+                                      <p:cBhvr>
+                                        <p:cTn id="22" dur="1" fill="hold">
+                                          <p:stCondLst>
+                                            <p:cond delay="0"/>
+                                          </p:stCondLst>
+                                        </p:cTn>
+                                        <p:tgtEl>
+                                          <p:spTgt spid="15"/>
+                                        </p:tgtEl>
+                                        <p:attrNameLst>
+                                          <p:attrName>style.visibility</p:attrName>
+                                        </p:attrNameLst>
+                                      </p:cBhvr>
+                                      <p:to>
+                                        <p:strVal val="visible"/>
+                                      </p:to>
+                                    </p:set>
+                                  </p:childTnLst>
+                                </p:cTn>
+                              </p:par>
+                            </p:childTnLst>
+                          </p:cTn>
+                        </p:par>
+                      </p:childTnLst>
+                    </p:cTn>
+                  </p:par>
+                  <p:par>
+                    <p:cTn id="23" fill="hold">
+                      <p:stCondLst>
+                        <p:cond delay="indefinite"/>
+                      </p:stCondLst>
+                      <p:childTnLst>
+                        <p:par>
+                          <p:cTn id="24" fill="hold">
+                            <p:stCondLst>
+                              <p:cond delay="0"/>
+                            </p:stCondLst>
+                            <p:childTnLst>
+                              <p:par>
+                                <p:cTn id="25" presetID="1" presetClass="entr" presetSubtype="0" fill="hold" grpId="0" nodeType="clickEffect">
+                                  <p:stCondLst>
+                                    <p:cond delay="0"/>
+                                  </p:stCondLst>
+                                  <p:childTnLst>
+                                    <p:set>
+                                      <p:cBhvr>
+                                        <p:cTn id="26" dur="1" fill="hold">
+                                          <p:stCondLst>
+                                            <p:cond delay="0"/>
+                                          </p:stCondLst>
+                                        </p:cTn>
+                                        <p:tgtEl>
+                                          <p:spTgt spid="16"/>
+                                        </p:tgtEl>
+                                        <p:attrNameLst>
+                                          <p:attrName>style.visibility</p:attrName>
+                                        </p:attrNameLst>
+                                      </p:cBhvr>
+                                      <p:to>
+                                        <p:strVal val="visible"/>
+                                      </p:to>
+                                    </p:set>
+                                  </p:childTnLst>
+                                </p:cTn>
+                              </p:par>
+                            </p:childTnLst>
+                          </p:cTn>
+                        </p:par>
+                      </p:childTnLst>
+                    </p:cTn>
+                  </p:par>
+                  <p:par>
+                    <p:cTn id="27" fill="hold">
+                      <p:stCondLst>
+                        <p:cond delay="indefinite"/>
+                      </p:stCondLst>
+                      <p:childTnLst>
+                        <p:par>
+                          <p:cTn id="28" fill="hold">
+                            <p:stCondLst>
+                              <p:cond delay="0"/>
+                            </p:stCondLst>
+                            <p:childTnLst>
+                              <p:par>
+                                <p:cTn id="29" presetID="1" presetClass="entr" presetSubtype="0" fill="hold" grpId="0" nodeType="clickEffect">
+                                  <p:stCondLst>
+                                    <p:cond delay="0"/>
+                                  </p:stCondLst>
+                                  <p:childTnLst>
+                                    <p:set>
+                                      <p:cBhvr>
+                                        <p:cTn id="30" dur="1" fill="hold">
+                                          <p:stCondLst>
+                                            <p:cond delay="0"/>
+                                          </p:stCondLst>
+                                        </p:cTn>
+                                        <p:tgtEl>
+                                          <p:spTgt spid="17"/>
+                                        </p:tgtEl>
+                                        <p:attrNameLst>
+                                          <p:attrName>style.visibility</p:attrName>
+                                        </p:attrNameLst>
+                                      </p:cBhvr>
+                                      <p:to>
+                                        <p:strVal val="visible"/>
+                                      </p:to>
+                                    </p:set>
+                                  </p:childTnLst>
+                                </p:cTn>
+                              </p:par>
+                            </p:childTnLst>
+                          </p:cTn>
+                        </p:par>
+                      </p:childTnLst>
+                    </p:cTn>
+                  </p:par>
+                </p:childTnLst>
+              </p:cTn>
+              <p:prevCondLst>
+                <p:cond evt="onPrev" delay="0">
+                  <p:tgtEl>
+                    <p:sldTgt/>
+                  </p:tgtEl>
+                </p:cond>
+              </p:prevCondLst>
+              <p:nextCondLst>
+                <p:cond evt="onNext" delay="0">
+                  <p:tgtEl>
+                    <p:sldTgt/>
+                  </p:tgtEl>
+                </p:cond>
+              </p:nextCondLst>
+            </p:seq>
+          </p:childTnLst>
+        </p:cTn>
+      </p:par>
+    </p:tnLst>
+    <p:bldLst>
+      <p:bldP spid="11" grpId="0"/>
+      <p:bldP spid="12" grpId="0" animBg="1"/>
+      <p:bldP spid="13" grpId="0" animBg="1"/>
+      <p:bldP spid="14" grpId="0" animBg="1"/>
+      <p:bldP spid="15" grpId="0" animBg="1"/>
+      <p:bldP spid="16" grpId="0" animBg="1"/>
+      <p:bldP spid="17" grpId="0" animBg="1"/>
+    </p:bldLst>
+  </p:timing>
 </p:sld>
 </file>
 
@@ -10370,7 +11539,7 @@
           <a:p>
             <a:r>
               <a:rPr lang="en-US" dirty="0"/>
-              <a:t>Backwards Declarations</a:t>
+              <a:t>Backward Function Declarations</a:t>
             </a:r>
           </a:p>
         </p:txBody>
@@ -11941,7 +13110,7 @@
               <a:rPr lang="en-US" sz="1800" dirty="0">
                 <a:latin typeface="Calibri" panose="020F0502020204030204" pitchFamily="34" charset="0"/>
               </a:rPr>
-              <a:t> *</a:t>
+              <a:t>* </a:t>
             </a:r>
             <a:r>
               <a:rPr lang="en-US" sz="1800" dirty="0" err="1">
@@ -13554,7 +14723,7 @@
         <p:spPr>
           <a:xfrm>
             <a:off x="628650" y="1249882"/>
-            <a:ext cx="4923207" cy="2862322"/>
+            <a:ext cx="5810052" cy="3170099"/>
           </a:xfrm>
           <a:prstGeom prst="rect">
             <a:avLst/>
@@ -13568,272 +14737,272 @@
           <a:lstStyle/>
           <a:p>
             <a:r>
-              <a:rPr lang="en-US" sz="1800" dirty="0">
+              <a:rPr lang="en-US" sz="2000" dirty="0">
+                <a:solidFill>
+                  <a:srgbClr val="C00000"/>
+                </a:solidFill>
+                <a:latin typeface="Calibri" panose="020F0502020204030204" pitchFamily="34" charset="0"/>
+              </a:rPr>
+              <a:t>// </a:t>
+            </a:r>
+            <a:r>
+              <a:rPr lang="en-US" sz="2000" dirty="0" err="1">
+                <a:solidFill>
+                  <a:srgbClr val="C00000"/>
+                </a:solidFill>
+                <a:latin typeface="Calibri" panose="020F0502020204030204" pitchFamily="34" charset="0"/>
+              </a:rPr>
+              <a:t>initalize</a:t>
+            </a:r>
+            <a:r>
+              <a:rPr lang="en-US" sz="2000" dirty="0">
+                <a:solidFill>
+                  <a:srgbClr val="C00000"/>
+                </a:solidFill>
+                <a:latin typeface="Calibri" panose="020F0502020204030204" pitchFamily="34" charset="0"/>
+              </a:rPr>
+              <a:t> return type </a:t>
+            </a:r>
+          </a:p>
+          <a:p>
+            <a:r>
+              <a:rPr lang="en-US" sz="2000" dirty="0" err="1">
+                <a:latin typeface="Calibri" panose="020F0502020204030204" pitchFamily="34" charset="0"/>
+              </a:rPr>
+              <a:t>llvm</a:t>
+            </a:r>
+            <a:r>
+              <a:rPr lang="en-US" sz="2000" dirty="0">
+                <a:latin typeface="Calibri" panose="020F0502020204030204" pitchFamily="34" charset="0"/>
+              </a:rPr>
+              <a:t>::Type *</a:t>
+            </a:r>
+            <a:r>
+              <a:rPr lang="en-US" sz="2000" dirty="0" err="1">
+                <a:latin typeface="Calibri" panose="020F0502020204030204" pitchFamily="34" charset="0"/>
+              </a:rPr>
+              <a:t>returnTy</a:t>
+            </a:r>
+            <a:r>
+              <a:rPr lang="en-US" sz="2000" dirty="0">
+                <a:latin typeface="Calibri" panose="020F0502020204030204" pitchFamily="34" charset="0"/>
+              </a:rPr>
+              <a:t> = std::vector&lt;</a:t>
+            </a:r>
+            <a:r>
+              <a:rPr lang="en-US" sz="2000" dirty="0" err="1">
+                <a:latin typeface="Calibri" panose="020F0502020204030204" pitchFamily="34" charset="0"/>
+              </a:rPr>
+              <a:t>llvm</a:t>
+            </a:r>
+            <a:r>
+              <a:rPr lang="en-US" sz="2000" dirty="0">
+                <a:latin typeface="Calibri" panose="020F0502020204030204" pitchFamily="34" charset="0"/>
+              </a:rPr>
+              <a:t>::Type *&gt; </a:t>
+            </a:r>
+            <a:r>
+              <a:rPr lang="en-US" sz="2000" dirty="0" err="1">
+                <a:latin typeface="Calibri" panose="020F0502020204030204" pitchFamily="34" charset="0"/>
+              </a:rPr>
+              <a:t>args</a:t>
+            </a:r>
+            <a:r>
+              <a:rPr lang="en-US" sz="2000" dirty="0">
+                <a:latin typeface="Calibri" panose="020F0502020204030204" pitchFamily="34" charset="0"/>
+              </a:rPr>
+              <a:t>; </a:t>
+            </a:r>
+          </a:p>
+          <a:p>
+            <a:r>
+              <a:rPr lang="en-US" sz="2000" dirty="0">
+                <a:solidFill>
+                  <a:srgbClr val="C00000"/>
+                </a:solidFill>
+                <a:latin typeface="Calibri" panose="020F0502020204030204" pitchFamily="34" charset="0"/>
+              </a:rPr>
+              <a:t>// </a:t>
+            </a:r>
+            <a:r>
+              <a:rPr lang="en-US" sz="2000" dirty="0" err="1">
+                <a:solidFill>
+                  <a:srgbClr val="C00000"/>
+                </a:solidFill>
+                <a:latin typeface="Calibri" panose="020F0502020204030204" pitchFamily="34" charset="0"/>
+              </a:rPr>
+              <a:t>args</a:t>
+            </a:r>
+            <a:r>
+              <a:rPr lang="en-US" sz="2000" dirty="0">
+                <a:solidFill>
+                  <a:srgbClr val="C00000"/>
+                </a:solidFill>
+                <a:latin typeface="Calibri" panose="020F0502020204030204" pitchFamily="34" charset="0"/>
+              </a:rPr>
+              <a:t> := initialize the vector of argument types</a:t>
+            </a:r>
+          </a:p>
+          <a:p>
+            <a:r>
+              <a:rPr lang="en-US" sz="2000" dirty="0">
                 <a:latin typeface="Calibri" panose="020F0502020204030204" pitchFamily="34" charset="0"/>
               </a:rPr>
               <a:t> </a:t>
             </a:r>
             <a:r>
-              <a:rPr lang="en-US" sz="1800" dirty="0" err="1">
+              <a:rPr lang="en-US" sz="2000" dirty="0" err="1">
                 <a:latin typeface="Calibri" panose="020F0502020204030204" pitchFamily="34" charset="0"/>
               </a:rPr>
               <a:t>llvm</a:t>
             </a:r>
             <a:r>
-              <a:rPr lang="en-US" sz="1800" dirty="0">
-                <a:latin typeface="Calibri" panose="020F0502020204030204" pitchFamily="34" charset="0"/>
-              </a:rPr>
-              <a:t>::Type *</a:t>
-            </a:r>
-            <a:r>
-              <a:rPr lang="en-US" sz="1800" dirty="0" err="1">
+              <a:rPr lang="en-US" sz="2000" dirty="0">
+                <a:latin typeface="Calibri" panose="020F0502020204030204" pitchFamily="34" charset="0"/>
+              </a:rPr>
+              <a:t>::Function *</a:t>
+            </a:r>
+            <a:r>
+              <a:rPr lang="en-US" sz="2000" dirty="0" err="1">
+                <a:latin typeface="Calibri" panose="020F0502020204030204" pitchFamily="34" charset="0"/>
+              </a:rPr>
+              <a:t>func</a:t>
+            </a:r>
+            <a:r>
+              <a:rPr lang="en-US" sz="2000" dirty="0">
+                <a:latin typeface="Calibri" panose="020F0502020204030204" pitchFamily="34" charset="0"/>
+              </a:rPr>
+              <a:t> = </a:t>
+            </a:r>
+            <a:r>
+              <a:rPr lang="en-US" sz="2000" dirty="0" err="1">
+                <a:latin typeface="Calibri" panose="020F0502020204030204" pitchFamily="34" charset="0"/>
+              </a:rPr>
+              <a:t>llvm</a:t>
+            </a:r>
+            <a:r>
+              <a:rPr lang="en-US" sz="2000" dirty="0">
+                <a:latin typeface="Calibri" panose="020F0502020204030204" pitchFamily="34" charset="0"/>
+              </a:rPr>
+              <a:t>::Function::Create(</a:t>
+            </a:r>
+          </a:p>
+          <a:p>
+            <a:r>
+              <a:rPr lang="en-US" sz="2000" dirty="0">
+                <a:latin typeface="Calibri" panose="020F0502020204030204" pitchFamily="34" charset="0"/>
+              </a:rPr>
+              <a:t>        </a:t>
+            </a:r>
+            <a:r>
+              <a:rPr lang="en-US" sz="2000" dirty="0" err="1">
+                <a:latin typeface="Calibri" panose="020F0502020204030204" pitchFamily="34" charset="0"/>
+              </a:rPr>
+              <a:t>llvm</a:t>
+            </a:r>
+            <a:r>
+              <a:rPr lang="en-US" sz="2000" dirty="0">
+                <a:latin typeface="Calibri" panose="020F0502020204030204" pitchFamily="34" charset="0"/>
+              </a:rPr>
+              <a:t>::</a:t>
+            </a:r>
+            <a:r>
+              <a:rPr lang="en-US" sz="2000" dirty="0" err="1">
+                <a:latin typeface="Calibri" panose="020F0502020204030204" pitchFamily="34" charset="0"/>
+              </a:rPr>
+              <a:t>FunctionType</a:t>
+            </a:r>
+            <a:r>
+              <a:rPr lang="en-US" sz="2000" dirty="0">
+                <a:latin typeface="Calibri" panose="020F0502020204030204" pitchFamily="34" charset="0"/>
+              </a:rPr>
+              <a:t>::get(</a:t>
+            </a:r>
+            <a:r>
+              <a:rPr lang="en-US" sz="2000" dirty="0" err="1">
                 <a:latin typeface="Calibri" panose="020F0502020204030204" pitchFamily="34" charset="0"/>
               </a:rPr>
               <a:t>returnTy</a:t>
             </a:r>
             <a:r>
-              <a:rPr lang="en-US" sz="1800" dirty="0">
-                <a:latin typeface="Calibri" panose="020F0502020204030204" pitchFamily="34" charset="0"/>
-              </a:rPr>
-              <a:t> = /* </a:t>
-            </a:r>
-            <a:r>
-              <a:rPr lang="en-US" sz="1800" dirty="0" err="1">
-                <a:latin typeface="Calibri" panose="020F0502020204030204" pitchFamily="34" charset="0"/>
-              </a:rPr>
-              <a:t>initalize</a:t>
-            </a:r>
-            <a:r>
-              <a:rPr lang="en-US" sz="1800" dirty="0">
-                <a:latin typeface="Calibri" panose="020F0502020204030204" pitchFamily="34" charset="0"/>
-              </a:rPr>
-              <a:t> return type */</a:t>
-            </a:r>
-          </a:p>
-          <a:p>
-            <a:r>
-              <a:rPr lang="en-US" sz="1800" dirty="0">
-                <a:latin typeface="Calibri" panose="020F0502020204030204" pitchFamily="34" charset="0"/>
-              </a:rPr>
-              <a:t> </a:t>
-            </a:r>
-            <a:r>
-              <a:rPr lang="en-US" sz="1800" dirty="0" err="1">
-                <a:latin typeface="Calibri" panose="020F0502020204030204" pitchFamily="34" charset="0"/>
-              </a:rPr>
-              <a:t>std</a:t>
-            </a:r>
-            <a:r>
-              <a:rPr lang="en-US" sz="1800" dirty="0">
-                <a:latin typeface="Calibri" panose="020F0502020204030204" pitchFamily="34" charset="0"/>
-              </a:rPr>
-              <a:t>::vector&lt;</a:t>
-            </a:r>
-            <a:r>
-              <a:rPr lang="en-US" sz="1800" dirty="0" err="1">
+              <a:rPr lang="en-US" sz="2000" dirty="0">
+                <a:latin typeface="Calibri" panose="020F0502020204030204" pitchFamily="34" charset="0"/>
+              </a:rPr>
+              <a:t>, </a:t>
+            </a:r>
+            <a:r>
+              <a:rPr lang="en-US" sz="2000" dirty="0" err="1">
+                <a:latin typeface="Calibri" panose="020F0502020204030204" pitchFamily="34" charset="0"/>
+              </a:rPr>
+              <a:t>args</a:t>
+            </a:r>
+            <a:r>
+              <a:rPr lang="en-US" sz="2000" dirty="0">
+                <a:latin typeface="Calibri" panose="020F0502020204030204" pitchFamily="34" charset="0"/>
+              </a:rPr>
+              <a:t>, false),</a:t>
+            </a:r>
+          </a:p>
+          <a:p>
+            <a:r>
+              <a:rPr lang="en-US" sz="2000" dirty="0">
+                <a:latin typeface="Calibri" panose="020F0502020204030204" pitchFamily="34" charset="0"/>
+              </a:rPr>
+              <a:t>        </a:t>
+            </a:r>
+            <a:r>
+              <a:rPr lang="en-US" sz="2000" dirty="0" err="1">
                 <a:latin typeface="Calibri" panose="020F0502020204030204" pitchFamily="34" charset="0"/>
               </a:rPr>
               <a:t>llvm</a:t>
             </a:r>
             <a:r>
-              <a:rPr lang="en-US" sz="1800" dirty="0">
-                <a:latin typeface="Calibri" panose="020F0502020204030204" pitchFamily="34" charset="0"/>
-              </a:rPr>
-              <a:t>::Type *&gt; </a:t>
-            </a:r>
-            <a:r>
-              <a:rPr lang="en-US" sz="1800" dirty="0" err="1">
-                <a:latin typeface="Calibri" panose="020F0502020204030204" pitchFamily="34" charset="0"/>
-              </a:rPr>
-              <a:t>args</a:t>
-            </a:r>
-            <a:r>
-              <a:rPr lang="en-US" sz="1800" dirty="0">
-                <a:latin typeface="Calibri" panose="020F0502020204030204" pitchFamily="34" charset="0"/>
-              </a:rPr>
-              <a:t>;</a:t>
-            </a:r>
-          </a:p>
-          <a:p>
-            <a:r>
-              <a:rPr lang="en-US" sz="1800" dirty="0">
-                <a:latin typeface="Calibri" panose="020F0502020204030204" pitchFamily="34" charset="0"/>
-              </a:rPr>
-              <a:t>/* </a:t>
-            </a:r>
-            <a:r>
-              <a:rPr lang="en-US" sz="1800" dirty="0" err="1">
-                <a:latin typeface="Calibri" panose="020F0502020204030204" pitchFamily="34" charset="0"/>
-              </a:rPr>
-              <a:t>args</a:t>
-            </a:r>
-            <a:r>
-              <a:rPr lang="en-US" sz="1800" dirty="0">
-                <a:latin typeface="Calibri" panose="020F0502020204030204" pitchFamily="34" charset="0"/>
-              </a:rPr>
-              <a:t> := initialize the vector of argument types */</a:t>
-            </a:r>
-          </a:p>
-          <a:p>
-            <a:r>
-              <a:rPr lang="en-US" sz="1800" dirty="0">
-                <a:latin typeface="Calibri" panose="020F0502020204030204" pitchFamily="34" charset="0"/>
-              </a:rPr>
-              <a:t> </a:t>
-            </a:r>
-            <a:r>
-              <a:rPr lang="en-US" sz="1800" dirty="0" err="1">
-                <a:latin typeface="Calibri" panose="020F0502020204030204" pitchFamily="34" charset="0"/>
-              </a:rPr>
-              <a:t>llvm</a:t>
-            </a:r>
-            <a:r>
-              <a:rPr lang="en-US" sz="1800" dirty="0">
-                <a:latin typeface="Calibri" panose="020F0502020204030204" pitchFamily="34" charset="0"/>
-              </a:rPr>
-              <a:t>::Function *</a:t>
-            </a:r>
-            <a:r>
-              <a:rPr lang="en-US" sz="1800" dirty="0" err="1">
-                <a:latin typeface="Calibri" panose="020F0502020204030204" pitchFamily="34" charset="0"/>
-              </a:rPr>
-              <a:t>func</a:t>
-            </a:r>
-            <a:r>
-              <a:rPr lang="en-US" sz="1800" dirty="0">
-                <a:latin typeface="Calibri" panose="020F0502020204030204" pitchFamily="34" charset="0"/>
-              </a:rPr>
-              <a:t> = </a:t>
-            </a:r>
-            <a:r>
-              <a:rPr lang="en-US" sz="1800" dirty="0" err="1">
-                <a:latin typeface="Calibri" panose="020F0502020204030204" pitchFamily="34" charset="0"/>
-              </a:rPr>
-              <a:t>llvm</a:t>
-            </a:r>
-            <a:r>
-              <a:rPr lang="en-US" sz="1800" dirty="0">
-                <a:latin typeface="Calibri" panose="020F0502020204030204" pitchFamily="34" charset="0"/>
-              </a:rPr>
-              <a:t>::Function::Create(</a:t>
-            </a:r>
-          </a:p>
-          <a:p>
-            <a:r>
-              <a:rPr lang="en-US" sz="1800" dirty="0">
+              <a:rPr lang="en-US" sz="2000" dirty="0">
+                <a:latin typeface="Calibri" panose="020F0502020204030204" pitchFamily="34" charset="0"/>
+              </a:rPr>
+              <a:t>::Function::</a:t>
+            </a:r>
+            <a:r>
+              <a:rPr lang="en-US" sz="2000" dirty="0" err="1">
+                <a:latin typeface="Calibri" panose="020F0502020204030204" pitchFamily="34" charset="0"/>
+              </a:rPr>
+              <a:t>ExternalLinkage</a:t>
+            </a:r>
+            <a:r>
+              <a:rPr lang="en-US" sz="2000" dirty="0">
+                <a:latin typeface="Calibri" panose="020F0502020204030204" pitchFamily="34" charset="0"/>
+              </a:rPr>
+              <a:t>,</a:t>
+            </a:r>
+          </a:p>
+          <a:p>
+            <a:r>
+              <a:rPr lang="en-US" sz="2000" dirty="0">
+                <a:latin typeface="Calibri" panose="020F0502020204030204" pitchFamily="34" charset="0"/>
+              </a:rPr>
+              <a:t>        Name,</a:t>
+            </a:r>
+          </a:p>
+          <a:p>
+            <a:r>
+              <a:rPr lang="en-US" sz="2000" dirty="0">
                 <a:latin typeface="Calibri" panose="020F0502020204030204" pitchFamily="34" charset="0"/>
               </a:rPr>
               <a:t>        </a:t>
             </a:r>
             <a:r>
-              <a:rPr lang="en-US" sz="1800" dirty="0" err="1">
-                <a:latin typeface="Calibri" panose="020F0502020204030204" pitchFamily="34" charset="0"/>
-              </a:rPr>
-              <a:t>llvm</a:t>
-            </a:r>
-            <a:r>
-              <a:rPr lang="en-US" sz="1800" dirty="0">
-                <a:latin typeface="Calibri" panose="020F0502020204030204" pitchFamily="34" charset="0"/>
-              </a:rPr>
-              <a:t>::</a:t>
-            </a:r>
-            <a:r>
-              <a:rPr lang="en-US" sz="1800" dirty="0" err="1">
-                <a:latin typeface="Calibri" panose="020F0502020204030204" pitchFamily="34" charset="0"/>
-              </a:rPr>
-              <a:t>FunctionType</a:t>
-            </a:r>
-            <a:r>
-              <a:rPr lang="en-US" sz="1800" dirty="0">
-                <a:latin typeface="Calibri" panose="020F0502020204030204" pitchFamily="34" charset="0"/>
-              </a:rPr>
-              <a:t>::get(</a:t>
-            </a:r>
-            <a:r>
-              <a:rPr lang="en-US" sz="1800" dirty="0" err="1">
-                <a:latin typeface="Calibri" panose="020F0502020204030204" pitchFamily="34" charset="0"/>
-              </a:rPr>
-              <a:t>returnTy</a:t>
-            </a:r>
-            <a:r>
-              <a:rPr lang="en-US" sz="1800" dirty="0">
-                <a:latin typeface="Calibri" panose="020F0502020204030204" pitchFamily="34" charset="0"/>
-              </a:rPr>
-              <a:t>, </a:t>
-            </a:r>
-            <a:r>
-              <a:rPr lang="en-US" sz="1800" dirty="0" err="1">
-                <a:latin typeface="Calibri" panose="020F0502020204030204" pitchFamily="34" charset="0"/>
-              </a:rPr>
-              <a:t>args</a:t>
-            </a:r>
-            <a:r>
-              <a:rPr lang="en-US" sz="1800" dirty="0">
-                <a:latin typeface="Calibri" panose="020F0502020204030204" pitchFamily="34" charset="0"/>
-              </a:rPr>
-              <a:t>, false),</a:t>
-            </a:r>
-          </a:p>
-          <a:p>
-            <a:r>
-              <a:rPr lang="en-US" sz="1800" dirty="0">
-                <a:latin typeface="Calibri" panose="020F0502020204030204" pitchFamily="34" charset="0"/>
-              </a:rPr>
-              <a:t>        </a:t>
-            </a:r>
-            <a:r>
-              <a:rPr lang="en-US" sz="1800" dirty="0" err="1">
-                <a:latin typeface="Calibri" panose="020F0502020204030204" pitchFamily="34" charset="0"/>
-              </a:rPr>
-              <a:t>llvm</a:t>
-            </a:r>
-            <a:r>
-              <a:rPr lang="en-US" sz="1800" dirty="0">
-                <a:latin typeface="Calibri" panose="020F0502020204030204" pitchFamily="34" charset="0"/>
-              </a:rPr>
-              <a:t>::Function::</a:t>
-            </a:r>
-            <a:r>
-              <a:rPr lang="en-US" sz="1800" dirty="0" err="1">
-                <a:latin typeface="Calibri" panose="020F0502020204030204" pitchFamily="34" charset="0"/>
-              </a:rPr>
-              <a:t>ExternalLinkage</a:t>
-            </a:r>
-            <a:r>
-              <a:rPr lang="en-US" sz="1800" dirty="0">
-                <a:latin typeface="Calibri" panose="020F0502020204030204" pitchFamily="34" charset="0"/>
-              </a:rPr>
-              <a:t>,</a:t>
-            </a:r>
-          </a:p>
-          <a:p>
-            <a:r>
-              <a:rPr lang="en-US" sz="1800" dirty="0">
-                <a:latin typeface="Calibri" panose="020F0502020204030204" pitchFamily="34" charset="0"/>
-              </a:rPr>
-              <a:t>        Name,</a:t>
-            </a:r>
-          </a:p>
-          <a:p>
-            <a:r>
-              <a:rPr lang="en-US" sz="1800" dirty="0">
-                <a:latin typeface="Calibri" panose="020F0502020204030204" pitchFamily="34" charset="0"/>
-              </a:rPr>
-              <a:t>        </a:t>
-            </a:r>
-            <a:r>
-              <a:rPr lang="en-US" sz="1800" dirty="0" err="1">
+              <a:rPr lang="en-US" sz="2000" dirty="0" err="1">
                 <a:latin typeface="Calibri" panose="020F0502020204030204" pitchFamily="34" charset="0"/>
               </a:rPr>
               <a:t>TheModule</a:t>
             </a:r>
-            <a:endParaRPr lang="en-US" sz="1800" dirty="0">
+            <a:endParaRPr lang="en-US" sz="2000" dirty="0">
               <a:latin typeface="Calibri" panose="020F0502020204030204" pitchFamily="34" charset="0"/>
             </a:endParaRPr>
           </a:p>
           <a:p>
             <a:r>
-              <a:rPr lang="en-US" sz="1800" dirty="0">
+              <a:rPr lang="en-US" sz="2000" dirty="0">
                 <a:latin typeface="Calibri" panose="020F0502020204030204" pitchFamily="34" charset="0"/>
               </a:rPr>
               <a:t>    );</a:t>
@@ -13841,31 +15010,31 @@
           </a:p>
           <a:p>
             <a:r>
-              <a:rPr lang="en-US" sz="1800" dirty="0">
+              <a:rPr lang="en-US" sz="2000" dirty="0">
                 <a:latin typeface="Calibri" panose="020F0502020204030204" pitchFamily="34" charset="0"/>
               </a:rPr>
               <a:t> </a:t>
             </a:r>
             <a:r>
-              <a:rPr lang="en-US" sz="1800" dirty="0" err="1">
+              <a:rPr lang="en-US" sz="2000" dirty="0" err="1">
                 <a:latin typeface="Calibri" panose="020F0502020204030204" pitchFamily="34" charset="0"/>
               </a:rPr>
               <a:t>syms.enter_symtbl</a:t>
             </a:r>
             <a:r>
-              <a:rPr lang="en-US" sz="1800" dirty="0">
+              <a:rPr lang="en-US" sz="2000" dirty="0">
                 <a:latin typeface="Calibri" panose="020F0502020204030204" pitchFamily="34" charset="0"/>
               </a:rPr>
               <a:t>(Name, </a:t>
             </a:r>
             <a:r>
-              <a:rPr lang="en-US" sz="1800" dirty="0" err="1">
+              <a:rPr lang="en-US" sz="2000" dirty="0" err="1">
                 <a:latin typeface="Calibri" panose="020F0502020204030204" pitchFamily="34" charset="0"/>
               </a:rPr>
               <a:t>func</a:t>
             </a:r>
             <a:r>
-              <a:rPr lang="en-US" sz="1800" dirty="0">
+              <a:rPr lang="en-US" sz="2000" dirty="0">
                 <a:latin typeface="Calibri" panose="020F0502020204030204" pitchFamily="34" charset="0"/>
               </a:rPr>
               <a:t>);</a:t>
@@ -13887,13 +15056,13 @@
         </p:nvSpPr>
         <p:spPr>
           <a:xfrm>
-            <a:off x="4499992" y="3703663"/>
+            <a:off x="4765762" y="3485077"/>
             <a:ext cx="3384376" cy="817082"/>
           </a:xfrm>
           <a:prstGeom prst="wedgeRectCallout">
             <a:avLst>
-              <a:gd name="adj1" fmla="val -69129"/>
-              <a:gd name="adj2" fmla="val -29933"/>
+              <a:gd name="adj1" fmla="val -66041"/>
+              <a:gd name="adj2" fmla="val 34015"/>
             </a:avLst>
           </a:prstGeom>
         </p:spPr>
@@ -14598,6 +15767,9 @@
           <a:p>
             <a:r>
               <a:rPr lang="en-US" sz="2100" dirty="0">
+                <a:solidFill>
+                  <a:srgbClr val="C00000"/>
+                </a:solidFill>
                 <a:latin typeface="Calibri" panose="020F0502020204030204" pitchFamily="34" charset="0"/>
               </a:rPr>
               <a:t>// Create a new basic block which contains a sequence of LLVM instructions</a:t>
@@ -14712,6 +15884,9 @@
           <a:p>
             <a:r>
               <a:rPr lang="en-US" sz="2100" dirty="0">
+                <a:solidFill>
+                  <a:srgbClr val="C00000"/>
+                </a:solidFill>
                 <a:latin typeface="Calibri" panose="020F0502020204030204" pitchFamily="34" charset="0"/>
               </a:rPr>
               <a:t>// insert into symbol table</a:t>
@@ -14734,18 +15909,27 @@
           <a:p>
             <a:r>
               <a:rPr lang="en-US" sz="2100" dirty="0">
+                <a:solidFill>
+                  <a:srgbClr val="C00000"/>
+                </a:solidFill>
                 <a:latin typeface="Calibri" panose="020F0502020204030204" pitchFamily="34" charset="0"/>
               </a:rPr>
               <a:t>// All subsequent calls to </a:t>
             </a:r>
             <a:r>
               <a:rPr lang="en-US" sz="2100" dirty="0" err="1">
+                <a:solidFill>
+                  <a:srgbClr val="C00000"/>
+                </a:solidFill>
                 <a:latin typeface="Calibri" panose="020F0502020204030204" pitchFamily="34" charset="0"/>
               </a:rPr>
               <a:t>IRBuilder</a:t>
             </a:r>
             <a:r>
               <a:rPr lang="en-US" sz="2100" dirty="0">
+                <a:solidFill>
+                  <a:srgbClr val="C00000"/>
+                </a:solidFill>
                 <a:latin typeface="Calibri" panose="020F0502020204030204" pitchFamily="34" charset="0"/>
               </a:rPr>
               <a:t> will place instructions in this location</a:t>

</xml_diff>

<commit_message>
fixed typos in sdt and llvm slides
</commit_message>
<xml_diff>
--- a/assets/ppt/codegen/decafLLVM.pptx
+++ b/assets/ppt/codegen/decafLLVM.pptx
@@ -267,7 +267,7 @@
                 <a:latin typeface="Calibri" panose="020F0502020204030204" pitchFamily="34" charset="0"/>
               </a:rPr>
               <a:pPr/>
-              <a:t>10/18/20</a:t>
+              <a:t>10/19/20</a:t>
             </a:fld>
             <a:endParaRPr lang="en-US" dirty="0">
               <a:latin typeface="Calibri" panose="020F0502020204030204" pitchFamily="34" charset="0"/>
@@ -952,7 +952,7 @@
           <a:p>
             <a:fld id="{1B6DC762-1116-2146-A47C-D79A5A5DBAFD}" type="datetime1">
               <a:rPr lang="en-CA" smtClean="0"/>
-              <a:t>2020-10-18</a:t>
+              <a:t>2020-10-19</a:t>
             </a:fld>
             <a:endParaRPr lang="en-US"/>
           </a:p>
@@ -1150,7 +1150,7 @@
           <a:p>
             <a:fld id="{725FEDD1-5A1B-2342-BAF0-F7C5511A73CE}" type="datetime1">
               <a:rPr lang="en-CA" smtClean="0"/>
-              <a:t>2020-10-18</a:t>
+              <a:t>2020-10-19</a:t>
             </a:fld>
             <a:endParaRPr lang="en-US"/>
           </a:p>
@@ -1358,7 +1358,7 @@
           <a:p>
             <a:fld id="{F09E59AE-0AE1-4048-8BD6-D39FC0EBB194}" type="datetime1">
               <a:rPr lang="en-CA" smtClean="0"/>
-              <a:t>2020-10-18</a:t>
+              <a:t>2020-10-19</a:t>
             </a:fld>
             <a:endParaRPr lang="en-US"/>
           </a:p>
@@ -2833,7 +2833,7 @@
           <a:p>
             <a:fld id="{A2849525-9B7D-5945-A782-775278635E42}" type="datetime1">
               <a:rPr lang="en-CA" smtClean="0"/>
-              <a:t>2020-10-18</a:t>
+              <a:t>2020-10-19</a:t>
             </a:fld>
             <a:endParaRPr lang="en-US"/>
           </a:p>
@@ -3108,7 +3108,7 @@
           <a:p>
             <a:fld id="{D05E1499-BDD1-6940-8C79-13A8B8E63D57}" type="datetime1">
               <a:rPr lang="en-CA" smtClean="0"/>
-              <a:t>2020-10-18</a:t>
+              <a:t>2020-10-19</a:t>
             </a:fld>
             <a:endParaRPr lang="en-US"/>
           </a:p>
@@ -3373,7 +3373,7 @@
           <a:p>
             <a:fld id="{17E70EF3-18A7-4644-8DA2-1EB9CA66C736}" type="datetime1">
               <a:rPr lang="en-CA" smtClean="0"/>
-              <a:t>2020-10-18</a:t>
+              <a:t>2020-10-19</a:t>
             </a:fld>
             <a:endParaRPr lang="en-US"/>
           </a:p>
@@ -3785,7 +3785,7 @@
           <a:p>
             <a:fld id="{54538FC1-2481-FB4A-91E5-87F3422DE2D5}" type="datetime1">
               <a:rPr lang="en-CA" smtClean="0"/>
-              <a:t>2020-10-18</a:t>
+              <a:t>2020-10-19</a:t>
             </a:fld>
             <a:endParaRPr lang="en-US"/>
           </a:p>
@@ -3926,7 +3926,7 @@
           <a:p>
             <a:fld id="{93D5C515-1622-C840-89B2-A4A55D34866A}" type="datetime1">
               <a:rPr lang="en-CA" smtClean="0"/>
-              <a:t>2020-10-18</a:t>
+              <a:t>2020-10-19</a:t>
             </a:fld>
             <a:endParaRPr lang="en-US"/>
           </a:p>
@@ -4039,7 +4039,7 @@
           <a:p>
             <a:fld id="{B9077E75-6C88-BB47-AC6F-0DCA859E7113}" type="datetime1">
               <a:rPr lang="en-CA" smtClean="0"/>
-              <a:t>2020-10-18</a:t>
+              <a:t>2020-10-19</a:t>
             </a:fld>
             <a:endParaRPr lang="en-US"/>
           </a:p>
@@ -4350,7 +4350,7 @@
           <a:p>
             <a:fld id="{1AD12F8B-7E05-A047-BAC3-EE71BEBBE5BE}" type="datetime1">
               <a:rPr lang="en-CA" smtClean="0"/>
-              <a:t>2020-10-18</a:t>
+              <a:t>2020-10-19</a:t>
             </a:fld>
             <a:endParaRPr lang="en-US"/>
           </a:p>
@@ -4638,7 +4638,7 @@
           <a:p>
             <a:fld id="{C1D9F72A-E93E-B546-8268-6408A6E1DA62}" type="datetime1">
               <a:rPr lang="en-CA" smtClean="0"/>
-              <a:t>2020-10-18</a:t>
+              <a:t>2020-10-19</a:t>
             </a:fld>
             <a:endParaRPr lang="en-US"/>
           </a:p>
@@ -4881,7 +4881,7 @@
             <a:fld id="{97DF4AC7-DB73-7444-A2A7-FD79FE1A2B2B}" type="datetime1">
               <a:rPr lang="en-CA" smtClean="0"/>
               <a:pPr/>
-              <a:t>2020-10-18</a:t>
+              <a:t>2020-10-19</a:t>
             </a:fld>
             <a:endParaRPr lang="en-US" dirty="0"/>
           </a:p>
@@ -14723,7 +14723,7 @@
         <p:spPr>
           <a:xfrm>
             <a:off x="628650" y="1249882"/>
-            <a:ext cx="5810052" cy="3170099"/>
+            <a:ext cx="5381025" cy="3477875"/>
           </a:xfrm>
           <a:prstGeom prst="rect">
             <a:avLst/>
@@ -14787,7 +14787,45 @@
               <a:rPr lang="en-US" sz="2000" dirty="0">
                 <a:latin typeface="Calibri" panose="020F0502020204030204" pitchFamily="34" charset="0"/>
               </a:rPr>
-              <a:t> = std::vector&lt;</a:t>
+              <a:t> = </a:t>
+            </a:r>
+            <a:r>
+              <a:rPr lang="en-US" sz="2000" dirty="0" err="1">
+                <a:latin typeface="Calibri" panose="020F0502020204030204" pitchFamily="34" charset="0"/>
+              </a:rPr>
+              <a:t>getLLVMType</a:t>
+            </a:r>
+            <a:r>
+              <a:rPr lang="en-US" sz="2000" dirty="0">
+                <a:latin typeface="Calibri" panose="020F0502020204030204" pitchFamily="34" charset="0"/>
+              </a:rPr>
+              <a:t>(</a:t>
+            </a:r>
+            <a:r>
+              <a:rPr lang="en-US" sz="2000" dirty="0" err="1">
+                <a:latin typeface="Calibri" panose="020F0502020204030204" pitchFamily="34" charset="0"/>
+              </a:rPr>
+              <a:t>ReturnType</a:t>
+            </a:r>
+            <a:r>
+              <a:rPr lang="en-US" sz="2000">
+                <a:latin typeface="Calibri" panose="020F0502020204030204" pitchFamily="34" charset="0"/>
+              </a:rPr>
+              <a:t>);</a:t>
+            </a:r>
+          </a:p>
+          <a:p>
+            <a:r>
+              <a:rPr lang="en-US" sz="2000">
+                <a:latin typeface="Calibri" panose="020F0502020204030204" pitchFamily="34" charset="0"/>
+              </a:rPr>
+              <a:t>std</a:t>
+            </a:r>
+            <a:r>
+              <a:rPr lang="en-US" sz="2000" dirty="0">
+                <a:latin typeface="Calibri" panose="020F0502020204030204" pitchFamily="34" charset="0"/>
+              </a:rPr>
+              <a:t>::vector&lt;</a:t>
             </a:r>
             <a:r>
               <a:rPr lang="en-US" sz="2000" dirty="0" err="1">

</xml_diff>

<commit_message>
add info about checking for return statement in a function
</commit_message>
<xml_diff>
--- a/assets/ppt/codegen/decafLLVM.pptx
+++ b/assets/ppt/codegen/decafLLVM.pptx
@@ -267,7 +267,7 @@
                 <a:latin typeface="Calibri" panose="020F0502020204030204" pitchFamily="34" charset="0"/>
               </a:rPr>
               <a:pPr/>
-              <a:t>10/19/20</a:t>
+              <a:t>11/10/21</a:t>
             </a:fld>
             <a:endParaRPr lang="en-US" dirty="0">
               <a:latin typeface="Calibri" panose="020F0502020204030204" pitchFamily="34" charset="0"/>
@@ -952,7 +952,7 @@
           <a:p>
             <a:fld id="{1B6DC762-1116-2146-A47C-D79A5A5DBAFD}" type="datetime1">
               <a:rPr lang="en-CA" smtClean="0"/>
-              <a:t>2020-10-19</a:t>
+              <a:t>2021-11-10</a:t>
             </a:fld>
             <a:endParaRPr lang="en-US"/>
           </a:p>
@@ -1150,7 +1150,7 @@
           <a:p>
             <a:fld id="{725FEDD1-5A1B-2342-BAF0-F7C5511A73CE}" type="datetime1">
               <a:rPr lang="en-CA" smtClean="0"/>
-              <a:t>2020-10-19</a:t>
+              <a:t>2021-11-10</a:t>
             </a:fld>
             <a:endParaRPr lang="en-US"/>
           </a:p>
@@ -1358,7 +1358,7 @@
           <a:p>
             <a:fld id="{F09E59AE-0AE1-4048-8BD6-D39FC0EBB194}" type="datetime1">
               <a:rPr lang="en-CA" smtClean="0"/>
-              <a:t>2020-10-19</a:t>
+              <a:t>2021-11-10</a:t>
             </a:fld>
             <a:endParaRPr lang="en-US"/>
           </a:p>
@@ -2833,7 +2833,7 @@
           <a:p>
             <a:fld id="{A2849525-9B7D-5945-A782-775278635E42}" type="datetime1">
               <a:rPr lang="en-CA" smtClean="0"/>
-              <a:t>2020-10-19</a:t>
+              <a:t>2021-11-10</a:t>
             </a:fld>
             <a:endParaRPr lang="en-US"/>
           </a:p>
@@ -3108,7 +3108,7 @@
           <a:p>
             <a:fld id="{D05E1499-BDD1-6940-8C79-13A8B8E63D57}" type="datetime1">
               <a:rPr lang="en-CA" smtClean="0"/>
-              <a:t>2020-10-19</a:t>
+              <a:t>2021-11-10</a:t>
             </a:fld>
             <a:endParaRPr lang="en-US"/>
           </a:p>
@@ -3373,7 +3373,7 @@
           <a:p>
             <a:fld id="{17E70EF3-18A7-4644-8DA2-1EB9CA66C736}" type="datetime1">
               <a:rPr lang="en-CA" smtClean="0"/>
-              <a:t>2020-10-19</a:t>
+              <a:t>2021-11-10</a:t>
             </a:fld>
             <a:endParaRPr lang="en-US"/>
           </a:p>
@@ -3785,7 +3785,7 @@
           <a:p>
             <a:fld id="{54538FC1-2481-FB4A-91E5-87F3422DE2D5}" type="datetime1">
               <a:rPr lang="en-CA" smtClean="0"/>
-              <a:t>2020-10-19</a:t>
+              <a:t>2021-11-10</a:t>
             </a:fld>
             <a:endParaRPr lang="en-US"/>
           </a:p>
@@ -3926,7 +3926,7 @@
           <a:p>
             <a:fld id="{93D5C515-1622-C840-89B2-A4A55D34866A}" type="datetime1">
               <a:rPr lang="en-CA" smtClean="0"/>
-              <a:t>2020-10-19</a:t>
+              <a:t>2021-11-10</a:t>
             </a:fld>
             <a:endParaRPr lang="en-US"/>
           </a:p>
@@ -4039,7 +4039,7 @@
           <a:p>
             <a:fld id="{B9077E75-6C88-BB47-AC6F-0DCA859E7113}" type="datetime1">
               <a:rPr lang="en-CA" smtClean="0"/>
-              <a:t>2020-10-19</a:t>
+              <a:t>2021-11-10</a:t>
             </a:fld>
             <a:endParaRPr lang="en-US"/>
           </a:p>
@@ -4350,7 +4350,7 @@
           <a:p>
             <a:fld id="{1AD12F8B-7E05-A047-BAC3-EE71BEBBE5BE}" type="datetime1">
               <a:rPr lang="en-CA" smtClean="0"/>
-              <a:t>2020-10-19</a:t>
+              <a:t>2021-11-10</a:t>
             </a:fld>
             <a:endParaRPr lang="en-US"/>
           </a:p>
@@ -4638,7 +4638,7 @@
           <a:p>
             <a:fld id="{C1D9F72A-E93E-B546-8268-6408A6E1DA62}" type="datetime1">
               <a:rPr lang="en-CA" smtClean="0"/>
-              <a:t>2020-10-19</a:t>
+              <a:t>2021-11-10</a:t>
             </a:fld>
             <a:endParaRPr lang="en-US"/>
           </a:p>
@@ -4881,7 +4881,7 @@
             <a:fld id="{97DF4AC7-DB73-7444-A2A7-FD79FE1A2B2B}" type="datetime1">
               <a:rPr lang="en-CA" smtClean="0"/>
               <a:pPr/>
-              <a:t>2020-10-19</a:t>
+              <a:t>2021-11-10</a:t>
             </a:fld>
             <a:endParaRPr lang="en-US" dirty="0"/>
           </a:p>
@@ -5650,7 +5650,7 @@
         <p:spPr>
           <a:xfrm>
             <a:off x="404081" y="1262709"/>
-            <a:ext cx="8335838" cy="2031325"/>
+            <a:ext cx="8335838" cy="2677656"/>
           </a:xfrm>
           <a:prstGeom prst="rect">
             <a:avLst/>
@@ -5766,6 +5766,77 @@
               </a:rPr>
               <a:t>Add the arguments to the function as allocated on the stack (next slide)</a:t>
             </a:r>
+          </a:p>
+          <a:p>
+            <a:pPr marL="385763" indent="-385763">
+              <a:buFont typeface="+mj-lt"/>
+              <a:buAutoNum type="arabicPeriod"/>
+            </a:pPr>
+            <a:r>
+              <a:rPr lang="en-US" sz="2100" dirty="0">
+                <a:latin typeface="+mn-lt"/>
+              </a:rPr>
+              <a:t>You can check if a function has a </a:t>
+            </a:r>
+            <a:r>
+              <a:rPr lang="en-US" sz="2100" dirty="0">
+                <a:latin typeface="Consolas" panose="020B0609020204030204" pitchFamily="49" charset="0"/>
+                <a:cs typeface="Consolas" panose="020B0609020204030204" pitchFamily="49" charset="0"/>
+              </a:rPr>
+              <a:t>return</a:t>
+            </a:r>
+            <a:r>
+              <a:rPr lang="en-US" sz="2100" dirty="0">
+                <a:latin typeface="+mn-lt"/>
+              </a:rPr>
+              <a:t> statement by checking if the value of </a:t>
+            </a:r>
+            <a:r>
+              <a:rPr lang="en-US" sz="2100" dirty="0">
+                <a:latin typeface="Consolas" panose="020B0609020204030204" pitchFamily="49" charset="0"/>
+                <a:cs typeface="Consolas" panose="020B0609020204030204" pitchFamily="49" charset="0"/>
+              </a:rPr>
+              <a:t>BB-&gt;</a:t>
+            </a:r>
+            <a:r>
+              <a:rPr lang="en-US" sz="2100" dirty="0" err="1">
+                <a:latin typeface="Consolas" panose="020B0609020204030204" pitchFamily="49" charset="0"/>
+                <a:cs typeface="Consolas" panose="020B0609020204030204" pitchFamily="49" charset="0"/>
+              </a:rPr>
+              <a:t>getTerminator</a:t>
+            </a:r>
+            <a:r>
+              <a:rPr lang="en-US" sz="2100" dirty="0">
+                <a:latin typeface="Consolas" panose="020B0609020204030204" pitchFamily="49" charset="0"/>
+                <a:cs typeface="Consolas" panose="020B0609020204030204" pitchFamily="49" charset="0"/>
+              </a:rPr>
+              <a:t>() </a:t>
+            </a:r>
+            <a:r>
+              <a:rPr lang="en-US" sz="2100" dirty="0">
+                <a:latin typeface="+mn-lt"/>
+                <a:cs typeface="Consolas" panose="020B0609020204030204" pitchFamily="49" charset="0"/>
+              </a:rPr>
+              <a:t>is </a:t>
+            </a:r>
+            <a:r>
+              <a:rPr lang="en-US" sz="2100" dirty="0">
+                <a:latin typeface="Consolas" panose="020B0609020204030204" pitchFamily="49" charset="0"/>
+                <a:cs typeface="Consolas" panose="020B0609020204030204" pitchFamily="49" charset="0"/>
+              </a:rPr>
+              <a:t>NULL</a:t>
+            </a:r>
+            <a:r>
+              <a:rPr lang="en-US" sz="2100" dirty="0">
+                <a:latin typeface="+mn-lt"/>
+                <a:cs typeface="Consolas" panose="020B0609020204030204" pitchFamily="49" charset="0"/>
+              </a:rPr>
+              <a:t>.</a:t>
+            </a:r>
+            <a:endParaRPr lang="en-US" sz="2100" dirty="0">
+              <a:latin typeface="Consolas" panose="020B0609020204030204" pitchFamily="49" charset="0"/>
+              <a:cs typeface="Consolas" panose="020B0609020204030204" pitchFamily="49" charset="0"/>
+            </a:endParaRPr>
           </a:p>
         </p:txBody>
       </p:sp>

</xml_diff>

<commit_message>
updated short circuit explanation
</commit_message>
<xml_diff>
--- a/assets/ppt/codegen/decafLLVM.pptx
+++ b/assets/ppt/codegen/decafLLVM.pptx
@@ -5,10 +5,10 @@
     <p:sldMasterId id="2147483672" r:id="rId1"/>
   </p:sldMasterIdLst>
   <p:notesMasterIdLst>
-    <p:notesMasterId r:id="rId24"/>
+    <p:notesMasterId r:id="rId25"/>
   </p:notesMasterIdLst>
   <p:handoutMasterIdLst>
-    <p:handoutMasterId r:id="rId25"/>
+    <p:handoutMasterId r:id="rId26"/>
   </p:handoutMasterIdLst>
   <p:sldIdLst>
     <p:sldId id="382" r:id="rId2"/>
@@ -24,15 +24,16 @@
     <p:sldId id="273" r:id="rId12"/>
     <p:sldId id="263" r:id="rId13"/>
     <p:sldId id="384" r:id="rId14"/>
-    <p:sldId id="383" r:id="rId15"/>
-    <p:sldId id="265" r:id="rId16"/>
-    <p:sldId id="266" r:id="rId17"/>
-    <p:sldId id="267" r:id="rId18"/>
-    <p:sldId id="268" r:id="rId19"/>
-    <p:sldId id="388" r:id="rId20"/>
-    <p:sldId id="389" r:id="rId21"/>
-    <p:sldId id="385" r:id="rId22"/>
-    <p:sldId id="386" r:id="rId23"/>
+    <p:sldId id="385" r:id="rId15"/>
+    <p:sldId id="386" r:id="rId16"/>
+    <p:sldId id="383" r:id="rId17"/>
+    <p:sldId id="265" r:id="rId18"/>
+    <p:sldId id="266" r:id="rId19"/>
+    <p:sldId id="267" r:id="rId20"/>
+    <p:sldId id="268" r:id="rId21"/>
+    <p:sldId id="388" r:id="rId22"/>
+    <p:sldId id="389" r:id="rId23"/>
+    <p:sldId id="390" r:id="rId24"/>
   </p:sldIdLst>
   <p:sldSz cx="9144000" cy="5143500" type="screen16x9"/>
   <p:notesSz cx="6858000" cy="9144000"/>
@@ -267,7 +268,7 @@
                 <a:latin typeface="Calibri" panose="020F0502020204030204" pitchFamily="34" charset="0"/>
               </a:rPr>
               <a:pPr/>
-              <a:t>11/10/21</a:t>
+              <a:t>11/15/21</a:t>
             </a:fld>
             <a:endParaRPr lang="en-US" dirty="0">
               <a:latin typeface="Calibri" panose="020F0502020204030204" pitchFamily="34" charset="0"/>
@@ -952,7 +953,7 @@
           <a:p>
             <a:fld id="{1B6DC762-1116-2146-A47C-D79A5A5DBAFD}" type="datetime1">
               <a:rPr lang="en-CA" smtClean="0"/>
-              <a:t>2021-11-10</a:t>
+              <a:t>2021-11-15</a:t>
             </a:fld>
             <a:endParaRPr lang="en-US"/>
           </a:p>
@@ -1150,7 +1151,7 @@
           <a:p>
             <a:fld id="{725FEDD1-5A1B-2342-BAF0-F7C5511A73CE}" type="datetime1">
               <a:rPr lang="en-CA" smtClean="0"/>
-              <a:t>2021-11-10</a:t>
+              <a:t>2021-11-15</a:t>
             </a:fld>
             <a:endParaRPr lang="en-US"/>
           </a:p>
@@ -1358,7 +1359,7 @@
           <a:p>
             <a:fld id="{F09E59AE-0AE1-4048-8BD6-D39FC0EBB194}" type="datetime1">
               <a:rPr lang="en-CA" smtClean="0"/>
-              <a:t>2021-11-10</a:t>
+              <a:t>2021-11-15</a:t>
             </a:fld>
             <a:endParaRPr lang="en-US"/>
           </a:p>
@@ -2833,7 +2834,7 @@
           <a:p>
             <a:fld id="{A2849525-9B7D-5945-A782-775278635E42}" type="datetime1">
               <a:rPr lang="en-CA" smtClean="0"/>
-              <a:t>2021-11-10</a:t>
+              <a:t>2021-11-15</a:t>
             </a:fld>
             <a:endParaRPr lang="en-US"/>
           </a:p>
@@ -3108,7 +3109,7 @@
           <a:p>
             <a:fld id="{D05E1499-BDD1-6940-8C79-13A8B8E63D57}" type="datetime1">
               <a:rPr lang="en-CA" smtClean="0"/>
-              <a:t>2021-11-10</a:t>
+              <a:t>2021-11-15</a:t>
             </a:fld>
             <a:endParaRPr lang="en-US"/>
           </a:p>
@@ -3373,7 +3374,7 @@
           <a:p>
             <a:fld id="{17E70EF3-18A7-4644-8DA2-1EB9CA66C736}" type="datetime1">
               <a:rPr lang="en-CA" smtClean="0"/>
-              <a:t>2021-11-10</a:t>
+              <a:t>2021-11-15</a:t>
             </a:fld>
             <a:endParaRPr lang="en-US"/>
           </a:p>
@@ -3785,7 +3786,7 @@
           <a:p>
             <a:fld id="{54538FC1-2481-FB4A-91E5-87F3422DE2D5}" type="datetime1">
               <a:rPr lang="en-CA" smtClean="0"/>
-              <a:t>2021-11-10</a:t>
+              <a:t>2021-11-15</a:t>
             </a:fld>
             <a:endParaRPr lang="en-US"/>
           </a:p>
@@ -3926,7 +3927,7 @@
           <a:p>
             <a:fld id="{93D5C515-1622-C840-89B2-A4A55D34866A}" type="datetime1">
               <a:rPr lang="en-CA" smtClean="0"/>
-              <a:t>2021-11-10</a:t>
+              <a:t>2021-11-15</a:t>
             </a:fld>
             <a:endParaRPr lang="en-US"/>
           </a:p>
@@ -4039,7 +4040,7 @@
           <a:p>
             <a:fld id="{B9077E75-6C88-BB47-AC6F-0DCA859E7113}" type="datetime1">
               <a:rPr lang="en-CA" smtClean="0"/>
-              <a:t>2021-11-10</a:t>
+              <a:t>2021-11-15</a:t>
             </a:fld>
             <a:endParaRPr lang="en-US"/>
           </a:p>
@@ -4350,7 +4351,7 @@
           <a:p>
             <a:fld id="{1AD12F8B-7E05-A047-BAC3-EE71BEBBE5BE}" type="datetime1">
               <a:rPr lang="en-CA" smtClean="0"/>
-              <a:t>2021-11-10</a:t>
+              <a:t>2021-11-15</a:t>
             </a:fld>
             <a:endParaRPr lang="en-US"/>
           </a:p>
@@ -4638,7 +4639,7 @@
           <a:p>
             <a:fld id="{C1D9F72A-E93E-B546-8268-6408A6E1DA62}" type="datetime1">
               <a:rPr lang="en-CA" smtClean="0"/>
-              <a:t>2021-11-10</a:t>
+              <a:t>2021-11-15</a:t>
             </a:fld>
             <a:endParaRPr lang="en-US"/>
           </a:p>
@@ -4881,7 +4882,7 @@
             <a:fld id="{97DF4AC7-DB73-7444-A2A7-FD79FE1A2B2B}" type="datetime1">
               <a:rPr lang="en-CA" smtClean="0"/>
               <a:pPr/>
-              <a:t>2021-11-10</a:t>
+              <a:t>2021-11-15</a:t>
             </a:fld>
             <a:endParaRPr lang="en-US" dirty="0"/>
           </a:p>
@@ -6919,7 +6920,7 @@
           <p:cNvPr id="2" name="Title 1">
             <a:extLst>
               <a:ext uri="{FF2B5EF4-FFF2-40B4-BE49-F238E27FC236}">
-                <a16:creationId xmlns:a16="http://schemas.microsoft.com/office/drawing/2014/main" id="{1B89A0B8-6D70-0C49-AB4A-2C7E09B39362}"/>
+                <a16:creationId xmlns:a16="http://schemas.microsoft.com/office/drawing/2014/main" id="{787C3578-CF40-6944-89C9-DE6B9C4AD190}"/>
               </a:ext>
             </a:extLst>
           </p:cNvPr>
@@ -6932,27 +6933,20 @@
         </p:nvSpPr>
         <p:spPr/>
         <p:txBody>
-          <a:bodyPr>
-            <a:normAutofit/>
-          </a:bodyPr>
+          <a:bodyPr/>
           <a:lstStyle/>
           <a:p>
             <a:r>
-              <a:rPr lang="en-CA" sz="2800" dirty="0">
-                <a:solidFill>
-                  <a:srgbClr val="000000"/>
-                </a:solidFill>
-              </a:rPr>
-              <a:t>Control Flow in LLVM</a:t>
-            </a:r>
-            <a:endParaRPr lang="en-US" dirty="0"/>
+              <a:rPr lang="en-US" dirty="0"/>
+              <a:t>Backward Function Declarations</a:t>
+            </a:r>
           </a:p>
         </p:txBody>
       </p:sp>
     </p:spTree>
     <p:extLst>
       <p:ext uri="{BB962C8B-B14F-4D97-AF65-F5344CB8AC3E}">
-        <p14:creationId xmlns:p14="http://schemas.microsoft.com/office/powerpoint/2010/main" val="1930729082"/>
+        <p14:creationId xmlns:p14="http://schemas.microsoft.com/office/powerpoint/2010/main" val="2130071057"/>
       </p:ext>
     </p:extLst>
   </p:cSld>
@@ -6981,7 +6975,13 @@
       </p:grpSpPr>
       <p:sp>
         <p:nvSpPr>
-          <p:cNvPr id="2" name="Title 1"/>
+          <p:cNvPr id="2" name="Title 1">
+            <a:extLst>
+              <a:ext uri="{FF2B5EF4-FFF2-40B4-BE49-F238E27FC236}">
+                <a16:creationId xmlns:a16="http://schemas.microsoft.com/office/drawing/2014/main" id="{949B1B92-6B89-AA43-B98D-CE8295521998}"/>
+              </a:ext>
+            </a:extLst>
+          </p:cNvPr>
           <p:cNvSpPr>
             <a:spLocks noGrp="1"/>
           </p:cNvSpPr>
@@ -6996,139 +6996,20 @@
           <a:p>
             <a:r>
               <a:rPr lang="en-US" dirty="0"/>
-              <a:t>“</a:t>
-            </a:r>
-            <a:r>
-              <a:rPr lang="en-US" dirty="0" err="1"/>
-              <a:t>Backpatching</a:t>
-            </a:r>
-            <a:r>
-              <a:rPr lang="en-US" dirty="0"/>
-              <a:t>” in LLVM</a:t>
-            </a:r>
-          </a:p>
-        </p:txBody>
-      </p:sp>
-      <p:sp>
-        <p:nvSpPr>
-          <p:cNvPr id="3" name="Content Placeholder 2"/>
-          <p:cNvSpPr>
-            <a:spLocks noGrp="1"/>
-          </p:cNvSpPr>
-          <p:nvPr>
-            <p:ph idx="1"/>
-          </p:nvPr>
-        </p:nvSpPr>
-        <p:spPr/>
-        <p:txBody>
-          <a:bodyPr/>
-          <a:lstStyle/>
-          <a:p>
-            <a:r>
-              <a:rPr lang="en-US" dirty="0"/>
-              <a:t>Inside </a:t>
-            </a:r>
-            <a:r>
-              <a:rPr lang="en-US" dirty="0" err="1"/>
-              <a:t>IfStmt</a:t>
-            </a:r>
-            <a:r>
-              <a:rPr lang="en-US" dirty="0"/>
-              <a:t>-&gt;</a:t>
-            </a:r>
-            <a:r>
-              <a:rPr lang="en-US" dirty="0" err="1"/>
-              <a:t>Codegen</a:t>
-            </a:r>
-            <a:r>
-              <a:rPr lang="en-US" dirty="0"/>
-              <a:t>:</a:t>
-            </a:r>
-          </a:p>
-          <a:p>
-            <a:pPr lvl="1"/>
-            <a:r>
-              <a:rPr lang="en-US" dirty="0"/>
-              <a:t>Set up a new symbol table for code locations</a:t>
-            </a:r>
-          </a:p>
-          <a:p>
-            <a:pPr lvl="1"/>
-            <a:r>
-              <a:rPr lang="en-US" dirty="0"/>
-              <a:t>Create a new </a:t>
-            </a:r>
-            <a:r>
-              <a:rPr lang="en-US" dirty="0" err="1"/>
-              <a:t>BasicBlock</a:t>
-            </a:r>
-            <a:r>
-              <a:rPr lang="en-US" dirty="0"/>
-              <a:t> called </a:t>
-            </a:r>
-            <a:r>
-              <a:rPr lang="en-US" dirty="0" err="1"/>
-              <a:t>iftrue</a:t>
-            </a:r>
-            <a:r>
-              <a:rPr lang="en-US" dirty="0"/>
-              <a:t> (see slide 9)</a:t>
-            </a:r>
-          </a:p>
-          <a:p>
-            <a:pPr lvl="1"/>
-            <a:r>
-              <a:rPr lang="en-US" dirty="0"/>
-              <a:t>Create a new </a:t>
-            </a:r>
-            <a:r>
-              <a:rPr lang="en-US" dirty="0" err="1"/>
-              <a:t>BasicBlock</a:t>
-            </a:r>
-            <a:r>
-              <a:rPr lang="en-US" dirty="0"/>
-              <a:t> called </a:t>
-            </a:r>
-            <a:r>
-              <a:rPr lang="en-US" dirty="0" err="1"/>
-              <a:t>iffalse</a:t>
-            </a:r>
-            <a:endParaRPr lang="en-US" dirty="0"/>
-          </a:p>
-          <a:p>
-            <a:pPr lvl="1"/>
-            <a:r>
-              <a:rPr lang="en-US" dirty="0"/>
-              <a:t>Create a new </a:t>
-            </a:r>
-            <a:r>
-              <a:rPr lang="en-US" dirty="0" err="1"/>
-              <a:t>BasicBlock</a:t>
-            </a:r>
-            <a:r>
-              <a:rPr lang="en-US" dirty="0"/>
-              <a:t> called end</a:t>
-            </a:r>
-          </a:p>
-          <a:p>
-            <a:pPr lvl="1"/>
-            <a:r>
-              <a:rPr lang="en-US" dirty="0"/>
-              <a:t>Subsequent code generation anywhere else can insert code into these code locations</a:t>
-            </a:r>
-          </a:p>
-          <a:p>
-            <a:pPr lvl="1"/>
-            <a:r>
-              <a:rPr lang="en-US" dirty="0"/>
-              <a:t>Can be used for break, continue, short-circuits, etc.</a:t>
-            </a:r>
-          </a:p>
-        </p:txBody>
-      </p:sp>
-      <p:sp>
-        <p:nvSpPr>
-          <p:cNvPr id="5" name="Slide Number Placeholder 4"/>
+              <a:t>Backwards Declarations</a:t>
+            </a:r>
+          </a:p>
+        </p:txBody>
+      </p:sp>
+      <p:sp>
+        <p:nvSpPr>
+          <p:cNvPr id="3" name="Slide Number Placeholder 2">
+            <a:extLst>
+              <a:ext uri="{FF2B5EF4-FFF2-40B4-BE49-F238E27FC236}">
+                <a16:creationId xmlns:a16="http://schemas.microsoft.com/office/drawing/2014/main" id="{D59FD94A-158D-7E43-9F88-741A8A91A1A5}"/>
+              </a:ext>
+            </a:extLst>
+          </p:cNvPr>
           <p:cNvSpPr>
             <a:spLocks noGrp="1"/>
           </p:cNvSpPr>
@@ -7141,25 +7022,360 @@
           <a:bodyPr/>
           <a:lstStyle/>
           <a:p>
-            <a:fld id="{2B2C104B-E445-B247-BB91-C10CB560B869}" type="slidenum">
+            <a:fld id="{7B252BF6-6A9C-D04A-BBE8-37A07D64A1C3}" type="slidenum">
               <a:rPr lang="en-US" smtClean="0"/>
-              <a:pPr/>
               <a:t>15</a:t>
             </a:fld>
             <a:endParaRPr lang="en-US"/>
           </a:p>
         </p:txBody>
       </p:sp>
+      <p:sp>
+        <p:nvSpPr>
+          <p:cNvPr id="4" name="TextBox 3">
+            <a:extLst>
+              <a:ext uri="{FF2B5EF4-FFF2-40B4-BE49-F238E27FC236}">
+                <a16:creationId xmlns:a16="http://schemas.microsoft.com/office/drawing/2014/main" id="{F2C07872-49EF-9A41-AF65-3F6A6AB77C87}"/>
+              </a:ext>
+            </a:extLst>
+          </p:cNvPr>
+          <p:cNvSpPr txBox="1"/>
+          <p:nvPr/>
+        </p:nvSpPr>
+        <p:spPr>
+          <a:xfrm>
+            <a:off x="660496" y="1432590"/>
+            <a:ext cx="4839786" cy="3170099"/>
+          </a:xfrm>
+          <a:prstGeom prst="rect">
+            <a:avLst/>
+          </a:prstGeom>
+          <a:noFill/>
+        </p:spPr>
+        <p:txBody>
+          <a:bodyPr wrap="none" rtlCol="0">
+            <a:spAutoFit/>
+          </a:bodyPr>
+          <a:lstStyle/>
+          <a:p>
+            <a:r>
+              <a:rPr lang="en-CA" sz="2000" dirty="0">
+                <a:latin typeface="Consolas" panose="020B0609020204030204" pitchFamily="49" charset="0"/>
+                <a:cs typeface="Consolas" panose="020B0609020204030204" pitchFamily="49" charset="0"/>
+              </a:rPr>
+              <a:t>extern </a:t>
+            </a:r>
+            <a:r>
+              <a:rPr lang="en-CA" sz="2000" dirty="0" err="1">
+                <a:latin typeface="Consolas" panose="020B0609020204030204" pitchFamily="49" charset="0"/>
+                <a:cs typeface="Consolas" panose="020B0609020204030204" pitchFamily="49" charset="0"/>
+              </a:rPr>
+              <a:t>func</a:t>
+            </a:r>
+            <a:r>
+              <a:rPr lang="en-CA" sz="2000" dirty="0">
+                <a:latin typeface="Consolas" panose="020B0609020204030204" pitchFamily="49" charset="0"/>
+                <a:cs typeface="Consolas" panose="020B0609020204030204" pitchFamily="49" charset="0"/>
+              </a:rPr>
+              <a:t> </a:t>
+            </a:r>
+            <a:r>
+              <a:rPr lang="en-CA" sz="2000" dirty="0" err="1">
+                <a:latin typeface="Consolas" panose="020B0609020204030204" pitchFamily="49" charset="0"/>
+                <a:cs typeface="Consolas" panose="020B0609020204030204" pitchFamily="49" charset="0"/>
+              </a:rPr>
+              <a:t>print_int</a:t>
+            </a:r>
+            <a:r>
+              <a:rPr lang="en-CA" sz="2000" dirty="0">
+                <a:latin typeface="Consolas" panose="020B0609020204030204" pitchFamily="49" charset="0"/>
+                <a:cs typeface="Consolas" panose="020B0609020204030204" pitchFamily="49" charset="0"/>
+              </a:rPr>
+              <a:t>(int) void; </a:t>
+            </a:r>
+          </a:p>
+          <a:p>
+            <a:r>
+              <a:rPr lang="en-CA" sz="2000" dirty="0">
+                <a:latin typeface="Consolas" panose="020B0609020204030204" pitchFamily="49" charset="0"/>
+                <a:cs typeface="Consolas" panose="020B0609020204030204" pitchFamily="49" charset="0"/>
+              </a:rPr>
+              <a:t>package Test { </a:t>
+            </a:r>
+          </a:p>
+          <a:p>
+            <a:r>
+              <a:rPr lang="en-CA" sz="2000" dirty="0">
+                <a:latin typeface="Consolas" panose="020B0609020204030204" pitchFamily="49" charset="0"/>
+                <a:cs typeface="Consolas" panose="020B0609020204030204" pitchFamily="49" charset="0"/>
+              </a:rPr>
+              <a:t>  </a:t>
+            </a:r>
+            <a:r>
+              <a:rPr lang="en-CA" sz="2000" dirty="0" err="1">
+                <a:latin typeface="Consolas" panose="020B0609020204030204" pitchFamily="49" charset="0"/>
+                <a:cs typeface="Consolas" panose="020B0609020204030204" pitchFamily="49" charset="0"/>
+              </a:rPr>
+              <a:t>func</a:t>
+            </a:r>
+            <a:r>
+              <a:rPr lang="en-CA" sz="2000" dirty="0">
+                <a:latin typeface="Consolas" panose="020B0609020204030204" pitchFamily="49" charset="0"/>
+                <a:cs typeface="Consolas" panose="020B0609020204030204" pitchFamily="49" charset="0"/>
+              </a:rPr>
+              <a:t> main() int { </a:t>
+            </a:r>
+          </a:p>
+          <a:p>
+            <a:r>
+              <a:rPr lang="en-CA" sz="2000" dirty="0">
+                <a:latin typeface="Consolas" panose="020B0609020204030204" pitchFamily="49" charset="0"/>
+                <a:cs typeface="Consolas" panose="020B0609020204030204" pitchFamily="49" charset="0"/>
+              </a:rPr>
+              <a:t>    test(10, 13); </a:t>
+            </a:r>
+          </a:p>
+          <a:p>
+            <a:r>
+              <a:rPr lang="en-CA" sz="2000" dirty="0">
+                <a:latin typeface="Consolas" panose="020B0609020204030204" pitchFamily="49" charset="0"/>
+                <a:cs typeface="Consolas" panose="020B0609020204030204" pitchFamily="49" charset="0"/>
+              </a:rPr>
+              <a:t>  } </a:t>
+            </a:r>
+          </a:p>
+          <a:p>
+            <a:r>
+              <a:rPr lang="en-CA" sz="2000" dirty="0">
+                <a:latin typeface="Consolas" panose="020B0609020204030204" pitchFamily="49" charset="0"/>
+                <a:cs typeface="Consolas" panose="020B0609020204030204" pitchFamily="49" charset="0"/>
+              </a:rPr>
+              <a:t>  </a:t>
+            </a:r>
+            <a:r>
+              <a:rPr lang="en-CA" sz="2000" dirty="0" err="1">
+                <a:latin typeface="Consolas" panose="020B0609020204030204" pitchFamily="49" charset="0"/>
+                <a:cs typeface="Consolas" panose="020B0609020204030204" pitchFamily="49" charset="0"/>
+              </a:rPr>
+              <a:t>func</a:t>
+            </a:r>
+            <a:r>
+              <a:rPr lang="en-CA" sz="2000" dirty="0">
+                <a:latin typeface="Consolas" panose="020B0609020204030204" pitchFamily="49" charset="0"/>
+                <a:cs typeface="Consolas" panose="020B0609020204030204" pitchFamily="49" charset="0"/>
+              </a:rPr>
+              <a:t> test(a int, b int) void { </a:t>
+            </a:r>
+          </a:p>
+          <a:p>
+            <a:r>
+              <a:rPr lang="en-CA" sz="2000" dirty="0">
+                <a:latin typeface="Consolas" panose="020B0609020204030204" pitchFamily="49" charset="0"/>
+                <a:cs typeface="Consolas" panose="020B0609020204030204" pitchFamily="49" charset="0"/>
+              </a:rPr>
+              <a:t>    </a:t>
+            </a:r>
+            <a:r>
+              <a:rPr lang="en-CA" sz="2000" dirty="0" err="1">
+                <a:latin typeface="Consolas" panose="020B0609020204030204" pitchFamily="49" charset="0"/>
+                <a:cs typeface="Consolas" panose="020B0609020204030204" pitchFamily="49" charset="0"/>
+              </a:rPr>
+              <a:t>print_int</a:t>
+            </a:r>
+            <a:r>
+              <a:rPr lang="en-CA" sz="2000" dirty="0">
+                <a:latin typeface="Consolas" panose="020B0609020204030204" pitchFamily="49" charset="0"/>
+                <a:cs typeface="Consolas" panose="020B0609020204030204" pitchFamily="49" charset="0"/>
+              </a:rPr>
+              <a:t>(a); </a:t>
+            </a:r>
+          </a:p>
+          <a:p>
+            <a:r>
+              <a:rPr lang="en-CA" sz="2000" dirty="0">
+                <a:latin typeface="Consolas" panose="020B0609020204030204" pitchFamily="49" charset="0"/>
+                <a:cs typeface="Consolas" panose="020B0609020204030204" pitchFamily="49" charset="0"/>
+              </a:rPr>
+              <a:t>    </a:t>
+            </a:r>
+            <a:r>
+              <a:rPr lang="en-CA" sz="2000" dirty="0" err="1">
+                <a:latin typeface="Consolas" panose="020B0609020204030204" pitchFamily="49" charset="0"/>
+                <a:cs typeface="Consolas" panose="020B0609020204030204" pitchFamily="49" charset="0"/>
+              </a:rPr>
+              <a:t>print_int</a:t>
+            </a:r>
+            <a:r>
+              <a:rPr lang="en-CA" sz="2000" dirty="0">
+                <a:latin typeface="Consolas" panose="020B0609020204030204" pitchFamily="49" charset="0"/>
+                <a:cs typeface="Consolas" panose="020B0609020204030204" pitchFamily="49" charset="0"/>
+              </a:rPr>
+              <a:t>(b); </a:t>
+            </a:r>
+          </a:p>
+          <a:p>
+            <a:r>
+              <a:rPr lang="en-CA" sz="2000" dirty="0">
+                <a:latin typeface="Consolas" panose="020B0609020204030204" pitchFamily="49" charset="0"/>
+                <a:cs typeface="Consolas" panose="020B0609020204030204" pitchFamily="49" charset="0"/>
+              </a:rPr>
+              <a:t>  } </a:t>
+            </a:r>
+          </a:p>
+          <a:p>
+            <a:r>
+              <a:rPr lang="en-CA" sz="2000" dirty="0">
+                <a:latin typeface="Consolas" panose="020B0609020204030204" pitchFamily="49" charset="0"/>
+                <a:cs typeface="Consolas" panose="020B0609020204030204" pitchFamily="49" charset="0"/>
+              </a:rPr>
+              <a:t>}</a:t>
+            </a:r>
+            <a:endParaRPr lang="en-US" sz="2000" dirty="0">
+              <a:latin typeface="Consolas" panose="020B0609020204030204" pitchFamily="49" charset="0"/>
+              <a:cs typeface="Consolas" panose="020B0609020204030204" pitchFamily="49" charset="0"/>
+            </a:endParaRPr>
+          </a:p>
+        </p:txBody>
+      </p:sp>
+      <p:sp>
+        <p:nvSpPr>
+          <p:cNvPr id="5" name="Rectangular Callout 4">
+            <a:extLst>
+              <a:ext uri="{FF2B5EF4-FFF2-40B4-BE49-F238E27FC236}">
+                <a16:creationId xmlns:a16="http://schemas.microsoft.com/office/drawing/2014/main" id="{029B9EEC-024E-FE4E-BDD9-DBAE0B4EB184}"/>
+              </a:ext>
+            </a:extLst>
+          </p:cNvPr>
+          <p:cNvSpPr/>
+          <p:nvPr/>
+        </p:nvSpPr>
+        <p:spPr>
+          <a:xfrm>
+            <a:off x="3995936" y="1851670"/>
+            <a:ext cx="3406638" cy="864096"/>
+          </a:xfrm>
+          <a:prstGeom prst="wedgeRectCallout">
+            <a:avLst>
+              <a:gd name="adj1" fmla="val -73844"/>
+              <a:gd name="adj2" fmla="val 32987"/>
+            </a:avLst>
+          </a:prstGeom>
+        </p:spPr>
+        <p:style>
+          <a:lnRef idx="2">
+            <a:schemeClr val="accent1">
+              <a:shade val="50000"/>
+            </a:schemeClr>
+          </a:lnRef>
+          <a:fillRef idx="1">
+            <a:schemeClr val="accent1"/>
+          </a:fillRef>
+          <a:effectRef idx="0">
+            <a:schemeClr val="accent1"/>
+          </a:effectRef>
+          <a:fontRef idx="minor">
+            <a:schemeClr val="lt1"/>
+          </a:fontRef>
+        </p:style>
+        <p:txBody>
+          <a:bodyPr rtlCol="0" anchor="ctr"/>
+          <a:lstStyle/>
+          <a:p>
+            <a:r>
+              <a:rPr lang="en-US" sz="1800" dirty="0"/>
+              <a:t>Iterate through the list of function signatures and insert them into the symbol table. </a:t>
+            </a:r>
+          </a:p>
+        </p:txBody>
+      </p:sp>
     </p:spTree>
     <p:extLst>
       <p:ext uri="{BB962C8B-B14F-4D97-AF65-F5344CB8AC3E}">
-        <p14:creationId xmlns:p14="http://schemas.microsoft.com/office/powerpoint/2010/main" val="4112616064"/>
+        <p14:creationId xmlns:p14="http://schemas.microsoft.com/office/powerpoint/2010/main" val="987568984"/>
       </p:ext>
     </p:extLst>
   </p:cSld>
   <p:clrMapOvr>
     <a:masterClrMapping/>
   </p:clrMapOvr>
+  <p:timing>
+    <p:tnLst>
+      <p:par>
+        <p:cTn id="1" dur="indefinite" restart="never" nodeType="tmRoot">
+          <p:childTnLst>
+            <p:seq concurrent="1" nextAc="seek">
+              <p:cTn id="2" dur="indefinite" nodeType="mainSeq">
+                <p:childTnLst>
+                  <p:par>
+                    <p:cTn id="3" fill="hold">
+                      <p:stCondLst>
+                        <p:cond delay="indefinite"/>
+                      </p:stCondLst>
+                      <p:childTnLst>
+                        <p:par>
+                          <p:cTn id="4" fill="hold">
+                            <p:stCondLst>
+                              <p:cond delay="0"/>
+                            </p:stCondLst>
+                            <p:childTnLst>
+                              <p:par>
+                                <p:cTn id="5" presetID="1" presetClass="entr" presetSubtype="0" fill="hold" grpId="0" nodeType="clickEffect">
+                                  <p:stCondLst>
+                                    <p:cond delay="0"/>
+                                  </p:stCondLst>
+                                  <p:childTnLst>
+                                    <p:set>
+                                      <p:cBhvr>
+                                        <p:cTn id="6" dur="1" fill="hold">
+                                          <p:stCondLst>
+                                            <p:cond delay="0"/>
+                                          </p:stCondLst>
+                                        </p:cTn>
+                                        <p:tgtEl>
+                                          <p:spTgt spid="5"/>
+                                        </p:tgtEl>
+                                        <p:attrNameLst>
+                                          <p:attrName>style.visibility</p:attrName>
+                                        </p:attrNameLst>
+                                      </p:cBhvr>
+                                      <p:to>
+                                        <p:strVal val="visible"/>
+                                      </p:to>
+                                    </p:set>
+                                  </p:childTnLst>
+                                </p:cTn>
+                              </p:par>
+                            </p:childTnLst>
+                          </p:cTn>
+                        </p:par>
+                      </p:childTnLst>
+                    </p:cTn>
+                  </p:par>
+                </p:childTnLst>
+              </p:cTn>
+              <p:prevCondLst>
+                <p:cond evt="onPrev" delay="0">
+                  <p:tgtEl>
+                    <p:sldTgt/>
+                  </p:tgtEl>
+                </p:cond>
+              </p:prevCondLst>
+              <p:nextCondLst>
+                <p:cond evt="onNext" delay="0">
+                  <p:tgtEl>
+                    <p:sldTgt/>
+                  </p:tgtEl>
+                </p:cond>
+              </p:nextCondLst>
+            </p:seq>
+          </p:childTnLst>
+        </p:cTn>
+      </p:par>
+    </p:tnLst>
+    <p:bldLst>
+      <p:bldP spid="5" grpId="0" animBg="1"/>
+    </p:bldLst>
+  </p:timing>
 </p:sld>
 </file>
 
@@ -7182,6 +7398,71 @@
       </p:grpSpPr>
       <p:sp>
         <p:nvSpPr>
+          <p:cNvPr id="2" name="Title 1">
+            <a:extLst>
+              <a:ext uri="{FF2B5EF4-FFF2-40B4-BE49-F238E27FC236}">
+                <a16:creationId xmlns:a16="http://schemas.microsoft.com/office/drawing/2014/main" id="{1B89A0B8-6D70-0C49-AB4A-2C7E09B39362}"/>
+              </a:ext>
+            </a:extLst>
+          </p:cNvPr>
+          <p:cNvSpPr>
+            <a:spLocks noGrp="1"/>
+          </p:cNvSpPr>
+          <p:nvPr>
+            <p:ph type="title"/>
+          </p:nvPr>
+        </p:nvSpPr>
+        <p:spPr/>
+        <p:txBody>
+          <a:bodyPr>
+            <a:normAutofit/>
+          </a:bodyPr>
+          <a:lstStyle/>
+          <a:p>
+            <a:r>
+              <a:rPr lang="en-CA" sz="2800" dirty="0">
+                <a:solidFill>
+                  <a:srgbClr val="000000"/>
+                </a:solidFill>
+              </a:rPr>
+              <a:t>Control Flow in LLVM</a:t>
+            </a:r>
+            <a:endParaRPr lang="en-US" dirty="0"/>
+          </a:p>
+        </p:txBody>
+      </p:sp>
+    </p:spTree>
+    <p:extLst>
+      <p:ext uri="{BB962C8B-B14F-4D97-AF65-F5344CB8AC3E}">
+        <p14:creationId xmlns:p14="http://schemas.microsoft.com/office/powerpoint/2010/main" val="1930729082"/>
+      </p:ext>
+    </p:extLst>
+  </p:cSld>
+  <p:clrMapOvr>
+    <a:masterClrMapping/>
+  </p:clrMapOvr>
+</p:sld>
+</file>
+
+<file path=ppt/slides/slide17.xml><?xml version="1.0" encoding="utf-8"?>
+<p:sld xmlns:a="http://schemas.openxmlformats.org/drawingml/2006/main" xmlns:r="http://schemas.openxmlformats.org/officeDocument/2006/relationships" xmlns:p="http://schemas.openxmlformats.org/presentationml/2006/main">
+  <p:cSld>
+    <p:spTree>
+      <p:nvGrpSpPr>
+        <p:cNvPr id="1" name=""/>
+        <p:cNvGrpSpPr/>
+        <p:nvPr/>
+      </p:nvGrpSpPr>
+      <p:grpSpPr>
+        <a:xfrm>
+          <a:off x="0" y="0"/>
+          <a:ext cx="0" cy="0"/>
+          <a:chOff x="0" y="0"/>
+          <a:chExt cx="0" cy="0"/>
+        </a:xfrm>
+      </p:grpSpPr>
+      <p:sp>
+        <p:nvSpPr>
           <p:cNvPr id="2" name="Title 1"/>
           <p:cNvSpPr>
             <a:spLocks noGrp="1"/>
@@ -7200,12 +7481,129 @@
               <a:t>“</a:t>
             </a:r>
             <a:r>
-              <a:rPr lang="en-US"/>
+              <a:rPr lang="en-US" dirty="0" err="1"/>
               <a:t>Backpatching</a:t>
             </a:r>
             <a:r>
               <a:rPr lang="en-US" dirty="0"/>
               <a:t>” in LLVM</a:t>
+            </a:r>
+          </a:p>
+        </p:txBody>
+      </p:sp>
+      <p:sp>
+        <p:nvSpPr>
+          <p:cNvPr id="3" name="Content Placeholder 2"/>
+          <p:cNvSpPr>
+            <a:spLocks noGrp="1"/>
+          </p:cNvSpPr>
+          <p:nvPr>
+            <p:ph idx="1"/>
+          </p:nvPr>
+        </p:nvSpPr>
+        <p:spPr/>
+        <p:txBody>
+          <a:bodyPr/>
+          <a:lstStyle/>
+          <a:p>
+            <a:r>
+              <a:rPr lang="en-US" dirty="0"/>
+              <a:t>Inside </a:t>
+            </a:r>
+            <a:r>
+              <a:rPr lang="en-US" dirty="0" err="1"/>
+              <a:t>IfStmt</a:t>
+            </a:r>
+            <a:r>
+              <a:rPr lang="en-US" dirty="0"/>
+              <a:t>-&gt;</a:t>
+            </a:r>
+            <a:r>
+              <a:rPr lang="en-US" dirty="0" err="1"/>
+              <a:t>Codegen</a:t>
+            </a:r>
+            <a:r>
+              <a:rPr lang="en-US" dirty="0"/>
+              <a:t>:</a:t>
+            </a:r>
+          </a:p>
+          <a:p>
+            <a:pPr lvl="1"/>
+            <a:r>
+              <a:rPr lang="en-US" dirty="0"/>
+              <a:t>Set up a new symbol table for code locations</a:t>
+            </a:r>
+          </a:p>
+          <a:p>
+            <a:pPr lvl="1"/>
+            <a:r>
+              <a:rPr lang="en-US" dirty="0"/>
+              <a:t>Create a new </a:t>
+            </a:r>
+            <a:r>
+              <a:rPr lang="en-US" dirty="0" err="1"/>
+              <a:t>BasicBlock</a:t>
+            </a:r>
+            <a:r>
+              <a:rPr lang="en-US" dirty="0"/>
+              <a:t> called </a:t>
+            </a:r>
+            <a:r>
+              <a:rPr lang="en-US" dirty="0" err="1"/>
+              <a:t>iftrue</a:t>
+            </a:r>
+            <a:r>
+              <a:rPr lang="en-US" dirty="0"/>
+              <a:t> (see slide 9)</a:t>
+            </a:r>
+          </a:p>
+          <a:p>
+            <a:pPr lvl="1"/>
+            <a:r>
+              <a:rPr lang="en-US" dirty="0"/>
+              <a:t>Create a new </a:t>
+            </a:r>
+            <a:r>
+              <a:rPr lang="en-US" dirty="0" err="1"/>
+              <a:t>BasicBlock</a:t>
+            </a:r>
+            <a:r>
+              <a:rPr lang="en-US" dirty="0"/>
+              <a:t> called </a:t>
+            </a:r>
+            <a:r>
+              <a:rPr lang="en-US" dirty="0" err="1"/>
+              <a:t>iffalse</a:t>
+            </a:r>
+            <a:endParaRPr lang="en-US" dirty="0"/>
+          </a:p>
+          <a:p>
+            <a:pPr lvl="1"/>
+            <a:r>
+              <a:rPr lang="en-US" dirty="0"/>
+              <a:t>Create a new </a:t>
+            </a:r>
+            <a:r>
+              <a:rPr lang="en-US" dirty="0" err="1"/>
+              <a:t>BasicBlock</a:t>
+            </a:r>
+            <a:r>
+              <a:rPr lang="en-US" dirty="0"/>
+              <a:t> called end</a:t>
+            </a:r>
+          </a:p>
+          <a:p>
+            <a:pPr lvl="1"/>
+            <a:r>
+              <a:rPr lang="en-US" dirty="0"/>
+              <a:t>Subsequent code generation anywhere else can insert code into these code locations</a:t>
+            </a:r>
+          </a:p>
+          <a:p>
+            <a:pPr lvl="1"/>
+            <a:r>
+              <a:rPr lang="en-US" dirty="0"/>
+              <a:t>Can be used for break, continue, short-circuits, etc.</a:t>
             </a:r>
           </a:p>
         </p:txBody>
@@ -7228,7 +7626,91 @@
             <a:fld id="{2B2C104B-E445-B247-BB91-C10CB560B869}" type="slidenum">
               <a:rPr lang="en-US" smtClean="0"/>
               <a:pPr/>
-              <a:t>16</a:t>
+              <a:t>17</a:t>
+            </a:fld>
+            <a:endParaRPr lang="en-US"/>
+          </a:p>
+        </p:txBody>
+      </p:sp>
+    </p:spTree>
+    <p:extLst>
+      <p:ext uri="{BB962C8B-B14F-4D97-AF65-F5344CB8AC3E}">
+        <p14:creationId xmlns:p14="http://schemas.microsoft.com/office/powerpoint/2010/main" val="4112616064"/>
+      </p:ext>
+    </p:extLst>
+  </p:cSld>
+  <p:clrMapOvr>
+    <a:masterClrMapping/>
+  </p:clrMapOvr>
+</p:sld>
+</file>
+
+<file path=ppt/slides/slide18.xml><?xml version="1.0" encoding="utf-8"?>
+<p:sld xmlns:a="http://schemas.openxmlformats.org/drawingml/2006/main" xmlns:r="http://schemas.openxmlformats.org/officeDocument/2006/relationships" xmlns:p="http://schemas.openxmlformats.org/presentationml/2006/main">
+  <p:cSld>
+    <p:spTree>
+      <p:nvGrpSpPr>
+        <p:cNvPr id="1" name=""/>
+        <p:cNvGrpSpPr/>
+        <p:nvPr/>
+      </p:nvGrpSpPr>
+      <p:grpSpPr>
+        <a:xfrm>
+          <a:off x="0" y="0"/>
+          <a:ext cx="0" cy="0"/>
+          <a:chOff x="0" y="0"/>
+          <a:chExt cx="0" cy="0"/>
+        </a:xfrm>
+      </p:grpSpPr>
+      <p:sp>
+        <p:nvSpPr>
+          <p:cNvPr id="2" name="Title 1"/>
+          <p:cNvSpPr>
+            <a:spLocks noGrp="1"/>
+          </p:cNvSpPr>
+          <p:nvPr>
+            <p:ph type="title"/>
+          </p:nvPr>
+        </p:nvSpPr>
+        <p:spPr/>
+        <p:txBody>
+          <a:bodyPr/>
+          <a:lstStyle/>
+          <a:p>
+            <a:r>
+              <a:rPr lang="en-US" dirty="0"/>
+              <a:t>“</a:t>
+            </a:r>
+            <a:r>
+              <a:rPr lang="en-US"/>
+              <a:t>Backpatching</a:t>
+            </a:r>
+            <a:r>
+              <a:rPr lang="en-US" dirty="0"/>
+              <a:t>” in LLVM</a:t>
+            </a:r>
+          </a:p>
+        </p:txBody>
+      </p:sp>
+      <p:sp>
+        <p:nvSpPr>
+          <p:cNvPr id="5" name="Slide Number Placeholder 4"/>
+          <p:cNvSpPr>
+            <a:spLocks noGrp="1"/>
+          </p:cNvSpPr>
+          <p:nvPr>
+            <p:ph type="sldNum" sz="quarter" idx="12"/>
+          </p:nvPr>
+        </p:nvSpPr>
+        <p:spPr/>
+        <p:txBody>
+          <a:bodyPr/>
+          <a:lstStyle/>
+          <a:p>
+            <a:fld id="{2B2C104B-E445-B247-BB91-C10CB560B869}" type="slidenum">
+              <a:rPr lang="en-US" smtClean="0"/>
+              <a:pPr/>
+              <a:t>18</a:t>
             </a:fld>
             <a:endParaRPr lang="en-US"/>
           </a:p>
@@ -7737,7 +8219,7 @@
 </p:sld>
 </file>
 
-<file path=ppt/slides/slide17.xml><?xml version="1.0" encoding="utf-8"?>
+<file path=ppt/slides/slide19.xml><?xml version="1.0" encoding="utf-8"?>
 <p:sld xmlns:a="http://schemas.openxmlformats.org/drawingml/2006/main" xmlns:r="http://schemas.openxmlformats.org/officeDocument/2006/relationships" xmlns:p="http://schemas.openxmlformats.org/presentationml/2006/main">
   <p:cSld>
     <p:spTree>
@@ -7843,7 +8325,7 @@
             <a:fld id="{2B2C104B-E445-B247-BB91-C10CB560B869}" type="slidenum">
               <a:rPr lang="en-US" smtClean="0"/>
               <a:pPr/>
-              <a:t>17</a:t>
+              <a:t>19</a:t>
             </a:fld>
             <a:endParaRPr lang="en-US"/>
           </a:p>
@@ -8416,786 +8898,6 @@
 </p:sld>
 </file>
 
-<file path=ppt/slides/slide18.xml><?xml version="1.0" encoding="utf-8"?>
-<p:sld xmlns:a="http://schemas.openxmlformats.org/drawingml/2006/main" xmlns:r="http://schemas.openxmlformats.org/officeDocument/2006/relationships" xmlns:p="http://schemas.openxmlformats.org/presentationml/2006/main">
-  <p:cSld>
-    <p:spTree>
-      <p:nvGrpSpPr>
-        <p:cNvPr id="1" name=""/>
-        <p:cNvGrpSpPr/>
-        <p:nvPr/>
-      </p:nvGrpSpPr>
-      <p:grpSpPr>
-        <a:xfrm>
-          <a:off x="0" y="0"/>
-          <a:ext cx="0" cy="0"/>
-          <a:chOff x="0" y="0"/>
-          <a:chExt cx="0" cy="0"/>
-        </a:xfrm>
-      </p:grpSpPr>
-      <p:sp>
-        <p:nvSpPr>
-          <p:cNvPr id="2" name="Title 1"/>
-          <p:cNvSpPr>
-            <a:spLocks noGrp="1"/>
-          </p:cNvSpPr>
-          <p:nvPr>
-            <p:ph type="title"/>
-          </p:nvPr>
-        </p:nvSpPr>
-        <p:spPr/>
-        <p:txBody>
-          <a:bodyPr/>
-          <a:lstStyle/>
-          <a:p>
-            <a:r>
-              <a:rPr lang="en-US" sz="3000" dirty="0"/>
-              <a:t>Short-circuit of </a:t>
-            </a:r>
-            <a:r>
-              <a:rPr lang="en-US" sz="3000" dirty="0" err="1"/>
-              <a:t>boolean</a:t>
-            </a:r>
-            <a:r>
-              <a:rPr lang="en-US" sz="3000" dirty="0"/>
-              <a:t> expressions</a:t>
-            </a:r>
-          </a:p>
-        </p:txBody>
-      </p:sp>
-      <p:sp>
-        <p:nvSpPr>
-          <p:cNvPr id="5" name="Slide Number Placeholder 4"/>
-          <p:cNvSpPr>
-            <a:spLocks noGrp="1"/>
-          </p:cNvSpPr>
-          <p:nvPr>
-            <p:ph type="sldNum" sz="quarter" idx="12"/>
-          </p:nvPr>
-        </p:nvSpPr>
-        <p:spPr/>
-        <p:txBody>
-          <a:bodyPr/>
-          <a:lstStyle/>
-          <a:p>
-            <a:fld id="{2B2C104B-E445-B247-BB91-C10CB560B869}" type="slidenum">
-              <a:rPr lang="en-US" smtClean="0"/>
-              <a:pPr/>
-              <a:t>18</a:t>
-            </a:fld>
-            <a:endParaRPr lang="en-US"/>
-          </a:p>
-        </p:txBody>
-      </p:sp>
-      <p:sp>
-        <p:nvSpPr>
-          <p:cNvPr id="3" name="Content Placeholder 2"/>
-          <p:cNvSpPr>
-            <a:spLocks noGrp="1"/>
-          </p:cNvSpPr>
-          <p:nvPr>
-            <p:ph idx="4294967295"/>
-          </p:nvPr>
-        </p:nvSpPr>
-        <p:spPr>
-          <a:xfrm>
-            <a:off x="628650" y="1216025"/>
-            <a:ext cx="7543750" cy="707653"/>
-          </a:xfrm>
-        </p:spPr>
-        <p:txBody>
-          <a:bodyPr/>
-          <a:lstStyle/>
-          <a:p>
-            <a:r>
-              <a:rPr lang="en-US" dirty="0"/>
-              <a:t>For short circuit of </a:t>
-            </a:r>
-            <a:r>
-              <a:rPr lang="en-US" dirty="0" err="1"/>
-              <a:t>boolean</a:t>
-            </a:r>
-            <a:r>
-              <a:rPr lang="en-US" dirty="0"/>
-              <a:t> expressions you have to write the PHI function yourself</a:t>
-            </a:r>
-          </a:p>
-        </p:txBody>
-      </p:sp>
-      <p:sp>
-        <p:nvSpPr>
-          <p:cNvPr id="6" name="TextBox 5"/>
-          <p:cNvSpPr txBox="1"/>
-          <p:nvPr/>
-        </p:nvSpPr>
-        <p:spPr>
-          <a:xfrm>
-            <a:off x="359532" y="2140937"/>
-            <a:ext cx="8424936" cy="2354491"/>
-          </a:xfrm>
-          <a:prstGeom prst="rect">
-            <a:avLst/>
-          </a:prstGeom>
-          <a:solidFill>
-            <a:schemeClr val="accent5">
-              <a:lumMod val="20000"/>
-              <a:lumOff val="80000"/>
-            </a:schemeClr>
-          </a:solidFill>
-        </p:spPr>
-        <p:style>
-          <a:lnRef idx="1">
-            <a:schemeClr val="accent6"/>
-          </a:lnRef>
-          <a:fillRef idx="2">
-            <a:schemeClr val="accent6"/>
-          </a:fillRef>
-          <a:effectRef idx="1">
-            <a:schemeClr val="accent6"/>
-          </a:effectRef>
-          <a:fontRef idx="minor">
-            <a:schemeClr val="dk1"/>
-          </a:fontRef>
-        </p:style>
-        <p:txBody>
-          <a:bodyPr wrap="square" rtlCol="0">
-            <a:spAutoFit/>
-          </a:bodyPr>
-          <a:lstStyle/>
-          <a:p>
-            <a:r>
-              <a:rPr lang="en-US" sz="2100" dirty="0" err="1">
-                <a:latin typeface="Consolas" panose="020B0609020204030204" pitchFamily="49" charset="0"/>
-                <a:cs typeface="Consolas" panose="020B0609020204030204" pitchFamily="49" charset="0"/>
-              </a:rPr>
-              <a:t>llvm</a:t>
-            </a:r>
-            <a:r>
-              <a:rPr lang="en-US" sz="2100" dirty="0">
-                <a:latin typeface="Consolas" panose="020B0609020204030204" pitchFamily="49" charset="0"/>
-                <a:cs typeface="Consolas" panose="020B0609020204030204" pitchFamily="49" charset="0"/>
-              </a:rPr>
-              <a:t>::</a:t>
-            </a:r>
-            <a:r>
-              <a:rPr lang="en-US" sz="2100" dirty="0" err="1">
-                <a:latin typeface="Consolas" panose="020B0609020204030204" pitchFamily="49" charset="0"/>
-                <a:cs typeface="Consolas" panose="020B0609020204030204" pitchFamily="49" charset="0"/>
-              </a:rPr>
-              <a:t>PHINode</a:t>
-            </a:r>
-            <a:r>
-              <a:rPr lang="en-US" sz="2100" dirty="0">
-                <a:latin typeface="Consolas" panose="020B0609020204030204" pitchFamily="49" charset="0"/>
-                <a:cs typeface="Consolas" panose="020B0609020204030204" pitchFamily="49" charset="0"/>
-              </a:rPr>
-              <a:t> *</a:t>
-            </a:r>
-            <a:r>
-              <a:rPr lang="en-US" sz="2100" dirty="0" err="1">
-                <a:latin typeface="Consolas" panose="020B0609020204030204" pitchFamily="49" charset="0"/>
-                <a:cs typeface="Consolas" panose="020B0609020204030204" pitchFamily="49" charset="0"/>
-              </a:rPr>
-              <a:t>val</a:t>
-            </a:r>
-            <a:r>
-              <a:rPr lang="en-US" sz="2100" dirty="0">
-                <a:latin typeface="Consolas" panose="020B0609020204030204" pitchFamily="49" charset="0"/>
-                <a:cs typeface="Consolas" panose="020B0609020204030204" pitchFamily="49" charset="0"/>
-              </a:rPr>
-              <a:t> = </a:t>
-            </a:r>
-          </a:p>
-          <a:p>
-            <a:r>
-              <a:rPr lang="en-US" sz="2100" dirty="0">
-                <a:latin typeface="Consolas" panose="020B0609020204030204" pitchFamily="49" charset="0"/>
-                <a:cs typeface="Consolas" panose="020B0609020204030204" pitchFamily="49" charset="0"/>
-              </a:rPr>
-              <a:t>	</a:t>
-            </a:r>
-            <a:r>
-              <a:rPr lang="en-US" sz="2100" dirty="0" err="1">
-                <a:latin typeface="Consolas" panose="020B0609020204030204" pitchFamily="49" charset="0"/>
-                <a:cs typeface="Consolas" panose="020B0609020204030204" pitchFamily="49" charset="0"/>
-              </a:rPr>
-              <a:t>Builder.CreatePHI</a:t>
-            </a:r>
-            <a:r>
-              <a:rPr lang="en-US" sz="2100" dirty="0">
-                <a:latin typeface="Consolas" panose="020B0609020204030204" pitchFamily="49" charset="0"/>
-                <a:cs typeface="Consolas" panose="020B0609020204030204" pitchFamily="49" charset="0"/>
-              </a:rPr>
-              <a:t>(type, 2, "</a:t>
-            </a:r>
-            <a:r>
-              <a:rPr lang="en-US" sz="2100" dirty="0" err="1">
-                <a:latin typeface="Consolas" panose="020B0609020204030204" pitchFamily="49" charset="0"/>
-                <a:cs typeface="Consolas" panose="020B0609020204030204" pitchFamily="49" charset="0"/>
-              </a:rPr>
-              <a:t>phival</a:t>
-            </a:r>
-            <a:r>
-              <a:rPr lang="en-US" sz="2100" dirty="0">
-                <a:latin typeface="Consolas" panose="020B0609020204030204" pitchFamily="49" charset="0"/>
-                <a:cs typeface="Consolas" panose="020B0609020204030204" pitchFamily="49" charset="0"/>
-              </a:rPr>
-              <a:t>");</a:t>
-            </a:r>
-          </a:p>
-          <a:p>
-            <a:r>
-              <a:rPr lang="en-US" sz="2100" dirty="0">
-                <a:solidFill>
-                  <a:srgbClr val="C00000"/>
-                </a:solidFill>
-                <a:latin typeface="Consolas" panose="020B0609020204030204" pitchFamily="49" charset="0"/>
-                <a:cs typeface="Consolas" panose="020B0609020204030204" pitchFamily="49" charset="0"/>
-              </a:rPr>
-              <a:t>// </a:t>
-            </a:r>
-            <a:r>
-              <a:rPr lang="en-US" sz="2100" b="1" dirty="0">
-                <a:solidFill>
-                  <a:srgbClr val="C00000"/>
-                </a:solidFill>
-                <a:latin typeface="Consolas" panose="020B0609020204030204" pitchFamily="49" charset="0"/>
-                <a:cs typeface="Consolas" panose="020B0609020204030204" pitchFamily="49" charset="0"/>
-              </a:rPr>
-              <a:t>type is an LLVM::Type</a:t>
-            </a:r>
-            <a:endParaRPr lang="en-US" sz="2100" dirty="0">
-              <a:solidFill>
-                <a:srgbClr val="C00000"/>
-              </a:solidFill>
-              <a:latin typeface="Consolas" panose="020B0609020204030204" pitchFamily="49" charset="0"/>
-              <a:cs typeface="Consolas" panose="020B0609020204030204" pitchFamily="49" charset="0"/>
-            </a:endParaRPr>
-          </a:p>
-          <a:p>
-            <a:r>
-              <a:rPr lang="en-US" sz="2100" dirty="0" err="1">
-                <a:latin typeface="Consolas" panose="020B0609020204030204" pitchFamily="49" charset="0"/>
-                <a:cs typeface="Consolas" panose="020B0609020204030204" pitchFamily="49" charset="0"/>
-              </a:rPr>
-              <a:t>val</a:t>
-            </a:r>
-            <a:r>
-              <a:rPr lang="en-US" sz="2100" dirty="0">
-                <a:latin typeface="Consolas" panose="020B0609020204030204" pitchFamily="49" charset="0"/>
-                <a:cs typeface="Consolas" panose="020B0609020204030204" pitchFamily="49" charset="0"/>
-              </a:rPr>
-              <a:t>-&gt;</a:t>
-            </a:r>
-            <a:r>
-              <a:rPr lang="en-US" sz="2100" dirty="0" err="1">
-                <a:latin typeface="Consolas" panose="020B0609020204030204" pitchFamily="49" charset="0"/>
-                <a:cs typeface="Consolas" panose="020B0609020204030204" pitchFamily="49" charset="0"/>
-              </a:rPr>
-              <a:t>addIncoming</a:t>
-            </a:r>
-            <a:r>
-              <a:rPr lang="en-US" sz="2100" dirty="0">
-                <a:latin typeface="Consolas" panose="020B0609020204030204" pitchFamily="49" charset="0"/>
-                <a:cs typeface="Consolas" panose="020B0609020204030204" pitchFamily="49" charset="0"/>
-              </a:rPr>
-              <a:t>(L, </a:t>
-            </a:r>
-            <a:r>
-              <a:rPr lang="en-US" sz="2100" dirty="0" err="1">
-                <a:latin typeface="Consolas" panose="020B0609020204030204" pitchFamily="49" charset="0"/>
-                <a:cs typeface="Consolas" panose="020B0609020204030204" pitchFamily="49" charset="0"/>
-              </a:rPr>
-              <a:t>CurBB</a:t>
-            </a:r>
-            <a:r>
-              <a:rPr lang="en-US" sz="2100" dirty="0">
-                <a:latin typeface="Consolas" panose="020B0609020204030204" pitchFamily="49" charset="0"/>
-                <a:cs typeface="Consolas" panose="020B0609020204030204" pitchFamily="49" charset="0"/>
-              </a:rPr>
-              <a:t>);</a:t>
-            </a:r>
-          </a:p>
-          <a:p>
-            <a:r>
-              <a:rPr lang="en-US" sz="2100" dirty="0" err="1">
-                <a:latin typeface="Consolas" panose="020B0609020204030204" pitchFamily="49" charset="0"/>
-                <a:cs typeface="Consolas" panose="020B0609020204030204" pitchFamily="49" charset="0"/>
-              </a:rPr>
-              <a:t>val</a:t>
-            </a:r>
-            <a:r>
-              <a:rPr lang="en-US" sz="2100" dirty="0">
-                <a:latin typeface="Consolas" panose="020B0609020204030204" pitchFamily="49" charset="0"/>
-                <a:cs typeface="Consolas" panose="020B0609020204030204" pitchFamily="49" charset="0"/>
-              </a:rPr>
-              <a:t>-&gt;</a:t>
-            </a:r>
-            <a:r>
-              <a:rPr lang="en-US" sz="2100" dirty="0" err="1">
-                <a:latin typeface="Consolas" panose="020B0609020204030204" pitchFamily="49" charset="0"/>
-                <a:cs typeface="Consolas" panose="020B0609020204030204" pitchFamily="49" charset="0"/>
-              </a:rPr>
-              <a:t>addIncoming</a:t>
-            </a:r>
-            <a:r>
-              <a:rPr lang="en-US" sz="2100" dirty="0">
-                <a:latin typeface="Consolas" panose="020B0609020204030204" pitchFamily="49" charset="0"/>
-                <a:cs typeface="Consolas" panose="020B0609020204030204" pitchFamily="49" charset="0"/>
-              </a:rPr>
-              <a:t>(</a:t>
-            </a:r>
-            <a:r>
-              <a:rPr lang="en-US" sz="2100" dirty="0" err="1">
-                <a:latin typeface="Consolas" panose="020B0609020204030204" pitchFamily="49" charset="0"/>
-                <a:cs typeface="Consolas" panose="020B0609020204030204" pitchFamily="49" charset="0"/>
-              </a:rPr>
-              <a:t>opval</a:t>
-            </a:r>
-            <a:r>
-              <a:rPr lang="en-US" sz="2100" dirty="0">
-                <a:latin typeface="Consolas" panose="020B0609020204030204" pitchFamily="49" charset="0"/>
-                <a:cs typeface="Consolas" panose="020B0609020204030204" pitchFamily="49" charset="0"/>
-              </a:rPr>
-              <a:t>, </a:t>
-            </a:r>
-            <a:r>
-              <a:rPr lang="en-US" sz="2100" dirty="0" err="1">
-                <a:latin typeface="Consolas" panose="020B0609020204030204" pitchFamily="49" charset="0"/>
-                <a:cs typeface="Consolas" panose="020B0609020204030204" pitchFamily="49" charset="0"/>
-              </a:rPr>
-              <a:t>OpValBB</a:t>
-            </a:r>
-            <a:r>
-              <a:rPr lang="en-US" sz="2100" dirty="0">
-                <a:latin typeface="Consolas" panose="020B0609020204030204" pitchFamily="49" charset="0"/>
-                <a:cs typeface="Consolas" panose="020B0609020204030204" pitchFamily="49" charset="0"/>
-              </a:rPr>
-              <a:t>);</a:t>
-            </a:r>
-          </a:p>
-          <a:p>
-            <a:r>
-              <a:rPr lang="en-US" sz="2100" dirty="0">
-                <a:solidFill>
-                  <a:srgbClr val="C00000"/>
-                </a:solidFill>
-                <a:latin typeface="Consolas" panose="020B0609020204030204" pitchFamily="49" charset="0"/>
-                <a:cs typeface="Consolas" panose="020B0609020204030204" pitchFamily="49" charset="0"/>
-              </a:rPr>
-              <a:t>// </a:t>
-            </a:r>
-            <a:r>
-              <a:rPr lang="en-US" sz="2100" b="1" dirty="0" err="1">
-                <a:solidFill>
-                  <a:srgbClr val="C00000"/>
-                </a:solidFill>
-                <a:latin typeface="Consolas" panose="020B0609020204030204" pitchFamily="49" charset="0"/>
-                <a:cs typeface="Consolas" panose="020B0609020204030204" pitchFamily="49" charset="0"/>
-              </a:rPr>
-              <a:t>CurBB</a:t>
-            </a:r>
-            <a:r>
-              <a:rPr lang="en-US" sz="2100" b="1" dirty="0">
-                <a:solidFill>
-                  <a:srgbClr val="C00000"/>
-                </a:solidFill>
-                <a:latin typeface="Consolas" panose="020B0609020204030204" pitchFamily="49" charset="0"/>
-                <a:cs typeface="Consolas" panose="020B0609020204030204" pitchFamily="49" charset="0"/>
-              </a:rPr>
-              <a:t> and </a:t>
-            </a:r>
-            <a:r>
-              <a:rPr lang="en-US" sz="2100" b="1" dirty="0" err="1">
-                <a:solidFill>
-                  <a:srgbClr val="C00000"/>
-                </a:solidFill>
-                <a:latin typeface="Consolas" panose="020B0609020204030204" pitchFamily="49" charset="0"/>
-                <a:cs typeface="Consolas" panose="020B0609020204030204" pitchFamily="49" charset="0"/>
-              </a:rPr>
-              <a:t>OpValBB</a:t>
-            </a:r>
-            <a:r>
-              <a:rPr lang="en-US" sz="2100" b="1" dirty="0">
-                <a:solidFill>
-                  <a:srgbClr val="C00000"/>
-                </a:solidFill>
-                <a:latin typeface="Consolas" panose="020B0609020204030204" pitchFamily="49" charset="0"/>
-                <a:cs typeface="Consolas" panose="020B0609020204030204" pitchFamily="49" charset="0"/>
-              </a:rPr>
-              <a:t> are the two basic blocks that are incoming blocks for the PHI function</a:t>
-            </a:r>
-            <a:endParaRPr lang="en-US" sz="2100" dirty="0">
-              <a:solidFill>
-                <a:srgbClr val="C00000"/>
-              </a:solidFill>
-              <a:latin typeface="Consolas" panose="020B0609020204030204" pitchFamily="49" charset="0"/>
-              <a:cs typeface="Consolas" panose="020B0609020204030204" pitchFamily="49" charset="0"/>
-            </a:endParaRPr>
-          </a:p>
-        </p:txBody>
-      </p:sp>
-    </p:spTree>
-    <p:extLst>
-      <p:ext uri="{BB962C8B-B14F-4D97-AF65-F5344CB8AC3E}">
-        <p14:creationId xmlns:p14="http://schemas.microsoft.com/office/powerpoint/2010/main" val="2648466430"/>
-      </p:ext>
-    </p:extLst>
-  </p:cSld>
-  <p:clrMapOvr>
-    <a:masterClrMapping/>
-  </p:clrMapOvr>
-  <p:timing>
-    <p:tnLst>
-      <p:par>
-        <p:cTn id="1" dur="indefinite" restart="never" nodeType="tmRoot">
-          <p:childTnLst>
-            <p:seq concurrent="1" nextAc="seek">
-              <p:cTn id="2" dur="indefinite" nodeType="mainSeq">
-                <p:childTnLst>
-                  <p:par>
-                    <p:cTn id="3" fill="hold">
-                      <p:stCondLst>
-                        <p:cond delay="indefinite"/>
-                      </p:stCondLst>
-                      <p:childTnLst>
-                        <p:par>
-                          <p:cTn id="4" fill="hold">
-                            <p:stCondLst>
-                              <p:cond delay="0"/>
-                            </p:stCondLst>
-                            <p:childTnLst>
-                              <p:par>
-                                <p:cTn id="5" presetID="1" presetClass="entr" presetSubtype="0" fill="hold" grpId="0" nodeType="clickEffect">
-                                  <p:stCondLst>
-                                    <p:cond delay="0"/>
-                                  </p:stCondLst>
-                                  <p:childTnLst>
-                                    <p:set>
-                                      <p:cBhvr>
-                                        <p:cTn id="6" dur="1" fill="hold">
-                                          <p:stCondLst>
-                                            <p:cond delay="0"/>
-                                          </p:stCondLst>
-                                        </p:cTn>
-                                        <p:tgtEl>
-                                          <p:spTgt spid="3">
-                                            <p:txEl>
-                                              <p:pRg st="0" end="0"/>
-                                            </p:txEl>
-                                          </p:spTgt>
-                                        </p:tgtEl>
-                                        <p:attrNameLst>
-                                          <p:attrName>style.visibility</p:attrName>
-                                        </p:attrNameLst>
-                                      </p:cBhvr>
-                                      <p:to>
-                                        <p:strVal val="visible"/>
-                                      </p:to>
-                                    </p:set>
-                                  </p:childTnLst>
-                                </p:cTn>
-                              </p:par>
-                            </p:childTnLst>
-                          </p:cTn>
-                        </p:par>
-                      </p:childTnLst>
-                    </p:cTn>
-                  </p:par>
-                  <p:par>
-                    <p:cTn id="7" fill="hold">
-                      <p:stCondLst>
-                        <p:cond delay="indefinite"/>
-                      </p:stCondLst>
-                      <p:childTnLst>
-                        <p:par>
-                          <p:cTn id="8" fill="hold">
-                            <p:stCondLst>
-                              <p:cond delay="0"/>
-                            </p:stCondLst>
-                            <p:childTnLst>
-                              <p:par>
-                                <p:cTn id="9" presetID="1" presetClass="entr" presetSubtype="0" fill="hold" grpId="0" nodeType="clickEffect">
-                                  <p:stCondLst>
-                                    <p:cond delay="0"/>
-                                  </p:stCondLst>
-                                  <p:childTnLst>
-                                    <p:set>
-                                      <p:cBhvr>
-                                        <p:cTn id="10" dur="1" fill="hold">
-                                          <p:stCondLst>
-                                            <p:cond delay="0"/>
-                                          </p:stCondLst>
-                                        </p:cTn>
-                                        <p:tgtEl>
-                                          <p:spTgt spid="6"/>
-                                        </p:tgtEl>
-                                        <p:attrNameLst>
-                                          <p:attrName>style.visibility</p:attrName>
-                                        </p:attrNameLst>
-                                      </p:cBhvr>
-                                      <p:to>
-                                        <p:strVal val="visible"/>
-                                      </p:to>
-                                    </p:set>
-                                  </p:childTnLst>
-                                </p:cTn>
-                              </p:par>
-                            </p:childTnLst>
-                          </p:cTn>
-                        </p:par>
-                      </p:childTnLst>
-                    </p:cTn>
-                  </p:par>
-                </p:childTnLst>
-              </p:cTn>
-              <p:prevCondLst>
-                <p:cond evt="onPrev" delay="0">
-                  <p:tgtEl>
-                    <p:sldTgt/>
-                  </p:tgtEl>
-                </p:cond>
-              </p:prevCondLst>
-              <p:nextCondLst>
-                <p:cond evt="onNext" delay="0">
-                  <p:tgtEl>
-                    <p:sldTgt/>
-                  </p:tgtEl>
-                </p:cond>
-              </p:nextCondLst>
-            </p:seq>
-          </p:childTnLst>
-        </p:cTn>
-      </p:par>
-    </p:tnLst>
-    <p:bldLst>
-      <p:bldP spid="3" grpId="0" build="p"/>
-      <p:bldP spid="6" grpId="0" animBg="1"/>
-    </p:bldLst>
-  </p:timing>
-</p:sld>
-</file>
-
-<file path=ppt/slides/slide19.xml><?xml version="1.0" encoding="utf-8"?>
-<p:sld xmlns:a="http://schemas.openxmlformats.org/drawingml/2006/main" xmlns:r="http://schemas.openxmlformats.org/officeDocument/2006/relationships" xmlns:p="http://schemas.openxmlformats.org/presentationml/2006/main">
-  <p:cSld>
-    <p:spTree>
-      <p:nvGrpSpPr>
-        <p:cNvPr id="1" name=""/>
-        <p:cNvGrpSpPr/>
-        <p:nvPr/>
-      </p:nvGrpSpPr>
-      <p:grpSpPr>
-        <a:xfrm>
-          <a:off x="0" y="0"/>
-          <a:ext cx="0" cy="0"/>
-          <a:chOff x="0" y="0"/>
-          <a:chExt cx="0" cy="0"/>
-        </a:xfrm>
-      </p:grpSpPr>
-      <p:sp>
-        <p:nvSpPr>
-          <p:cNvPr id="2" name="Title 1">
-            <a:extLst>
-              <a:ext uri="{FF2B5EF4-FFF2-40B4-BE49-F238E27FC236}">
-                <a16:creationId xmlns:a16="http://schemas.microsoft.com/office/drawing/2014/main" id="{5B7260D1-69D6-534C-BD2B-54FFE929CFDC}"/>
-              </a:ext>
-            </a:extLst>
-          </p:cNvPr>
-          <p:cNvSpPr>
-            <a:spLocks noGrp="1"/>
-          </p:cNvSpPr>
-          <p:nvPr>
-            <p:ph type="title"/>
-          </p:nvPr>
-        </p:nvSpPr>
-        <p:spPr/>
-        <p:txBody>
-          <a:bodyPr/>
-          <a:lstStyle/>
-          <a:p>
-            <a:r>
-              <a:rPr lang="en-US" sz="3600" dirty="0"/>
-              <a:t>Short-circuit of </a:t>
-            </a:r>
-            <a:r>
-              <a:rPr lang="en-US" sz="3600" dirty="0" err="1"/>
-              <a:t>boolean</a:t>
-            </a:r>
-            <a:r>
-              <a:rPr lang="en-US" sz="3600" dirty="0"/>
-              <a:t> expressions</a:t>
-            </a:r>
-            <a:endParaRPr lang="en-US" dirty="0"/>
-          </a:p>
-        </p:txBody>
-      </p:sp>
-      <p:sp>
-        <p:nvSpPr>
-          <p:cNvPr id="3" name="Slide Number Placeholder 2">
-            <a:extLst>
-              <a:ext uri="{FF2B5EF4-FFF2-40B4-BE49-F238E27FC236}">
-                <a16:creationId xmlns:a16="http://schemas.microsoft.com/office/drawing/2014/main" id="{A1A4D194-1A47-054C-944C-ABE8043896CA}"/>
-              </a:ext>
-            </a:extLst>
-          </p:cNvPr>
-          <p:cNvSpPr>
-            <a:spLocks noGrp="1"/>
-          </p:cNvSpPr>
-          <p:nvPr>
-            <p:ph type="sldNum" sz="quarter" idx="12"/>
-          </p:nvPr>
-        </p:nvSpPr>
-        <p:spPr/>
-        <p:txBody>
-          <a:bodyPr/>
-          <a:lstStyle/>
-          <a:p>
-            <a:fld id="{7B252BF6-6A9C-D04A-BBE8-37A07D64A1C3}" type="slidenum">
-              <a:rPr lang="en-US" smtClean="0"/>
-              <a:t>19</a:t>
-            </a:fld>
-            <a:endParaRPr lang="en-US"/>
-          </a:p>
-        </p:txBody>
-      </p:sp>
-      <p:sp>
-        <p:nvSpPr>
-          <p:cNvPr id="4" name="TextBox 3">
-            <a:extLst>
-              <a:ext uri="{FF2B5EF4-FFF2-40B4-BE49-F238E27FC236}">
-                <a16:creationId xmlns:a16="http://schemas.microsoft.com/office/drawing/2014/main" id="{048109E3-493D-7F45-BFC2-F87F7260087B}"/>
-              </a:ext>
-            </a:extLst>
-          </p:cNvPr>
-          <p:cNvSpPr txBox="1"/>
-          <p:nvPr/>
-        </p:nvSpPr>
-        <p:spPr>
-          <a:xfrm>
-            <a:off x="827584" y="1419622"/>
-            <a:ext cx="4993675" cy="2246769"/>
-          </a:xfrm>
-          <a:prstGeom prst="rect">
-            <a:avLst/>
-          </a:prstGeom>
-          <a:noFill/>
-        </p:spPr>
-        <p:txBody>
-          <a:bodyPr wrap="none" rtlCol="0">
-            <a:spAutoFit/>
-          </a:bodyPr>
-          <a:lstStyle/>
-          <a:p>
-            <a:r>
-              <a:rPr lang="en-CA" sz="2000" dirty="0">
-                <a:latin typeface="Consolas" panose="020B0609020204030204" pitchFamily="49" charset="0"/>
-                <a:cs typeface="Consolas" panose="020B0609020204030204" pitchFamily="49" charset="0"/>
-              </a:rPr>
-              <a:t>package </a:t>
-            </a:r>
-            <a:r>
-              <a:rPr lang="en-CA" sz="2000" dirty="0" err="1">
-                <a:latin typeface="Consolas" panose="020B0609020204030204" pitchFamily="49" charset="0"/>
-                <a:cs typeface="Consolas" panose="020B0609020204030204" pitchFamily="49" charset="0"/>
-              </a:rPr>
-              <a:t>sckt</a:t>
-            </a:r>
-            <a:r>
-              <a:rPr lang="en-CA" sz="2000" dirty="0">
-                <a:latin typeface="Consolas" panose="020B0609020204030204" pitchFamily="49" charset="0"/>
-                <a:cs typeface="Consolas" panose="020B0609020204030204" pitchFamily="49" charset="0"/>
-              </a:rPr>
-              <a:t> { </a:t>
-            </a:r>
-          </a:p>
-          <a:p>
-            <a:r>
-              <a:rPr lang="en-CA" sz="2000" dirty="0">
-                <a:latin typeface="Consolas" panose="020B0609020204030204" pitchFamily="49" charset="0"/>
-                <a:cs typeface="Consolas" panose="020B0609020204030204" pitchFamily="49" charset="0"/>
-              </a:rPr>
-              <a:t>	</a:t>
-            </a:r>
-            <a:r>
-              <a:rPr lang="en-CA" sz="2000" dirty="0" err="1">
-                <a:latin typeface="Consolas" panose="020B0609020204030204" pitchFamily="49" charset="0"/>
-                <a:cs typeface="Consolas" panose="020B0609020204030204" pitchFamily="49" charset="0"/>
-              </a:rPr>
-              <a:t>func</a:t>
-            </a:r>
-            <a:r>
-              <a:rPr lang="en-CA" sz="2000" dirty="0">
-                <a:latin typeface="Consolas" panose="020B0609020204030204" pitchFamily="49" charset="0"/>
-                <a:cs typeface="Consolas" panose="020B0609020204030204" pitchFamily="49" charset="0"/>
-              </a:rPr>
-              <a:t> main() int { </a:t>
-            </a:r>
-          </a:p>
-          <a:p>
-            <a:r>
-              <a:rPr lang="en-CA" sz="2000" dirty="0">
-                <a:latin typeface="Consolas" panose="020B0609020204030204" pitchFamily="49" charset="0"/>
-                <a:cs typeface="Consolas" panose="020B0609020204030204" pitchFamily="49" charset="0"/>
-              </a:rPr>
-              <a:t>		var a, b, c bool; </a:t>
-            </a:r>
-          </a:p>
-          <a:p>
-            <a:r>
-              <a:rPr lang="en-CA" sz="2000" dirty="0">
-                <a:latin typeface="Consolas" panose="020B0609020204030204" pitchFamily="49" charset="0"/>
-                <a:cs typeface="Consolas" panose="020B0609020204030204" pitchFamily="49" charset="0"/>
-              </a:rPr>
-              <a:t>		a = true; b = false; </a:t>
-            </a:r>
-          </a:p>
-          <a:p>
-            <a:r>
-              <a:rPr lang="en-CA" sz="2000" dirty="0">
-                <a:latin typeface="Consolas" panose="020B0609020204030204" pitchFamily="49" charset="0"/>
-                <a:cs typeface="Consolas" panose="020B0609020204030204" pitchFamily="49" charset="0"/>
-              </a:rPr>
-              <a:t>		c = a || b; </a:t>
-            </a:r>
-          </a:p>
-          <a:p>
-            <a:r>
-              <a:rPr lang="en-CA" sz="2000" dirty="0">
-                <a:latin typeface="Consolas" panose="020B0609020204030204" pitchFamily="49" charset="0"/>
-                <a:cs typeface="Consolas" panose="020B0609020204030204" pitchFamily="49" charset="0"/>
-              </a:rPr>
-              <a:t>	} </a:t>
-            </a:r>
-          </a:p>
-          <a:p>
-            <a:r>
-              <a:rPr lang="en-CA" sz="2000" dirty="0">
-                <a:latin typeface="Consolas" panose="020B0609020204030204" pitchFamily="49" charset="0"/>
-                <a:cs typeface="Consolas" panose="020B0609020204030204" pitchFamily="49" charset="0"/>
-              </a:rPr>
-              <a:t>}</a:t>
-            </a:r>
-            <a:endParaRPr lang="en-US" sz="2000" dirty="0">
-              <a:latin typeface="Consolas" panose="020B0609020204030204" pitchFamily="49" charset="0"/>
-              <a:cs typeface="Consolas" panose="020B0609020204030204" pitchFamily="49" charset="0"/>
-            </a:endParaRPr>
-          </a:p>
-        </p:txBody>
-      </p:sp>
-    </p:spTree>
-    <p:extLst>
-      <p:ext uri="{BB962C8B-B14F-4D97-AF65-F5344CB8AC3E}">
-        <p14:creationId xmlns:p14="http://schemas.microsoft.com/office/powerpoint/2010/main" val="3097850059"/>
-      </p:ext>
-    </p:extLst>
-  </p:cSld>
-  <p:clrMapOvr>
-    <a:masterClrMapping/>
-  </p:clrMapOvr>
-</p:sld>
-</file>
-
 <file path=ppt/slides/slide2.xml><?xml version="1.0" encoding="utf-8"?>
 <p:sld xmlns:a="http://schemas.openxmlformats.org/drawingml/2006/main" xmlns:r="http://schemas.openxmlformats.org/officeDocument/2006/relationships" xmlns:p="http://schemas.openxmlformats.org/presentationml/2006/main">
   <p:cSld>
@@ -10134,6 +9836,566 @@
       </p:grpSpPr>
       <p:sp>
         <p:nvSpPr>
+          <p:cNvPr id="2" name="Title 1"/>
+          <p:cNvSpPr>
+            <a:spLocks noGrp="1"/>
+          </p:cNvSpPr>
+          <p:nvPr>
+            <p:ph type="title"/>
+          </p:nvPr>
+        </p:nvSpPr>
+        <p:spPr/>
+        <p:txBody>
+          <a:bodyPr/>
+          <a:lstStyle/>
+          <a:p>
+            <a:r>
+              <a:rPr lang="en-US" sz="3000" dirty="0"/>
+              <a:t>Short-circuit of </a:t>
+            </a:r>
+            <a:r>
+              <a:rPr lang="en-US" sz="3000" dirty="0" err="1"/>
+              <a:t>boolean</a:t>
+            </a:r>
+            <a:r>
+              <a:rPr lang="en-US" sz="3000" dirty="0"/>
+              <a:t> expressions</a:t>
+            </a:r>
+          </a:p>
+        </p:txBody>
+      </p:sp>
+      <p:sp>
+        <p:nvSpPr>
+          <p:cNvPr id="5" name="Slide Number Placeholder 4"/>
+          <p:cNvSpPr>
+            <a:spLocks noGrp="1"/>
+          </p:cNvSpPr>
+          <p:nvPr>
+            <p:ph type="sldNum" sz="quarter" idx="12"/>
+          </p:nvPr>
+        </p:nvSpPr>
+        <p:spPr/>
+        <p:txBody>
+          <a:bodyPr/>
+          <a:lstStyle/>
+          <a:p>
+            <a:fld id="{2B2C104B-E445-B247-BB91-C10CB560B869}" type="slidenum">
+              <a:rPr lang="en-US" smtClean="0"/>
+              <a:pPr/>
+              <a:t>20</a:t>
+            </a:fld>
+            <a:endParaRPr lang="en-US"/>
+          </a:p>
+        </p:txBody>
+      </p:sp>
+      <p:sp>
+        <p:nvSpPr>
+          <p:cNvPr id="3" name="Content Placeholder 2"/>
+          <p:cNvSpPr>
+            <a:spLocks noGrp="1"/>
+          </p:cNvSpPr>
+          <p:nvPr>
+            <p:ph idx="4294967295"/>
+          </p:nvPr>
+        </p:nvSpPr>
+        <p:spPr>
+          <a:xfrm>
+            <a:off x="628650" y="1216025"/>
+            <a:ext cx="7543750" cy="707653"/>
+          </a:xfrm>
+        </p:spPr>
+        <p:txBody>
+          <a:bodyPr/>
+          <a:lstStyle/>
+          <a:p>
+            <a:r>
+              <a:rPr lang="en-US" dirty="0"/>
+              <a:t>For short circuit of </a:t>
+            </a:r>
+            <a:r>
+              <a:rPr lang="en-US" dirty="0" err="1"/>
+              <a:t>boolean</a:t>
+            </a:r>
+            <a:r>
+              <a:rPr lang="en-US" dirty="0"/>
+              <a:t> expressions you have to write the PHI function yourself</a:t>
+            </a:r>
+          </a:p>
+        </p:txBody>
+      </p:sp>
+      <p:sp>
+        <p:nvSpPr>
+          <p:cNvPr id="6" name="TextBox 5"/>
+          <p:cNvSpPr txBox="1"/>
+          <p:nvPr/>
+        </p:nvSpPr>
+        <p:spPr>
+          <a:xfrm>
+            <a:off x="359532" y="2140937"/>
+            <a:ext cx="8424936" cy="2354491"/>
+          </a:xfrm>
+          <a:prstGeom prst="rect">
+            <a:avLst/>
+          </a:prstGeom>
+          <a:solidFill>
+            <a:schemeClr val="accent5">
+              <a:lumMod val="20000"/>
+              <a:lumOff val="80000"/>
+            </a:schemeClr>
+          </a:solidFill>
+        </p:spPr>
+        <p:style>
+          <a:lnRef idx="1">
+            <a:schemeClr val="accent6"/>
+          </a:lnRef>
+          <a:fillRef idx="2">
+            <a:schemeClr val="accent6"/>
+          </a:fillRef>
+          <a:effectRef idx="1">
+            <a:schemeClr val="accent6"/>
+          </a:effectRef>
+          <a:fontRef idx="minor">
+            <a:schemeClr val="dk1"/>
+          </a:fontRef>
+        </p:style>
+        <p:txBody>
+          <a:bodyPr wrap="square" rtlCol="0">
+            <a:spAutoFit/>
+          </a:bodyPr>
+          <a:lstStyle/>
+          <a:p>
+            <a:r>
+              <a:rPr lang="en-US" sz="2100" dirty="0" err="1">
+                <a:latin typeface="Consolas" panose="020B0609020204030204" pitchFamily="49" charset="0"/>
+                <a:cs typeface="Consolas" panose="020B0609020204030204" pitchFamily="49" charset="0"/>
+              </a:rPr>
+              <a:t>llvm</a:t>
+            </a:r>
+            <a:r>
+              <a:rPr lang="en-US" sz="2100" dirty="0">
+                <a:latin typeface="Consolas" panose="020B0609020204030204" pitchFamily="49" charset="0"/>
+                <a:cs typeface="Consolas" panose="020B0609020204030204" pitchFamily="49" charset="0"/>
+              </a:rPr>
+              <a:t>::</a:t>
+            </a:r>
+            <a:r>
+              <a:rPr lang="en-US" sz="2100" dirty="0" err="1">
+                <a:latin typeface="Consolas" panose="020B0609020204030204" pitchFamily="49" charset="0"/>
+                <a:cs typeface="Consolas" panose="020B0609020204030204" pitchFamily="49" charset="0"/>
+              </a:rPr>
+              <a:t>PHINode</a:t>
+            </a:r>
+            <a:r>
+              <a:rPr lang="en-US" sz="2100" dirty="0">
+                <a:latin typeface="Consolas" panose="020B0609020204030204" pitchFamily="49" charset="0"/>
+                <a:cs typeface="Consolas" panose="020B0609020204030204" pitchFamily="49" charset="0"/>
+              </a:rPr>
+              <a:t> *</a:t>
+            </a:r>
+            <a:r>
+              <a:rPr lang="en-US" sz="2100" dirty="0" err="1">
+                <a:latin typeface="Consolas" panose="020B0609020204030204" pitchFamily="49" charset="0"/>
+                <a:cs typeface="Consolas" panose="020B0609020204030204" pitchFamily="49" charset="0"/>
+              </a:rPr>
+              <a:t>val</a:t>
+            </a:r>
+            <a:r>
+              <a:rPr lang="en-US" sz="2100" dirty="0">
+                <a:latin typeface="Consolas" panose="020B0609020204030204" pitchFamily="49" charset="0"/>
+                <a:cs typeface="Consolas" panose="020B0609020204030204" pitchFamily="49" charset="0"/>
+              </a:rPr>
+              <a:t> = </a:t>
+            </a:r>
+          </a:p>
+          <a:p>
+            <a:r>
+              <a:rPr lang="en-US" sz="2100" dirty="0">
+                <a:latin typeface="Consolas" panose="020B0609020204030204" pitchFamily="49" charset="0"/>
+                <a:cs typeface="Consolas" panose="020B0609020204030204" pitchFamily="49" charset="0"/>
+              </a:rPr>
+              <a:t>	</a:t>
+            </a:r>
+            <a:r>
+              <a:rPr lang="en-US" sz="2100" dirty="0" err="1">
+                <a:latin typeface="Consolas" panose="020B0609020204030204" pitchFamily="49" charset="0"/>
+                <a:cs typeface="Consolas" panose="020B0609020204030204" pitchFamily="49" charset="0"/>
+              </a:rPr>
+              <a:t>Builder.CreatePHI</a:t>
+            </a:r>
+            <a:r>
+              <a:rPr lang="en-US" sz="2100" dirty="0">
+                <a:latin typeface="Consolas" panose="020B0609020204030204" pitchFamily="49" charset="0"/>
+                <a:cs typeface="Consolas" panose="020B0609020204030204" pitchFamily="49" charset="0"/>
+              </a:rPr>
+              <a:t>(type, 2, "</a:t>
+            </a:r>
+            <a:r>
+              <a:rPr lang="en-US" sz="2100" dirty="0" err="1">
+                <a:latin typeface="Consolas" panose="020B0609020204030204" pitchFamily="49" charset="0"/>
+                <a:cs typeface="Consolas" panose="020B0609020204030204" pitchFamily="49" charset="0"/>
+              </a:rPr>
+              <a:t>phival</a:t>
+            </a:r>
+            <a:r>
+              <a:rPr lang="en-US" sz="2100" dirty="0">
+                <a:latin typeface="Consolas" panose="020B0609020204030204" pitchFamily="49" charset="0"/>
+                <a:cs typeface="Consolas" panose="020B0609020204030204" pitchFamily="49" charset="0"/>
+              </a:rPr>
+              <a:t>");</a:t>
+            </a:r>
+          </a:p>
+          <a:p>
+            <a:r>
+              <a:rPr lang="en-US" sz="2100" dirty="0">
+                <a:solidFill>
+                  <a:srgbClr val="C00000"/>
+                </a:solidFill>
+                <a:latin typeface="Consolas" panose="020B0609020204030204" pitchFamily="49" charset="0"/>
+                <a:cs typeface="Consolas" panose="020B0609020204030204" pitchFamily="49" charset="0"/>
+              </a:rPr>
+              <a:t>// </a:t>
+            </a:r>
+            <a:r>
+              <a:rPr lang="en-US" sz="2100" b="1" dirty="0">
+                <a:solidFill>
+                  <a:srgbClr val="C00000"/>
+                </a:solidFill>
+                <a:latin typeface="Consolas" panose="020B0609020204030204" pitchFamily="49" charset="0"/>
+                <a:cs typeface="Consolas" panose="020B0609020204030204" pitchFamily="49" charset="0"/>
+              </a:rPr>
+              <a:t>type is an LLVM::Type</a:t>
+            </a:r>
+            <a:endParaRPr lang="en-US" sz="2100" dirty="0">
+              <a:solidFill>
+                <a:srgbClr val="C00000"/>
+              </a:solidFill>
+              <a:latin typeface="Consolas" panose="020B0609020204030204" pitchFamily="49" charset="0"/>
+              <a:cs typeface="Consolas" panose="020B0609020204030204" pitchFamily="49" charset="0"/>
+            </a:endParaRPr>
+          </a:p>
+          <a:p>
+            <a:r>
+              <a:rPr lang="en-US" sz="2100" dirty="0" err="1">
+                <a:latin typeface="Consolas" panose="020B0609020204030204" pitchFamily="49" charset="0"/>
+                <a:cs typeface="Consolas" panose="020B0609020204030204" pitchFamily="49" charset="0"/>
+              </a:rPr>
+              <a:t>val</a:t>
+            </a:r>
+            <a:r>
+              <a:rPr lang="en-US" sz="2100" dirty="0">
+                <a:latin typeface="Consolas" panose="020B0609020204030204" pitchFamily="49" charset="0"/>
+                <a:cs typeface="Consolas" panose="020B0609020204030204" pitchFamily="49" charset="0"/>
+              </a:rPr>
+              <a:t>-&gt;</a:t>
+            </a:r>
+            <a:r>
+              <a:rPr lang="en-US" sz="2100" dirty="0" err="1">
+                <a:latin typeface="Consolas" panose="020B0609020204030204" pitchFamily="49" charset="0"/>
+                <a:cs typeface="Consolas" panose="020B0609020204030204" pitchFamily="49" charset="0"/>
+              </a:rPr>
+              <a:t>addIncoming</a:t>
+            </a:r>
+            <a:r>
+              <a:rPr lang="en-US" sz="2100" dirty="0">
+                <a:latin typeface="Consolas" panose="020B0609020204030204" pitchFamily="49" charset="0"/>
+                <a:cs typeface="Consolas" panose="020B0609020204030204" pitchFamily="49" charset="0"/>
+              </a:rPr>
+              <a:t>(L, </a:t>
+            </a:r>
+            <a:r>
+              <a:rPr lang="en-US" sz="2100" dirty="0" err="1">
+                <a:latin typeface="Consolas" panose="020B0609020204030204" pitchFamily="49" charset="0"/>
+                <a:cs typeface="Consolas" panose="020B0609020204030204" pitchFamily="49" charset="0"/>
+              </a:rPr>
+              <a:t>CurBB</a:t>
+            </a:r>
+            <a:r>
+              <a:rPr lang="en-US" sz="2100" dirty="0">
+                <a:latin typeface="Consolas" panose="020B0609020204030204" pitchFamily="49" charset="0"/>
+                <a:cs typeface="Consolas" panose="020B0609020204030204" pitchFamily="49" charset="0"/>
+              </a:rPr>
+              <a:t>);</a:t>
+            </a:r>
+          </a:p>
+          <a:p>
+            <a:r>
+              <a:rPr lang="en-US" sz="2100" dirty="0" err="1">
+                <a:latin typeface="Consolas" panose="020B0609020204030204" pitchFamily="49" charset="0"/>
+                <a:cs typeface="Consolas" panose="020B0609020204030204" pitchFamily="49" charset="0"/>
+              </a:rPr>
+              <a:t>val</a:t>
+            </a:r>
+            <a:r>
+              <a:rPr lang="en-US" sz="2100" dirty="0">
+                <a:latin typeface="Consolas" panose="020B0609020204030204" pitchFamily="49" charset="0"/>
+                <a:cs typeface="Consolas" panose="020B0609020204030204" pitchFamily="49" charset="0"/>
+              </a:rPr>
+              <a:t>-&gt;</a:t>
+            </a:r>
+            <a:r>
+              <a:rPr lang="en-US" sz="2100" dirty="0" err="1">
+                <a:latin typeface="Consolas" panose="020B0609020204030204" pitchFamily="49" charset="0"/>
+                <a:cs typeface="Consolas" panose="020B0609020204030204" pitchFamily="49" charset="0"/>
+              </a:rPr>
+              <a:t>addIncoming</a:t>
+            </a:r>
+            <a:r>
+              <a:rPr lang="en-US" sz="2100" dirty="0">
+                <a:latin typeface="Consolas" panose="020B0609020204030204" pitchFamily="49" charset="0"/>
+                <a:cs typeface="Consolas" panose="020B0609020204030204" pitchFamily="49" charset="0"/>
+              </a:rPr>
+              <a:t>(</a:t>
+            </a:r>
+            <a:r>
+              <a:rPr lang="en-US" sz="2100" dirty="0" err="1">
+                <a:latin typeface="Consolas" panose="020B0609020204030204" pitchFamily="49" charset="0"/>
+                <a:cs typeface="Consolas" panose="020B0609020204030204" pitchFamily="49" charset="0"/>
+              </a:rPr>
+              <a:t>opval</a:t>
+            </a:r>
+            <a:r>
+              <a:rPr lang="en-US" sz="2100" dirty="0">
+                <a:latin typeface="Consolas" panose="020B0609020204030204" pitchFamily="49" charset="0"/>
+                <a:cs typeface="Consolas" panose="020B0609020204030204" pitchFamily="49" charset="0"/>
+              </a:rPr>
+              <a:t>, </a:t>
+            </a:r>
+            <a:r>
+              <a:rPr lang="en-US" sz="2100" dirty="0" err="1">
+                <a:latin typeface="Consolas" panose="020B0609020204030204" pitchFamily="49" charset="0"/>
+                <a:cs typeface="Consolas" panose="020B0609020204030204" pitchFamily="49" charset="0"/>
+              </a:rPr>
+              <a:t>OpValBB</a:t>
+            </a:r>
+            <a:r>
+              <a:rPr lang="en-US" sz="2100" dirty="0">
+                <a:latin typeface="Consolas" panose="020B0609020204030204" pitchFamily="49" charset="0"/>
+                <a:cs typeface="Consolas" panose="020B0609020204030204" pitchFamily="49" charset="0"/>
+              </a:rPr>
+              <a:t>);</a:t>
+            </a:r>
+          </a:p>
+          <a:p>
+            <a:r>
+              <a:rPr lang="en-US" sz="2100" dirty="0">
+                <a:solidFill>
+                  <a:srgbClr val="C00000"/>
+                </a:solidFill>
+                <a:latin typeface="Consolas" panose="020B0609020204030204" pitchFamily="49" charset="0"/>
+                <a:cs typeface="Consolas" panose="020B0609020204030204" pitchFamily="49" charset="0"/>
+              </a:rPr>
+              <a:t>// </a:t>
+            </a:r>
+            <a:r>
+              <a:rPr lang="en-US" sz="2100" b="1" dirty="0" err="1">
+                <a:solidFill>
+                  <a:srgbClr val="C00000"/>
+                </a:solidFill>
+                <a:latin typeface="Consolas" panose="020B0609020204030204" pitchFamily="49" charset="0"/>
+                <a:cs typeface="Consolas" panose="020B0609020204030204" pitchFamily="49" charset="0"/>
+              </a:rPr>
+              <a:t>CurBB</a:t>
+            </a:r>
+            <a:r>
+              <a:rPr lang="en-US" sz="2100" b="1" dirty="0">
+                <a:solidFill>
+                  <a:srgbClr val="C00000"/>
+                </a:solidFill>
+                <a:latin typeface="Consolas" panose="020B0609020204030204" pitchFamily="49" charset="0"/>
+                <a:cs typeface="Consolas" panose="020B0609020204030204" pitchFamily="49" charset="0"/>
+              </a:rPr>
+              <a:t> and </a:t>
+            </a:r>
+            <a:r>
+              <a:rPr lang="en-US" sz="2100" b="1" dirty="0" err="1">
+                <a:solidFill>
+                  <a:srgbClr val="C00000"/>
+                </a:solidFill>
+                <a:latin typeface="Consolas" panose="020B0609020204030204" pitchFamily="49" charset="0"/>
+                <a:cs typeface="Consolas" panose="020B0609020204030204" pitchFamily="49" charset="0"/>
+              </a:rPr>
+              <a:t>OpValBB</a:t>
+            </a:r>
+            <a:r>
+              <a:rPr lang="en-US" sz="2100" b="1" dirty="0">
+                <a:solidFill>
+                  <a:srgbClr val="C00000"/>
+                </a:solidFill>
+                <a:latin typeface="Consolas" panose="020B0609020204030204" pitchFamily="49" charset="0"/>
+                <a:cs typeface="Consolas" panose="020B0609020204030204" pitchFamily="49" charset="0"/>
+              </a:rPr>
+              <a:t> are the two basic blocks that are incoming blocks for the PHI function</a:t>
+            </a:r>
+            <a:endParaRPr lang="en-US" sz="2100" dirty="0">
+              <a:solidFill>
+                <a:srgbClr val="C00000"/>
+              </a:solidFill>
+              <a:latin typeface="Consolas" panose="020B0609020204030204" pitchFamily="49" charset="0"/>
+              <a:cs typeface="Consolas" panose="020B0609020204030204" pitchFamily="49" charset="0"/>
+            </a:endParaRPr>
+          </a:p>
+        </p:txBody>
+      </p:sp>
+    </p:spTree>
+    <p:extLst>
+      <p:ext uri="{BB962C8B-B14F-4D97-AF65-F5344CB8AC3E}">
+        <p14:creationId xmlns:p14="http://schemas.microsoft.com/office/powerpoint/2010/main" val="2648466430"/>
+      </p:ext>
+    </p:extLst>
+  </p:cSld>
+  <p:clrMapOvr>
+    <a:masterClrMapping/>
+  </p:clrMapOvr>
+  <p:timing>
+    <p:tnLst>
+      <p:par>
+        <p:cTn id="1" dur="indefinite" restart="never" nodeType="tmRoot">
+          <p:childTnLst>
+            <p:seq concurrent="1" nextAc="seek">
+              <p:cTn id="2" dur="indefinite" nodeType="mainSeq">
+                <p:childTnLst>
+                  <p:par>
+                    <p:cTn id="3" fill="hold">
+                      <p:stCondLst>
+                        <p:cond delay="indefinite"/>
+                      </p:stCondLst>
+                      <p:childTnLst>
+                        <p:par>
+                          <p:cTn id="4" fill="hold">
+                            <p:stCondLst>
+                              <p:cond delay="0"/>
+                            </p:stCondLst>
+                            <p:childTnLst>
+                              <p:par>
+                                <p:cTn id="5" presetID="1" presetClass="entr" presetSubtype="0" fill="hold" grpId="0" nodeType="clickEffect">
+                                  <p:stCondLst>
+                                    <p:cond delay="0"/>
+                                  </p:stCondLst>
+                                  <p:childTnLst>
+                                    <p:set>
+                                      <p:cBhvr>
+                                        <p:cTn id="6" dur="1" fill="hold">
+                                          <p:stCondLst>
+                                            <p:cond delay="0"/>
+                                          </p:stCondLst>
+                                        </p:cTn>
+                                        <p:tgtEl>
+                                          <p:spTgt spid="3">
+                                            <p:txEl>
+                                              <p:pRg st="0" end="0"/>
+                                            </p:txEl>
+                                          </p:spTgt>
+                                        </p:tgtEl>
+                                        <p:attrNameLst>
+                                          <p:attrName>style.visibility</p:attrName>
+                                        </p:attrNameLst>
+                                      </p:cBhvr>
+                                      <p:to>
+                                        <p:strVal val="visible"/>
+                                      </p:to>
+                                    </p:set>
+                                  </p:childTnLst>
+                                </p:cTn>
+                              </p:par>
+                            </p:childTnLst>
+                          </p:cTn>
+                        </p:par>
+                      </p:childTnLst>
+                    </p:cTn>
+                  </p:par>
+                  <p:par>
+                    <p:cTn id="7" fill="hold">
+                      <p:stCondLst>
+                        <p:cond delay="indefinite"/>
+                      </p:stCondLst>
+                      <p:childTnLst>
+                        <p:par>
+                          <p:cTn id="8" fill="hold">
+                            <p:stCondLst>
+                              <p:cond delay="0"/>
+                            </p:stCondLst>
+                            <p:childTnLst>
+                              <p:par>
+                                <p:cTn id="9" presetID="1" presetClass="entr" presetSubtype="0" fill="hold" grpId="0" nodeType="clickEffect">
+                                  <p:stCondLst>
+                                    <p:cond delay="0"/>
+                                  </p:stCondLst>
+                                  <p:childTnLst>
+                                    <p:set>
+                                      <p:cBhvr>
+                                        <p:cTn id="10" dur="1" fill="hold">
+                                          <p:stCondLst>
+                                            <p:cond delay="0"/>
+                                          </p:stCondLst>
+                                        </p:cTn>
+                                        <p:tgtEl>
+                                          <p:spTgt spid="6"/>
+                                        </p:tgtEl>
+                                        <p:attrNameLst>
+                                          <p:attrName>style.visibility</p:attrName>
+                                        </p:attrNameLst>
+                                      </p:cBhvr>
+                                      <p:to>
+                                        <p:strVal val="visible"/>
+                                      </p:to>
+                                    </p:set>
+                                  </p:childTnLst>
+                                </p:cTn>
+                              </p:par>
+                            </p:childTnLst>
+                          </p:cTn>
+                        </p:par>
+                      </p:childTnLst>
+                    </p:cTn>
+                  </p:par>
+                </p:childTnLst>
+              </p:cTn>
+              <p:prevCondLst>
+                <p:cond evt="onPrev" delay="0">
+                  <p:tgtEl>
+                    <p:sldTgt/>
+                  </p:tgtEl>
+                </p:cond>
+              </p:prevCondLst>
+              <p:nextCondLst>
+                <p:cond evt="onNext" delay="0">
+                  <p:tgtEl>
+                    <p:sldTgt/>
+                  </p:tgtEl>
+                </p:cond>
+              </p:nextCondLst>
+            </p:seq>
+          </p:childTnLst>
+        </p:cTn>
+      </p:par>
+    </p:tnLst>
+    <p:bldLst>
+      <p:bldP spid="3" grpId="0" build="p"/>
+      <p:bldP spid="6" grpId="0" animBg="1"/>
+    </p:bldLst>
+  </p:timing>
+</p:sld>
+</file>
+
+<file path=ppt/slides/slide21.xml><?xml version="1.0" encoding="utf-8"?>
+<p:sld xmlns:a="http://schemas.openxmlformats.org/drawingml/2006/main" xmlns:r="http://schemas.openxmlformats.org/officeDocument/2006/relationships" xmlns:p="http://schemas.openxmlformats.org/presentationml/2006/main">
+  <p:cSld>
+    <p:spTree>
+      <p:nvGrpSpPr>
+        <p:cNvPr id="1" name=""/>
+        <p:cNvGrpSpPr/>
+        <p:nvPr/>
+      </p:nvGrpSpPr>
+      <p:grpSpPr>
+        <a:xfrm>
+          <a:off x="0" y="0"/>
+          <a:ext cx="0" cy="0"/>
+          <a:chOff x="0" y="0"/>
+          <a:chExt cx="0" cy="0"/>
+        </a:xfrm>
+      </p:grpSpPr>
+      <p:sp>
+        <p:nvSpPr>
           <p:cNvPr id="2" name="Title 1">
             <a:extLst>
               <a:ext uri="{FF2B5EF4-FFF2-40B4-BE49-F238E27FC236}">
@@ -10192,7 +10454,227 @@
           <a:p>
             <a:fld id="{7B252BF6-6A9C-D04A-BBE8-37A07D64A1C3}" type="slidenum">
               <a:rPr lang="en-US" smtClean="0"/>
-              <a:t>20</a:t>
+              <a:t>21</a:t>
+            </a:fld>
+            <a:endParaRPr lang="en-US"/>
+          </a:p>
+        </p:txBody>
+      </p:sp>
+      <p:sp>
+        <p:nvSpPr>
+          <p:cNvPr id="4" name="TextBox 3">
+            <a:extLst>
+              <a:ext uri="{FF2B5EF4-FFF2-40B4-BE49-F238E27FC236}">
+                <a16:creationId xmlns:a16="http://schemas.microsoft.com/office/drawing/2014/main" id="{048109E3-493D-7F45-BFC2-F87F7260087B}"/>
+              </a:ext>
+            </a:extLst>
+          </p:cNvPr>
+          <p:cNvSpPr txBox="1"/>
+          <p:nvPr/>
+        </p:nvSpPr>
+        <p:spPr>
+          <a:xfrm>
+            <a:off x="827584" y="1419622"/>
+            <a:ext cx="4993675" cy="2246769"/>
+          </a:xfrm>
+          <a:prstGeom prst="rect">
+            <a:avLst/>
+          </a:prstGeom>
+          <a:noFill/>
+        </p:spPr>
+        <p:txBody>
+          <a:bodyPr wrap="none" rtlCol="0">
+            <a:spAutoFit/>
+          </a:bodyPr>
+          <a:lstStyle/>
+          <a:p>
+            <a:r>
+              <a:rPr lang="en-CA" sz="2000" dirty="0">
+                <a:latin typeface="Consolas" panose="020B0609020204030204" pitchFamily="49" charset="0"/>
+                <a:cs typeface="Consolas" panose="020B0609020204030204" pitchFamily="49" charset="0"/>
+              </a:rPr>
+              <a:t>package </a:t>
+            </a:r>
+            <a:r>
+              <a:rPr lang="en-CA" sz="2000" dirty="0" err="1">
+                <a:latin typeface="Consolas" panose="020B0609020204030204" pitchFamily="49" charset="0"/>
+                <a:cs typeface="Consolas" panose="020B0609020204030204" pitchFamily="49" charset="0"/>
+              </a:rPr>
+              <a:t>sckt</a:t>
+            </a:r>
+            <a:r>
+              <a:rPr lang="en-CA" sz="2000" dirty="0">
+                <a:latin typeface="Consolas" panose="020B0609020204030204" pitchFamily="49" charset="0"/>
+                <a:cs typeface="Consolas" panose="020B0609020204030204" pitchFamily="49" charset="0"/>
+              </a:rPr>
+              <a:t> { </a:t>
+            </a:r>
+          </a:p>
+          <a:p>
+            <a:r>
+              <a:rPr lang="en-CA" sz="2000" dirty="0">
+                <a:latin typeface="Consolas" panose="020B0609020204030204" pitchFamily="49" charset="0"/>
+                <a:cs typeface="Consolas" panose="020B0609020204030204" pitchFamily="49" charset="0"/>
+              </a:rPr>
+              <a:t>	</a:t>
+            </a:r>
+            <a:r>
+              <a:rPr lang="en-CA" sz="2000" dirty="0" err="1">
+                <a:latin typeface="Consolas" panose="020B0609020204030204" pitchFamily="49" charset="0"/>
+                <a:cs typeface="Consolas" panose="020B0609020204030204" pitchFamily="49" charset="0"/>
+              </a:rPr>
+              <a:t>func</a:t>
+            </a:r>
+            <a:r>
+              <a:rPr lang="en-CA" sz="2000" dirty="0">
+                <a:latin typeface="Consolas" panose="020B0609020204030204" pitchFamily="49" charset="0"/>
+                <a:cs typeface="Consolas" panose="020B0609020204030204" pitchFamily="49" charset="0"/>
+              </a:rPr>
+              <a:t> main() int { </a:t>
+            </a:r>
+          </a:p>
+          <a:p>
+            <a:r>
+              <a:rPr lang="en-CA" sz="2000" dirty="0">
+                <a:latin typeface="Consolas" panose="020B0609020204030204" pitchFamily="49" charset="0"/>
+                <a:cs typeface="Consolas" panose="020B0609020204030204" pitchFamily="49" charset="0"/>
+              </a:rPr>
+              <a:t>		var a, b, c bool; </a:t>
+            </a:r>
+          </a:p>
+          <a:p>
+            <a:r>
+              <a:rPr lang="en-CA" sz="2000" dirty="0">
+                <a:latin typeface="Consolas" panose="020B0609020204030204" pitchFamily="49" charset="0"/>
+                <a:cs typeface="Consolas" panose="020B0609020204030204" pitchFamily="49" charset="0"/>
+              </a:rPr>
+              <a:t>		a = true; b = false; </a:t>
+            </a:r>
+          </a:p>
+          <a:p>
+            <a:r>
+              <a:rPr lang="en-CA" sz="2000" dirty="0">
+                <a:latin typeface="Consolas" panose="020B0609020204030204" pitchFamily="49" charset="0"/>
+                <a:cs typeface="Consolas" panose="020B0609020204030204" pitchFamily="49" charset="0"/>
+              </a:rPr>
+              <a:t>		c = a || b; </a:t>
+            </a:r>
+          </a:p>
+          <a:p>
+            <a:r>
+              <a:rPr lang="en-CA" sz="2000" dirty="0">
+                <a:latin typeface="Consolas" panose="020B0609020204030204" pitchFamily="49" charset="0"/>
+                <a:cs typeface="Consolas" panose="020B0609020204030204" pitchFamily="49" charset="0"/>
+              </a:rPr>
+              <a:t>	} </a:t>
+            </a:r>
+          </a:p>
+          <a:p>
+            <a:r>
+              <a:rPr lang="en-CA" sz="2000" dirty="0">
+                <a:latin typeface="Consolas" panose="020B0609020204030204" pitchFamily="49" charset="0"/>
+                <a:cs typeface="Consolas" panose="020B0609020204030204" pitchFamily="49" charset="0"/>
+              </a:rPr>
+              <a:t>}</a:t>
+            </a:r>
+            <a:endParaRPr lang="en-US" sz="2000" dirty="0">
+              <a:latin typeface="Consolas" panose="020B0609020204030204" pitchFamily="49" charset="0"/>
+              <a:cs typeface="Consolas" panose="020B0609020204030204" pitchFamily="49" charset="0"/>
+            </a:endParaRPr>
+          </a:p>
+        </p:txBody>
+      </p:sp>
+    </p:spTree>
+    <p:extLst>
+      <p:ext uri="{BB962C8B-B14F-4D97-AF65-F5344CB8AC3E}">
+        <p14:creationId xmlns:p14="http://schemas.microsoft.com/office/powerpoint/2010/main" val="3097850059"/>
+      </p:ext>
+    </p:extLst>
+  </p:cSld>
+  <p:clrMapOvr>
+    <a:masterClrMapping/>
+  </p:clrMapOvr>
+</p:sld>
+</file>
+
+<file path=ppt/slides/slide22.xml><?xml version="1.0" encoding="utf-8"?>
+<p:sld xmlns:a="http://schemas.openxmlformats.org/drawingml/2006/main" xmlns:r="http://schemas.openxmlformats.org/officeDocument/2006/relationships" xmlns:p="http://schemas.openxmlformats.org/presentationml/2006/main">
+  <p:cSld>
+    <p:spTree>
+      <p:nvGrpSpPr>
+        <p:cNvPr id="1" name=""/>
+        <p:cNvGrpSpPr/>
+        <p:nvPr/>
+      </p:nvGrpSpPr>
+      <p:grpSpPr>
+        <a:xfrm>
+          <a:off x="0" y="0"/>
+          <a:ext cx="0" cy="0"/>
+          <a:chOff x="0" y="0"/>
+          <a:chExt cx="0" cy="0"/>
+        </a:xfrm>
+      </p:grpSpPr>
+      <p:sp>
+        <p:nvSpPr>
+          <p:cNvPr id="2" name="Title 1">
+            <a:extLst>
+              <a:ext uri="{FF2B5EF4-FFF2-40B4-BE49-F238E27FC236}">
+                <a16:creationId xmlns:a16="http://schemas.microsoft.com/office/drawing/2014/main" id="{5B7260D1-69D6-534C-BD2B-54FFE929CFDC}"/>
+              </a:ext>
+            </a:extLst>
+          </p:cNvPr>
+          <p:cNvSpPr>
+            <a:spLocks noGrp="1"/>
+          </p:cNvSpPr>
+          <p:nvPr>
+            <p:ph type="title"/>
+          </p:nvPr>
+        </p:nvSpPr>
+        <p:spPr/>
+        <p:txBody>
+          <a:bodyPr/>
+          <a:lstStyle/>
+          <a:p>
+            <a:r>
+              <a:rPr lang="en-US" sz="3600" dirty="0"/>
+              <a:t>Short-circuit of </a:t>
+            </a:r>
+            <a:r>
+              <a:rPr lang="en-US" sz="3600" dirty="0" err="1"/>
+              <a:t>boolean</a:t>
+            </a:r>
+            <a:r>
+              <a:rPr lang="en-US" sz="3600" dirty="0"/>
+              <a:t> expressions</a:t>
+            </a:r>
+            <a:endParaRPr lang="en-US" dirty="0"/>
+          </a:p>
+        </p:txBody>
+      </p:sp>
+      <p:sp>
+        <p:nvSpPr>
+          <p:cNvPr id="3" name="Slide Number Placeholder 2">
+            <a:extLst>
+              <a:ext uri="{FF2B5EF4-FFF2-40B4-BE49-F238E27FC236}">
+                <a16:creationId xmlns:a16="http://schemas.microsoft.com/office/drawing/2014/main" id="{A1A4D194-1A47-054C-944C-ABE8043896CA}"/>
+              </a:ext>
+            </a:extLst>
+          </p:cNvPr>
+          <p:cNvSpPr>
+            <a:spLocks noGrp="1"/>
+          </p:cNvSpPr>
+          <p:nvPr>
+            <p:ph type="sldNum" sz="quarter" idx="12"/>
+          </p:nvPr>
+        </p:nvSpPr>
+        <p:spPr/>
+        <p:txBody>
+          <a:bodyPr/>
+          <a:lstStyle/>
+          <a:p>
+            <a:fld id="{7B252BF6-6A9C-D04A-BBE8-37A07D64A1C3}" type="slidenum">
+              <a:rPr lang="en-US" smtClean="0"/>
+              <a:t>22</a:t>
             </a:fld>
             <a:endParaRPr lang="en-US"/>
           </a:p>
@@ -11570,7 +12052,7 @@
 </p:sld>
 </file>
 
-<file path=ppt/slides/slide21.xml><?xml version="1.0" encoding="utf-8"?>
+<file path=ppt/slides/slide23.xml><?xml version="1.0" encoding="utf-8"?>
 <p:sld xmlns:a="http://schemas.openxmlformats.org/drawingml/2006/main" xmlns:r="http://schemas.openxmlformats.org/officeDocument/2006/relationships" xmlns:p="http://schemas.openxmlformats.org/presentationml/2006/main">
   <p:cSld>
     <p:spTree>
@@ -11592,7 +12074,7 @@
           <p:cNvPr id="2" name="Title 1">
             <a:extLst>
               <a:ext uri="{FF2B5EF4-FFF2-40B4-BE49-F238E27FC236}">
-                <a16:creationId xmlns:a16="http://schemas.microsoft.com/office/drawing/2014/main" id="{787C3578-CF40-6944-89C9-DE6B9C4AD190}"/>
+                <a16:creationId xmlns:a16="http://schemas.microsoft.com/office/drawing/2014/main" id="{5B7260D1-69D6-534C-BD2B-54FFE929CFDC}"/>
               </a:ext>
             </a:extLst>
           </p:cNvPr>
@@ -11609,67 +12091,18 @@
           <a:lstStyle/>
           <a:p>
             <a:r>
-              <a:rPr lang="en-US" dirty="0"/>
-              <a:t>Backward Function Declarations</a:t>
-            </a:r>
-          </a:p>
-        </p:txBody>
-      </p:sp>
-    </p:spTree>
-    <p:extLst>
-      <p:ext uri="{BB962C8B-B14F-4D97-AF65-F5344CB8AC3E}">
-        <p14:creationId xmlns:p14="http://schemas.microsoft.com/office/powerpoint/2010/main" val="2130071057"/>
-      </p:ext>
-    </p:extLst>
-  </p:cSld>
-  <p:clrMapOvr>
-    <a:masterClrMapping/>
-  </p:clrMapOvr>
-</p:sld>
-</file>
-
-<file path=ppt/slides/slide22.xml><?xml version="1.0" encoding="utf-8"?>
-<p:sld xmlns:a="http://schemas.openxmlformats.org/drawingml/2006/main" xmlns:r="http://schemas.openxmlformats.org/officeDocument/2006/relationships" xmlns:p="http://schemas.openxmlformats.org/presentationml/2006/main">
-  <p:cSld>
-    <p:spTree>
-      <p:nvGrpSpPr>
-        <p:cNvPr id="1" name=""/>
-        <p:cNvGrpSpPr/>
-        <p:nvPr/>
-      </p:nvGrpSpPr>
-      <p:grpSpPr>
-        <a:xfrm>
-          <a:off x="0" y="0"/>
-          <a:ext cx="0" cy="0"/>
-          <a:chOff x="0" y="0"/>
-          <a:chExt cx="0" cy="0"/>
-        </a:xfrm>
-      </p:grpSpPr>
-      <p:sp>
-        <p:nvSpPr>
-          <p:cNvPr id="2" name="Title 1">
-            <a:extLst>
-              <a:ext uri="{FF2B5EF4-FFF2-40B4-BE49-F238E27FC236}">
-                <a16:creationId xmlns:a16="http://schemas.microsoft.com/office/drawing/2014/main" id="{949B1B92-6B89-AA43-B98D-CE8295521998}"/>
-              </a:ext>
-            </a:extLst>
-          </p:cNvPr>
-          <p:cNvSpPr>
-            <a:spLocks noGrp="1"/>
-          </p:cNvSpPr>
-          <p:nvPr>
-            <p:ph type="title"/>
-          </p:nvPr>
-        </p:nvSpPr>
-        <p:spPr/>
-        <p:txBody>
-          <a:bodyPr/>
-          <a:lstStyle/>
-          <a:p>
-            <a:r>
-              <a:rPr lang="en-US" dirty="0"/>
-              <a:t>Backwards Declarations</a:t>
-            </a:r>
+              <a:rPr lang="en-US" sz="3600" dirty="0"/>
+              <a:t>Short-circuit of </a:t>
+            </a:r>
+            <a:r>
+              <a:rPr lang="en-US" sz="3600" dirty="0" err="1"/>
+              <a:t>boolean</a:t>
+            </a:r>
+            <a:r>
+              <a:rPr lang="en-US" sz="3600" dirty="0"/>
+              <a:t> expressions</a:t>
+            </a:r>
+            <a:endParaRPr lang="en-US" dirty="0"/>
           </a:p>
         </p:txBody>
       </p:sp>
@@ -11678,7 +12111,7 @@
           <p:cNvPr id="3" name="Slide Number Placeholder 2">
             <a:extLst>
               <a:ext uri="{FF2B5EF4-FFF2-40B4-BE49-F238E27FC236}">
-                <a16:creationId xmlns:a16="http://schemas.microsoft.com/office/drawing/2014/main" id="{D59FD94A-158D-7E43-9F88-741A8A91A1A5}"/>
+                <a16:creationId xmlns:a16="http://schemas.microsoft.com/office/drawing/2014/main" id="{A1A4D194-1A47-054C-944C-ABE8043896CA}"/>
               </a:ext>
             </a:extLst>
           </p:cNvPr>
@@ -11696,7 +12129,7 @@
           <a:p>
             <a:fld id="{7B252BF6-6A9C-D04A-BBE8-37A07D64A1C3}" type="slidenum">
               <a:rPr lang="en-US" smtClean="0"/>
-              <a:t>22</a:t>
+              <a:t>23</a:t>
             </a:fld>
             <a:endParaRPr lang="en-US"/>
           </a:p>
@@ -11707,7 +12140,7 @@
           <p:cNvPr id="4" name="TextBox 3">
             <a:extLst>
               <a:ext uri="{FF2B5EF4-FFF2-40B4-BE49-F238E27FC236}">
-                <a16:creationId xmlns:a16="http://schemas.microsoft.com/office/drawing/2014/main" id="{F2C07872-49EF-9A41-AF65-3F6A6AB77C87}"/>
+                <a16:creationId xmlns:a16="http://schemas.microsoft.com/office/drawing/2014/main" id="{048109E3-493D-7F45-BFC2-F87F7260087B}"/>
               </a:ext>
             </a:extLst>
           </p:cNvPr>
@@ -11716,8 +12149,8 @@
         </p:nvSpPr>
         <p:spPr>
           <a:xfrm>
-            <a:off x="660496" y="1432590"/>
-            <a:ext cx="4839786" cy="3170099"/>
+            <a:off x="720640" y="1222240"/>
+            <a:ext cx="4458272" cy="2031325"/>
           </a:xfrm>
           <a:prstGeom prst="rect">
             <a:avLst/>
@@ -11731,190 +12164,675 @@
           <a:lstStyle/>
           <a:p>
             <a:r>
-              <a:rPr lang="en-CA" sz="2000" dirty="0">
-                <a:latin typeface="Consolas" panose="020B0609020204030204" pitchFamily="49" charset="0"/>
-                <a:cs typeface="Consolas" panose="020B0609020204030204" pitchFamily="49" charset="0"/>
-              </a:rPr>
-              <a:t>extern </a:t>
-            </a:r>
-            <a:r>
-              <a:rPr lang="en-CA" sz="2000" dirty="0" err="1">
+              <a:rPr lang="en-CA" sz="1400" dirty="0">
+                <a:latin typeface="Consolas" panose="020B0609020204030204" pitchFamily="49" charset="0"/>
+                <a:cs typeface="Consolas" panose="020B0609020204030204" pitchFamily="49" charset="0"/>
+              </a:rPr>
+              <a:t>; </a:t>
+            </a:r>
+            <a:r>
+              <a:rPr lang="en-CA" sz="1400" dirty="0" err="1">
+                <a:latin typeface="Consolas" panose="020B0609020204030204" pitchFamily="49" charset="0"/>
+                <a:cs typeface="Consolas" panose="020B0609020204030204" pitchFamily="49" charset="0"/>
+              </a:rPr>
+              <a:t>ModuleID</a:t>
+            </a:r>
+            <a:r>
+              <a:rPr lang="en-CA" sz="1400" dirty="0">
+                <a:latin typeface="Consolas" panose="020B0609020204030204" pitchFamily="49" charset="0"/>
+                <a:cs typeface="Consolas" panose="020B0609020204030204" pitchFamily="49" charset="0"/>
+              </a:rPr>
+              <a:t> = '</a:t>
+            </a:r>
+            <a:r>
+              <a:rPr lang="en-CA" sz="1400" dirty="0" err="1">
+                <a:latin typeface="Consolas" panose="020B0609020204030204" pitchFamily="49" charset="0"/>
+                <a:cs typeface="Consolas" panose="020B0609020204030204" pitchFamily="49" charset="0"/>
+              </a:rPr>
+              <a:t>sckt</a:t>
+            </a:r>
+            <a:r>
+              <a:rPr lang="en-CA" sz="1400" dirty="0">
+                <a:latin typeface="Consolas" panose="020B0609020204030204" pitchFamily="49" charset="0"/>
+                <a:cs typeface="Consolas" panose="020B0609020204030204" pitchFamily="49" charset="0"/>
+              </a:rPr>
+              <a:t>’ </a:t>
+            </a:r>
+          </a:p>
+          <a:p>
+            <a:r>
+              <a:rPr lang="en-CA" sz="1400" dirty="0" err="1">
+                <a:latin typeface="Consolas" panose="020B0609020204030204" pitchFamily="49" charset="0"/>
+                <a:cs typeface="Consolas" panose="020B0609020204030204" pitchFamily="49" charset="0"/>
+              </a:rPr>
+              <a:t>source_filename</a:t>
+            </a:r>
+            <a:r>
+              <a:rPr lang="en-CA" sz="1400" dirty="0">
+                <a:latin typeface="Consolas" panose="020B0609020204030204" pitchFamily="49" charset="0"/>
+                <a:cs typeface="Consolas" panose="020B0609020204030204" pitchFamily="49" charset="0"/>
+              </a:rPr>
+              <a:t> = "</a:t>
+            </a:r>
+            <a:r>
+              <a:rPr lang="en-CA" sz="1400" dirty="0" err="1">
+                <a:latin typeface="Consolas" panose="020B0609020204030204" pitchFamily="49" charset="0"/>
+                <a:cs typeface="Consolas" panose="020B0609020204030204" pitchFamily="49" charset="0"/>
+              </a:rPr>
+              <a:t>DecafComp</a:t>
+            </a:r>
+            <a:r>
+              <a:rPr lang="en-CA" sz="1400" dirty="0">
+                <a:latin typeface="Consolas" panose="020B0609020204030204" pitchFamily="49" charset="0"/>
+                <a:cs typeface="Consolas" panose="020B0609020204030204" pitchFamily="49" charset="0"/>
+              </a:rPr>
+              <a:t>" </a:t>
+            </a:r>
+          </a:p>
+          <a:p>
+            <a:r>
+              <a:rPr lang="en-CA" sz="1400" dirty="0">
+                <a:latin typeface="Consolas" panose="020B0609020204030204" pitchFamily="49" charset="0"/>
+                <a:cs typeface="Consolas" panose="020B0609020204030204" pitchFamily="49" charset="0"/>
+              </a:rPr>
+              <a:t>define i32 @main() { </a:t>
+            </a:r>
+          </a:p>
+          <a:p>
+            <a:r>
+              <a:rPr lang="en-CA" sz="1400" dirty="0" err="1">
                 <a:latin typeface="Consolas" panose="020B0609020204030204" pitchFamily="49" charset="0"/>
                 <a:cs typeface="Consolas" panose="020B0609020204030204" pitchFamily="49" charset="0"/>
               </a:rPr>
               <a:t>func</a:t>
             </a:r>
             <a:r>
-              <a:rPr lang="en-CA" sz="2000" dirty="0">
+              <a:rPr lang="en-CA" sz="1400" dirty="0">
+                <a:latin typeface="Consolas" panose="020B0609020204030204" pitchFamily="49" charset="0"/>
+                <a:cs typeface="Consolas" panose="020B0609020204030204" pitchFamily="49" charset="0"/>
+              </a:rPr>
+              <a:t>: </a:t>
+            </a:r>
+          </a:p>
+          <a:p>
+            <a:r>
+              <a:rPr lang="en-CA" sz="1400" dirty="0">
+                <a:latin typeface="Consolas" panose="020B0609020204030204" pitchFamily="49" charset="0"/>
+                <a:cs typeface="Consolas" panose="020B0609020204030204" pitchFamily="49" charset="0"/>
+              </a:rPr>
+              <a:t>  ; removed all variable </a:t>
+            </a:r>
+            <a:r>
+              <a:rPr lang="en-CA" sz="1400" dirty="0" err="1">
+                <a:latin typeface="Consolas" panose="020B0609020204030204" pitchFamily="49" charset="0"/>
+                <a:cs typeface="Consolas" panose="020B0609020204030204" pitchFamily="49" charset="0"/>
+              </a:rPr>
+              <a:t>init</a:t>
+            </a:r>
+            <a:r>
+              <a:rPr lang="en-CA" sz="1400" dirty="0">
+                <a:latin typeface="Consolas" panose="020B0609020204030204" pitchFamily="49" charset="0"/>
+                <a:cs typeface="Consolas" panose="020B0609020204030204" pitchFamily="49" charset="0"/>
+              </a:rPr>
+              <a:t> code</a:t>
+            </a:r>
+          </a:p>
+          <a:p>
+            <a:r>
+              <a:rPr lang="en-CA" sz="1400" dirty="0">
+                <a:latin typeface="Consolas" panose="020B0609020204030204" pitchFamily="49" charset="0"/>
+                <a:cs typeface="Consolas" panose="020B0609020204030204" pitchFamily="49" charset="0"/>
+              </a:rPr>
+              <a:t>  store i1 true, i1* %a </a:t>
+            </a:r>
+          </a:p>
+          <a:p>
+            <a:r>
+              <a:rPr lang="en-CA" sz="1400" dirty="0">
+                <a:latin typeface="Consolas" panose="020B0609020204030204" pitchFamily="49" charset="0"/>
+                <a:cs typeface="Consolas" panose="020B0609020204030204" pitchFamily="49" charset="0"/>
+              </a:rPr>
+              <a:t>  store i1 false, i1* %b </a:t>
+            </a:r>
+          </a:p>
+          <a:p>
+            <a:r>
+              <a:rPr lang="en-CA" sz="1400" dirty="0">
+                <a:latin typeface="Consolas" panose="020B0609020204030204" pitchFamily="49" charset="0"/>
+                <a:cs typeface="Consolas" panose="020B0609020204030204" pitchFamily="49" charset="0"/>
+              </a:rPr>
+              <a:t>  %a1 = load i1, i1* %a </a:t>
+            </a:r>
+          </a:p>
+          <a:p>
+            <a:r>
+              <a:rPr lang="en-CA" sz="1400" dirty="0">
+                <a:latin typeface="Consolas" panose="020B0609020204030204" pitchFamily="49" charset="0"/>
+                <a:cs typeface="Consolas" panose="020B0609020204030204" pitchFamily="49" charset="0"/>
+              </a:rPr>
+              <a:t>  </a:t>
+            </a:r>
+            <a:r>
+              <a:rPr lang="en-CA" sz="1400" dirty="0" err="1">
+                <a:latin typeface="Consolas" panose="020B0609020204030204" pitchFamily="49" charset="0"/>
+                <a:cs typeface="Consolas" panose="020B0609020204030204" pitchFamily="49" charset="0"/>
+              </a:rPr>
+              <a:t>br</a:t>
+            </a:r>
+            <a:r>
+              <a:rPr lang="en-CA" sz="1400" dirty="0">
+                <a:latin typeface="Consolas" panose="020B0609020204030204" pitchFamily="49" charset="0"/>
+                <a:cs typeface="Consolas" panose="020B0609020204030204" pitchFamily="49" charset="0"/>
+              </a:rPr>
+              <a:t> i1 %a1, label %</a:t>
+            </a:r>
+            <a:r>
+              <a:rPr lang="en-CA" sz="1400" dirty="0" err="1">
+                <a:latin typeface="Consolas" panose="020B0609020204030204" pitchFamily="49" charset="0"/>
+                <a:cs typeface="Consolas" panose="020B0609020204030204" pitchFamily="49" charset="0"/>
+              </a:rPr>
+              <a:t>skctend</a:t>
+            </a:r>
+            <a:r>
+              <a:rPr lang="en-CA" sz="1400" dirty="0">
+                <a:latin typeface="Consolas" panose="020B0609020204030204" pitchFamily="49" charset="0"/>
+                <a:cs typeface="Consolas" panose="020B0609020204030204" pitchFamily="49" charset="0"/>
+              </a:rPr>
+              <a:t>, label %</a:t>
+            </a:r>
+            <a:r>
+              <a:rPr lang="en-CA" sz="1400" dirty="0" err="1">
+                <a:latin typeface="Consolas" panose="020B0609020204030204" pitchFamily="49" charset="0"/>
+                <a:cs typeface="Consolas" panose="020B0609020204030204" pitchFamily="49" charset="0"/>
+              </a:rPr>
+              <a:t>noskct</a:t>
+            </a:r>
+            <a:r>
+              <a:rPr lang="en-CA" sz="1400" dirty="0">
                 <a:latin typeface="Consolas" panose="020B0609020204030204" pitchFamily="49" charset="0"/>
                 <a:cs typeface="Consolas" panose="020B0609020204030204" pitchFamily="49" charset="0"/>
               </a:rPr>
               <a:t> </a:t>
             </a:r>
-            <a:r>
-              <a:rPr lang="en-CA" sz="2000" dirty="0" err="1">
-                <a:latin typeface="Consolas" panose="020B0609020204030204" pitchFamily="49" charset="0"/>
-                <a:cs typeface="Consolas" panose="020B0609020204030204" pitchFamily="49" charset="0"/>
-              </a:rPr>
-              <a:t>print_int</a:t>
-            </a:r>
-            <a:r>
-              <a:rPr lang="en-CA" sz="2000" dirty="0">
-                <a:latin typeface="Consolas" panose="020B0609020204030204" pitchFamily="49" charset="0"/>
-                <a:cs typeface="Consolas" panose="020B0609020204030204" pitchFamily="49" charset="0"/>
-              </a:rPr>
-              <a:t>(int) void; </a:t>
-            </a:r>
-          </a:p>
-          <a:p>
-            <a:r>
-              <a:rPr lang="en-CA" sz="2000" dirty="0">
-                <a:latin typeface="Consolas" panose="020B0609020204030204" pitchFamily="49" charset="0"/>
-                <a:cs typeface="Consolas" panose="020B0609020204030204" pitchFamily="49" charset="0"/>
-              </a:rPr>
-              <a:t>package Test { </a:t>
-            </a:r>
-          </a:p>
-          <a:p>
-            <a:r>
-              <a:rPr lang="en-CA" sz="2000" dirty="0">
+          </a:p>
+        </p:txBody>
+      </p:sp>
+      <p:sp>
+        <p:nvSpPr>
+          <p:cNvPr id="5" name="TextBox 4">
+            <a:extLst>
+              <a:ext uri="{FF2B5EF4-FFF2-40B4-BE49-F238E27FC236}">
+                <a16:creationId xmlns:a16="http://schemas.microsoft.com/office/drawing/2014/main" id="{2B70E52F-DAC7-C24B-8506-4D8E7EABF150}"/>
+              </a:ext>
+            </a:extLst>
+          </p:cNvPr>
+          <p:cNvSpPr txBox="1"/>
+          <p:nvPr/>
+        </p:nvSpPr>
+        <p:spPr>
+          <a:xfrm>
+            <a:off x="665722" y="3502083"/>
+            <a:ext cx="2768707" cy="954107"/>
+          </a:xfrm>
+          <a:prstGeom prst="rect">
+            <a:avLst/>
+          </a:prstGeom>
+          <a:noFill/>
+        </p:spPr>
+        <p:txBody>
+          <a:bodyPr wrap="none" rtlCol="0">
+            <a:spAutoFit/>
+          </a:bodyPr>
+          <a:lstStyle/>
+          <a:p>
+            <a:r>
+              <a:rPr lang="en-CA" sz="1400" dirty="0" err="1">
+                <a:latin typeface="Consolas" panose="020B0609020204030204" pitchFamily="49" charset="0"/>
+                <a:cs typeface="Consolas" panose="020B0609020204030204" pitchFamily="49" charset="0"/>
+              </a:rPr>
+              <a:t>noskct</a:t>
+            </a:r>
+            <a:r>
+              <a:rPr lang="en-CA" sz="1400" dirty="0">
+                <a:latin typeface="Consolas" panose="020B0609020204030204" pitchFamily="49" charset="0"/>
+                <a:cs typeface="Consolas" panose="020B0609020204030204" pitchFamily="49" charset="0"/>
+              </a:rPr>
+              <a:t>: ; </a:t>
+            </a:r>
+            <a:r>
+              <a:rPr lang="en-CA" sz="1400" dirty="0" err="1">
+                <a:latin typeface="Consolas" panose="020B0609020204030204" pitchFamily="49" charset="0"/>
+                <a:cs typeface="Consolas" panose="020B0609020204030204" pitchFamily="49" charset="0"/>
+              </a:rPr>
+              <a:t>preds</a:t>
+            </a:r>
+            <a:r>
+              <a:rPr lang="en-CA" sz="1400" dirty="0">
+                <a:latin typeface="Consolas" panose="020B0609020204030204" pitchFamily="49" charset="0"/>
+                <a:cs typeface="Consolas" panose="020B0609020204030204" pitchFamily="49" charset="0"/>
+              </a:rPr>
+              <a:t> = %</a:t>
+            </a:r>
+            <a:r>
+              <a:rPr lang="en-CA" sz="1400" dirty="0" err="1">
+                <a:latin typeface="Consolas" panose="020B0609020204030204" pitchFamily="49" charset="0"/>
+                <a:cs typeface="Consolas" panose="020B0609020204030204" pitchFamily="49" charset="0"/>
+              </a:rPr>
+              <a:t>func</a:t>
+            </a:r>
+            <a:r>
+              <a:rPr lang="en-CA" sz="1400" dirty="0">
+                <a:latin typeface="Consolas" panose="020B0609020204030204" pitchFamily="49" charset="0"/>
+                <a:cs typeface="Consolas" panose="020B0609020204030204" pitchFamily="49" charset="0"/>
+              </a:rPr>
+              <a:t> </a:t>
+            </a:r>
+          </a:p>
+          <a:p>
+            <a:r>
+              <a:rPr lang="en-CA" sz="1400" dirty="0">
+                <a:latin typeface="Consolas" panose="020B0609020204030204" pitchFamily="49" charset="0"/>
+                <a:cs typeface="Consolas" panose="020B0609020204030204" pitchFamily="49" charset="0"/>
+              </a:rPr>
+              <a:t>  %b2 = load i1, i1* %b </a:t>
+            </a:r>
+          </a:p>
+          <a:p>
+            <a:r>
+              <a:rPr lang="en-CA" sz="1400" dirty="0">
+                <a:latin typeface="Consolas" panose="020B0609020204030204" pitchFamily="49" charset="0"/>
+                <a:cs typeface="Consolas" panose="020B0609020204030204" pitchFamily="49" charset="0"/>
+              </a:rPr>
+              <a:t>  %</a:t>
+            </a:r>
+            <a:r>
+              <a:rPr lang="en-CA" sz="1400" dirty="0" err="1">
+                <a:latin typeface="Consolas" panose="020B0609020204030204" pitchFamily="49" charset="0"/>
+                <a:cs typeface="Consolas" panose="020B0609020204030204" pitchFamily="49" charset="0"/>
+              </a:rPr>
+              <a:t>ortmp</a:t>
+            </a:r>
+            <a:r>
+              <a:rPr lang="en-CA" sz="1400" dirty="0">
+                <a:latin typeface="Consolas" panose="020B0609020204030204" pitchFamily="49" charset="0"/>
+                <a:cs typeface="Consolas" panose="020B0609020204030204" pitchFamily="49" charset="0"/>
+              </a:rPr>
+              <a:t> = or i1 %a1, %b2 </a:t>
+            </a:r>
+          </a:p>
+          <a:p>
+            <a:r>
+              <a:rPr lang="en-CA" sz="1400" dirty="0">
                 <a:latin typeface="Consolas" panose="020B0609020204030204" pitchFamily="49" charset="0"/>
                 <a:cs typeface="Consolas" panose="020B0609020204030204" pitchFamily="49" charset="0"/>
               </a:rPr>
               <a:t>  </a:t>
             </a:r>
             <a:r>
-              <a:rPr lang="en-CA" sz="2000" dirty="0" err="1">
+              <a:rPr lang="en-CA" sz="1400" dirty="0" err="1">
+                <a:latin typeface="Consolas" panose="020B0609020204030204" pitchFamily="49" charset="0"/>
+                <a:cs typeface="Consolas" panose="020B0609020204030204" pitchFamily="49" charset="0"/>
+              </a:rPr>
+              <a:t>br</a:t>
+            </a:r>
+            <a:r>
+              <a:rPr lang="en-CA" sz="1400" dirty="0">
+                <a:latin typeface="Consolas" panose="020B0609020204030204" pitchFamily="49" charset="0"/>
+                <a:cs typeface="Consolas" panose="020B0609020204030204" pitchFamily="49" charset="0"/>
+              </a:rPr>
+              <a:t> label %</a:t>
+            </a:r>
+            <a:r>
+              <a:rPr lang="en-CA" sz="1400" dirty="0" err="1">
+                <a:latin typeface="Consolas" panose="020B0609020204030204" pitchFamily="49" charset="0"/>
+                <a:cs typeface="Consolas" panose="020B0609020204030204" pitchFamily="49" charset="0"/>
+              </a:rPr>
+              <a:t>skctend</a:t>
+            </a:r>
+            <a:r>
+              <a:rPr lang="en-CA" sz="1400" dirty="0">
+                <a:latin typeface="Consolas" panose="020B0609020204030204" pitchFamily="49" charset="0"/>
+                <a:cs typeface="Consolas" panose="020B0609020204030204" pitchFamily="49" charset="0"/>
+              </a:rPr>
+              <a:t> </a:t>
+            </a:r>
+          </a:p>
+        </p:txBody>
+      </p:sp>
+      <p:sp>
+        <p:nvSpPr>
+          <p:cNvPr id="6" name="TextBox 5">
+            <a:extLst>
+              <a:ext uri="{FF2B5EF4-FFF2-40B4-BE49-F238E27FC236}">
+                <a16:creationId xmlns:a16="http://schemas.microsoft.com/office/drawing/2014/main" id="{4CCA303C-B688-4843-B5BA-109A2B1CD57F}"/>
+              </a:ext>
+            </a:extLst>
+          </p:cNvPr>
+          <p:cNvSpPr txBox="1"/>
+          <p:nvPr/>
+        </p:nvSpPr>
+        <p:spPr>
+          <a:xfrm>
+            <a:off x="3888992" y="3649733"/>
+            <a:ext cx="4855816" cy="1384995"/>
+          </a:xfrm>
+          <a:prstGeom prst="rect">
+            <a:avLst/>
+          </a:prstGeom>
+          <a:noFill/>
+        </p:spPr>
+        <p:txBody>
+          <a:bodyPr wrap="none" rtlCol="0">
+            <a:spAutoFit/>
+          </a:bodyPr>
+          <a:lstStyle/>
+          <a:p>
+            <a:r>
+              <a:rPr lang="en-CA" sz="1400" dirty="0" err="1">
+                <a:latin typeface="Consolas" panose="020B0609020204030204" pitchFamily="49" charset="0"/>
+                <a:cs typeface="Consolas" panose="020B0609020204030204" pitchFamily="49" charset="0"/>
+              </a:rPr>
+              <a:t>skctend</a:t>
+            </a:r>
+            <a:r>
+              <a:rPr lang="en-CA" sz="1400" dirty="0">
+                <a:latin typeface="Consolas" panose="020B0609020204030204" pitchFamily="49" charset="0"/>
+                <a:cs typeface="Consolas" panose="020B0609020204030204" pitchFamily="49" charset="0"/>
+              </a:rPr>
+              <a:t>: ; </a:t>
+            </a:r>
+            <a:r>
+              <a:rPr lang="en-CA" sz="1400" dirty="0" err="1">
+                <a:latin typeface="Consolas" panose="020B0609020204030204" pitchFamily="49" charset="0"/>
+                <a:cs typeface="Consolas" panose="020B0609020204030204" pitchFamily="49" charset="0"/>
+              </a:rPr>
+              <a:t>preds</a:t>
+            </a:r>
+            <a:r>
+              <a:rPr lang="en-CA" sz="1400" dirty="0">
+                <a:latin typeface="Consolas" panose="020B0609020204030204" pitchFamily="49" charset="0"/>
+                <a:cs typeface="Consolas" panose="020B0609020204030204" pitchFamily="49" charset="0"/>
+              </a:rPr>
+              <a:t> = %</a:t>
+            </a:r>
+            <a:r>
+              <a:rPr lang="en-CA" sz="1400" dirty="0" err="1">
+                <a:latin typeface="Consolas" panose="020B0609020204030204" pitchFamily="49" charset="0"/>
+                <a:cs typeface="Consolas" panose="020B0609020204030204" pitchFamily="49" charset="0"/>
+              </a:rPr>
+              <a:t>noskct</a:t>
+            </a:r>
+            <a:r>
+              <a:rPr lang="en-CA" sz="1400" dirty="0">
+                <a:latin typeface="Consolas" panose="020B0609020204030204" pitchFamily="49" charset="0"/>
+                <a:cs typeface="Consolas" panose="020B0609020204030204" pitchFamily="49" charset="0"/>
+              </a:rPr>
+              <a:t>, %</a:t>
+            </a:r>
+            <a:r>
+              <a:rPr lang="en-CA" sz="1400" dirty="0" err="1">
                 <a:latin typeface="Consolas" panose="020B0609020204030204" pitchFamily="49" charset="0"/>
                 <a:cs typeface="Consolas" panose="020B0609020204030204" pitchFamily="49" charset="0"/>
               </a:rPr>
               <a:t>func</a:t>
             </a:r>
             <a:r>
-              <a:rPr lang="en-CA" sz="2000" dirty="0">
-                <a:latin typeface="Consolas" panose="020B0609020204030204" pitchFamily="49" charset="0"/>
-                <a:cs typeface="Consolas" panose="020B0609020204030204" pitchFamily="49" charset="0"/>
-              </a:rPr>
-              <a:t> main() int { </a:t>
-            </a:r>
-          </a:p>
-          <a:p>
-            <a:r>
-              <a:rPr lang="en-CA" sz="2000" dirty="0">
-                <a:latin typeface="Consolas" panose="020B0609020204030204" pitchFamily="49" charset="0"/>
-                <a:cs typeface="Consolas" panose="020B0609020204030204" pitchFamily="49" charset="0"/>
-              </a:rPr>
-              <a:t>    test(10, 13); </a:t>
-            </a:r>
-          </a:p>
-          <a:p>
-            <a:r>
-              <a:rPr lang="en-CA" sz="2000" dirty="0">
-                <a:latin typeface="Consolas" panose="020B0609020204030204" pitchFamily="49" charset="0"/>
-                <a:cs typeface="Consolas" panose="020B0609020204030204" pitchFamily="49" charset="0"/>
-              </a:rPr>
-              <a:t>  } </a:t>
-            </a:r>
-          </a:p>
-          <a:p>
-            <a:r>
-              <a:rPr lang="en-CA" sz="2000" dirty="0">
-                <a:latin typeface="Consolas" panose="020B0609020204030204" pitchFamily="49" charset="0"/>
-                <a:cs typeface="Consolas" panose="020B0609020204030204" pitchFamily="49" charset="0"/>
-              </a:rPr>
-              <a:t>  </a:t>
-            </a:r>
-            <a:r>
-              <a:rPr lang="en-CA" sz="2000" dirty="0" err="1">
+              <a:rPr lang="en-CA" sz="1400" dirty="0">
+                <a:latin typeface="Consolas" panose="020B0609020204030204" pitchFamily="49" charset="0"/>
+                <a:cs typeface="Consolas" panose="020B0609020204030204" pitchFamily="49" charset="0"/>
+              </a:rPr>
+              <a:t> </a:t>
+            </a:r>
+          </a:p>
+          <a:p>
+            <a:r>
+              <a:rPr lang="en-CA" sz="1400" dirty="0">
+                <a:latin typeface="Consolas" panose="020B0609020204030204" pitchFamily="49" charset="0"/>
+                <a:cs typeface="Consolas" panose="020B0609020204030204" pitchFamily="49" charset="0"/>
+              </a:rPr>
+              <a:t>  %</a:t>
+            </a:r>
+            <a:r>
+              <a:rPr lang="en-CA" sz="1400" dirty="0" err="1">
+                <a:latin typeface="Consolas" panose="020B0609020204030204" pitchFamily="49" charset="0"/>
+                <a:cs typeface="Consolas" panose="020B0609020204030204" pitchFamily="49" charset="0"/>
+              </a:rPr>
+              <a:t>phival</a:t>
+            </a:r>
+            <a:r>
+              <a:rPr lang="en-CA" sz="1400" dirty="0">
+                <a:latin typeface="Consolas" panose="020B0609020204030204" pitchFamily="49" charset="0"/>
+                <a:cs typeface="Consolas" panose="020B0609020204030204" pitchFamily="49" charset="0"/>
+              </a:rPr>
+              <a:t> = </a:t>
+            </a:r>
+          </a:p>
+          <a:p>
+            <a:r>
+              <a:rPr lang="en-CA" sz="1400" dirty="0">
+                <a:latin typeface="Consolas" panose="020B0609020204030204" pitchFamily="49" charset="0"/>
+                <a:cs typeface="Consolas" panose="020B0609020204030204" pitchFamily="49" charset="0"/>
+              </a:rPr>
+              <a:t>    phi i1 [ %a1, %</a:t>
+            </a:r>
+            <a:r>
+              <a:rPr lang="en-CA" sz="1400" dirty="0" err="1">
                 <a:latin typeface="Consolas" panose="020B0609020204030204" pitchFamily="49" charset="0"/>
                 <a:cs typeface="Consolas" panose="020B0609020204030204" pitchFamily="49" charset="0"/>
               </a:rPr>
               <a:t>func</a:t>
             </a:r>
             <a:r>
-              <a:rPr lang="en-CA" sz="2000" dirty="0">
-                <a:latin typeface="Consolas" panose="020B0609020204030204" pitchFamily="49" charset="0"/>
-                <a:cs typeface="Consolas" panose="020B0609020204030204" pitchFamily="49" charset="0"/>
-              </a:rPr>
-              <a:t> test(a int, b int) void { </a:t>
-            </a:r>
-          </a:p>
-          <a:p>
-            <a:r>
-              <a:rPr lang="en-CA" sz="2000" dirty="0">
-                <a:latin typeface="Consolas" panose="020B0609020204030204" pitchFamily="49" charset="0"/>
-                <a:cs typeface="Consolas" panose="020B0609020204030204" pitchFamily="49" charset="0"/>
-              </a:rPr>
-              <a:t>    </a:t>
-            </a:r>
-            <a:r>
-              <a:rPr lang="en-CA" sz="2000" dirty="0" err="1">
-                <a:latin typeface="Consolas" panose="020B0609020204030204" pitchFamily="49" charset="0"/>
-                <a:cs typeface="Consolas" panose="020B0609020204030204" pitchFamily="49" charset="0"/>
-              </a:rPr>
-              <a:t>print_int</a:t>
-            </a:r>
-            <a:r>
-              <a:rPr lang="en-CA" sz="2000" dirty="0">
-                <a:latin typeface="Consolas" panose="020B0609020204030204" pitchFamily="49" charset="0"/>
-                <a:cs typeface="Consolas" panose="020B0609020204030204" pitchFamily="49" charset="0"/>
-              </a:rPr>
-              <a:t>(a); </a:t>
-            </a:r>
-          </a:p>
-          <a:p>
-            <a:r>
-              <a:rPr lang="en-CA" sz="2000" dirty="0">
-                <a:latin typeface="Consolas" panose="020B0609020204030204" pitchFamily="49" charset="0"/>
-                <a:cs typeface="Consolas" panose="020B0609020204030204" pitchFamily="49" charset="0"/>
-              </a:rPr>
-              <a:t>    </a:t>
-            </a:r>
-            <a:r>
-              <a:rPr lang="en-CA" sz="2000" dirty="0" err="1">
-                <a:latin typeface="Consolas" panose="020B0609020204030204" pitchFamily="49" charset="0"/>
-                <a:cs typeface="Consolas" panose="020B0609020204030204" pitchFamily="49" charset="0"/>
-              </a:rPr>
-              <a:t>print_int</a:t>
-            </a:r>
-            <a:r>
-              <a:rPr lang="en-CA" sz="2000" dirty="0">
-                <a:latin typeface="Consolas" panose="020B0609020204030204" pitchFamily="49" charset="0"/>
-                <a:cs typeface="Consolas" panose="020B0609020204030204" pitchFamily="49" charset="0"/>
-              </a:rPr>
-              <a:t>(b); </a:t>
-            </a:r>
-          </a:p>
-          <a:p>
-            <a:r>
-              <a:rPr lang="en-CA" sz="2000" dirty="0">
-                <a:latin typeface="Consolas" panose="020B0609020204030204" pitchFamily="49" charset="0"/>
-                <a:cs typeface="Consolas" panose="020B0609020204030204" pitchFamily="49" charset="0"/>
-              </a:rPr>
-              <a:t>  } </a:t>
-            </a:r>
-          </a:p>
-          <a:p>
-            <a:r>
-              <a:rPr lang="en-CA" sz="2000" dirty="0">
+              <a:rPr lang="en-CA" sz="1400" dirty="0">
+                <a:latin typeface="Consolas" panose="020B0609020204030204" pitchFamily="49" charset="0"/>
+                <a:cs typeface="Consolas" panose="020B0609020204030204" pitchFamily="49" charset="0"/>
+              </a:rPr>
+              <a:t> ], [ %</a:t>
+            </a:r>
+            <a:r>
+              <a:rPr lang="en-CA" sz="1400" dirty="0" err="1">
+                <a:latin typeface="Consolas" panose="020B0609020204030204" pitchFamily="49" charset="0"/>
+                <a:cs typeface="Consolas" panose="020B0609020204030204" pitchFamily="49" charset="0"/>
+              </a:rPr>
+              <a:t>ortmp</a:t>
+            </a:r>
+            <a:r>
+              <a:rPr lang="en-CA" sz="1400" dirty="0">
+                <a:latin typeface="Consolas" panose="020B0609020204030204" pitchFamily="49" charset="0"/>
+                <a:cs typeface="Consolas" panose="020B0609020204030204" pitchFamily="49" charset="0"/>
+              </a:rPr>
+              <a:t>, %</a:t>
+            </a:r>
+            <a:r>
+              <a:rPr lang="en-CA" sz="1400" dirty="0" err="1">
+                <a:latin typeface="Consolas" panose="020B0609020204030204" pitchFamily="49" charset="0"/>
+                <a:cs typeface="Consolas" panose="020B0609020204030204" pitchFamily="49" charset="0"/>
+              </a:rPr>
+              <a:t>noskct</a:t>
+            </a:r>
+            <a:r>
+              <a:rPr lang="en-CA" sz="1400" dirty="0">
+                <a:latin typeface="Consolas" panose="020B0609020204030204" pitchFamily="49" charset="0"/>
+                <a:cs typeface="Consolas" panose="020B0609020204030204" pitchFamily="49" charset="0"/>
+              </a:rPr>
+              <a:t> ] </a:t>
+            </a:r>
+          </a:p>
+          <a:p>
+            <a:r>
+              <a:rPr lang="en-CA" sz="1400" dirty="0">
+                <a:latin typeface="Consolas" panose="020B0609020204030204" pitchFamily="49" charset="0"/>
+                <a:cs typeface="Consolas" panose="020B0609020204030204" pitchFamily="49" charset="0"/>
+              </a:rPr>
+              <a:t>  store i1 %</a:t>
+            </a:r>
+            <a:r>
+              <a:rPr lang="en-CA" sz="1400" dirty="0" err="1">
+                <a:latin typeface="Consolas" panose="020B0609020204030204" pitchFamily="49" charset="0"/>
+                <a:cs typeface="Consolas" panose="020B0609020204030204" pitchFamily="49" charset="0"/>
+              </a:rPr>
+              <a:t>phival</a:t>
+            </a:r>
+            <a:r>
+              <a:rPr lang="en-CA" sz="1400" dirty="0">
+                <a:latin typeface="Consolas" panose="020B0609020204030204" pitchFamily="49" charset="0"/>
+                <a:cs typeface="Consolas" panose="020B0609020204030204" pitchFamily="49" charset="0"/>
+              </a:rPr>
+              <a:t>, i1* %c </a:t>
+            </a:r>
+          </a:p>
+          <a:p>
+            <a:r>
+              <a:rPr lang="en-CA" sz="1400" dirty="0">
+                <a:latin typeface="Consolas" panose="020B0609020204030204" pitchFamily="49" charset="0"/>
+                <a:cs typeface="Consolas" panose="020B0609020204030204" pitchFamily="49" charset="0"/>
+              </a:rPr>
+              <a:t>  ret i32 0 </a:t>
+            </a:r>
+          </a:p>
+          <a:p>
+            <a:r>
+              <a:rPr lang="en-CA" sz="1400" dirty="0">
                 <a:latin typeface="Consolas" panose="020B0609020204030204" pitchFamily="49" charset="0"/>
                 <a:cs typeface="Consolas" panose="020B0609020204030204" pitchFamily="49" charset="0"/>
               </a:rPr>
               <a:t>}</a:t>
             </a:r>
-            <a:endParaRPr lang="en-US" sz="2000" dirty="0">
+            <a:endParaRPr lang="en-US" sz="1400" dirty="0">
               <a:latin typeface="Consolas" panose="020B0609020204030204" pitchFamily="49" charset="0"/>
               <a:cs typeface="Consolas" panose="020B0609020204030204" pitchFamily="49" charset="0"/>
             </a:endParaRPr>
           </a:p>
         </p:txBody>
       </p:sp>
-      <p:sp>
-        <p:nvSpPr>
-          <p:cNvPr id="5" name="Rectangular Callout 4">
+      <p:cxnSp>
+        <p:nvCxnSpPr>
+          <p:cNvPr id="8" name="Straight Arrow Connector 7">
             <a:extLst>
               <a:ext uri="{FF2B5EF4-FFF2-40B4-BE49-F238E27FC236}">
-                <a16:creationId xmlns:a16="http://schemas.microsoft.com/office/drawing/2014/main" id="{029B9EEC-024E-FE4E-BDD9-DBAE0B4EB184}"/>
+                <a16:creationId xmlns:a16="http://schemas.microsoft.com/office/drawing/2014/main" id="{1E9967B2-1694-2440-A6CB-D01496DC8415}"/>
+              </a:ext>
+            </a:extLst>
+          </p:cNvPr>
+          <p:cNvCxnSpPr>
+            <a:stCxn id="4" idx="2"/>
+          </p:cNvCxnSpPr>
+          <p:nvPr/>
+        </p:nvCxnSpPr>
+        <p:spPr>
+          <a:xfrm flipH="1">
+            <a:off x="2160800" y="3253565"/>
+            <a:ext cx="788976" cy="248518"/>
+          </a:xfrm>
+          <a:prstGeom prst="straightConnector1">
+            <a:avLst/>
+          </a:prstGeom>
+          <a:ln>
+            <a:tailEnd type="triangle"/>
+          </a:ln>
+        </p:spPr>
+        <p:style>
+          <a:lnRef idx="1">
+            <a:schemeClr val="accent1"/>
+          </a:lnRef>
+          <a:fillRef idx="0">
+            <a:schemeClr val="accent1"/>
+          </a:fillRef>
+          <a:effectRef idx="0">
+            <a:schemeClr val="accent1"/>
+          </a:effectRef>
+          <a:fontRef idx="minor">
+            <a:schemeClr val="tx1"/>
+          </a:fontRef>
+        </p:style>
+      </p:cxnSp>
+      <p:cxnSp>
+        <p:nvCxnSpPr>
+          <p:cNvPr id="10" name="Straight Arrow Connector 9">
+            <a:extLst>
+              <a:ext uri="{FF2B5EF4-FFF2-40B4-BE49-F238E27FC236}">
+                <a16:creationId xmlns:a16="http://schemas.microsoft.com/office/drawing/2014/main" id="{F906257D-4C4F-4542-97EE-79B18E879E57}"/>
+              </a:ext>
+            </a:extLst>
+          </p:cNvPr>
+          <p:cNvCxnSpPr>
+            <a:stCxn id="5" idx="3"/>
+            <a:endCxn id="6" idx="1"/>
+          </p:cNvCxnSpPr>
+          <p:nvPr/>
+        </p:nvCxnSpPr>
+        <p:spPr>
+          <a:xfrm>
+            <a:off x="3434429" y="3979137"/>
+            <a:ext cx="454563" cy="363094"/>
+          </a:xfrm>
+          <a:prstGeom prst="straightConnector1">
+            <a:avLst/>
+          </a:prstGeom>
+          <a:ln>
+            <a:tailEnd type="triangle"/>
+          </a:ln>
+        </p:spPr>
+        <p:style>
+          <a:lnRef idx="1">
+            <a:schemeClr val="accent1"/>
+          </a:lnRef>
+          <a:fillRef idx="0">
+            <a:schemeClr val="accent1"/>
+          </a:fillRef>
+          <a:effectRef idx="0">
+            <a:schemeClr val="accent1"/>
+          </a:effectRef>
+          <a:fontRef idx="minor">
+            <a:schemeClr val="tx1"/>
+          </a:fontRef>
+        </p:style>
+      </p:cxnSp>
+      <p:sp>
+        <p:nvSpPr>
+          <p:cNvPr id="11" name="TextBox 10">
+            <a:extLst>
+              <a:ext uri="{FF2B5EF4-FFF2-40B4-BE49-F238E27FC236}">
+                <a16:creationId xmlns:a16="http://schemas.microsoft.com/office/drawing/2014/main" id="{71856F19-E7A0-6B4B-81C4-323FE403CBCD}"/>
+              </a:ext>
+            </a:extLst>
+          </p:cNvPr>
+          <p:cNvSpPr txBox="1"/>
+          <p:nvPr/>
+        </p:nvSpPr>
+        <p:spPr>
+          <a:xfrm>
+            <a:off x="5453803" y="1530399"/>
+            <a:ext cx="2053767" cy="461665"/>
+          </a:xfrm>
+          <a:prstGeom prst="rect">
+            <a:avLst/>
+          </a:prstGeom>
+          <a:noFill/>
+        </p:spPr>
+        <p:txBody>
+          <a:bodyPr wrap="none" rtlCol="0">
+            <a:spAutoFit/>
+          </a:bodyPr>
+          <a:lstStyle/>
+          <a:p>
+            <a:r>
+              <a:rPr lang="en-CA" dirty="0">
+                <a:latin typeface="Consolas" panose="020B0609020204030204" pitchFamily="49" charset="0"/>
+                <a:cs typeface="Consolas" panose="020B0609020204030204" pitchFamily="49" charset="0"/>
+              </a:rPr>
+              <a:t>c = a || b;</a:t>
+            </a:r>
+            <a:endParaRPr lang="en-US" dirty="0"/>
+          </a:p>
+        </p:txBody>
+      </p:sp>
+      <p:sp>
+        <p:nvSpPr>
+          <p:cNvPr id="12" name="Rectangle 11">
+            <a:extLst>
+              <a:ext uri="{FF2B5EF4-FFF2-40B4-BE49-F238E27FC236}">
+                <a16:creationId xmlns:a16="http://schemas.microsoft.com/office/drawing/2014/main" id="{F7165190-925B-DC4A-A171-212AE6D8B3F6}"/>
               </a:ext>
             </a:extLst>
           </p:cNvPr>
@@ -11923,14 +12841,11 @@
         </p:nvSpPr>
         <p:spPr>
           <a:xfrm>
-            <a:off x="3995936" y="1851670"/>
-            <a:ext cx="3406638" cy="864096"/>
+            <a:off x="5456266" y="2156661"/>
+            <a:ext cx="1924046" cy="563269"/>
           </a:xfrm>
-          <a:prstGeom prst="wedgeRectCallout">
-            <a:avLst>
-              <a:gd name="adj1" fmla="val -73844"/>
-              <a:gd name="adj2" fmla="val 32987"/>
-            </a:avLst>
+          <a:prstGeom prst="rect">
+            <a:avLst/>
           </a:prstGeom>
         </p:spPr>
         <p:style>
@@ -11953,17 +12868,723 @@
           <a:bodyPr rtlCol="0" anchor="ctr"/>
           <a:lstStyle/>
           <a:p>
+            <a:pPr algn="ctr"/>
             <a:r>
               <a:rPr lang="en-US" sz="1800" dirty="0"/>
-              <a:t>Iterate through the list of function signatures and insert them into the symbol table. </a:t>
-            </a:r>
+              <a:t>if </a:t>
+            </a:r>
+            <a:r>
+              <a:rPr lang="en-US" sz="1800" dirty="0">
+                <a:latin typeface="Consolas" panose="020B0609020204030204" pitchFamily="49" charset="0"/>
+                <a:cs typeface="Consolas" panose="020B0609020204030204" pitchFamily="49" charset="0"/>
+              </a:rPr>
+              <a:t>a</a:t>
+            </a:r>
+            <a:r>
+              <a:rPr lang="en-US" sz="1800" dirty="0"/>
+              <a:t> is </a:t>
+            </a:r>
+            <a:r>
+              <a:rPr lang="en-US" sz="1800" dirty="0">
+                <a:latin typeface="Consolas" panose="020B0609020204030204" pitchFamily="49" charset="0"/>
+                <a:cs typeface="Consolas" panose="020B0609020204030204" pitchFamily="49" charset="0"/>
+              </a:rPr>
+              <a:t>True</a:t>
+            </a:r>
+            <a:r>
+              <a:rPr lang="en-US" sz="1800" dirty="0"/>
+              <a:t> then do not evaluate </a:t>
+            </a:r>
+            <a:r>
+              <a:rPr lang="en-US" sz="1800" dirty="0">
+                <a:latin typeface="Consolas" panose="020B0609020204030204" pitchFamily="49" charset="0"/>
+                <a:cs typeface="Consolas" panose="020B0609020204030204" pitchFamily="49" charset="0"/>
+              </a:rPr>
+              <a:t>b</a:t>
+            </a:r>
+          </a:p>
+        </p:txBody>
+      </p:sp>
+      <p:sp>
+        <p:nvSpPr>
+          <p:cNvPr id="13" name="Rectangle 12">
+            <a:extLst>
+              <a:ext uri="{FF2B5EF4-FFF2-40B4-BE49-F238E27FC236}">
+                <a16:creationId xmlns:a16="http://schemas.microsoft.com/office/drawing/2014/main" id="{55E6DD7F-84B3-464E-97F2-45A27969D387}"/>
+              </a:ext>
+            </a:extLst>
+          </p:cNvPr>
+          <p:cNvSpPr/>
+          <p:nvPr/>
+        </p:nvSpPr>
+        <p:spPr>
+          <a:xfrm>
+            <a:off x="1538741" y="2945776"/>
+            <a:ext cx="440971" cy="248518"/>
+          </a:xfrm>
+          <a:prstGeom prst="rect">
+            <a:avLst/>
+          </a:prstGeom>
+          <a:noFill/>
+        </p:spPr>
+        <p:style>
+          <a:lnRef idx="2">
+            <a:schemeClr val="accent1">
+              <a:shade val="50000"/>
+            </a:schemeClr>
+          </a:lnRef>
+          <a:fillRef idx="1">
+            <a:schemeClr val="accent1"/>
+          </a:fillRef>
+          <a:effectRef idx="0">
+            <a:schemeClr val="accent1"/>
+          </a:effectRef>
+          <a:fontRef idx="minor">
+            <a:schemeClr val="lt1"/>
+          </a:fontRef>
+        </p:style>
+        <p:txBody>
+          <a:bodyPr rtlCol="0" anchor="ctr"/>
+          <a:lstStyle/>
+          <a:p>
+            <a:pPr algn="ctr"/>
+            <a:endParaRPr lang="en-US"/>
+          </a:p>
+        </p:txBody>
+      </p:sp>
+      <p:sp>
+        <p:nvSpPr>
+          <p:cNvPr id="14" name="Rectangle 13">
+            <a:extLst>
+              <a:ext uri="{FF2B5EF4-FFF2-40B4-BE49-F238E27FC236}">
+                <a16:creationId xmlns:a16="http://schemas.microsoft.com/office/drawing/2014/main" id="{FE21BABD-3E36-BE40-9F04-F11F1ADF92AC}"/>
+              </a:ext>
+            </a:extLst>
+          </p:cNvPr>
+          <p:cNvSpPr/>
+          <p:nvPr/>
+        </p:nvSpPr>
+        <p:spPr>
+          <a:xfrm>
+            <a:off x="2589184" y="2945776"/>
+            <a:ext cx="902696" cy="248518"/>
+          </a:xfrm>
+          <a:prstGeom prst="rect">
+            <a:avLst/>
+          </a:prstGeom>
+          <a:noFill/>
+        </p:spPr>
+        <p:style>
+          <a:lnRef idx="2">
+            <a:schemeClr val="accent1">
+              <a:shade val="50000"/>
+            </a:schemeClr>
+          </a:lnRef>
+          <a:fillRef idx="1">
+            <a:schemeClr val="accent1"/>
+          </a:fillRef>
+          <a:effectRef idx="0">
+            <a:schemeClr val="accent1"/>
+          </a:effectRef>
+          <a:fontRef idx="minor">
+            <a:schemeClr val="lt1"/>
+          </a:fontRef>
+        </p:style>
+        <p:txBody>
+          <a:bodyPr rtlCol="0" anchor="ctr"/>
+          <a:lstStyle/>
+          <a:p>
+            <a:pPr algn="ctr"/>
+            <a:endParaRPr lang="en-US"/>
+          </a:p>
+        </p:txBody>
+      </p:sp>
+      <p:sp>
+        <p:nvSpPr>
+          <p:cNvPr id="15" name="Rectangle 14">
+            <a:extLst>
+              <a:ext uri="{FF2B5EF4-FFF2-40B4-BE49-F238E27FC236}">
+                <a16:creationId xmlns:a16="http://schemas.microsoft.com/office/drawing/2014/main" id="{B684ABAF-4BD1-5B46-B8D3-769AC9B24473}"/>
+              </a:ext>
+            </a:extLst>
+          </p:cNvPr>
+          <p:cNvSpPr/>
+          <p:nvPr/>
+        </p:nvSpPr>
+        <p:spPr>
+          <a:xfrm>
+            <a:off x="3888992" y="3684053"/>
+            <a:ext cx="902696" cy="248518"/>
+          </a:xfrm>
+          <a:prstGeom prst="rect">
+            <a:avLst/>
+          </a:prstGeom>
+          <a:noFill/>
+        </p:spPr>
+        <p:style>
+          <a:lnRef idx="2">
+            <a:schemeClr val="accent1">
+              <a:shade val="50000"/>
+            </a:schemeClr>
+          </a:lnRef>
+          <a:fillRef idx="1">
+            <a:schemeClr val="accent1"/>
+          </a:fillRef>
+          <a:effectRef idx="0">
+            <a:schemeClr val="accent1"/>
+          </a:effectRef>
+          <a:fontRef idx="minor">
+            <a:schemeClr val="lt1"/>
+          </a:fontRef>
+        </p:style>
+        <p:txBody>
+          <a:bodyPr rtlCol="0" anchor="ctr"/>
+          <a:lstStyle/>
+          <a:p>
+            <a:pPr algn="ctr"/>
+            <a:endParaRPr lang="en-US"/>
+          </a:p>
+        </p:txBody>
+      </p:sp>
+      <p:sp>
+        <p:nvSpPr>
+          <p:cNvPr id="16" name="Rectangle 15">
+            <a:extLst>
+              <a:ext uri="{FF2B5EF4-FFF2-40B4-BE49-F238E27FC236}">
+                <a16:creationId xmlns:a16="http://schemas.microsoft.com/office/drawing/2014/main" id="{9E9D424F-8E9A-FA49-81BC-81191E4B6618}"/>
+              </a:ext>
+            </a:extLst>
+          </p:cNvPr>
+          <p:cNvSpPr/>
+          <p:nvPr/>
+        </p:nvSpPr>
+        <p:spPr>
+          <a:xfrm>
+            <a:off x="4155577" y="2945776"/>
+            <a:ext cx="902696" cy="248518"/>
+          </a:xfrm>
+          <a:prstGeom prst="rect">
+            <a:avLst/>
+          </a:prstGeom>
+          <a:noFill/>
+        </p:spPr>
+        <p:style>
+          <a:lnRef idx="2">
+            <a:schemeClr val="accent1">
+              <a:shade val="50000"/>
+            </a:schemeClr>
+          </a:lnRef>
+          <a:fillRef idx="1">
+            <a:schemeClr val="accent1"/>
+          </a:fillRef>
+          <a:effectRef idx="0">
+            <a:schemeClr val="accent1"/>
+          </a:effectRef>
+          <a:fontRef idx="minor">
+            <a:schemeClr val="lt1"/>
+          </a:fontRef>
+        </p:style>
+        <p:txBody>
+          <a:bodyPr rtlCol="0" anchor="ctr"/>
+          <a:lstStyle/>
+          <a:p>
+            <a:pPr algn="ctr"/>
+            <a:endParaRPr lang="en-US"/>
+          </a:p>
+        </p:txBody>
+      </p:sp>
+      <p:sp>
+        <p:nvSpPr>
+          <p:cNvPr id="17" name="Rectangle 16">
+            <a:extLst>
+              <a:ext uri="{FF2B5EF4-FFF2-40B4-BE49-F238E27FC236}">
+                <a16:creationId xmlns:a16="http://schemas.microsoft.com/office/drawing/2014/main" id="{97D6064D-D646-5C4D-A1B4-E7BC689D2424}"/>
+              </a:ext>
+            </a:extLst>
+          </p:cNvPr>
+          <p:cNvSpPr/>
+          <p:nvPr/>
+        </p:nvSpPr>
+        <p:spPr>
+          <a:xfrm>
+            <a:off x="665722" y="3525474"/>
+            <a:ext cx="776526" cy="248518"/>
+          </a:xfrm>
+          <a:prstGeom prst="rect">
+            <a:avLst/>
+          </a:prstGeom>
+          <a:noFill/>
+        </p:spPr>
+        <p:style>
+          <a:lnRef idx="2">
+            <a:schemeClr val="accent1">
+              <a:shade val="50000"/>
+            </a:schemeClr>
+          </a:lnRef>
+          <a:fillRef idx="1">
+            <a:schemeClr val="accent1"/>
+          </a:fillRef>
+          <a:effectRef idx="0">
+            <a:schemeClr val="accent1"/>
+          </a:effectRef>
+          <a:fontRef idx="minor">
+            <a:schemeClr val="lt1"/>
+          </a:fontRef>
+        </p:style>
+        <p:txBody>
+          <a:bodyPr rtlCol="0" anchor="ctr"/>
+          <a:lstStyle/>
+          <a:p>
+            <a:pPr algn="ctr"/>
+            <a:endParaRPr lang="en-US"/>
+          </a:p>
+        </p:txBody>
+      </p:sp>
+      <p:sp>
+        <p:nvSpPr>
+          <p:cNvPr id="7" name="Rounded Rectangular Callout 6">
+            <a:extLst>
+              <a:ext uri="{FF2B5EF4-FFF2-40B4-BE49-F238E27FC236}">
+                <a16:creationId xmlns:a16="http://schemas.microsoft.com/office/drawing/2014/main" id="{C252FFA0-DB60-744B-8EA8-DAF917B3E148}"/>
+              </a:ext>
+            </a:extLst>
+          </p:cNvPr>
+          <p:cNvSpPr/>
+          <p:nvPr/>
+        </p:nvSpPr>
+        <p:spPr>
+          <a:xfrm>
+            <a:off x="5946546" y="1049291"/>
+            <a:ext cx="2660794" cy="301024"/>
+          </a:xfrm>
+          <a:prstGeom prst="wedgeRoundRectCallout">
+            <a:avLst>
+              <a:gd name="adj1" fmla="val -35501"/>
+              <a:gd name="adj2" fmla="val 150266"/>
+              <a:gd name="adj3" fmla="val 16667"/>
+            </a:avLst>
+          </a:prstGeom>
+        </p:spPr>
+        <p:style>
+          <a:lnRef idx="2">
+            <a:schemeClr val="dk1">
+              <a:shade val="50000"/>
+            </a:schemeClr>
+          </a:lnRef>
+          <a:fillRef idx="1">
+            <a:schemeClr val="dk1"/>
+          </a:fillRef>
+          <a:effectRef idx="0">
+            <a:schemeClr val="dk1"/>
+          </a:effectRef>
+          <a:fontRef idx="minor">
+            <a:schemeClr val="lt1"/>
+          </a:fontRef>
+        </p:style>
+        <p:txBody>
+          <a:bodyPr rtlCol="0" anchor="ctr"/>
+          <a:lstStyle/>
+          <a:p>
+            <a:r>
+              <a:rPr lang="en-US" sz="1400" dirty="0" err="1"/>
+              <a:t>llvm</a:t>
+            </a:r>
+            <a:r>
+              <a:rPr lang="en-US" sz="1400" dirty="0"/>
+              <a:t>::Value *L = LHS-&gt;</a:t>
+            </a:r>
+            <a:r>
+              <a:rPr lang="en-US" sz="1400" dirty="0" err="1"/>
+              <a:t>Codegen</a:t>
+            </a:r>
+            <a:r>
+              <a:rPr lang="en-US" sz="1400" dirty="0"/>
+              <a:t>();</a:t>
+            </a:r>
+          </a:p>
+        </p:txBody>
+      </p:sp>
+      <p:sp>
+        <p:nvSpPr>
+          <p:cNvPr id="18" name="Rounded Rectangular Callout 17">
+            <a:extLst>
+              <a:ext uri="{FF2B5EF4-FFF2-40B4-BE49-F238E27FC236}">
+                <a16:creationId xmlns:a16="http://schemas.microsoft.com/office/drawing/2014/main" id="{27B96BA9-6A9A-564B-9D81-94E63BBC9093}"/>
+              </a:ext>
+            </a:extLst>
+          </p:cNvPr>
+          <p:cNvSpPr/>
+          <p:nvPr/>
+        </p:nvSpPr>
+        <p:spPr>
+          <a:xfrm>
+            <a:off x="15315" y="4475776"/>
+            <a:ext cx="4140262" cy="455549"/>
+          </a:xfrm>
+          <a:prstGeom prst="wedgeRoundRectCallout">
+            <a:avLst>
+              <a:gd name="adj1" fmla="val 23173"/>
+              <a:gd name="adj2" fmla="val -112778"/>
+              <a:gd name="adj3" fmla="val 16667"/>
+            </a:avLst>
+          </a:prstGeom>
+        </p:spPr>
+        <p:style>
+          <a:lnRef idx="2">
+            <a:schemeClr val="dk1">
+              <a:shade val="50000"/>
+            </a:schemeClr>
+          </a:lnRef>
+          <a:fillRef idx="1">
+            <a:schemeClr val="dk1"/>
+          </a:fillRef>
+          <a:effectRef idx="0">
+            <a:schemeClr val="dk1"/>
+          </a:effectRef>
+          <a:fontRef idx="minor">
+            <a:schemeClr val="lt1"/>
+          </a:fontRef>
+        </p:style>
+        <p:txBody>
+          <a:bodyPr rtlCol="0" anchor="ctr"/>
+          <a:lstStyle/>
+          <a:p>
+            <a:r>
+              <a:rPr lang="en-US" sz="1400" dirty="0" err="1"/>
+              <a:t>llvm</a:t>
+            </a:r>
+            <a:r>
+              <a:rPr lang="en-US" sz="1400" dirty="0"/>
+              <a:t>::Value *</a:t>
+            </a:r>
+            <a:r>
+              <a:rPr lang="en-US" sz="1400" dirty="0" err="1"/>
+              <a:t>opval</a:t>
+            </a:r>
+            <a:r>
+              <a:rPr lang="en-US" sz="1400" dirty="0"/>
+              <a:t> = </a:t>
+            </a:r>
+            <a:r>
+              <a:rPr lang="en-US" sz="1400" dirty="0" err="1"/>
+              <a:t>Builder.CreateOr</a:t>
+            </a:r>
+            <a:r>
+              <a:rPr lang="en-US" sz="1400" dirty="0"/>
+              <a:t>(L, R, "</a:t>
+            </a:r>
+            <a:r>
+              <a:rPr lang="en-US" sz="1400" dirty="0" err="1"/>
+              <a:t>ortmp</a:t>
+            </a:r>
+            <a:r>
+              <a:rPr lang="en-US" sz="1400" dirty="0"/>
+              <a:t>");</a:t>
+            </a:r>
+          </a:p>
+          <a:p>
+            <a:r>
+              <a:rPr lang="en-US" sz="1400" dirty="0" err="1"/>
+              <a:t>llvm</a:t>
+            </a:r>
+            <a:r>
+              <a:rPr lang="en-US" sz="1400" dirty="0"/>
+              <a:t>::</a:t>
+            </a:r>
+            <a:r>
+              <a:rPr lang="en-US" sz="1400" dirty="0" err="1"/>
+              <a:t>BasicBlock</a:t>
+            </a:r>
+            <a:r>
+              <a:rPr lang="en-US" sz="1400" dirty="0"/>
+              <a:t> *</a:t>
+            </a:r>
+            <a:r>
+              <a:rPr lang="en-US" sz="1400" dirty="0" err="1"/>
+              <a:t>OpValBB</a:t>
+            </a:r>
+            <a:r>
+              <a:rPr lang="en-US" sz="1400" dirty="0"/>
+              <a:t> = </a:t>
+            </a:r>
+            <a:r>
+              <a:rPr lang="en-US" sz="1400" dirty="0" err="1"/>
+              <a:t>Builder.GetInsertBlock</a:t>
+            </a:r>
+            <a:r>
+              <a:rPr lang="en-US" sz="1400" dirty="0"/>
+              <a:t>();</a:t>
+            </a:r>
+          </a:p>
+        </p:txBody>
+      </p:sp>
+      <p:sp>
+        <p:nvSpPr>
+          <p:cNvPr id="19" name="Rounded Rectangular Callout 18">
+            <a:extLst>
+              <a:ext uri="{FF2B5EF4-FFF2-40B4-BE49-F238E27FC236}">
+                <a16:creationId xmlns:a16="http://schemas.microsoft.com/office/drawing/2014/main" id="{0C06B635-F1DD-934D-AB1D-B85002A65D51}"/>
+              </a:ext>
+            </a:extLst>
+          </p:cNvPr>
+          <p:cNvSpPr/>
+          <p:nvPr/>
+        </p:nvSpPr>
+        <p:spPr>
+          <a:xfrm>
+            <a:off x="5453804" y="2839202"/>
+            <a:ext cx="3510684" cy="810531"/>
+          </a:xfrm>
+          <a:prstGeom prst="wedgeRoundRectCallout">
+            <a:avLst>
+              <a:gd name="adj1" fmla="val 20102"/>
+              <a:gd name="adj2" fmla="val 106665"/>
+              <a:gd name="adj3" fmla="val 16667"/>
+            </a:avLst>
+          </a:prstGeom>
+        </p:spPr>
+        <p:style>
+          <a:lnRef idx="2">
+            <a:schemeClr val="dk1">
+              <a:shade val="50000"/>
+            </a:schemeClr>
+          </a:lnRef>
+          <a:fillRef idx="1">
+            <a:schemeClr val="dk1"/>
+          </a:fillRef>
+          <a:effectRef idx="0">
+            <a:schemeClr val="dk1"/>
+          </a:effectRef>
+          <a:fontRef idx="minor">
+            <a:schemeClr val="lt1"/>
+          </a:fontRef>
+        </p:style>
+        <p:txBody>
+          <a:bodyPr rtlCol="0" anchor="ctr"/>
+          <a:lstStyle/>
+          <a:p>
+            <a:r>
+              <a:rPr lang="en-US" sz="1200" dirty="0" err="1"/>
+              <a:t>llvm</a:t>
+            </a:r>
+            <a:r>
+              <a:rPr lang="en-US" sz="1200" dirty="0"/>
+              <a:t>::</a:t>
+            </a:r>
+            <a:r>
+              <a:rPr lang="en-US" sz="1200" dirty="0" err="1"/>
+              <a:t>PHINode</a:t>
+            </a:r>
+            <a:r>
+              <a:rPr lang="en-US" sz="1200" dirty="0"/>
+              <a:t> *</a:t>
+            </a:r>
+            <a:r>
+              <a:rPr lang="en-US" sz="1200" dirty="0" err="1"/>
+              <a:t>val</a:t>
+            </a:r>
+            <a:r>
+              <a:rPr lang="en-US" sz="1200" dirty="0"/>
+              <a:t> = </a:t>
+            </a:r>
+          </a:p>
+          <a:p>
+            <a:r>
+              <a:rPr lang="en-US" sz="1200" dirty="0"/>
+              <a:t>    </a:t>
+            </a:r>
+            <a:r>
+              <a:rPr lang="en-US" sz="1200" dirty="0" err="1"/>
+              <a:t>Builder.CreatePHI</a:t>
+            </a:r>
+            <a:r>
+              <a:rPr lang="en-US" sz="1200" dirty="0"/>
+              <a:t>(L-&gt;</a:t>
+            </a:r>
+            <a:r>
+              <a:rPr lang="en-US" sz="1200" dirty="0" err="1"/>
+              <a:t>getType</a:t>
+            </a:r>
+            <a:r>
+              <a:rPr lang="en-US" sz="1200" dirty="0"/>
+              <a:t>(), 2, "</a:t>
+            </a:r>
+            <a:r>
+              <a:rPr lang="en-US" sz="1200" dirty="0" err="1"/>
+              <a:t>phival</a:t>
+            </a:r>
+            <a:r>
+              <a:rPr lang="en-US" sz="1200" dirty="0"/>
+              <a:t>");</a:t>
+            </a:r>
+          </a:p>
+          <a:p>
+            <a:r>
+              <a:rPr lang="en-US" sz="1200" dirty="0" err="1"/>
+              <a:t>val</a:t>
+            </a:r>
+            <a:r>
+              <a:rPr lang="en-US" sz="1200" dirty="0"/>
+              <a:t>-&gt;</a:t>
+            </a:r>
+            <a:r>
+              <a:rPr lang="en-US" sz="1200" dirty="0" err="1"/>
+              <a:t>addIncoming</a:t>
+            </a:r>
+            <a:r>
+              <a:rPr lang="en-US" sz="1200" dirty="0"/>
+              <a:t>(L, </a:t>
+            </a:r>
+            <a:r>
+              <a:rPr lang="en-US" sz="1200" dirty="0" err="1"/>
+              <a:t>CurBB</a:t>
+            </a:r>
+            <a:r>
+              <a:rPr lang="en-US" sz="1200" dirty="0"/>
+              <a:t>); / * </a:t>
+            </a:r>
+            <a:r>
+              <a:rPr lang="en-US" sz="1200" dirty="0" err="1"/>
+              <a:t>func</a:t>
+            </a:r>
+            <a:r>
+              <a:rPr lang="en-US" sz="1200" dirty="0"/>
+              <a:t> */</a:t>
+            </a:r>
+          </a:p>
+          <a:p>
+            <a:r>
+              <a:rPr lang="en-US" sz="1200" dirty="0" err="1"/>
+              <a:t>val</a:t>
+            </a:r>
+            <a:r>
+              <a:rPr lang="en-US" sz="1200" dirty="0"/>
+              <a:t>-&gt;</a:t>
+            </a:r>
+            <a:r>
+              <a:rPr lang="en-US" sz="1200" dirty="0" err="1"/>
+              <a:t>addIncoming</a:t>
+            </a:r>
+            <a:r>
+              <a:rPr lang="en-US" sz="1200" dirty="0"/>
+              <a:t>(</a:t>
+            </a:r>
+            <a:r>
+              <a:rPr lang="en-US" sz="1200" dirty="0" err="1"/>
+              <a:t>opval</a:t>
+            </a:r>
+            <a:r>
+              <a:rPr lang="en-US" sz="1200" dirty="0"/>
+              <a:t>, </a:t>
+            </a:r>
+            <a:r>
+              <a:rPr lang="en-US" sz="1200" dirty="0" err="1"/>
+              <a:t>OpValBB</a:t>
+            </a:r>
+            <a:r>
+              <a:rPr lang="en-US" sz="1200" dirty="0"/>
+              <a:t>); / * </a:t>
+            </a:r>
+            <a:r>
+              <a:rPr lang="en-US" sz="1200" dirty="0" err="1"/>
+              <a:t>noskct</a:t>
+            </a:r>
+            <a:r>
+              <a:rPr lang="en-US" sz="1200" dirty="0"/>
+              <a:t> */</a:t>
+            </a:r>
+          </a:p>
+        </p:txBody>
+      </p:sp>
+      <p:sp>
+        <p:nvSpPr>
+          <p:cNvPr id="20" name="Rectangle 19">
+            <a:extLst>
+              <a:ext uri="{FF2B5EF4-FFF2-40B4-BE49-F238E27FC236}">
+                <a16:creationId xmlns:a16="http://schemas.microsoft.com/office/drawing/2014/main" id="{6E4223DD-B07D-F747-9223-A94711B9E453}"/>
+              </a:ext>
+            </a:extLst>
+          </p:cNvPr>
+          <p:cNvSpPr/>
+          <p:nvPr/>
+        </p:nvSpPr>
+        <p:spPr>
+          <a:xfrm>
+            <a:off x="2788891" y="125911"/>
+            <a:ext cx="6175597" cy="406814"/>
+          </a:xfrm>
+          <a:prstGeom prst="rect">
+            <a:avLst/>
+          </a:prstGeom>
+        </p:spPr>
+        <p:style>
+          <a:lnRef idx="2">
+            <a:schemeClr val="accent1">
+              <a:shade val="50000"/>
+            </a:schemeClr>
+          </a:lnRef>
+          <a:fillRef idx="1">
+            <a:schemeClr val="accent1"/>
+          </a:fillRef>
+          <a:effectRef idx="0">
+            <a:schemeClr val="accent1"/>
+          </a:effectRef>
+          <a:fontRef idx="minor">
+            <a:schemeClr val="lt1"/>
+          </a:fontRef>
+        </p:style>
+        <p:txBody>
+          <a:bodyPr rtlCol="0" anchor="ctr"/>
+          <a:lstStyle/>
+          <a:p>
+            <a:pPr algn="ctr"/>
+            <a:r>
+              <a:rPr lang="en-US" sz="1800" dirty="0"/>
+              <a:t>Q: Why is </a:t>
+            </a:r>
+            <a:r>
+              <a:rPr lang="en-US" sz="1800" dirty="0" err="1"/>
+              <a:t>CreatePHI</a:t>
+            </a:r>
+            <a:r>
+              <a:rPr lang="en-US" sz="1800" dirty="0"/>
+              <a:t> using </a:t>
+            </a:r>
+            <a:r>
+              <a:rPr lang="en-US" sz="1800" dirty="0" err="1"/>
+              <a:t>OpValBB</a:t>
+            </a:r>
+            <a:r>
+              <a:rPr lang="en-US" sz="1800" dirty="0"/>
+              <a:t> not </a:t>
+            </a:r>
+            <a:r>
+              <a:rPr lang="en-US" sz="1800" dirty="0" err="1"/>
+              <a:t>NoSkctBB</a:t>
+            </a:r>
+            <a:r>
+              <a:rPr lang="en-US" sz="1800" dirty="0"/>
+              <a:t> aka </a:t>
+            </a:r>
+            <a:r>
+              <a:rPr lang="en-US" sz="1800" dirty="0" err="1"/>
+              <a:t>nosckt</a:t>
+            </a:r>
+            <a:r>
+              <a:rPr lang="en-US" sz="1800" dirty="0"/>
+              <a:t>: ?</a:t>
+            </a:r>
+            <a:endParaRPr lang="en-US" sz="1800" dirty="0">
+              <a:latin typeface="Consolas" panose="020B0609020204030204" pitchFamily="49" charset="0"/>
+              <a:cs typeface="Consolas" panose="020B0609020204030204" pitchFamily="49" charset="0"/>
+            </a:endParaRPr>
           </a:p>
         </p:txBody>
       </p:sp>
     </p:spTree>
     <p:extLst>
       <p:ext uri="{BB962C8B-B14F-4D97-AF65-F5344CB8AC3E}">
-        <p14:creationId xmlns:p14="http://schemas.microsoft.com/office/powerpoint/2010/main" val="987568984"/>
+        <p14:creationId xmlns:p14="http://schemas.microsoft.com/office/powerpoint/2010/main" val="1858329582"/>
       </p:ext>
     </p:extLst>
   </p:cSld>
@@ -12004,7 +13625,142 @@
                                           </p:stCondLst>
                                         </p:cTn>
                                         <p:tgtEl>
-                                          <p:spTgt spid="5"/>
+                                          <p:spTgt spid="7"/>
+                                        </p:tgtEl>
+                                        <p:attrNameLst>
+                                          <p:attrName>style.visibility</p:attrName>
+                                        </p:attrNameLst>
+                                      </p:cBhvr>
+                                      <p:to>
+                                        <p:strVal val="visible"/>
+                                      </p:to>
+                                    </p:set>
+                                  </p:childTnLst>
+                                </p:cTn>
+                              </p:par>
+                            </p:childTnLst>
+                          </p:cTn>
+                        </p:par>
+                      </p:childTnLst>
+                    </p:cTn>
+                  </p:par>
+                  <p:par>
+                    <p:cTn id="7" fill="hold">
+                      <p:stCondLst>
+                        <p:cond delay="indefinite"/>
+                      </p:stCondLst>
+                      <p:childTnLst>
+                        <p:par>
+                          <p:cTn id="8" fill="hold">
+                            <p:stCondLst>
+                              <p:cond delay="0"/>
+                            </p:stCondLst>
+                            <p:childTnLst>
+                              <p:par>
+                                <p:cTn id="9" presetID="1" presetClass="entr" presetSubtype="0" fill="hold" grpId="0" nodeType="clickEffect">
+                                  <p:stCondLst>
+                                    <p:cond delay="0"/>
+                                  </p:stCondLst>
+                                  <p:childTnLst>
+                                    <p:set>
+                                      <p:cBhvr>
+                                        <p:cTn id="10" dur="1" fill="hold">
+                                          <p:stCondLst>
+                                            <p:cond delay="0"/>
+                                          </p:stCondLst>
+                                        </p:cTn>
+                                        <p:tgtEl>
+                                          <p:spTgt spid="18"/>
+                                        </p:tgtEl>
+                                        <p:attrNameLst>
+                                          <p:attrName>style.visibility</p:attrName>
+                                        </p:attrNameLst>
+                                      </p:cBhvr>
+                                      <p:to>
+                                        <p:strVal val="visible"/>
+                                      </p:to>
+                                    </p:set>
+                                  </p:childTnLst>
+                                </p:cTn>
+                              </p:par>
+                            </p:childTnLst>
+                          </p:cTn>
+                        </p:par>
+                      </p:childTnLst>
+                    </p:cTn>
+                  </p:par>
+                  <p:par>
+                    <p:cTn id="11" fill="hold">
+                      <p:stCondLst>
+                        <p:cond delay="indefinite"/>
+                      </p:stCondLst>
+                      <p:childTnLst>
+                        <p:par>
+                          <p:cTn id="12" fill="hold">
+                            <p:stCondLst>
+                              <p:cond delay="0"/>
+                            </p:stCondLst>
+                            <p:childTnLst>
+                              <p:par>
+                                <p:cTn id="13" presetID="1" presetClass="entr" presetSubtype="0" fill="hold" grpId="0" nodeType="clickEffect">
+                                  <p:stCondLst>
+                                    <p:cond delay="0"/>
+                                  </p:stCondLst>
+                                  <p:childTnLst>
+                                    <p:set>
+                                      <p:cBhvr>
+                                        <p:cTn id="14" dur="1" fill="hold">
+                                          <p:stCondLst>
+                                            <p:cond delay="0"/>
+                                          </p:stCondLst>
+                                        </p:cTn>
+                                        <p:tgtEl>
+                                          <p:spTgt spid="19"/>
+                                        </p:tgtEl>
+                                        <p:attrNameLst>
+                                          <p:attrName>style.visibility</p:attrName>
+                                        </p:attrNameLst>
+                                      </p:cBhvr>
+                                      <p:to>
+                                        <p:strVal val="visible"/>
+                                      </p:to>
+                                    </p:set>
+                                  </p:childTnLst>
+                                </p:cTn>
+                              </p:par>
+                            </p:childTnLst>
+                          </p:cTn>
+                        </p:par>
+                      </p:childTnLst>
+                    </p:cTn>
+                  </p:par>
+                  <p:par>
+                    <p:cTn id="15" fill="hold">
+                      <p:stCondLst>
+                        <p:cond delay="indefinite"/>
+                      </p:stCondLst>
+                      <p:childTnLst>
+                        <p:par>
+                          <p:cTn id="16" fill="hold">
+                            <p:stCondLst>
+                              <p:cond delay="0"/>
+                            </p:stCondLst>
+                            <p:childTnLst>
+                              <p:par>
+                                <p:cTn id="17" presetID="1" presetClass="entr" presetSubtype="0" fill="hold" grpId="0" nodeType="clickEffect">
+                                  <p:stCondLst>
+                                    <p:cond delay="0"/>
+                                  </p:stCondLst>
+                                  <p:childTnLst>
+                                    <p:set>
+                                      <p:cBhvr>
+                                        <p:cTn id="18" dur="1" fill="hold">
+                                          <p:stCondLst>
+                                            <p:cond delay="0"/>
+                                          </p:stCondLst>
+                                        </p:cTn>
+                                        <p:tgtEl>
+                                          <p:spTgt spid="20"/>
                                         </p:tgtEl>
                                         <p:attrNameLst>
                                           <p:attrName>style.visibility</p:attrName>
@@ -12045,7 +13801,10 @@
       </p:par>
     </p:tnLst>
     <p:bldLst>
-      <p:bldP spid="5" grpId="0" animBg="1"/>
+      <p:bldP spid="7" grpId="0" animBg="1"/>
+      <p:bldP spid="18" grpId="0" animBg="1"/>
+      <p:bldP spid="19" grpId="0" animBg="1"/>
+      <p:bldP spid="20" grpId="0" animBg="1"/>
     </p:bldLst>
   </p:timing>
 </p:sld>

</xml_diff>